<commit_message>
Plots finalized and presentation mostly done
</commit_message>
<xml_diff>
--- a/NLP_presentation.pptx
+++ b/NLP_presentation.pptx
@@ -4,11 +4,27 @@
   <p:sldMasterIdLst>
     <p:sldMasterId id="2147483648" r:id="rId1"/>
   </p:sldMasterIdLst>
+  <p:notesMasterIdLst>
+    <p:notesMasterId r:id="rId19"/>
+  </p:notesMasterIdLst>
   <p:sldIdLst>
     <p:sldId id="256" r:id="rId2"/>
     <p:sldId id="257" r:id="rId3"/>
     <p:sldId id="258" r:id="rId4"/>
     <p:sldId id="259" r:id="rId5"/>
+    <p:sldId id="260" r:id="rId6"/>
+    <p:sldId id="264" r:id="rId7"/>
+    <p:sldId id="265" r:id="rId8"/>
+    <p:sldId id="266" r:id="rId9"/>
+    <p:sldId id="267" r:id="rId10"/>
+    <p:sldId id="268" r:id="rId11"/>
+    <p:sldId id="261" r:id="rId12"/>
+    <p:sldId id="262" r:id="rId13"/>
+    <p:sldId id="263" r:id="rId14"/>
+    <p:sldId id="269" r:id="rId15"/>
+    <p:sldId id="270" r:id="rId16"/>
+    <p:sldId id="272" r:id="rId17"/>
+    <p:sldId id="271" r:id="rId18"/>
   </p:sldIdLst>
   <p:sldSz cx="12192000" cy="6858000"/>
   <p:notesSz cx="6858000" cy="9144000"/>
@@ -107,7 +123,1858 @@
       </a:defRPr>
     </a:lvl9pPr>
   </p:defaultTextStyle>
+  <p:extLst>
+    <p:ext uri="{EFAFB233-063F-42B5-8137-9DF3F51BA10A}">
+      <p15:sldGuideLst xmlns:p15="http://schemas.microsoft.com/office/powerpoint/2012/main"/>
+    </p:ext>
+  </p:extLst>
 </p:presentation>
+</file>
+
+<file path=ppt/notesMasters/notesMaster1.xml><?xml version="1.0" encoding="utf-8"?>
+<p:notesMaster xmlns:a="http://schemas.openxmlformats.org/drawingml/2006/main" xmlns:r="http://schemas.openxmlformats.org/officeDocument/2006/relationships" xmlns:p="http://schemas.openxmlformats.org/presentationml/2006/main">
+  <p:cSld>
+    <p:bg>
+      <p:bgRef idx="1001">
+        <a:schemeClr val="bg1"/>
+      </p:bgRef>
+    </p:bg>
+    <p:spTree>
+      <p:nvGrpSpPr>
+        <p:cNvPr id="1" name=""/>
+        <p:cNvGrpSpPr/>
+        <p:nvPr/>
+      </p:nvGrpSpPr>
+      <p:grpSpPr>
+        <a:xfrm>
+          <a:off x="0" y="0"/>
+          <a:ext cx="0" cy="0"/>
+          <a:chOff x="0" y="0"/>
+          <a:chExt cx="0" cy="0"/>
+        </a:xfrm>
+      </p:grpSpPr>
+      <p:sp>
+        <p:nvSpPr>
+          <p:cNvPr id="2" name="Header Placeholder 1"/>
+          <p:cNvSpPr>
+            <a:spLocks noGrp="1"/>
+          </p:cNvSpPr>
+          <p:nvPr>
+            <p:ph type="hdr" sz="quarter"/>
+          </p:nvPr>
+        </p:nvSpPr>
+        <p:spPr>
+          <a:xfrm>
+            <a:off x="0" y="0"/>
+            <a:ext cx="2971800" cy="458788"/>
+          </a:xfrm>
+          <a:prstGeom prst="rect">
+            <a:avLst/>
+          </a:prstGeom>
+        </p:spPr>
+        <p:txBody>
+          <a:bodyPr vert="horz" lIns="91440" tIns="45720" rIns="91440" bIns="45720" rtlCol="0"/>
+          <a:lstStyle>
+            <a:lvl1pPr algn="l">
+              <a:defRPr sz="1200"/>
+            </a:lvl1pPr>
+          </a:lstStyle>
+          <a:p>
+            <a:endParaRPr lang="en-US"/>
+          </a:p>
+        </p:txBody>
+      </p:sp>
+      <p:sp>
+        <p:nvSpPr>
+          <p:cNvPr id="3" name="Date Placeholder 2"/>
+          <p:cNvSpPr>
+            <a:spLocks noGrp="1"/>
+          </p:cNvSpPr>
+          <p:nvPr>
+            <p:ph type="dt" idx="1"/>
+          </p:nvPr>
+        </p:nvSpPr>
+        <p:spPr>
+          <a:xfrm>
+            <a:off x="3884613" y="0"/>
+            <a:ext cx="2971800" cy="458788"/>
+          </a:xfrm>
+          <a:prstGeom prst="rect">
+            <a:avLst/>
+          </a:prstGeom>
+        </p:spPr>
+        <p:txBody>
+          <a:bodyPr vert="horz" lIns="91440" tIns="45720" rIns="91440" bIns="45720" rtlCol="0"/>
+          <a:lstStyle>
+            <a:lvl1pPr algn="r">
+              <a:defRPr sz="1200"/>
+            </a:lvl1pPr>
+          </a:lstStyle>
+          <a:p>
+            <a:fld id="{8F35A468-736C-4859-9661-77158CF12608}" type="datetimeFigureOut">
+              <a:rPr lang="en-US" smtClean="0"/>
+              <a:t>11/27/2019</a:t>
+            </a:fld>
+            <a:endParaRPr lang="en-US"/>
+          </a:p>
+        </p:txBody>
+      </p:sp>
+      <p:sp>
+        <p:nvSpPr>
+          <p:cNvPr id="4" name="Slide Image Placeholder 3"/>
+          <p:cNvSpPr>
+            <a:spLocks noGrp="1" noRot="1" noChangeAspect="1"/>
+          </p:cNvSpPr>
+          <p:nvPr>
+            <p:ph type="sldImg" idx="2"/>
+          </p:nvPr>
+        </p:nvSpPr>
+        <p:spPr>
+          <a:xfrm>
+            <a:off x="685800" y="1143000"/>
+            <a:ext cx="5486400" cy="3086100"/>
+          </a:xfrm>
+          <a:prstGeom prst="rect">
+            <a:avLst/>
+          </a:prstGeom>
+          <a:noFill/>
+          <a:ln w="12700">
+            <a:solidFill>
+              <a:prstClr val="black"/>
+            </a:solidFill>
+          </a:ln>
+        </p:spPr>
+        <p:txBody>
+          <a:bodyPr vert="horz" lIns="91440" tIns="45720" rIns="91440" bIns="45720" rtlCol="0" anchor="ctr"/>
+          <a:lstStyle/>
+          <a:p>
+            <a:endParaRPr lang="en-US"/>
+          </a:p>
+        </p:txBody>
+      </p:sp>
+      <p:sp>
+        <p:nvSpPr>
+          <p:cNvPr id="5" name="Notes Placeholder 4"/>
+          <p:cNvSpPr>
+            <a:spLocks noGrp="1"/>
+          </p:cNvSpPr>
+          <p:nvPr>
+            <p:ph type="body" sz="quarter" idx="3"/>
+          </p:nvPr>
+        </p:nvSpPr>
+        <p:spPr>
+          <a:xfrm>
+            <a:off x="685800" y="4400550"/>
+            <a:ext cx="5486400" cy="3600450"/>
+          </a:xfrm>
+          <a:prstGeom prst="rect">
+            <a:avLst/>
+          </a:prstGeom>
+        </p:spPr>
+        <p:txBody>
+          <a:bodyPr vert="horz" lIns="91440" tIns="45720" rIns="91440" bIns="45720" rtlCol="0"/>
+          <a:lstStyle/>
+          <a:p>
+            <a:pPr lvl="0"/>
+            <a:r>
+              <a:rPr lang="en-US" smtClean="0"/>
+              <a:t>Edit Master text styles</a:t>
+            </a:r>
+          </a:p>
+          <a:p>
+            <a:pPr lvl="1"/>
+            <a:r>
+              <a:rPr lang="en-US" smtClean="0"/>
+              <a:t>Second level</a:t>
+            </a:r>
+          </a:p>
+          <a:p>
+            <a:pPr lvl="2"/>
+            <a:r>
+              <a:rPr lang="en-US" smtClean="0"/>
+              <a:t>Third level</a:t>
+            </a:r>
+          </a:p>
+          <a:p>
+            <a:pPr lvl="3"/>
+            <a:r>
+              <a:rPr lang="en-US" smtClean="0"/>
+              <a:t>Fourth level</a:t>
+            </a:r>
+          </a:p>
+          <a:p>
+            <a:pPr lvl="4"/>
+            <a:r>
+              <a:rPr lang="en-US" smtClean="0"/>
+              <a:t>Fifth level</a:t>
+            </a:r>
+            <a:endParaRPr lang="en-US"/>
+          </a:p>
+        </p:txBody>
+      </p:sp>
+      <p:sp>
+        <p:nvSpPr>
+          <p:cNvPr id="6" name="Footer Placeholder 5"/>
+          <p:cNvSpPr>
+            <a:spLocks noGrp="1"/>
+          </p:cNvSpPr>
+          <p:nvPr>
+            <p:ph type="ftr" sz="quarter" idx="4"/>
+          </p:nvPr>
+        </p:nvSpPr>
+        <p:spPr>
+          <a:xfrm>
+            <a:off x="0" y="8685213"/>
+            <a:ext cx="2971800" cy="458787"/>
+          </a:xfrm>
+          <a:prstGeom prst="rect">
+            <a:avLst/>
+          </a:prstGeom>
+        </p:spPr>
+        <p:txBody>
+          <a:bodyPr vert="horz" lIns="91440" tIns="45720" rIns="91440" bIns="45720" rtlCol="0" anchor="b"/>
+          <a:lstStyle>
+            <a:lvl1pPr algn="l">
+              <a:defRPr sz="1200"/>
+            </a:lvl1pPr>
+          </a:lstStyle>
+          <a:p>
+            <a:endParaRPr lang="en-US"/>
+          </a:p>
+        </p:txBody>
+      </p:sp>
+      <p:sp>
+        <p:nvSpPr>
+          <p:cNvPr id="7" name="Slide Number Placeholder 6"/>
+          <p:cNvSpPr>
+            <a:spLocks noGrp="1"/>
+          </p:cNvSpPr>
+          <p:nvPr>
+            <p:ph type="sldNum" sz="quarter" idx="5"/>
+          </p:nvPr>
+        </p:nvSpPr>
+        <p:spPr>
+          <a:xfrm>
+            <a:off x="3884613" y="8685213"/>
+            <a:ext cx="2971800" cy="458787"/>
+          </a:xfrm>
+          <a:prstGeom prst="rect">
+            <a:avLst/>
+          </a:prstGeom>
+        </p:spPr>
+        <p:txBody>
+          <a:bodyPr vert="horz" lIns="91440" tIns="45720" rIns="91440" bIns="45720" rtlCol="0" anchor="b"/>
+          <a:lstStyle>
+            <a:lvl1pPr algn="r">
+              <a:defRPr sz="1200"/>
+            </a:lvl1pPr>
+          </a:lstStyle>
+          <a:p>
+            <a:fld id="{FF5CDC9F-0281-447B-80BB-A2BA7CFD35CB}" type="slidenum">
+              <a:rPr lang="en-US" smtClean="0"/>
+              <a:t>‹#›</a:t>
+            </a:fld>
+            <a:endParaRPr lang="en-US"/>
+          </a:p>
+        </p:txBody>
+      </p:sp>
+    </p:spTree>
+    <p:extLst>
+      <p:ext uri="{BB962C8B-B14F-4D97-AF65-F5344CB8AC3E}">
+        <p14:creationId xmlns:p14="http://schemas.microsoft.com/office/powerpoint/2010/main" val="219121688"/>
+      </p:ext>
+    </p:extLst>
+  </p:cSld>
+  <p:clrMap bg1="lt1" tx1="dk1" bg2="lt2" tx2="dk2" accent1="accent1" accent2="accent2" accent3="accent3" accent4="accent4" accent5="accent5" accent6="accent6" hlink="hlink" folHlink="folHlink"/>
+  <p:notesStyle>
+    <a:lvl1pPr marL="0" algn="l" defTabSz="914400" rtl="0" eaLnBrk="1" latinLnBrk="0" hangingPunct="1">
+      <a:defRPr sz="1200" kern="1200">
+        <a:solidFill>
+          <a:schemeClr val="tx1"/>
+        </a:solidFill>
+        <a:latin typeface="+mn-lt"/>
+        <a:ea typeface="+mn-ea"/>
+        <a:cs typeface="+mn-cs"/>
+      </a:defRPr>
+    </a:lvl1pPr>
+    <a:lvl2pPr marL="457200" algn="l" defTabSz="914400" rtl="0" eaLnBrk="1" latinLnBrk="0" hangingPunct="1">
+      <a:defRPr sz="1200" kern="1200">
+        <a:solidFill>
+          <a:schemeClr val="tx1"/>
+        </a:solidFill>
+        <a:latin typeface="+mn-lt"/>
+        <a:ea typeface="+mn-ea"/>
+        <a:cs typeface="+mn-cs"/>
+      </a:defRPr>
+    </a:lvl2pPr>
+    <a:lvl3pPr marL="914400" algn="l" defTabSz="914400" rtl="0" eaLnBrk="1" latinLnBrk="0" hangingPunct="1">
+      <a:defRPr sz="1200" kern="1200">
+        <a:solidFill>
+          <a:schemeClr val="tx1"/>
+        </a:solidFill>
+        <a:latin typeface="+mn-lt"/>
+        <a:ea typeface="+mn-ea"/>
+        <a:cs typeface="+mn-cs"/>
+      </a:defRPr>
+    </a:lvl3pPr>
+    <a:lvl4pPr marL="1371600" algn="l" defTabSz="914400" rtl="0" eaLnBrk="1" latinLnBrk="0" hangingPunct="1">
+      <a:defRPr sz="1200" kern="1200">
+        <a:solidFill>
+          <a:schemeClr val="tx1"/>
+        </a:solidFill>
+        <a:latin typeface="+mn-lt"/>
+        <a:ea typeface="+mn-ea"/>
+        <a:cs typeface="+mn-cs"/>
+      </a:defRPr>
+    </a:lvl4pPr>
+    <a:lvl5pPr marL="1828800" algn="l" defTabSz="914400" rtl="0" eaLnBrk="1" latinLnBrk="0" hangingPunct="1">
+      <a:defRPr sz="1200" kern="1200">
+        <a:solidFill>
+          <a:schemeClr val="tx1"/>
+        </a:solidFill>
+        <a:latin typeface="+mn-lt"/>
+        <a:ea typeface="+mn-ea"/>
+        <a:cs typeface="+mn-cs"/>
+      </a:defRPr>
+    </a:lvl5pPr>
+    <a:lvl6pPr marL="2286000" algn="l" defTabSz="914400" rtl="0" eaLnBrk="1" latinLnBrk="0" hangingPunct="1">
+      <a:defRPr sz="1200" kern="1200">
+        <a:solidFill>
+          <a:schemeClr val="tx1"/>
+        </a:solidFill>
+        <a:latin typeface="+mn-lt"/>
+        <a:ea typeface="+mn-ea"/>
+        <a:cs typeface="+mn-cs"/>
+      </a:defRPr>
+    </a:lvl6pPr>
+    <a:lvl7pPr marL="2743200" algn="l" defTabSz="914400" rtl="0" eaLnBrk="1" latinLnBrk="0" hangingPunct="1">
+      <a:defRPr sz="1200" kern="1200">
+        <a:solidFill>
+          <a:schemeClr val="tx1"/>
+        </a:solidFill>
+        <a:latin typeface="+mn-lt"/>
+        <a:ea typeface="+mn-ea"/>
+        <a:cs typeface="+mn-cs"/>
+      </a:defRPr>
+    </a:lvl7pPr>
+    <a:lvl8pPr marL="3200400" algn="l" defTabSz="914400" rtl="0" eaLnBrk="1" latinLnBrk="0" hangingPunct="1">
+      <a:defRPr sz="1200" kern="1200">
+        <a:solidFill>
+          <a:schemeClr val="tx1"/>
+        </a:solidFill>
+        <a:latin typeface="+mn-lt"/>
+        <a:ea typeface="+mn-ea"/>
+        <a:cs typeface="+mn-cs"/>
+      </a:defRPr>
+    </a:lvl8pPr>
+    <a:lvl9pPr marL="3657600" algn="l" defTabSz="914400" rtl="0" eaLnBrk="1" latinLnBrk="0" hangingPunct="1">
+      <a:defRPr sz="1200" kern="1200">
+        <a:solidFill>
+          <a:schemeClr val="tx1"/>
+        </a:solidFill>
+        <a:latin typeface="+mn-lt"/>
+        <a:ea typeface="+mn-ea"/>
+        <a:cs typeface="+mn-cs"/>
+      </a:defRPr>
+    </a:lvl9pPr>
+  </p:notesStyle>
+</p:notesMaster>
+</file>
+
+<file path=ppt/notesSlides/notesSlide1.xml><?xml version="1.0" encoding="utf-8"?>
+<p:notes xmlns:a="http://schemas.openxmlformats.org/drawingml/2006/main" xmlns:r="http://schemas.openxmlformats.org/officeDocument/2006/relationships" xmlns:p="http://schemas.openxmlformats.org/presentationml/2006/main">
+  <p:cSld>
+    <p:spTree>
+      <p:nvGrpSpPr>
+        <p:cNvPr id="1" name=""/>
+        <p:cNvGrpSpPr/>
+        <p:nvPr/>
+      </p:nvGrpSpPr>
+      <p:grpSpPr>
+        <a:xfrm>
+          <a:off x="0" y="0"/>
+          <a:ext cx="0" cy="0"/>
+          <a:chOff x="0" y="0"/>
+          <a:chExt cx="0" cy="0"/>
+        </a:xfrm>
+      </p:grpSpPr>
+      <p:sp>
+        <p:nvSpPr>
+          <p:cNvPr id="2" name="Slide Image Placeholder 1"/>
+          <p:cNvSpPr>
+            <a:spLocks noGrp="1" noRot="1" noChangeAspect="1"/>
+          </p:cNvSpPr>
+          <p:nvPr>
+            <p:ph type="sldImg"/>
+          </p:nvPr>
+        </p:nvSpPr>
+        <p:spPr/>
+      </p:sp>
+      <p:sp>
+        <p:nvSpPr>
+          <p:cNvPr id="3" name="Notes Placeholder 2"/>
+          <p:cNvSpPr>
+            <a:spLocks noGrp="1"/>
+          </p:cNvSpPr>
+          <p:nvPr>
+            <p:ph type="body" idx="1"/>
+          </p:nvPr>
+        </p:nvSpPr>
+        <p:spPr/>
+        <p:txBody>
+          <a:bodyPr/>
+          <a:lstStyle/>
+          <a:p>
+            <a:r>
+              <a:rPr lang="en-US" dirty="0" smtClean="0"/>
+              <a:t>Jacob</a:t>
+            </a:r>
+            <a:endParaRPr lang="en-US" dirty="0"/>
+          </a:p>
+        </p:txBody>
+      </p:sp>
+      <p:sp>
+        <p:nvSpPr>
+          <p:cNvPr id="4" name="Slide Number Placeholder 3"/>
+          <p:cNvSpPr>
+            <a:spLocks noGrp="1"/>
+          </p:cNvSpPr>
+          <p:nvPr>
+            <p:ph type="sldNum" sz="quarter" idx="10"/>
+          </p:nvPr>
+        </p:nvSpPr>
+        <p:spPr/>
+        <p:txBody>
+          <a:bodyPr/>
+          <a:lstStyle/>
+          <a:p>
+            <a:fld id="{FF5CDC9F-0281-447B-80BB-A2BA7CFD35CB}" type="slidenum">
+              <a:rPr lang="en-US" smtClean="0"/>
+              <a:t>1</a:t>
+            </a:fld>
+            <a:endParaRPr lang="en-US"/>
+          </a:p>
+        </p:txBody>
+      </p:sp>
+    </p:spTree>
+    <p:extLst>
+      <p:ext uri="{BB962C8B-B14F-4D97-AF65-F5344CB8AC3E}">
+        <p14:creationId xmlns:p14="http://schemas.microsoft.com/office/powerpoint/2010/main" val="1390815864"/>
+      </p:ext>
+    </p:extLst>
+  </p:cSld>
+  <p:clrMapOvr>
+    <a:masterClrMapping/>
+  </p:clrMapOvr>
+</p:notes>
+</file>
+
+<file path=ppt/notesSlides/notesSlide10.xml><?xml version="1.0" encoding="utf-8"?>
+<p:notes xmlns:a="http://schemas.openxmlformats.org/drawingml/2006/main" xmlns:r="http://schemas.openxmlformats.org/officeDocument/2006/relationships" xmlns:p="http://schemas.openxmlformats.org/presentationml/2006/main">
+  <p:cSld>
+    <p:spTree>
+      <p:nvGrpSpPr>
+        <p:cNvPr id="1" name=""/>
+        <p:cNvGrpSpPr/>
+        <p:nvPr/>
+      </p:nvGrpSpPr>
+      <p:grpSpPr>
+        <a:xfrm>
+          <a:off x="0" y="0"/>
+          <a:ext cx="0" cy="0"/>
+          <a:chOff x="0" y="0"/>
+          <a:chExt cx="0" cy="0"/>
+        </a:xfrm>
+      </p:grpSpPr>
+      <p:sp>
+        <p:nvSpPr>
+          <p:cNvPr id="2" name="Slide Image Placeholder 1"/>
+          <p:cNvSpPr>
+            <a:spLocks noGrp="1" noRot="1" noChangeAspect="1"/>
+          </p:cNvSpPr>
+          <p:nvPr>
+            <p:ph type="sldImg"/>
+          </p:nvPr>
+        </p:nvSpPr>
+        <p:spPr/>
+      </p:sp>
+      <p:sp>
+        <p:nvSpPr>
+          <p:cNvPr id="3" name="Notes Placeholder 2"/>
+          <p:cNvSpPr>
+            <a:spLocks noGrp="1"/>
+          </p:cNvSpPr>
+          <p:nvPr>
+            <p:ph type="body" idx="1"/>
+          </p:nvPr>
+        </p:nvSpPr>
+        <p:spPr/>
+        <p:txBody>
+          <a:bodyPr/>
+          <a:lstStyle/>
+          <a:p>
+            <a:r>
+              <a:rPr lang="en-US" dirty="0" smtClean="0"/>
+              <a:t>Jacob</a:t>
+            </a:r>
+            <a:endParaRPr lang="en-US" dirty="0"/>
+          </a:p>
+        </p:txBody>
+      </p:sp>
+      <p:sp>
+        <p:nvSpPr>
+          <p:cNvPr id="4" name="Slide Number Placeholder 3"/>
+          <p:cNvSpPr>
+            <a:spLocks noGrp="1"/>
+          </p:cNvSpPr>
+          <p:nvPr>
+            <p:ph type="sldNum" sz="quarter" idx="10"/>
+          </p:nvPr>
+        </p:nvSpPr>
+        <p:spPr/>
+        <p:txBody>
+          <a:bodyPr/>
+          <a:lstStyle/>
+          <a:p>
+            <a:fld id="{FF5CDC9F-0281-447B-80BB-A2BA7CFD35CB}" type="slidenum">
+              <a:rPr lang="en-US" smtClean="0"/>
+              <a:t>10</a:t>
+            </a:fld>
+            <a:endParaRPr lang="en-US"/>
+          </a:p>
+        </p:txBody>
+      </p:sp>
+    </p:spTree>
+    <p:extLst>
+      <p:ext uri="{BB962C8B-B14F-4D97-AF65-F5344CB8AC3E}">
+        <p14:creationId xmlns:p14="http://schemas.microsoft.com/office/powerpoint/2010/main" val="1917533121"/>
+      </p:ext>
+    </p:extLst>
+  </p:cSld>
+  <p:clrMapOvr>
+    <a:masterClrMapping/>
+  </p:clrMapOvr>
+</p:notes>
+</file>
+
+<file path=ppt/notesSlides/notesSlide11.xml><?xml version="1.0" encoding="utf-8"?>
+<p:notes xmlns:a="http://schemas.openxmlformats.org/drawingml/2006/main" xmlns:r="http://schemas.openxmlformats.org/officeDocument/2006/relationships" xmlns:p="http://schemas.openxmlformats.org/presentationml/2006/main">
+  <p:cSld>
+    <p:spTree>
+      <p:nvGrpSpPr>
+        <p:cNvPr id="1" name=""/>
+        <p:cNvGrpSpPr/>
+        <p:nvPr/>
+      </p:nvGrpSpPr>
+      <p:grpSpPr>
+        <a:xfrm>
+          <a:off x="0" y="0"/>
+          <a:ext cx="0" cy="0"/>
+          <a:chOff x="0" y="0"/>
+          <a:chExt cx="0" cy="0"/>
+        </a:xfrm>
+      </p:grpSpPr>
+      <p:sp>
+        <p:nvSpPr>
+          <p:cNvPr id="2" name="Slide Image Placeholder 1"/>
+          <p:cNvSpPr>
+            <a:spLocks noGrp="1" noRot="1" noChangeAspect="1"/>
+          </p:cNvSpPr>
+          <p:nvPr>
+            <p:ph type="sldImg"/>
+          </p:nvPr>
+        </p:nvSpPr>
+        <p:spPr/>
+      </p:sp>
+      <p:sp>
+        <p:nvSpPr>
+          <p:cNvPr id="3" name="Notes Placeholder 2"/>
+          <p:cNvSpPr>
+            <a:spLocks noGrp="1"/>
+          </p:cNvSpPr>
+          <p:nvPr>
+            <p:ph type="body" idx="1"/>
+          </p:nvPr>
+        </p:nvSpPr>
+        <p:spPr/>
+        <p:txBody>
+          <a:bodyPr/>
+          <a:lstStyle/>
+          <a:p>
+            <a:r>
+              <a:rPr lang="en-US" dirty="0" smtClean="0"/>
+              <a:t>Hannah</a:t>
+            </a:r>
+            <a:endParaRPr lang="en-US" dirty="0"/>
+          </a:p>
+        </p:txBody>
+      </p:sp>
+      <p:sp>
+        <p:nvSpPr>
+          <p:cNvPr id="4" name="Slide Number Placeholder 3"/>
+          <p:cNvSpPr>
+            <a:spLocks noGrp="1"/>
+          </p:cNvSpPr>
+          <p:nvPr>
+            <p:ph type="sldNum" sz="quarter" idx="10"/>
+          </p:nvPr>
+        </p:nvSpPr>
+        <p:spPr/>
+        <p:txBody>
+          <a:bodyPr/>
+          <a:lstStyle/>
+          <a:p>
+            <a:fld id="{FF5CDC9F-0281-447B-80BB-A2BA7CFD35CB}" type="slidenum">
+              <a:rPr lang="en-US" smtClean="0"/>
+              <a:t>11</a:t>
+            </a:fld>
+            <a:endParaRPr lang="en-US"/>
+          </a:p>
+        </p:txBody>
+      </p:sp>
+    </p:spTree>
+    <p:extLst>
+      <p:ext uri="{BB962C8B-B14F-4D97-AF65-F5344CB8AC3E}">
+        <p14:creationId xmlns:p14="http://schemas.microsoft.com/office/powerpoint/2010/main" val="1173625869"/>
+      </p:ext>
+    </p:extLst>
+  </p:cSld>
+  <p:clrMapOvr>
+    <a:masterClrMapping/>
+  </p:clrMapOvr>
+</p:notes>
+</file>
+
+<file path=ppt/notesSlides/notesSlide12.xml><?xml version="1.0" encoding="utf-8"?>
+<p:notes xmlns:a="http://schemas.openxmlformats.org/drawingml/2006/main" xmlns:r="http://schemas.openxmlformats.org/officeDocument/2006/relationships" xmlns:p="http://schemas.openxmlformats.org/presentationml/2006/main">
+  <p:cSld>
+    <p:spTree>
+      <p:nvGrpSpPr>
+        <p:cNvPr id="1" name=""/>
+        <p:cNvGrpSpPr/>
+        <p:nvPr/>
+      </p:nvGrpSpPr>
+      <p:grpSpPr>
+        <a:xfrm>
+          <a:off x="0" y="0"/>
+          <a:ext cx="0" cy="0"/>
+          <a:chOff x="0" y="0"/>
+          <a:chExt cx="0" cy="0"/>
+        </a:xfrm>
+      </p:grpSpPr>
+      <p:sp>
+        <p:nvSpPr>
+          <p:cNvPr id="2" name="Slide Image Placeholder 1"/>
+          <p:cNvSpPr>
+            <a:spLocks noGrp="1" noRot="1" noChangeAspect="1"/>
+          </p:cNvSpPr>
+          <p:nvPr>
+            <p:ph type="sldImg"/>
+          </p:nvPr>
+        </p:nvSpPr>
+        <p:spPr/>
+      </p:sp>
+      <p:sp>
+        <p:nvSpPr>
+          <p:cNvPr id="3" name="Notes Placeholder 2"/>
+          <p:cNvSpPr>
+            <a:spLocks noGrp="1"/>
+          </p:cNvSpPr>
+          <p:nvPr>
+            <p:ph type="body" idx="1"/>
+          </p:nvPr>
+        </p:nvSpPr>
+        <p:spPr/>
+        <p:txBody>
+          <a:bodyPr/>
+          <a:lstStyle/>
+          <a:p>
+            <a:r>
+              <a:rPr lang="en-US" dirty="0" smtClean="0"/>
+              <a:t>Hannah</a:t>
+            </a:r>
+            <a:endParaRPr lang="en-US" dirty="0"/>
+          </a:p>
+        </p:txBody>
+      </p:sp>
+      <p:sp>
+        <p:nvSpPr>
+          <p:cNvPr id="4" name="Slide Number Placeholder 3"/>
+          <p:cNvSpPr>
+            <a:spLocks noGrp="1"/>
+          </p:cNvSpPr>
+          <p:nvPr>
+            <p:ph type="sldNum" sz="quarter" idx="10"/>
+          </p:nvPr>
+        </p:nvSpPr>
+        <p:spPr/>
+        <p:txBody>
+          <a:bodyPr/>
+          <a:lstStyle/>
+          <a:p>
+            <a:fld id="{FF5CDC9F-0281-447B-80BB-A2BA7CFD35CB}" type="slidenum">
+              <a:rPr lang="en-US" smtClean="0"/>
+              <a:t>12</a:t>
+            </a:fld>
+            <a:endParaRPr lang="en-US"/>
+          </a:p>
+        </p:txBody>
+      </p:sp>
+    </p:spTree>
+    <p:extLst>
+      <p:ext uri="{BB962C8B-B14F-4D97-AF65-F5344CB8AC3E}">
+        <p14:creationId xmlns:p14="http://schemas.microsoft.com/office/powerpoint/2010/main" val="3489769194"/>
+      </p:ext>
+    </p:extLst>
+  </p:cSld>
+  <p:clrMapOvr>
+    <a:masterClrMapping/>
+  </p:clrMapOvr>
+</p:notes>
+</file>
+
+<file path=ppt/notesSlides/notesSlide13.xml><?xml version="1.0" encoding="utf-8"?>
+<p:notes xmlns:a="http://schemas.openxmlformats.org/drawingml/2006/main" xmlns:r="http://schemas.openxmlformats.org/officeDocument/2006/relationships" xmlns:p="http://schemas.openxmlformats.org/presentationml/2006/main">
+  <p:cSld>
+    <p:spTree>
+      <p:nvGrpSpPr>
+        <p:cNvPr id="1" name=""/>
+        <p:cNvGrpSpPr/>
+        <p:nvPr/>
+      </p:nvGrpSpPr>
+      <p:grpSpPr>
+        <a:xfrm>
+          <a:off x="0" y="0"/>
+          <a:ext cx="0" cy="0"/>
+          <a:chOff x="0" y="0"/>
+          <a:chExt cx="0" cy="0"/>
+        </a:xfrm>
+      </p:grpSpPr>
+      <p:sp>
+        <p:nvSpPr>
+          <p:cNvPr id="2" name="Slide Image Placeholder 1"/>
+          <p:cNvSpPr>
+            <a:spLocks noGrp="1" noRot="1" noChangeAspect="1"/>
+          </p:cNvSpPr>
+          <p:nvPr>
+            <p:ph type="sldImg"/>
+          </p:nvPr>
+        </p:nvSpPr>
+        <p:spPr/>
+      </p:sp>
+      <p:sp>
+        <p:nvSpPr>
+          <p:cNvPr id="3" name="Notes Placeholder 2"/>
+          <p:cNvSpPr>
+            <a:spLocks noGrp="1"/>
+          </p:cNvSpPr>
+          <p:nvPr>
+            <p:ph type="body" idx="1"/>
+          </p:nvPr>
+        </p:nvSpPr>
+        <p:spPr/>
+        <p:txBody>
+          <a:bodyPr/>
+          <a:lstStyle/>
+          <a:p>
+            <a:r>
+              <a:rPr lang="en-US" dirty="0" smtClean="0"/>
+              <a:t>Hannah</a:t>
+            </a:r>
+            <a:endParaRPr lang="en-US" dirty="0"/>
+          </a:p>
+        </p:txBody>
+      </p:sp>
+      <p:sp>
+        <p:nvSpPr>
+          <p:cNvPr id="4" name="Slide Number Placeholder 3"/>
+          <p:cNvSpPr>
+            <a:spLocks noGrp="1"/>
+          </p:cNvSpPr>
+          <p:nvPr>
+            <p:ph type="sldNum" sz="quarter" idx="10"/>
+          </p:nvPr>
+        </p:nvSpPr>
+        <p:spPr/>
+        <p:txBody>
+          <a:bodyPr/>
+          <a:lstStyle/>
+          <a:p>
+            <a:fld id="{FF5CDC9F-0281-447B-80BB-A2BA7CFD35CB}" type="slidenum">
+              <a:rPr lang="en-US" smtClean="0"/>
+              <a:t>13</a:t>
+            </a:fld>
+            <a:endParaRPr lang="en-US"/>
+          </a:p>
+        </p:txBody>
+      </p:sp>
+    </p:spTree>
+    <p:extLst>
+      <p:ext uri="{BB962C8B-B14F-4D97-AF65-F5344CB8AC3E}">
+        <p14:creationId xmlns:p14="http://schemas.microsoft.com/office/powerpoint/2010/main" val="1707275101"/>
+      </p:ext>
+    </p:extLst>
+  </p:cSld>
+  <p:clrMapOvr>
+    <a:masterClrMapping/>
+  </p:clrMapOvr>
+</p:notes>
+</file>
+
+<file path=ppt/notesSlides/notesSlide14.xml><?xml version="1.0" encoding="utf-8"?>
+<p:notes xmlns:a="http://schemas.openxmlformats.org/drawingml/2006/main" xmlns:r="http://schemas.openxmlformats.org/officeDocument/2006/relationships" xmlns:p="http://schemas.openxmlformats.org/presentationml/2006/main">
+  <p:cSld>
+    <p:spTree>
+      <p:nvGrpSpPr>
+        <p:cNvPr id="1" name=""/>
+        <p:cNvGrpSpPr/>
+        <p:nvPr/>
+      </p:nvGrpSpPr>
+      <p:grpSpPr>
+        <a:xfrm>
+          <a:off x="0" y="0"/>
+          <a:ext cx="0" cy="0"/>
+          <a:chOff x="0" y="0"/>
+          <a:chExt cx="0" cy="0"/>
+        </a:xfrm>
+      </p:grpSpPr>
+      <p:sp>
+        <p:nvSpPr>
+          <p:cNvPr id="2" name="Slide Image Placeholder 1"/>
+          <p:cNvSpPr>
+            <a:spLocks noGrp="1" noRot="1" noChangeAspect="1"/>
+          </p:cNvSpPr>
+          <p:nvPr>
+            <p:ph type="sldImg"/>
+          </p:nvPr>
+        </p:nvSpPr>
+        <p:spPr/>
+      </p:sp>
+      <p:sp>
+        <p:nvSpPr>
+          <p:cNvPr id="3" name="Notes Placeholder 2"/>
+          <p:cNvSpPr>
+            <a:spLocks noGrp="1"/>
+          </p:cNvSpPr>
+          <p:nvPr>
+            <p:ph type="body" idx="1"/>
+          </p:nvPr>
+        </p:nvSpPr>
+        <p:spPr/>
+        <p:txBody>
+          <a:bodyPr/>
+          <a:lstStyle/>
+          <a:p>
+            <a:r>
+              <a:rPr lang="en-US" dirty="0" smtClean="0"/>
+              <a:t>Hannah</a:t>
+            </a:r>
+            <a:endParaRPr lang="en-US" dirty="0"/>
+          </a:p>
+        </p:txBody>
+      </p:sp>
+      <p:sp>
+        <p:nvSpPr>
+          <p:cNvPr id="4" name="Slide Number Placeholder 3"/>
+          <p:cNvSpPr>
+            <a:spLocks noGrp="1"/>
+          </p:cNvSpPr>
+          <p:nvPr>
+            <p:ph type="sldNum" sz="quarter" idx="10"/>
+          </p:nvPr>
+        </p:nvSpPr>
+        <p:spPr/>
+        <p:txBody>
+          <a:bodyPr/>
+          <a:lstStyle/>
+          <a:p>
+            <a:fld id="{FF5CDC9F-0281-447B-80BB-A2BA7CFD35CB}" type="slidenum">
+              <a:rPr lang="en-US" smtClean="0"/>
+              <a:t>14</a:t>
+            </a:fld>
+            <a:endParaRPr lang="en-US"/>
+          </a:p>
+        </p:txBody>
+      </p:sp>
+    </p:spTree>
+    <p:extLst>
+      <p:ext uri="{BB962C8B-B14F-4D97-AF65-F5344CB8AC3E}">
+        <p14:creationId xmlns:p14="http://schemas.microsoft.com/office/powerpoint/2010/main" val="3312622130"/>
+      </p:ext>
+    </p:extLst>
+  </p:cSld>
+  <p:clrMapOvr>
+    <a:masterClrMapping/>
+  </p:clrMapOvr>
+</p:notes>
+</file>
+
+<file path=ppt/notesSlides/notesSlide15.xml><?xml version="1.0" encoding="utf-8"?>
+<p:notes xmlns:a="http://schemas.openxmlformats.org/drawingml/2006/main" xmlns:r="http://schemas.openxmlformats.org/officeDocument/2006/relationships" xmlns:p="http://schemas.openxmlformats.org/presentationml/2006/main">
+  <p:cSld>
+    <p:spTree>
+      <p:nvGrpSpPr>
+        <p:cNvPr id="1" name=""/>
+        <p:cNvGrpSpPr/>
+        <p:nvPr/>
+      </p:nvGrpSpPr>
+      <p:grpSpPr>
+        <a:xfrm>
+          <a:off x="0" y="0"/>
+          <a:ext cx="0" cy="0"/>
+          <a:chOff x="0" y="0"/>
+          <a:chExt cx="0" cy="0"/>
+        </a:xfrm>
+      </p:grpSpPr>
+      <p:sp>
+        <p:nvSpPr>
+          <p:cNvPr id="2" name="Slide Image Placeholder 1"/>
+          <p:cNvSpPr>
+            <a:spLocks noGrp="1" noRot="1" noChangeAspect="1"/>
+          </p:cNvSpPr>
+          <p:nvPr>
+            <p:ph type="sldImg"/>
+          </p:nvPr>
+        </p:nvSpPr>
+        <p:spPr/>
+      </p:sp>
+      <p:sp>
+        <p:nvSpPr>
+          <p:cNvPr id="3" name="Notes Placeholder 2"/>
+          <p:cNvSpPr>
+            <a:spLocks noGrp="1"/>
+          </p:cNvSpPr>
+          <p:nvPr>
+            <p:ph type="body" idx="1"/>
+          </p:nvPr>
+        </p:nvSpPr>
+        <p:spPr/>
+        <p:txBody>
+          <a:bodyPr/>
+          <a:lstStyle/>
+          <a:p>
+            <a:r>
+              <a:rPr lang="en-US" dirty="0" smtClean="0"/>
+              <a:t>Hannah</a:t>
+            </a:r>
+            <a:endParaRPr lang="en-US" dirty="0"/>
+          </a:p>
+        </p:txBody>
+      </p:sp>
+      <p:sp>
+        <p:nvSpPr>
+          <p:cNvPr id="4" name="Slide Number Placeholder 3"/>
+          <p:cNvSpPr>
+            <a:spLocks noGrp="1"/>
+          </p:cNvSpPr>
+          <p:nvPr>
+            <p:ph type="sldNum" sz="quarter" idx="10"/>
+          </p:nvPr>
+        </p:nvSpPr>
+        <p:spPr/>
+        <p:txBody>
+          <a:bodyPr/>
+          <a:lstStyle/>
+          <a:p>
+            <a:fld id="{FF5CDC9F-0281-447B-80BB-A2BA7CFD35CB}" type="slidenum">
+              <a:rPr lang="en-US" smtClean="0"/>
+              <a:t>15</a:t>
+            </a:fld>
+            <a:endParaRPr lang="en-US"/>
+          </a:p>
+        </p:txBody>
+      </p:sp>
+    </p:spTree>
+    <p:extLst>
+      <p:ext uri="{BB962C8B-B14F-4D97-AF65-F5344CB8AC3E}">
+        <p14:creationId xmlns:p14="http://schemas.microsoft.com/office/powerpoint/2010/main" val="2588264008"/>
+      </p:ext>
+    </p:extLst>
+  </p:cSld>
+  <p:clrMapOvr>
+    <a:masterClrMapping/>
+  </p:clrMapOvr>
+</p:notes>
+</file>
+
+<file path=ppt/notesSlides/notesSlide16.xml><?xml version="1.0" encoding="utf-8"?>
+<p:notes xmlns:a="http://schemas.openxmlformats.org/drawingml/2006/main" xmlns:r="http://schemas.openxmlformats.org/officeDocument/2006/relationships" xmlns:p="http://schemas.openxmlformats.org/presentationml/2006/main">
+  <p:cSld>
+    <p:spTree>
+      <p:nvGrpSpPr>
+        <p:cNvPr id="1" name=""/>
+        <p:cNvGrpSpPr/>
+        <p:nvPr/>
+      </p:nvGrpSpPr>
+      <p:grpSpPr>
+        <a:xfrm>
+          <a:off x="0" y="0"/>
+          <a:ext cx="0" cy="0"/>
+          <a:chOff x="0" y="0"/>
+          <a:chExt cx="0" cy="0"/>
+        </a:xfrm>
+      </p:grpSpPr>
+      <p:sp>
+        <p:nvSpPr>
+          <p:cNvPr id="2" name="Slide Image Placeholder 1"/>
+          <p:cNvSpPr>
+            <a:spLocks noGrp="1" noRot="1" noChangeAspect="1"/>
+          </p:cNvSpPr>
+          <p:nvPr>
+            <p:ph type="sldImg"/>
+          </p:nvPr>
+        </p:nvSpPr>
+        <p:spPr/>
+      </p:sp>
+      <p:sp>
+        <p:nvSpPr>
+          <p:cNvPr id="3" name="Notes Placeholder 2"/>
+          <p:cNvSpPr>
+            <a:spLocks noGrp="1"/>
+          </p:cNvSpPr>
+          <p:nvPr>
+            <p:ph type="body" idx="1"/>
+          </p:nvPr>
+        </p:nvSpPr>
+        <p:spPr/>
+        <p:txBody>
+          <a:bodyPr/>
+          <a:lstStyle/>
+          <a:p>
+            <a:r>
+              <a:rPr lang="en-US" dirty="0" smtClean="0"/>
+              <a:t>Jacob</a:t>
+            </a:r>
+            <a:endParaRPr lang="en-US" dirty="0"/>
+          </a:p>
+        </p:txBody>
+      </p:sp>
+      <p:sp>
+        <p:nvSpPr>
+          <p:cNvPr id="4" name="Slide Number Placeholder 3"/>
+          <p:cNvSpPr>
+            <a:spLocks noGrp="1"/>
+          </p:cNvSpPr>
+          <p:nvPr>
+            <p:ph type="sldNum" sz="quarter" idx="10"/>
+          </p:nvPr>
+        </p:nvSpPr>
+        <p:spPr/>
+        <p:txBody>
+          <a:bodyPr/>
+          <a:lstStyle/>
+          <a:p>
+            <a:fld id="{FF5CDC9F-0281-447B-80BB-A2BA7CFD35CB}" type="slidenum">
+              <a:rPr lang="en-US" smtClean="0"/>
+              <a:t>16</a:t>
+            </a:fld>
+            <a:endParaRPr lang="en-US"/>
+          </a:p>
+        </p:txBody>
+      </p:sp>
+    </p:spTree>
+    <p:extLst>
+      <p:ext uri="{BB962C8B-B14F-4D97-AF65-F5344CB8AC3E}">
+        <p14:creationId xmlns:p14="http://schemas.microsoft.com/office/powerpoint/2010/main" val="3424159689"/>
+      </p:ext>
+    </p:extLst>
+  </p:cSld>
+  <p:clrMapOvr>
+    <a:masterClrMapping/>
+  </p:clrMapOvr>
+</p:notes>
+</file>
+
+<file path=ppt/notesSlides/notesSlide17.xml><?xml version="1.0" encoding="utf-8"?>
+<p:notes xmlns:a="http://schemas.openxmlformats.org/drawingml/2006/main" xmlns:r="http://schemas.openxmlformats.org/officeDocument/2006/relationships" xmlns:p="http://schemas.openxmlformats.org/presentationml/2006/main">
+  <p:cSld>
+    <p:spTree>
+      <p:nvGrpSpPr>
+        <p:cNvPr id="1" name=""/>
+        <p:cNvGrpSpPr/>
+        <p:nvPr/>
+      </p:nvGrpSpPr>
+      <p:grpSpPr>
+        <a:xfrm>
+          <a:off x="0" y="0"/>
+          <a:ext cx="0" cy="0"/>
+          <a:chOff x="0" y="0"/>
+          <a:chExt cx="0" cy="0"/>
+        </a:xfrm>
+      </p:grpSpPr>
+      <p:sp>
+        <p:nvSpPr>
+          <p:cNvPr id="2" name="Slide Image Placeholder 1"/>
+          <p:cNvSpPr>
+            <a:spLocks noGrp="1" noRot="1" noChangeAspect="1"/>
+          </p:cNvSpPr>
+          <p:nvPr>
+            <p:ph type="sldImg"/>
+          </p:nvPr>
+        </p:nvSpPr>
+        <p:spPr/>
+      </p:sp>
+      <p:sp>
+        <p:nvSpPr>
+          <p:cNvPr id="3" name="Notes Placeholder 2"/>
+          <p:cNvSpPr>
+            <a:spLocks noGrp="1"/>
+          </p:cNvSpPr>
+          <p:nvPr>
+            <p:ph type="body" idx="1"/>
+          </p:nvPr>
+        </p:nvSpPr>
+        <p:spPr/>
+        <p:txBody>
+          <a:bodyPr/>
+          <a:lstStyle/>
+          <a:p>
+            <a:r>
+              <a:rPr lang="en-US" dirty="0" smtClean="0"/>
+              <a:t>Jacob</a:t>
+            </a:r>
+            <a:endParaRPr lang="en-US" dirty="0"/>
+          </a:p>
+        </p:txBody>
+      </p:sp>
+      <p:sp>
+        <p:nvSpPr>
+          <p:cNvPr id="4" name="Slide Number Placeholder 3"/>
+          <p:cNvSpPr>
+            <a:spLocks noGrp="1"/>
+          </p:cNvSpPr>
+          <p:nvPr>
+            <p:ph type="sldNum" sz="quarter" idx="10"/>
+          </p:nvPr>
+        </p:nvSpPr>
+        <p:spPr/>
+        <p:txBody>
+          <a:bodyPr/>
+          <a:lstStyle/>
+          <a:p>
+            <a:fld id="{FF5CDC9F-0281-447B-80BB-A2BA7CFD35CB}" type="slidenum">
+              <a:rPr lang="en-US" smtClean="0"/>
+              <a:t>17</a:t>
+            </a:fld>
+            <a:endParaRPr lang="en-US"/>
+          </a:p>
+        </p:txBody>
+      </p:sp>
+    </p:spTree>
+    <p:extLst>
+      <p:ext uri="{BB962C8B-B14F-4D97-AF65-F5344CB8AC3E}">
+        <p14:creationId xmlns:p14="http://schemas.microsoft.com/office/powerpoint/2010/main" val="695313553"/>
+      </p:ext>
+    </p:extLst>
+  </p:cSld>
+  <p:clrMapOvr>
+    <a:masterClrMapping/>
+  </p:clrMapOvr>
+</p:notes>
+</file>
+
+<file path=ppt/notesSlides/notesSlide2.xml><?xml version="1.0" encoding="utf-8"?>
+<p:notes xmlns:a="http://schemas.openxmlformats.org/drawingml/2006/main" xmlns:r="http://schemas.openxmlformats.org/officeDocument/2006/relationships" xmlns:p="http://schemas.openxmlformats.org/presentationml/2006/main">
+  <p:cSld>
+    <p:spTree>
+      <p:nvGrpSpPr>
+        <p:cNvPr id="1" name=""/>
+        <p:cNvGrpSpPr/>
+        <p:nvPr/>
+      </p:nvGrpSpPr>
+      <p:grpSpPr>
+        <a:xfrm>
+          <a:off x="0" y="0"/>
+          <a:ext cx="0" cy="0"/>
+          <a:chOff x="0" y="0"/>
+          <a:chExt cx="0" cy="0"/>
+        </a:xfrm>
+      </p:grpSpPr>
+      <p:sp>
+        <p:nvSpPr>
+          <p:cNvPr id="2" name="Slide Image Placeholder 1"/>
+          <p:cNvSpPr>
+            <a:spLocks noGrp="1" noRot="1" noChangeAspect="1"/>
+          </p:cNvSpPr>
+          <p:nvPr>
+            <p:ph type="sldImg"/>
+          </p:nvPr>
+        </p:nvSpPr>
+        <p:spPr/>
+      </p:sp>
+      <p:sp>
+        <p:nvSpPr>
+          <p:cNvPr id="3" name="Notes Placeholder 2"/>
+          <p:cNvSpPr>
+            <a:spLocks noGrp="1"/>
+          </p:cNvSpPr>
+          <p:nvPr>
+            <p:ph type="body" idx="1"/>
+          </p:nvPr>
+        </p:nvSpPr>
+        <p:spPr/>
+        <p:txBody>
+          <a:bodyPr/>
+          <a:lstStyle/>
+          <a:p>
+            <a:r>
+              <a:rPr lang="en-US" dirty="0" smtClean="0"/>
+              <a:t>Jacob</a:t>
+            </a:r>
+            <a:endParaRPr lang="en-US" dirty="0"/>
+          </a:p>
+        </p:txBody>
+      </p:sp>
+      <p:sp>
+        <p:nvSpPr>
+          <p:cNvPr id="4" name="Slide Number Placeholder 3"/>
+          <p:cNvSpPr>
+            <a:spLocks noGrp="1"/>
+          </p:cNvSpPr>
+          <p:nvPr>
+            <p:ph type="sldNum" sz="quarter" idx="10"/>
+          </p:nvPr>
+        </p:nvSpPr>
+        <p:spPr/>
+        <p:txBody>
+          <a:bodyPr/>
+          <a:lstStyle/>
+          <a:p>
+            <a:fld id="{FF5CDC9F-0281-447B-80BB-A2BA7CFD35CB}" type="slidenum">
+              <a:rPr lang="en-US" smtClean="0"/>
+              <a:t>2</a:t>
+            </a:fld>
+            <a:endParaRPr lang="en-US"/>
+          </a:p>
+        </p:txBody>
+      </p:sp>
+    </p:spTree>
+    <p:extLst>
+      <p:ext uri="{BB962C8B-B14F-4D97-AF65-F5344CB8AC3E}">
+        <p14:creationId xmlns:p14="http://schemas.microsoft.com/office/powerpoint/2010/main" val="2917978683"/>
+      </p:ext>
+    </p:extLst>
+  </p:cSld>
+  <p:clrMapOvr>
+    <a:masterClrMapping/>
+  </p:clrMapOvr>
+</p:notes>
+</file>
+
+<file path=ppt/notesSlides/notesSlide3.xml><?xml version="1.0" encoding="utf-8"?>
+<p:notes xmlns:a="http://schemas.openxmlformats.org/drawingml/2006/main" xmlns:r="http://schemas.openxmlformats.org/officeDocument/2006/relationships" xmlns:p="http://schemas.openxmlformats.org/presentationml/2006/main">
+  <p:cSld>
+    <p:spTree>
+      <p:nvGrpSpPr>
+        <p:cNvPr id="1" name=""/>
+        <p:cNvGrpSpPr/>
+        <p:nvPr/>
+      </p:nvGrpSpPr>
+      <p:grpSpPr>
+        <a:xfrm>
+          <a:off x="0" y="0"/>
+          <a:ext cx="0" cy="0"/>
+          <a:chOff x="0" y="0"/>
+          <a:chExt cx="0" cy="0"/>
+        </a:xfrm>
+      </p:grpSpPr>
+      <p:sp>
+        <p:nvSpPr>
+          <p:cNvPr id="2" name="Slide Image Placeholder 1"/>
+          <p:cNvSpPr>
+            <a:spLocks noGrp="1" noRot="1" noChangeAspect="1"/>
+          </p:cNvSpPr>
+          <p:nvPr>
+            <p:ph type="sldImg"/>
+          </p:nvPr>
+        </p:nvSpPr>
+        <p:spPr/>
+      </p:sp>
+      <p:sp>
+        <p:nvSpPr>
+          <p:cNvPr id="3" name="Notes Placeholder 2"/>
+          <p:cNvSpPr>
+            <a:spLocks noGrp="1"/>
+          </p:cNvSpPr>
+          <p:nvPr>
+            <p:ph type="body" idx="1"/>
+          </p:nvPr>
+        </p:nvSpPr>
+        <p:spPr/>
+        <p:txBody>
+          <a:bodyPr/>
+          <a:lstStyle/>
+          <a:p>
+            <a:r>
+              <a:rPr lang="en-US" dirty="0" smtClean="0"/>
+              <a:t>Jacob</a:t>
+            </a:r>
+            <a:endParaRPr lang="en-US" dirty="0"/>
+          </a:p>
+        </p:txBody>
+      </p:sp>
+      <p:sp>
+        <p:nvSpPr>
+          <p:cNvPr id="4" name="Slide Number Placeholder 3"/>
+          <p:cNvSpPr>
+            <a:spLocks noGrp="1"/>
+          </p:cNvSpPr>
+          <p:nvPr>
+            <p:ph type="sldNum" sz="quarter" idx="10"/>
+          </p:nvPr>
+        </p:nvSpPr>
+        <p:spPr/>
+        <p:txBody>
+          <a:bodyPr/>
+          <a:lstStyle/>
+          <a:p>
+            <a:fld id="{FF5CDC9F-0281-447B-80BB-A2BA7CFD35CB}" type="slidenum">
+              <a:rPr lang="en-US" smtClean="0"/>
+              <a:t>3</a:t>
+            </a:fld>
+            <a:endParaRPr lang="en-US"/>
+          </a:p>
+        </p:txBody>
+      </p:sp>
+    </p:spTree>
+    <p:extLst>
+      <p:ext uri="{BB962C8B-B14F-4D97-AF65-F5344CB8AC3E}">
+        <p14:creationId xmlns:p14="http://schemas.microsoft.com/office/powerpoint/2010/main" val="1842437838"/>
+      </p:ext>
+    </p:extLst>
+  </p:cSld>
+  <p:clrMapOvr>
+    <a:masterClrMapping/>
+  </p:clrMapOvr>
+</p:notes>
+</file>
+
+<file path=ppt/notesSlides/notesSlide4.xml><?xml version="1.0" encoding="utf-8"?>
+<p:notes xmlns:a="http://schemas.openxmlformats.org/drawingml/2006/main" xmlns:r="http://schemas.openxmlformats.org/officeDocument/2006/relationships" xmlns:p="http://schemas.openxmlformats.org/presentationml/2006/main">
+  <p:cSld>
+    <p:spTree>
+      <p:nvGrpSpPr>
+        <p:cNvPr id="1" name=""/>
+        <p:cNvGrpSpPr/>
+        <p:nvPr/>
+      </p:nvGrpSpPr>
+      <p:grpSpPr>
+        <a:xfrm>
+          <a:off x="0" y="0"/>
+          <a:ext cx="0" cy="0"/>
+          <a:chOff x="0" y="0"/>
+          <a:chExt cx="0" cy="0"/>
+        </a:xfrm>
+      </p:grpSpPr>
+      <p:sp>
+        <p:nvSpPr>
+          <p:cNvPr id="2" name="Slide Image Placeholder 1"/>
+          <p:cNvSpPr>
+            <a:spLocks noGrp="1" noRot="1" noChangeAspect="1"/>
+          </p:cNvSpPr>
+          <p:nvPr>
+            <p:ph type="sldImg"/>
+          </p:nvPr>
+        </p:nvSpPr>
+        <p:spPr/>
+      </p:sp>
+      <p:sp>
+        <p:nvSpPr>
+          <p:cNvPr id="3" name="Notes Placeholder 2"/>
+          <p:cNvSpPr>
+            <a:spLocks noGrp="1"/>
+          </p:cNvSpPr>
+          <p:nvPr>
+            <p:ph type="body" idx="1"/>
+          </p:nvPr>
+        </p:nvSpPr>
+        <p:spPr/>
+        <p:txBody>
+          <a:bodyPr/>
+          <a:lstStyle/>
+          <a:p>
+            <a:r>
+              <a:rPr lang="en-US" dirty="0" smtClean="0"/>
+              <a:t>Jacob</a:t>
+            </a:r>
+            <a:endParaRPr lang="en-US" dirty="0"/>
+          </a:p>
+        </p:txBody>
+      </p:sp>
+      <p:sp>
+        <p:nvSpPr>
+          <p:cNvPr id="4" name="Slide Number Placeholder 3"/>
+          <p:cNvSpPr>
+            <a:spLocks noGrp="1"/>
+          </p:cNvSpPr>
+          <p:nvPr>
+            <p:ph type="sldNum" sz="quarter" idx="10"/>
+          </p:nvPr>
+        </p:nvSpPr>
+        <p:spPr/>
+        <p:txBody>
+          <a:bodyPr/>
+          <a:lstStyle/>
+          <a:p>
+            <a:fld id="{FF5CDC9F-0281-447B-80BB-A2BA7CFD35CB}" type="slidenum">
+              <a:rPr lang="en-US" smtClean="0"/>
+              <a:t>4</a:t>
+            </a:fld>
+            <a:endParaRPr lang="en-US"/>
+          </a:p>
+        </p:txBody>
+      </p:sp>
+    </p:spTree>
+    <p:extLst>
+      <p:ext uri="{BB962C8B-B14F-4D97-AF65-F5344CB8AC3E}">
+        <p14:creationId xmlns:p14="http://schemas.microsoft.com/office/powerpoint/2010/main" val="2400956133"/>
+      </p:ext>
+    </p:extLst>
+  </p:cSld>
+  <p:clrMapOvr>
+    <a:masterClrMapping/>
+  </p:clrMapOvr>
+</p:notes>
+</file>
+
+<file path=ppt/notesSlides/notesSlide5.xml><?xml version="1.0" encoding="utf-8"?>
+<p:notes xmlns:a="http://schemas.openxmlformats.org/drawingml/2006/main" xmlns:r="http://schemas.openxmlformats.org/officeDocument/2006/relationships" xmlns:p="http://schemas.openxmlformats.org/presentationml/2006/main">
+  <p:cSld>
+    <p:spTree>
+      <p:nvGrpSpPr>
+        <p:cNvPr id="1" name=""/>
+        <p:cNvGrpSpPr/>
+        <p:nvPr/>
+      </p:nvGrpSpPr>
+      <p:grpSpPr>
+        <a:xfrm>
+          <a:off x="0" y="0"/>
+          <a:ext cx="0" cy="0"/>
+          <a:chOff x="0" y="0"/>
+          <a:chExt cx="0" cy="0"/>
+        </a:xfrm>
+      </p:grpSpPr>
+      <p:sp>
+        <p:nvSpPr>
+          <p:cNvPr id="2" name="Slide Image Placeholder 1"/>
+          <p:cNvSpPr>
+            <a:spLocks noGrp="1" noRot="1" noChangeAspect="1"/>
+          </p:cNvSpPr>
+          <p:nvPr>
+            <p:ph type="sldImg"/>
+          </p:nvPr>
+        </p:nvSpPr>
+        <p:spPr/>
+      </p:sp>
+      <p:sp>
+        <p:nvSpPr>
+          <p:cNvPr id="3" name="Notes Placeholder 2"/>
+          <p:cNvSpPr>
+            <a:spLocks noGrp="1"/>
+          </p:cNvSpPr>
+          <p:nvPr>
+            <p:ph type="body" idx="1"/>
+          </p:nvPr>
+        </p:nvSpPr>
+        <p:spPr/>
+        <p:txBody>
+          <a:bodyPr/>
+          <a:lstStyle/>
+          <a:p>
+            <a:r>
+              <a:rPr lang="en-US" dirty="0" smtClean="0"/>
+              <a:t>Jacob</a:t>
+            </a:r>
+            <a:endParaRPr lang="en-US" dirty="0"/>
+          </a:p>
+        </p:txBody>
+      </p:sp>
+      <p:sp>
+        <p:nvSpPr>
+          <p:cNvPr id="4" name="Slide Number Placeholder 3"/>
+          <p:cNvSpPr>
+            <a:spLocks noGrp="1"/>
+          </p:cNvSpPr>
+          <p:nvPr>
+            <p:ph type="sldNum" sz="quarter" idx="10"/>
+          </p:nvPr>
+        </p:nvSpPr>
+        <p:spPr/>
+        <p:txBody>
+          <a:bodyPr/>
+          <a:lstStyle/>
+          <a:p>
+            <a:fld id="{FF5CDC9F-0281-447B-80BB-A2BA7CFD35CB}" type="slidenum">
+              <a:rPr lang="en-US" smtClean="0"/>
+              <a:t>5</a:t>
+            </a:fld>
+            <a:endParaRPr lang="en-US"/>
+          </a:p>
+        </p:txBody>
+      </p:sp>
+    </p:spTree>
+    <p:extLst>
+      <p:ext uri="{BB962C8B-B14F-4D97-AF65-F5344CB8AC3E}">
+        <p14:creationId xmlns:p14="http://schemas.microsoft.com/office/powerpoint/2010/main" val="3418817495"/>
+      </p:ext>
+    </p:extLst>
+  </p:cSld>
+  <p:clrMapOvr>
+    <a:masterClrMapping/>
+  </p:clrMapOvr>
+</p:notes>
+</file>
+
+<file path=ppt/notesSlides/notesSlide6.xml><?xml version="1.0" encoding="utf-8"?>
+<p:notes xmlns:a="http://schemas.openxmlformats.org/drawingml/2006/main" xmlns:r="http://schemas.openxmlformats.org/officeDocument/2006/relationships" xmlns:p="http://schemas.openxmlformats.org/presentationml/2006/main">
+  <p:cSld>
+    <p:spTree>
+      <p:nvGrpSpPr>
+        <p:cNvPr id="1" name=""/>
+        <p:cNvGrpSpPr/>
+        <p:nvPr/>
+      </p:nvGrpSpPr>
+      <p:grpSpPr>
+        <a:xfrm>
+          <a:off x="0" y="0"/>
+          <a:ext cx="0" cy="0"/>
+          <a:chOff x="0" y="0"/>
+          <a:chExt cx="0" cy="0"/>
+        </a:xfrm>
+      </p:grpSpPr>
+      <p:sp>
+        <p:nvSpPr>
+          <p:cNvPr id="2" name="Slide Image Placeholder 1"/>
+          <p:cNvSpPr>
+            <a:spLocks noGrp="1" noRot="1" noChangeAspect="1"/>
+          </p:cNvSpPr>
+          <p:nvPr>
+            <p:ph type="sldImg"/>
+          </p:nvPr>
+        </p:nvSpPr>
+        <p:spPr/>
+      </p:sp>
+      <p:sp>
+        <p:nvSpPr>
+          <p:cNvPr id="3" name="Notes Placeholder 2"/>
+          <p:cNvSpPr>
+            <a:spLocks noGrp="1"/>
+          </p:cNvSpPr>
+          <p:nvPr>
+            <p:ph type="body" idx="1"/>
+          </p:nvPr>
+        </p:nvSpPr>
+        <p:spPr/>
+        <p:txBody>
+          <a:bodyPr/>
+          <a:lstStyle/>
+          <a:p>
+            <a:r>
+              <a:rPr lang="en-US" dirty="0" smtClean="0"/>
+              <a:t>Jacob</a:t>
+            </a:r>
+            <a:endParaRPr lang="en-US" dirty="0"/>
+          </a:p>
+        </p:txBody>
+      </p:sp>
+      <p:sp>
+        <p:nvSpPr>
+          <p:cNvPr id="4" name="Slide Number Placeholder 3"/>
+          <p:cNvSpPr>
+            <a:spLocks noGrp="1"/>
+          </p:cNvSpPr>
+          <p:nvPr>
+            <p:ph type="sldNum" sz="quarter" idx="10"/>
+          </p:nvPr>
+        </p:nvSpPr>
+        <p:spPr/>
+        <p:txBody>
+          <a:bodyPr/>
+          <a:lstStyle/>
+          <a:p>
+            <a:fld id="{FF5CDC9F-0281-447B-80BB-A2BA7CFD35CB}" type="slidenum">
+              <a:rPr lang="en-US" smtClean="0"/>
+              <a:t>6</a:t>
+            </a:fld>
+            <a:endParaRPr lang="en-US"/>
+          </a:p>
+        </p:txBody>
+      </p:sp>
+    </p:spTree>
+    <p:extLst>
+      <p:ext uri="{BB962C8B-B14F-4D97-AF65-F5344CB8AC3E}">
+        <p14:creationId xmlns:p14="http://schemas.microsoft.com/office/powerpoint/2010/main" val="2932862323"/>
+      </p:ext>
+    </p:extLst>
+  </p:cSld>
+  <p:clrMapOvr>
+    <a:masterClrMapping/>
+  </p:clrMapOvr>
+</p:notes>
+</file>
+
+<file path=ppt/notesSlides/notesSlide7.xml><?xml version="1.0" encoding="utf-8"?>
+<p:notes xmlns:a="http://schemas.openxmlformats.org/drawingml/2006/main" xmlns:r="http://schemas.openxmlformats.org/officeDocument/2006/relationships" xmlns:p="http://schemas.openxmlformats.org/presentationml/2006/main">
+  <p:cSld>
+    <p:spTree>
+      <p:nvGrpSpPr>
+        <p:cNvPr id="1" name=""/>
+        <p:cNvGrpSpPr/>
+        <p:nvPr/>
+      </p:nvGrpSpPr>
+      <p:grpSpPr>
+        <a:xfrm>
+          <a:off x="0" y="0"/>
+          <a:ext cx="0" cy="0"/>
+          <a:chOff x="0" y="0"/>
+          <a:chExt cx="0" cy="0"/>
+        </a:xfrm>
+      </p:grpSpPr>
+      <p:sp>
+        <p:nvSpPr>
+          <p:cNvPr id="2" name="Slide Image Placeholder 1"/>
+          <p:cNvSpPr>
+            <a:spLocks noGrp="1" noRot="1" noChangeAspect="1"/>
+          </p:cNvSpPr>
+          <p:nvPr>
+            <p:ph type="sldImg"/>
+          </p:nvPr>
+        </p:nvSpPr>
+        <p:spPr/>
+      </p:sp>
+      <p:sp>
+        <p:nvSpPr>
+          <p:cNvPr id="3" name="Notes Placeholder 2"/>
+          <p:cNvSpPr>
+            <a:spLocks noGrp="1"/>
+          </p:cNvSpPr>
+          <p:nvPr>
+            <p:ph type="body" idx="1"/>
+          </p:nvPr>
+        </p:nvSpPr>
+        <p:spPr/>
+        <p:txBody>
+          <a:bodyPr/>
+          <a:lstStyle/>
+          <a:p>
+            <a:r>
+              <a:rPr lang="en-US" dirty="0" smtClean="0"/>
+              <a:t>Jacob</a:t>
+            </a:r>
+            <a:endParaRPr lang="en-US" dirty="0"/>
+          </a:p>
+        </p:txBody>
+      </p:sp>
+      <p:sp>
+        <p:nvSpPr>
+          <p:cNvPr id="4" name="Slide Number Placeholder 3"/>
+          <p:cNvSpPr>
+            <a:spLocks noGrp="1"/>
+          </p:cNvSpPr>
+          <p:nvPr>
+            <p:ph type="sldNum" sz="quarter" idx="10"/>
+          </p:nvPr>
+        </p:nvSpPr>
+        <p:spPr/>
+        <p:txBody>
+          <a:bodyPr/>
+          <a:lstStyle/>
+          <a:p>
+            <a:fld id="{FF5CDC9F-0281-447B-80BB-A2BA7CFD35CB}" type="slidenum">
+              <a:rPr lang="en-US" smtClean="0"/>
+              <a:t>7</a:t>
+            </a:fld>
+            <a:endParaRPr lang="en-US"/>
+          </a:p>
+        </p:txBody>
+      </p:sp>
+    </p:spTree>
+    <p:extLst>
+      <p:ext uri="{BB962C8B-B14F-4D97-AF65-F5344CB8AC3E}">
+        <p14:creationId xmlns:p14="http://schemas.microsoft.com/office/powerpoint/2010/main" val="3055074060"/>
+      </p:ext>
+    </p:extLst>
+  </p:cSld>
+  <p:clrMapOvr>
+    <a:masterClrMapping/>
+  </p:clrMapOvr>
+</p:notes>
+</file>
+
+<file path=ppt/notesSlides/notesSlide8.xml><?xml version="1.0" encoding="utf-8"?>
+<p:notes xmlns:a="http://schemas.openxmlformats.org/drawingml/2006/main" xmlns:r="http://schemas.openxmlformats.org/officeDocument/2006/relationships" xmlns:p="http://schemas.openxmlformats.org/presentationml/2006/main">
+  <p:cSld>
+    <p:spTree>
+      <p:nvGrpSpPr>
+        <p:cNvPr id="1" name=""/>
+        <p:cNvGrpSpPr/>
+        <p:nvPr/>
+      </p:nvGrpSpPr>
+      <p:grpSpPr>
+        <a:xfrm>
+          <a:off x="0" y="0"/>
+          <a:ext cx="0" cy="0"/>
+          <a:chOff x="0" y="0"/>
+          <a:chExt cx="0" cy="0"/>
+        </a:xfrm>
+      </p:grpSpPr>
+      <p:sp>
+        <p:nvSpPr>
+          <p:cNvPr id="2" name="Slide Image Placeholder 1"/>
+          <p:cNvSpPr>
+            <a:spLocks noGrp="1" noRot="1" noChangeAspect="1"/>
+          </p:cNvSpPr>
+          <p:nvPr>
+            <p:ph type="sldImg"/>
+          </p:nvPr>
+        </p:nvSpPr>
+        <p:spPr/>
+      </p:sp>
+      <p:sp>
+        <p:nvSpPr>
+          <p:cNvPr id="3" name="Notes Placeholder 2"/>
+          <p:cNvSpPr>
+            <a:spLocks noGrp="1"/>
+          </p:cNvSpPr>
+          <p:nvPr>
+            <p:ph type="body" idx="1"/>
+          </p:nvPr>
+        </p:nvSpPr>
+        <p:spPr/>
+        <p:txBody>
+          <a:bodyPr/>
+          <a:lstStyle/>
+          <a:p>
+            <a:r>
+              <a:rPr lang="en-US" dirty="0" smtClean="0"/>
+              <a:t>Jacob</a:t>
+            </a:r>
+            <a:endParaRPr lang="en-US" dirty="0"/>
+          </a:p>
+        </p:txBody>
+      </p:sp>
+      <p:sp>
+        <p:nvSpPr>
+          <p:cNvPr id="4" name="Slide Number Placeholder 3"/>
+          <p:cNvSpPr>
+            <a:spLocks noGrp="1"/>
+          </p:cNvSpPr>
+          <p:nvPr>
+            <p:ph type="sldNum" sz="quarter" idx="10"/>
+          </p:nvPr>
+        </p:nvSpPr>
+        <p:spPr/>
+        <p:txBody>
+          <a:bodyPr/>
+          <a:lstStyle/>
+          <a:p>
+            <a:fld id="{FF5CDC9F-0281-447B-80BB-A2BA7CFD35CB}" type="slidenum">
+              <a:rPr lang="en-US" smtClean="0"/>
+              <a:t>8</a:t>
+            </a:fld>
+            <a:endParaRPr lang="en-US"/>
+          </a:p>
+        </p:txBody>
+      </p:sp>
+    </p:spTree>
+    <p:extLst>
+      <p:ext uri="{BB962C8B-B14F-4D97-AF65-F5344CB8AC3E}">
+        <p14:creationId xmlns:p14="http://schemas.microsoft.com/office/powerpoint/2010/main" val="752139258"/>
+      </p:ext>
+    </p:extLst>
+  </p:cSld>
+  <p:clrMapOvr>
+    <a:masterClrMapping/>
+  </p:clrMapOvr>
+</p:notes>
+</file>
+
+<file path=ppt/notesSlides/notesSlide9.xml><?xml version="1.0" encoding="utf-8"?>
+<p:notes xmlns:a="http://schemas.openxmlformats.org/drawingml/2006/main" xmlns:r="http://schemas.openxmlformats.org/officeDocument/2006/relationships" xmlns:p="http://schemas.openxmlformats.org/presentationml/2006/main">
+  <p:cSld>
+    <p:spTree>
+      <p:nvGrpSpPr>
+        <p:cNvPr id="1" name=""/>
+        <p:cNvGrpSpPr/>
+        <p:nvPr/>
+      </p:nvGrpSpPr>
+      <p:grpSpPr>
+        <a:xfrm>
+          <a:off x="0" y="0"/>
+          <a:ext cx="0" cy="0"/>
+          <a:chOff x="0" y="0"/>
+          <a:chExt cx="0" cy="0"/>
+        </a:xfrm>
+      </p:grpSpPr>
+      <p:sp>
+        <p:nvSpPr>
+          <p:cNvPr id="2" name="Slide Image Placeholder 1"/>
+          <p:cNvSpPr>
+            <a:spLocks noGrp="1" noRot="1" noChangeAspect="1"/>
+          </p:cNvSpPr>
+          <p:nvPr>
+            <p:ph type="sldImg"/>
+          </p:nvPr>
+        </p:nvSpPr>
+        <p:spPr/>
+      </p:sp>
+      <p:sp>
+        <p:nvSpPr>
+          <p:cNvPr id="3" name="Notes Placeholder 2"/>
+          <p:cNvSpPr>
+            <a:spLocks noGrp="1"/>
+          </p:cNvSpPr>
+          <p:nvPr>
+            <p:ph type="body" idx="1"/>
+          </p:nvPr>
+        </p:nvSpPr>
+        <p:spPr/>
+        <p:txBody>
+          <a:bodyPr/>
+          <a:lstStyle/>
+          <a:p>
+            <a:r>
+              <a:rPr lang="en-US" dirty="0" smtClean="0"/>
+              <a:t>Jacob</a:t>
+            </a:r>
+            <a:endParaRPr lang="en-US" dirty="0"/>
+          </a:p>
+        </p:txBody>
+      </p:sp>
+      <p:sp>
+        <p:nvSpPr>
+          <p:cNvPr id="4" name="Slide Number Placeholder 3"/>
+          <p:cNvSpPr>
+            <a:spLocks noGrp="1"/>
+          </p:cNvSpPr>
+          <p:nvPr>
+            <p:ph type="sldNum" sz="quarter" idx="10"/>
+          </p:nvPr>
+        </p:nvSpPr>
+        <p:spPr/>
+        <p:txBody>
+          <a:bodyPr/>
+          <a:lstStyle/>
+          <a:p>
+            <a:fld id="{FF5CDC9F-0281-447B-80BB-A2BA7CFD35CB}" type="slidenum">
+              <a:rPr lang="en-US" smtClean="0"/>
+              <a:t>9</a:t>
+            </a:fld>
+            <a:endParaRPr lang="en-US"/>
+          </a:p>
+        </p:txBody>
+      </p:sp>
+    </p:spTree>
+    <p:extLst>
+      <p:ext uri="{BB962C8B-B14F-4D97-AF65-F5344CB8AC3E}">
+        <p14:creationId xmlns:p14="http://schemas.microsoft.com/office/powerpoint/2010/main" val="2111569844"/>
+      </p:ext>
+    </p:extLst>
+  </p:cSld>
+  <p:clrMapOvr>
+    <a:masterClrMapping/>
+  </p:clrMapOvr>
+</p:notes>
 </file>
 
 <file path=ppt/slideLayouts/slideLayout1.xml><?xml version="1.0" encoding="utf-8"?>
@@ -681,14 +2548,20 @@
         </p:nvSpPr>
         <p:spPr/>
         <p:txBody>
-          <a:bodyPr/>
-          <a:lstStyle/>
-          <a:p>
-            <a:r>
-              <a:rPr lang="en-US" smtClean="0"/>
+          <a:bodyPr>
+            <a:normAutofit/>
+          </a:bodyPr>
+          <a:lstStyle>
+            <a:lvl1pPr>
+              <a:defRPr sz="3600"/>
+            </a:lvl1pPr>
+          </a:lstStyle>
+          <a:p>
+            <a:r>
+              <a:rPr lang="en-US" dirty="0" smtClean="0"/>
               <a:t>Click to edit Master title style</a:t>
             </a:r>
-            <a:endParaRPr lang="en-US"/>
+            <a:endParaRPr lang="en-US" dirty="0"/>
           </a:p>
         </p:txBody>
       </p:sp>
@@ -3026,6 +4899,897 @@
 </p:sld>
 </file>
 
+<file path=ppt/slides/slide10.xml><?xml version="1.0" encoding="utf-8"?>
+<p:sld xmlns:a="http://schemas.openxmlformats.org/drawingml/2006/main" xmlns:r="http://schemas.openxmlformats.org/officeDocument/2006/relationships" xmlns:p="http://schemas.openxmlformats.org/presentationml/2006/main">
+  <p:cSld>
+    <p:spTree>
+      <p:nvGrpSpPr>
+        <p:cNvPr id="1" name=""/>
+        <p:cNvGrpSpPr/>
+        <p:nvPr/>
+      </p:nvGrpSpPr>
+      <p:grpSpPr>
+        <a:xfrm>
+          <a:off x="0" y="0"/>
+          <a:ext cx="0" cy="0"/>
+          <a:chOff x="0" y="0"/>
+          <a:chExt cx="0" cy="0"/>
+        </a:xfrm>
+      </p:grpSpPr>
+      <p:sp>
+        <p:nvSpPr>
+          <p:cNvPr id="2" name="Title 1"/>
+          <p:cNvSpPr>
+            <a:spLocks noGrp="1"/>
+          </p:cNvSpPr>
+          <p:nvPr>
+            <p:ph type="title"/>
+          </p:nvPr>
+        </p:nvSpPr>
+        <p:spPr/>
+        <p:txBody>
+          <a:bodyPr/>
+          <a:lstStyle/>
+          <a:p>
+            <a:r>
+              <a:rPr lang="en-US" dirty="0" smtClean="0"/>
+              <a:t>Unintended Bias – Time</a:t>
+            </a:r>
+            <a:endParaRPr lang="en-US" dirty="0"/>
+          </a:p>
+        </p:txBody>
+      </p:sp>
+      <p:sp>
+        <p:nvSpPr>
+          <p:cNvPr id="3" name="Content Placeholder 2"/>
+          <p:cNvSpPr>
+            <a:spLocks noGrp="1"/>
+          </p:cNvSpPr>
+          <p:nvPr>
+            <p:ph idx="1"/>
+          </p:nvPr>
+        </p:nvSpPr>
+        <p:spPr>
+          <a:xfrm>
+            <a:off x="838199" y="1398155"/>
+            <a:ext cx="6900949" cy="585066"/>
+          </a:xfrm>
+        </p:spPr>
+        <p:txBody>
+          <a:bodyPr>
+            <a:normAutofit/>
+          </a:bodyPr>
+          <a:lstStyle/>
+          <a:p>
+            <a:pPr marL="0" indent="0">
+              <a:buNone/>
+            </a:pPr>
+            <a:r>
+              <a:rPr lang="en-US" sz="2400" i="1" dirty="0" smtClean="0"/>
+              <a:t>Weighted toxicity per disability over time</a:t>
+            </a:r>
+            <a:endParaRPr lang="en-US" sz="2400" i="1" dirty="0"/>
+          </a:p>
+        </p:txBody>
+      </p:sp>
+      <p:pic>
+        <p:nvPicPr>
+          <p:cNvPr id="4" name="Picture 3"/>
+          <p:cNvPicPr>
+            <a:picLocks noChangeAspect="1"/>
+          </p:cNvPicPr>
+          <p:nvPr/>
+        </p:nvPicPr>
+        <p:blipFill>
+          <a:blip r:embed="rId3">
+            <a:extLst>
+              <a:ext uri="{28A0092B-C50C-407E-A947-70E740481C1C}">
+                <a14:useLocalDpi xmlns:a14="http://schemas.microsoft.com/office/drawing/2010/main" val="0"/>
+              </a:ext>
+            </a:extLst>
+          </a:blip>
+          <a:stretch>
+            <a:fillRect/>
+          </a:stretch>
+        </p:blipFill>
+        <p:spPr>
+          <a:xfrm>
+            <a:off x="1777732" y="1895202"/>
+            <a:ext cx="8636535" cy="4858051"/>
+          </a:xfrm>
+          <a:prstGeom prst="rect">
+            <a:avLst/>
+          </a:prstGeom>
+        </p:spPr>
+      </p:pic>
+    </p:spTree>
+    <p:extLst>
+      <p:ext uri="{BB962C8B-B14F-4D97-AF65-F5344CB8AC3E}">
+        <p14:creationId xmlns:p14="http://schemas.microsoft.com/office/powerpoint/2010/main" val="1269366173"/>
+      </p:ext>
+    </p:extLst>
+  </p:cSld>
+  <p:clrMapOvr>
+    <a:masterClrMapping/>
+  </p:clrMapOvr>
+</p:sld>
+</file>
+
+<file path=ppt/slides/slide11.xml><?xml version="1.0" encoding="utf-8"?>
+<p:sld xmlns:a="http://schemas.openxmlformats.org/drawingml/2006/main" xmlns:r="http://schemas.openxmlformats.org/officeDocument/2006/relationships" xmlns:p="http://schemas.openxmlformats.org/presentationml/2006/main">
+  <p:cSld>
+    <p:spTree>
+      <p:nvGrpSpPr>
+        <p:cNvPr id="1" name=""/>
+        <p:cNvGrpSpPr/>
+        <p:nvPr/>
+      </p:nvGrpSpPr>
+      <p:grpSpPr>
+        <a:xfrm>
+          <a:off x="0" y="0"/>
+          <a:ext cx="0" cy="0"/>
+          <a:chOff x="0" y="0"/>
+          <a:chExt cx="0" cy="0"/>
+        </a:xfrm>
+      </p:grpSpPr>
+      <p:sp>
+        <p:nvSpPr>
+          <p:cNvPr id="2" name="Title 1"/>
+          <p:cNvSpPr>
+            <a:spLocks noGrp="1"/>
+          </p:cNvSpPr>
+          <p:nvPr>
+            <p:ph type="title"/>
+          </p:nvPr>
+        </p:nvSpPr>
+        <p:spPr/>
+        <p:txBody>
+          <a:bodyPr/>
+          <a:lstStyle/>
+          <a:p>
+            <a:r>
+              <a:rPr lang="en-US" dirty="0" smtClean="0"/>
+              <a:t>Class Imbalance</a:t>
+            </a:r>
+            <a:endParaRPr lang="en-US" dirty="0"/>
+          </a:p>
+        </p:txBody>
+      </p:sp>
+      <p:pic>
+        <p:nvPicPr>
+          <p:cNvPr id="6" name="Content Placeholder 5"/>
+          <p:cNvPicPr>
+            <a:picLocks noGrp="1" noChangeAspect="1"/>
+          </p:cNvPicPr>
+          <p:nvPr>
+            <p:ph idx="1"/>
+          </p:nvPr>
+        </p:nvPicPr>
+        <p:blipFill>
+          <a:blip r:embed="rId3">
+            <a:extLst>
+              <a:ext uri="{28A0092B-C50C-407E-A947-70E740481C1C}">
+                <a14:useLocalDpi xmlns:a14="http://schemas.microsoft.com/office/drawing/2010/main" val="0"/>
+              </a:ext>
+            </a:extLst>
+          </a:blip>
+          <a:stretch>
+            <a:fillRect/>
+          </a:stretch>
+        </p:blipFill>
+        <p:spPr>
+          <a:xfrm>
+            <a:off x="2178940" y="1690688"/>
+            <a:ext cx="7252230" cy="4351338"/>
+          </a:xfrm>
+        </p:spPr>
+      </p:pic>
+    </p:spTree>
+    <p:extLst>
+      <p:ext uri="{BB962C8B-B14F-4D97-AF65-F5344CB8AC3E}">
+        <p14:creationId xmlns:p14="http://schemas.microsoft.com/office/powerpoint/2010/main" val="16722719"/>
+      </p:ext>
+    </p:extLst>
+  </p:cSld>
+  <p:clrMapOvr>
+    <a:masterClrMapping/>
+  </p:clrMapOvr>
+</p:sld>
+</file>
+
+<file path=ppt/slides/slide12.xml><?xml version="1.0" encoding="utf-8"?>
+<p:sld xmlns:a="http://schemas.openxmlformats.org/drawingml/2006/main" xmlns:r="http://schemas.openxmlformats.org/officeDocument/2006/relationships" xmlns:p="http://schemas.openxmlformats.org/presentationml/2006/main">
+  <p:cSld>
+    <p:spTree>
+      <p:nvGrpSpPr>
+        <p:cNvPr id="1" name=""/>
+        <p:cNvGrpSpPr/>
+        <p:nvPr/>
+      </p:nvGrpSpPr>
+      <p:grpSpPr>
+        <a:xfrm>
+          <a:off x="0" y="0"/>
+          <a:ext cx="0" cy="0"/>
+          <a:chOff x="0" y="0"/>
+          <a:chExt cx="0" cy="0"/>
+        </a:xfrm>
+      </p:grpSpPr>
+      <p:sp>
+        <p:nvSpPr>
+          <p:cNvPr id="2" name="Title 1"/>
+          <p:cNvSpPr>
+            <a:spLocks noGrp="1"/>
+          </p:cNvSpPr>
+          <p:nvPr>
+            <p:ph type="title"/>
+          </p:nvPr>
+        </p:nvSpPr>
+        <p:spPr/>
+        <p:txBody>
+          <a:bodyPr/>
+          <a:lstStyle/>
+          <a:p>
+            <a:r>
+              <a:rPr lang="en-US" dirty="0" smtClean="0"/>
+              <a:t>Class Imbalance - Demographic</a:t>
+            </a:r>
+            <a:endParaRPr lang="en-US" dirty="0"/>
+          </a:p>
+        </p:txBody>
+      </p:sp>
+      <p:pic>
+        <p:nvPicPr>
+          <p:cNvPr id="6" name="Content Placeholder 5"/>
+          <p:cNvPicPr>
+            <a:picLocks noGrp="1" noChangeAspect="1"/>
+          </p:cNvPicPr>
+          <p:nvPr>
+            <p:ph idx="1"/>
+          </p:nvPr>
+        </p:nvPicPr>
+        <p:blipFill>
+          <a:blip r:embed="rId3" cstate="print">
+            <a:extLst>
+              <a:ext uri="{28A0092B-C50C-407E-A947-70E740481C1C}">
+                <a14:useLocalDpi xmlns:a14="http://schemas.microsoft.com/office/drawing/2010/main" val="0"/>
+              </a:ext>
+            </a:extLst>
+          </a:blip>
+          <a:stretch>
+            <a:fillRect/>
+          </a:stretch>
+        </p:blipFill>
+        <p:spPr>
+          <a:xfrm>
+            <a:off x="2832496" y="1825625"/>
+            <a:ext cx="6527007" cy="4351338"/>
+          </a:xfrm>
+        </p:spPr>
+      </p:pic>
+    </p:spTree>
+    <p:extLst>
+      <p:ext uri="{BB962C8B-B14F-4D97-AF65-F5344CB8AC3E}">
+        <p14:creationId xmlns:p14="http://schemas.microsoft.com/office/powerpoint/2010/main" val="4089371635"/>
+      </p:ext>
+    </p:extLst>
+  </p:cSld>
+  <p:clrMapOvr>
+    <a:masterClrMapping/>
+  </p:clrMapOvr>
+</p:sld>
+</file>
+
+<file path=ppt/slides/slide13.xml><?xml version="1.0" encoding="utf-8"?>
+<p:sld xmlns:a="http://schemas.openxmlformats.org/drawingml/2006/main" xmlns:r="http://schemas.openxmlformats.org/officeDocument/2006/relationships" xmlns:p="http://schemas.openxmlformats.org/presentationml/2006/main">
+  <p:cSld>
+    <p:spTree>
+      <p:nvGrpSpPr>
+        <p:cNvPr id="1" name=""/>
+        <p:cNvGrpSpPr/>
+        <p:nvPr/>
+      </p:nvGrpSpPr>
+      <p:grpSpPr>
+        <a:xfrm>
+          <a:off x="0" y="0"/>
+          <a:ext cx="0" cy="0"/>
+          <a:chOff x="0" y="0"/>
+          <a:chExt cx="0" cy="0"/>
+        </a:xfrm>
+      </p:grpSpPr>
+      <p:sp>
+        <p:nvSpPr>
+          <p:cNvPr id="2" name="Title 1"/>
+          <p:cNvSpPr>
+            <a:spLocks noGrp="1"/>
+          </p:cNvSpPr>
+          <p:nvPr>
+            <p:ph type="title"/>
+          </p:nvPr>
+        </p:nvSpPr>
+        <p:spPr/>
+        <p:txBody>
+          <a:bodyPr/>
+          <a:lstStyle/>
+          <a:p>
+            <a:r>
+              <a:rPr lang="en-US" dirty="0" smtClean="0"/>
+              <a:t>Model</a:t>
+            </a:r>
+            <a:endParaRPr lang="en-US" dirty="0"/>
+          </a:p>
+        </p:txBody>
+      </p:sp>
+      <p:sp>
+        <p:nvSpPr>
+          <p:cNvPr id="3" name="Content Placeholder 2"/>
+          <p:cNvSpPr>
+            <a:spLocks noGrp="1"/>
+          </p:cNvSpPr>
+          <p:nvPr>
+            <p:ph idx="1"/>
+          </p:nvPr>
+        </p:nvSpPr>
+        <p:spPr/>
+        <p:txBody>
+          <a:bodyPr/>
+          <a:lstStyle/>
+          <a:p>
+            <a:r>
+              <a:rPr lang="en-US" dirty="0" smtClean="0"/>
+              <a:t>Auxiliary outputs</a:t>
+            </a:r>
+          </a:p>
+          <a:p>
+            <a:pPr lvl="1"/>
+            <a:r>
+              <a:rPr lang="en-US" dirty="0" smtClean="0"/>
+              <a:t>Looks at more than just comment toxicity</a:t>
+            </a:r>
+            <a:endParaRPr lang="en-US" dirty="0"/>
+          </a:p>
+        </p:txBody>
+      </p:sp>
+    </p:spTree>
+    <p:extLst>
+      <p:ext uri="{BB962C8B-B14F-4D97-AF65-F5344CB8AC3E}">
+        <p14:creationId xmlns:p14="http://schemas.microsoft.com/office/powerpoint/2010/main" val="3945511465"/>
+      </p:ext>
+    </p:extLst>
+  </p:cSld>
+  <p:clrMapOvr>
+    <a:masterClrMapping/>
+  </p:clrMapOvr>
+</p:sld>
+</file>
+
+<file path=ppt/slides/slide14.xml><?xml version="1.0" encoding="utf-8"?>
+<p:sld xmlns:a="http://schemas.openxmlformats.org/drawingml/2006/main" xmlns:r="http://schemas.openxmlformats.org/officeDocument/2006/relationships" xmlns:p="http://schemas.openxmlformats.org/presentationml/2006/main">
+  <p:cSld>
+    <p:spTree>
+      <p:nvGrpSpPr>
+        <p:cNvPr id="1" name=""/>
+        <p:cNvGrpSpPr/>
+        <p:nvPr/>
+      </p:nvGrpSpPr>
+      <p:grpSpPr>
+        <a:xfrm>
+          <a:off x="0" y="0"/>
+          <a:ext cx="0" cy="0"/>
+          <a:chOff x="0" y="0"/>
+          <a:chExt cx="0" cy="0"/>
+        </a:xfrm>
+      </p:grpSpPr>
+      <p:sp>
+        <p:nvSpPr>
+          <p:cNvPr id="2" name="Title 1"/>
+          <p:cNvSpPr>
+            <a:spLocks noGrp="1"/>
+          </p:cNvSpPr>
+          <p:nvPr>
+            <p:ph type="title"/>
+          </p:nvPr>
+        </p:nvSpPr>
+        <p:spPr/>
+        <p:txBody>
+          <a:bodyPr/>
+          <a:lstStyle/>
+          <a:p>
+            <a:r>
+              <a:rPr lang="en-US" dirty="0" smtClean="0"/>
+              <a:t>Preliminary Results</a:t>
+            </a:r>
+            <a:endParaRPr lang="en-US" dirty="0"/>
+          </a:p>
+        </p:txBody>
+      </p:sp>
+      <p:sp>
+        <p:nvSpPr>
+          <p:cNvPr id="3" name="Content Placeholder 2"/>
+          <p:cNvSpPr>
+            <a:spLocks noGrp="1"/>
+          </p:cNvSpPr>
+          <p:nvPr>
+            <p:ph idx="1"/>
+          </p:nvPr>
+        </p:nvSpPr>
+        <p:spPr/>
+        <p:txBody>
+          <a:bodyPr/>
+          <a:lstStyle/>
+          <a:p>
+            <a:endParaRPr lang="en-US" dirty="0"/>
+          </a:p>
+        </p:txBody>
+      </p:sp>
+    </p:spTree>
+    <p:extLst>
+      <p:ext uri="{BB962C8B-B14F-4D97-AF65-F5344CB8AC3E}">
+        <p14:creationId xmlns:p14="http://schemas.microsoft.com/office/powerpoint/2010/main" val="2162024959"/>
+      </p:ext>
+    </p:extLst>
+  </p:cSld>
+  <p:clrMapOvr>
+    <a:masterClrMapping/>
+  </p:clrMapOvr>
+</p:sld>
+</file>
+
+<file path=ppt/slides/slide15.xml><?xml version="1.0" encoding="utf-8"?>
+<p:sld xmlns:a="http://schemas.openxmlformats.org/drawingml/2006/main" xmlns:r="http://schemas.openxmlformats.org/officeDocument/2006/relationships" xmlns:p="http://schemas.openxmlformats.org/presentationml/2006/main">
+  <p:cSld>
+    <p:spTree>
+      <p:nvGrpSpPr>
+        <p:cNvPr id="1" name=""/>
+        <p:cNvGrpSpPr/>
+        <p:nvPr/>
+      </p:nvGrpSpPr>
+      <p:grpSpPr>
+        <a:xfrm>
+          <a:off x="0" y="0"/>
+          <a:ext cx="0" cy="0"/>
+          <a:chOff x="0" y="0"/>
+          <a:chExt cx="0" cy="0"/>
+        </a:xfrm>
+      </p:grpSpPr>
+      <p:sp>
+        <p:nvSpPr>
+          <p:cNvPr id="2" name="Title 1"/>
+          <p:cNvSpPr>
+            <a:spLocks noGrp="1"/>
+          </p:cNvSpPr>
+          <p:nvPr>
+            <p:ph type="title"/>
+          </p:nvPr>
+        </p:nvSpPr>
+        <p:spPr/>
+        <p:txBody>
+          <a:bodyPr/>
+          <a:lstStyle/>
+          <a:p>
+            <a:r>
+              <a:rPr lang="en-US" dirty="0" smtClean="0"/>
+              <a:t>Model Deployment – Societal Impacts</a:t>
+            </a:r>
+            <a:endParaRPr lang="en-US" dirty="0"/>
+          </a:p>
+        </p:txBody>
+      </p:sp>
+      <p:sp>
+        <p:nvSpPr>
+          <p:cNvPr id="3" name="Content Placeholder 2"/>
+          <p:cNvSpPr>
+            <a:spLocks noGrp="1"/>
+          </p:cNvSpPr>
+          <p:nvPr>
+            <p:ph idx="1"/>
+          </p:nvPr>
+        </p:nvSpPr>
+        <p:spPr/>
+        <p:txBody>
+          <a:bodyPr>
+            <a:normAutofit fontScale="85000" lnSpcReduction="20000"/>
+          </a:bodyPr>
+          <a:lstStyle/>
+          <a:p>
+            <a:r>
+              <a:rPr lang="en-US" dirty="0" smtClean="0"/>
+              <a:t>Transparency (Opacity)</a:t>
+            </a:r>
+          </a:p>
+          <a:p>
+            <a:pPr lvl="1"/>
+            <a:r>
+              <a:rPr lang="en-US" dirty="0" smtClean="0"/>
+              <a:t>Transparency to the deploying company</a:t>
+            </a:r>
+          </a:p>
+          <a:p>
+            <a:pPr lvl="1"/>
+            <a:r>
+              <a:rPr lang="en-US" dirty="0" smtClean="0"/>
+              <a:t>Determining auxiliary outputs can help make the model more transparent</a:t>
+            </a:r>
+          </a:p>
+          <a:p>
+            <a:r>
+              <a:rPr lang="en-US" dirty="0" smtClean="0"/>
+              <a:t>Bias</a:t>
+            </a:r>
+          </a:p>
+          <a:p>
+            <a:pPr lvl="1"/>
+            <a:r>
+              <a:rPr lang="en-US" dirty="0" smtClean="0"/>
+              <a:t>Ensuring output is not biased towards certain groups</a:t>
+            </a:r>
+          </a:p>
+          <a:p>
+            <a:r>
+              <a:rPr lang="en-US" dirty="0" smtClean="0"/>
+              <a:t>Labor</a:t>
+            </a:r>
+          </a:p>
+          <a:p>
+            <a:pPr lvl="1"/>
+            <a:r>
+              <a:rPr lang="en-US" dirty="0" smtClean="0"/>
+              <a:t>Very minimal</a:t>
+            </a:r>
+          </a:p>
+          <a:p>
+            <a:r>
+              <a:rPr lang="en-US" dirty="0" smtClean="0"/>
+              <a:t>Privacy</a:t>
+            </a:r>
+          </a:p>
+          <a:p>
+            <a:pPr lvl="1"/>
+            <a:r>
+              <a:rPr lang="en-US" dirty="0" smtClean="0"/>
+              <a:t>Some people might be concerned with their data being used</a:t>
+            </a:r>
+          </a:p>
+          <a:p>
+            <a:pPr lvl="1"/>
+            <a:r>
+              <a:rPr lang="en-US" dirty="0" smtClean="0"/>
+              <a:t>These are public comments</a:t>
+            </a:r>
+          </a:p>
+          <a:p>
+            <a:r>
+              <a:rPr lang="en-US" dirty="0" smtClean="0"/>
+              <a:t>Liability</a:t>
+            </a:r>
+          </a:p>
+          <a:p>
+            <a:pPr lvl="1"/>
+            <a:r>
+              <a:rPr lang="en-US" dirty="0" smtClean="0"/>
+              <a:t>Missing a toxic comment</a:t>
+            </a:r>
+          </a:p>
+          <a:p>
+            <a:pPr lvl="1"/>
+            <a:r>
+              <a:rPr lang="en-US" dirty="0" smtClean="0"/>
+              <a:t>Flagging a non-toxic comment</a:t>
+            </a:r>
+          </a:p>
+        </p:txBody>
+      </p:sp>
+    </p:spTree>
+    <p:extLst>
+      <p:ext uri="{BB962C8B-B14F-4D97-AF65-F5344CB8AC3E}">
+        <p14:creationId xmlns:p14="http://schemas.microsoft.com/office/powerpoint/2010/main" val="2085265388"/>
+      </p:ext>
+    </p:extLst>
+  </p:cSld>
+  <p:clrMapOvr>
+    <a:masterClrMapping/>
+  </p:clrMapOvr>
+</p:sld>
+</file>
+
+<file path=ppt/slides/slide16.xml><?xml version="1.0" encoding="utf-8"?>
+<p:sld xmlns:a="http://schemas.openxmlformats.org/drawingml/2006/main" xmlns:r="http://schemas.openxmlformats.org/officeDocument/2006/relationships" xmlns:p="http://schemas.openxmlformats.org/presentationml/2006/main">
+  <p:cSld>
+    <p:spTree>
+      <p:nvGrpSpPr>
+        <p:cNvPr id="1" name=""/>
+        <p:cNvGrpSpPr/>
+        <p:nvPr/>
+      </p:nvGrpSpPr>
+      <p:grpSpPr>
+        <a:xfrm>
+          <a:off x="0" y="0"/>
+          <a:ext cx="0" cy="0"/>
+          <a:chOff x="0" y="0"/>
+          <a:chExt cx="0" cy="0"/>
+        </a:xfrm>
+      </p:grpSpPr>
+      <p:sp>
+        <p:nvSpPr>
+          <p:cNvPr id="2" name="Title 1"/>
+          <p:cNvSpPr>
+            <a:spLocks noGrp="1"/>
+          </p:cNvSpPr>
+          <p:nvPr>
+            <p:ph type="title"/>
+          </p:nvPr>
+        </p:nvSpPr>
+        <p:spPr/>
+        <p:txBody>
+          <a:bodyPr/>
+          <a:lstStyle/>
+          <a:p>
+            <a:r>
+              <a:rPr lang="en-US" dirty="0" smtClean="0"/>
+              <a:t>Freedom of Speech and Censorship</a:t>
+            </a:r>
+            <a:endParaRPr lang="en-US" dirty="0"/>
+          </a:p>
+        </p:txBody>
+      </p:sp>
+      <p:sp>
+        <p:nvSpPr>
+          <p:cNvPr id="3" name="Content Placeholder 2"/>
+          <p:cNvSpPr>
+            <a:spLocks noGrp="1"/>
+          </p:cNvSpPr>
+          <p:nvPr>
+            <p:ph idx="1"/>
+          </p:nvPr>
+        </p:nvSpPr>
+        <p:spPr/>
+        <p:txBody>
+          <a:bodyPr/>
+          <a:lstStyle/>
+          <a:p>
+            <a:r>
+              <a:rPr lang="en-US" dirty="0" smtClean="0"/>
+              <a:t>Societal controversy regarding freedom of speech and censorship</a:t>
+            </a:r>
+          </a:p>
+          <a:p>
+            <a:pPr lvl="1"/>
+            <a:r>
+              <a:rPr lang="en-US" dirty="0" smtClean="0"/>
+              <a:t>How is this considered in AI models?</a:t>
+            </a:r>
+          </a:p>
+          <a:p>
+            <a:pPr lvl="1"/>
+            <a:endParaRPr lang="en-US" dirty="0"/>
+          </a:p>
+          <a:p>
+            <a:r>
+              <a:rPr lang="en-US" dirty="0" smtClean="0"/>
+              <a:t>Is this model necessary?</a:t>
+            </a:r>
+          </a:p>
+        </p:txBody>
+      </p:sp>
+    </p:spTree>
+    <p:extLst>
+      <p:ext uri="{BB962C8B-B14F-4D97-AF65-F5344CB8AC3E}">
+        <p14:creationId xmlns:p14="http://schemas.microsoft.com/office/powerpoint/2010/main" val="485101640"/>
+      </p:ext>
+    </p:extLst>
+  </p:cSld>
+  <p:clrMapOvr>
+    <a:masterClrMapping/>
+  </p:clrMapOvr>
+</p:sld>
+</file>
+
+<file path=ppt/slides/slide17.xml><?xml version="1.0" encoding="utf-8"?>
+<p:sld xmlns:a="http://schemas.openxmlformats.org/drawingml/2006/main" xmlns:r="http://schemas.openxmlformats.org/officeDocument/2006/relationships" xmlns:p="http://schemas.openxmlformats.org/presentationml/2006/main">
+  <p:cSld>
+    <p:spTree>
+      <p:nvGrpSpPr>
+        <p:cNvPr id="1" name=""/>
+        <p:cNvGrpSpPr/>
+        <p:nvPr/>
+      </p:nvGrpSpPr>
+      <p:grpSpPr>
+        <a:xfrm>
+          <a:off x="0" y="0"/>
+          <a:ext cx="0" cy="0"/>
+          <a:chOff x="0" y="0"/>
+          <a:chExt cx="0" cy="0"/>
+        </a:xfrm>
+      </p:grpSpPr>
+      <p:sp>
+        <p:nvSpPr>
+          <p:cNvPr id="2" name="Title 1"/>
+          <p:cNvSpPr>
+            <a:spLocks noGrp="1"/>
+          </p:cNvSpPr>
+          <p:nvPr>
+            <p:ph type="title"/>
+          </p:nvPr>
+        </p:nvSpPr>
+        <p:spPr/>
+        <p:txBody>
+          <a:bodyPr/>
+          <a:lstStyle/>
+          <a:p>
+            <a:r>
+              <a:rPr lang="en-US" dirty="0" smtClean="0"/>
+              <a:t>Future Work</a:t>
+            </a:r>
+            <a:endParaRPr lang="en-US" dirty="0"/>
+          </a:p>
+        </p:txBody>
+      </p:sp>
+      <p:pic>
+        <p:nvPicPr>
+          <p:cNvPr id="4" name="Content Placeholder 3"/>
+          <p:cNvPicPr>
+            <a:picLocks noGrp="1" noChangeAspect="1"/>
+          </p:cNvPicPr>
+          <p:nvPr>
+            <p:ph idx="1"/>
+          </p:nvPr>
+        </p:nvPicPr>
+        <p:blipFill>
+          <a:blip r:embed="rId3" cstate="print">
+            <a:extLst>
+              <a:ext uri="{28A0092B-C50C-407E-A947-70E740481C1C}">
+                <a14:useLocalDpi xmlns:a14="http://schemas.microsoft.com/office/drawing/2010/main" val="0"/>
+              </a:ext>
+            </a:extLst>
+          </a:blip>
+          <a:stretch>
+            <a:fillRect/>
+          </a:stretch>
+        </p:blipFill>
+        <p:spPr>
+          <a:xfrm>
+            <a:off x="4622881" y="1690688"/>
+            <a:ext cx="7252229" cy="4351337"/>
+          </a:xfrm>
+        </p:spPr>
+      </p:pic>
+      <p:sp>
+        <p:nvSpPr>
+          <p:cNvPr id="5" name="TextBox 4"/>
+          <p:cNvSpPr txBox="1"/>
+          <p:nvPr/>
+        </p:nvSpPr>
+        <p:spPr>
+          <a:xfrm>
+            <a:off x="897775" y="2069869"/>
+            <a:ext cx="3433156" cy="3970318"/>
+          </a:xfrm>
+          <a:prstGeom prst="rect">
+            <a:avLst/>
+          </a:prstGeom>
+          <a:noFill/>
+        </p:spPr>
+        <p:txBody>
+          <a:bodyPr wrap="square" rtlCol="0">
+            <a:spAutoFit/>
+          </a:bodyPr>
+          <a:lstStyle/>
+          <a:p>
+            <a:pPr marL="285750" indent="-285750">
+              <a:buFont typeface="Arial" panose="020B0604020202020204" pitchFamily="34" charset="0"/>
+              <a:buChar char="•"/>
+            </a:pPr>
+            <a:r>
+              <a:rPr lang="en-US" dirty="0" smtClean="0"/>
+              <a:t>Feature Engineering</a:t>
+            </a:r>
+          </a:p>
+          <a:p>
+            <a:pPr marL="742950" lvl="1" indent="-285750">
+              <a:buFont typeface="Arial" panose="020B0604020202020204" pitchFamily="34" charset="0"/>
+              <a:buChar char="•"/>
+            </a:pPr>
+            <a:r>
+              <a:rPr lang="en-US" dirty="0" smtClean="0"/>
+              <a:t>New features</a:t>
+            </a:r>
+          </a:p>
+          <a:p>
+            <a:pPr marL="742950" lvl="1" indent="-285750">
+              <a:buFont typeface="Arial" panose="020B0604020202020204" pitchFamily="34" charset="0"/>
+              <a:buChar char="•"/>
+            </a:pPr>
+            <a:endParaRPr lang="en-US" dirty="0"/>
+          </a:p>
+          <a:p>
+            <a:pPr marL="285750" indent="-285750">
+              <a:buFont typeface="Arial" panose="020B0604020202020204" pitchFamily="34" charset="0"/>
+              <a:buChar char="•"/>
+            </a:pPr>
+            <a:r>
+              <a:rPr lang="en-US" dirty="0" smtClean="0"/>
+              <a:t>Data cleaning</a:t>
+            </a:r>
+          </a:p>
+          <a:p>
+            <a:pPr marL="742950" lvl="1" indent="-285750">
+              <a:buFont typeface="Arial" panose="020B0604020202020204" pitchFamily="34" charset="0"/>
+              <a:buChar char="•"/>
+            </a:pPr>
+            <a:r>
+              <a:rPr lang="en-US" dirty="0" smtClean="0"/>
+              <a:t>Contraction mapping</a:t>
+            </a:r>
+          </a:p>
+          <a:p>
+            <a:pPr lvl="1"/>
+            <a:endParaRPr lang="en-US" dirty="0" smtClean="0"/>
+          </a:p>
+          <a:p>
+            <a:pPr marL="285750" indent="-285750">
+              <a:buFont typeface="Arial" panose="020B0604020202020204" pitchFamily="34" charset="0"/>
+              <a:buChar char="•"/>
+            </a:pPr>
+            <a:r>
+              <a:rPr lang="en-US" dirty="0" smtClean="0"/>
+              <a:t>Addressing class imbalance</a:t>
+            </a:r>
+          </a:p>
+          <a:p>
+            <a:pPr marL="742950" lvl="1" indent="-285750">
+              <a:buFont typeface="Arial" panose="020B0604020202020204" pitchFamily="34" charset="0"/>
+              <a:buChar char="•"/>
+            </a:pPr>
+            <a:endParaRPr lang="en-US" dirty="0"/>
+          </a:p>
+          <a:p>
+            <a:pPr marL="285750" indent="-285750">
+              <a:buFont typeface="Arial" panose="020B0604020202020204" pitchFamily="34" charset="0"/>
+              <a:buChar char="•"/>
+            </a:pPr>
+            <a:r>
+              <a:rPr lang="en-US" dirty="0" smtClean="0"/>
+              <a:t>Performance based on demographic</a:t>
+            </a:r>
+          </a:p>
+          <a:p>
+            <a:pPr marL="742950" lvl="1" indent="-285750">
+              <a:buFont typeface="Arial" panose="020B0604020202020204" pitchFamily="34" charset="0"/>
+              <a:buChar char="•"/>
+            </a:pPr>
+            <a:r>
+              <a:rPr lang="en-US" dirty="0" smtClean="0"/>
+              <a:t>Toxicity and auxiliary outputs</a:t>
+            </a:r>
+          </a:p>
+          <a:p>
+            <a:pPr marL="285750" indent="-285750">
+              <a:buFont typeface="Arial" panose="020B0604020202020204" pitchFamily="34" charset="0"/>
+              <a:buChar char="•"/>
+            </a:pPr>
+            <a:endParaRPr lang="en-US" dirty="0"/>
+          </a:p>
+          <a:p>
+            <a:pPr marL="285750" indent="-285750">
+              <a:buFont typeface="Arial" panose="020B0604020202020204" pitchFamily="34" charset="0"/>
+              <a:buChar char="•"/>
+            </a:pPr>
+            <a:endParaRPr lang="en-US" dirty="0"/>
+          </a:p>
+        </p:txBody>
+      </p:sp>
+    </p:spTree>
+    <p:extLst>
+      <p:ext uri="{BB962C8B-B14F-4D97-AF65-F5344CB8AC3E}">
+        <p14:creationId xmlns:p14="http://schemas.microsoft.com/office/powerpoint/2010/main" val="86519822"/>
+      </p:ext>
+    </p:extLst>
+  </p:cSld>
+  <p:clrMapOvr>
+    <a:masterClrMapping/>
+  </p:clrMapOvr>
+</p:sld>
+</file>
+
 <file path=ppt/slides/slide2.xml><?xml version="1.0" encoding="utf-8"?>
 <p:sld xmlns:a="http://schemas.openxmlformats.org/drawingml/2006/main" xmlns:r="http://schemas.openxmlformats.org/officeDocument/2006/relationships" xmlns:p="http://schemas.openxmlformats.org/presentationml/2006/main">
   <p:cSld>
@@ -3282,33 +6046,593 @@
           <a:bodyPr/>
           <a:lstStyle/>
           <a:p>
-            <a:endParaRPr lang="en-US"/>
-          </a:p>
-        </p:txBody>
-      </p:sp>
-      <p:sp>
-        <p:nvSpPr>
-          <p:cNvPr id="3" name="Content Placeholder 2"/>
-          <p:cNvSpPr>
-            <a:spLocks noGrp="1"/>
-          </p:cNvSpPr>
+            <a:r>
+              <a:rPr lang="en-US" dirty="0" smtClean="0"/>
+              <a:t>Unintended Bias – Demographics &amp; Toxicity</a:t>
+            </a:r>
+            <a:endParaRPr lang="en-US" dirty="0"/>
+          </a:p>
+        </p:txBody>
+      </p:sp>
+      <p:pic>
+        <p:nvPicPr>
+          <p:cNvPr id="10" name="Content Placeholder 9"/>
+          <p:cNvPicPr>
+            <a:picLocks noGrp="1" noChangeAspect="1"/>
+          </p:cNvPicPr>
           <p:nvPr>
             <p:ph idx="1"/>
           </p:nvPr>
-        </p:nvSpPr>
-        <p:spPr/>
-        <p:txBody>
-          <a:bodyPr/>
-          <a:lstStyle/>
-          <a:p>
-            <a:endParaRPr lang="en-US"/>
-          </a:p>
-        </p:txBody>
-      </p:sp>
+        </p:nvPicPr>
+        <p:blipFill>
+          <a:blip r:embed="rId3" cstate="print">
+            <a:extLst>
+              <a:ext uri="{28A0092B-C50C-407E-A947-70E740481C1C}">
+                <a14:useLocalDpi xmlns:a14="http://schemas.microsoft.com/office/drawing/2010/main" val="0"/>
+              </a:ext>
+            </a:extLst>
+          </a:blip>
+          <a:stretch>
+            <a:fillRect/>
+          </a:stretch>
+        </p:blipFill>
+        <p:spPr>
+          <a:xfrm>
+            <a:off x="2832496" y="1825625"/>
+            <a:ext cx="6527007" cy="4351338"/>
+          </a:xfrm>
+        </p:spPr>
+      </p:pic>
     </p:spTree>
     <p:extLst>
       <p:ext uri="{BB962C8B-B14F-4D97-AF65-F5344CB8AC3E}">
         <p14:creationId xmlns:p14="http://schemas.microsoft.com/office/powerpoint/2010/main" val="1683545053"/>
+      </p:ext>
+    </p:extLst>
+  </p:cSld>
+  <p:clrMapOvr>
+    <a:masterClrMapping/>
+  </p:clrMapOvr>
+</p:sld>
+</file>
+
+<file path=ppt/slides/slide5.xml><?xml version="1.0" encoding="utf-8"?>
+<p:sld xmlns:a="http://schemas.openxmlformats.org/drawingml/2006/main" xmlns:r="http://schemas.openxmlformats.org/officeDocument/2006/relationships" xmlns:p="http://schemas.openxmlformats.org/presentationml/2006/main">
+  <p:cSld>
+    <p:spTree>
+      <p:nvGrpSpPr>
+        <p:cNvPr id="1" name=""/>
+        <p:cNvGrpSpPr/>
+        <p:nvPr/>
+      </p:nvGrpSpPr>
+      <p:grpSpPr>
+        <a:xfrm>
+          <a:off x="0" y="0"/>
+          <a:ext cx="0" cy="0"/>
+          <a:chOff x="0" y="0"/>
+          <a:chExt cx="0" cy="0"/>
+        </a:xfrm>
+      </p:grpSpPr>
+      <p:sp>
+        <p:nvSpPr>
+          <p:cNvPr id="2" name="Title 1"/>
+          <p:cNvSpPr>
+            <a:spLocks noGrp="1"/>
+          </p:cNvSpPr>
+          <p:nvPr>
+            <p:ph type="title"/>
+          </p:nvPr>
+        </p:nvSpPr>
+        <p:spPr/>
+        <p:txBody>
+          <a:bodyPr/>
+          <a:lstStyle/>
+          <a:p>
+            <a:r>
+              <a:rPr lang="en-US" dirty="0" smtClean="0"/>
+              <a:t>Unintended Bias – Demographics &amp; Comment Label</a:t>
+            </a:r>
+            <a:endParaRPr lang="en-US" dirty="0"/>
+          </a:p>
+        </p:txBody>
+      </p:sp>
+      <p:pic>
+        <p:nvPicPr>
+          <p:cNvPr id="6" name="Content Placeholder 5"/>
+          <p:cNvPicPr>
+            <a:picLocks noGrp="1" noChangeAspect="1"/>
+          </p:cNvPicPr>
+          <p:nvPr>
+            <p:ph idx="1"/>
+          </p:nvPr>
+        </p:nvPicPr>
+        <p:blipFill>
+          <a:blip r:embed="rId3" cstate="print">
+            <a:extLst>
+              <a:ext uri="{28A0092B-C50C-407E-A947-70E740481C1C}">
+                <a14:useLocalDpi xmlns:a14="http://schemas.microsoft.com/office/drawing/2010/main" val="0"/>
+              </a:ext>
+            </a:extLst>
+          </a:blip>
+          <a:stretch>
+            <a:fillRect/>
+          </a:stretch>
+        </p:blipFill>
+        <p:spPr>
+          <a:xfrm>
+            <a:off x="2832497" y="1825625"/>
+            <a:ext cx="6527006" cy="4351338"/>
+          </a:xfrm>
+        </p:spPr>
+      </p:pic>
+    </p:spTree>
+    <p:extLst>
+      <p:ext uri="{BB962C8B-B14F-4D97-AF65-F5344CB8AC3E}">
+        <p14:creationId xmlns:p14="http://schemas.microsoft.com/office/powerpoint/2010/main" val="4059991253"/>
+      </p:ext>
+    </p:extLst>
+  </p:cSld>
+  <p:clrMapOvr>
+    <a:masterClrMapping/>
+  </p:clrMapOvr>
+</p:sld>
+</file>
+
+<file path=ppt/slides/slide6.xml><?xml version="1.0" encoding="utf-8"?>
+<p:sld xmlns:a="http://schemas.openxmlformats.org/drawingml/2006/main" xmlns:r="http://schemas.openxmlformats.org/officeDocument/2006/relationships" xmlns:p="http://schemas.openxmlformats.org/presentationml/2006/main">
+  <p:cSld>
+    <p:spTree>
+      <p:nvGrpSpPr>
+        <p:cNvPr id="1" name=""/>
+        <p:cNvGrpSpPr/>
+        <p:nvPr/>
+      </p:nvGrpSpPr>
+      <p:grpSpPr>
+        <a:xfrm>
+          <a:off x="0" y="0"/>
+          <a:ext cx="0" cy="0"/>
+          <a:chOff x="0" y="0"/>
+          <a:chExt cx="0" cy="0"/>
+        </a:xfrm>
+      </p:grpSpPr>
+      <p:sp>
+        <p:nvSpPr>
+          <p:cNvPr id="2" name="Title 1"/>
+          <p:cNvSpPr>
+            <a:spLocks noGrp="1"/>
+          </p:cNvSpPr>
+          <p:nvPr>
+            <p:ph type="title"/>
+          </p:nvPr>
+        </p:nvSpPr>
+        <p:spPr/>
+        <p:txBody>
+          <a:bodyPr/>
+          <a:lstStyle/>
+          <a:p>
+            <a:r>
+              <a:rPr lang="en-US" dirty="0" smtClean="0"/>
+              <a:t>Unintended Bias – Time</a:t>
+            </a:r>
+            <a:endParaRPr lang="en-US" dirty="0"/>
+          </a:p>
+        </p:txBody>
+      </p:sp>
+      <p:sp>
+        <p:nvSpPr>
+          <p:cNvPr id="3" name="Content Placeholder 2"/>
+          <p:cNvSpPr>
+            <a:spLocks noGrp="1"/>
+          </p:cNvSpPr>
+          <p:nvPr>
+            <p:ph idx="1"/>
+          </p:nvPr>
+        </p:nvSpPr>
+        <p:spPr>
+          <a:xfrm>
+            <a:off x="838200" y="1398155"/>
+            <a:ext cx="5421284" cy="585066"/>
+          </a:xfrm>
+        </p:spPr>
+        <p:txBody>
+          <a:bodyPr>
+            <a:normAutofit/>
+          </a:bodyPr>
+          <a:lstStyle/>
+          <a:p>
+            <a:pPr marL="0" indent="0">
+              <a:buNone/>
+            </a:pPr>
+            <a:r>
+              <a:rPr lang="en-US" sz="2400" i="1" dirty="0" smtClean="0"/>
+              <a:t>Weighted toxicity per race over time</a:t>
+            </a:r>
+            <a:endParaRPr lang="en-US" sz="2400" i="1" dirty="0"/>
+          </a:p>
+        </p:txBody>
+      </p:sp>
+      <p:pic>
+        <p:nvPicPr>
+          <p:cNvPr id="4" name="Picture 3"/>
+          <p:cNvPicPr>
+            <a:picLocks noChangeAspect="1"/>
+          </p:cNvPicPr>
+          <p:nvPr/>
+        </p:nvPicPr>
+        <p:blipFill>
+          <a:blip r:embed="rId3">
+            <a:extLst>
+              <a:ext uri="{28A0092B-C50C-407E-A947-70E740481C1C}">
+                <a14:useLocalDpi xmlns:a14="http://schemas.microsoft.com/office/drawing/2010/main" val="0"/>
+              </a:ext>
+            </a:extLst>
+          </a:blip>
+          <a:stretch>
+            <a:fillRect/>
+          </a:stretch>
+        </p:blipFill>
+        <p:spPr>
+          <a:xfrm>
+            <a:off x="1777731" y="1895202"/>
+            <a:ext cx="8636538" cy="4858053"/>
+          </a:xfrm>
+          <a:prstGeom prst="rect">
+            <a:avLst/>
+          </a:prstGeom>
+        </p:spPr>
+      </p:pic>
+    </p:spTree>
+    <p:extLst>
+      <p:ext uri="{BB962C8B-B14F-4D97-AF65-F5344CB8AC3E}">
+        <p14:creationId xmlns:p14="http://schemas.microsoft.com/office/powerpoint/2010/main" val="1219999629"/>
+      </p:ext>
+    </p:extLst>
+  </p:cSld>
+  <p:clrMapOvr>
+    <a:masterClrMapping/>
+  </p:clrMapOvr>
+</p:sld>
+</file>
+
+<file path=ppt/slides/slide7.xml><?xml version="1.0" encoding="utf-8"?>
+<p:sld xmlns:a="http://schemas.openxmlformats.org/drawingml/2006/main" xmlns:r="http://schemas.openxmlformats.org/officeDocument/2006/relationships" xmlns:p="http://schemas.openxmlformats.org/presentationml/2006/main">
+  <p:cSld>
+    <p:spTree>
+      <p:nvGrpSpPr>
+        <p:cNvPr id="1" name=""/>
+        <p:cNvGrpSpPr/>
+        <p:nvPr/>
+      </p:nvGrpSpPr>
+      <p:grpSpPr>
+        <a:xfrm>
+          <a:off x="0" y="0"/>
+          <a:ext cx="0" cy="0"/>
+          <a:chOff x="0" y="0"/>
+          <a:chExt cx="0" cy="0"/>
+        </a:xfrm>
+      </p:grpSpPr>
+      <p:sp>
+        <p:nvSpPr>
+          <p:cNvPr id="2" name="Title 1"/>
+          <p:cNvSpPr>
+            <a:spLocks noGrp="1"/>
+          </p:cNvSpPr>
+          <p:nvPr>
+            <p:ph type="title"/>
+          </p:nvPr>
+        </p:nvSpPr>
+        <p:spPr/>
+        <p:txBody>
+          <a:bodyPr/>
+          <a:lstStyle/>
+          <a:p>
+            <a:r>
+              <a:rPr lang="en-US" dirty="0" smtClean="0"/>
+              <a:t>Unintended Bias – Time</a:t>
+            </a:r>
+            <a:endParaRPr lang="en-US" dirty="0"/>
+          </a:p>
+        </p:txBody>
+      </p:sp>
+      <p:sp>
+        <p:nvSpPr>
+          <p:cNvPr id="3" name="Content Placeholder 2"/>
+          <p:cNvSpPr>
+            <a:spLocks noGrp="1"/>
+          </p:cNvSpPr>
+          <p:nvPr>
+            <p:ph idx="1"/>
+          </p:nvPr>
+        </p:nvSpPr>
+        <p:spPr>
+          <a:xfrm>
+            <a:off x="838200" y="1398155"/>
+            <a:ext cx="5421284" cy="585066"/>
+          </a:xfrm>
+        </p:spPr>
+        <p:txBody>
+          <a:bodyPr>
+            <a:normAutofit/>
+          </a:bodyPr>
+          <a:lstStyle/>
+          <a:p>
+            <a:pPr marL="0" indent="0">
+              <a:buNone/>
+            </a:pPr>
+            <a:r>
+              <a:rPr lang="en-US" sz="2400" i="1" dirty="0" smtClean="0"/>
+              <a:t>Weighted toxicity per religion over time</a:t>
+            </a:r>
+            <a:endParaRPr lang="en-US" sz="2400" i="1" dirty="0"/>
+          </a:p>
+        </p:txBody>
+      </p:sp>
+      <p:pic>
+        <p:nvPicPr>
+          <p:cNvPr id="4" name="Picture 3"/>
+          <p:cNvPicPr>
+            <a:picLocks noChangeAspect="1"/>
+          </p:cNvPicPr>
+          <p:nvPr/>
+        </p:nvPicPr>
+        <p:blipFill>
+          <a:blip r:embed="rId3">
+            <a:extLst>
+              <a:ext uri="{28A0092B-C50C-407E-A947-70E740481C1C}">
+                <a14:useLocalDpi xmlns:a14="http://schemas.microsoft.com/office/drawing/2010/main" val="0"/>
+              </a:ext>
+            </a:extLst>
+          </a:blip>
+          <a:stretch>
+            <a:fillRect/>
+          </a:stretch>
+        </p:blipFill>
+        <p:spPr>
+          <a:xfrm>
+            <a:off x="1777731" y="1895202"/>
+            <a:ext cx="8636538" cy="4858052"/>
+          </a:xfrm>
+          <a:prstGeom prst="rect">
+            <a:avLst/>
+          </a:prstGeom>
+        </p:spPr>
+      </p:pic>
+    </p:spTree>
+    <p:extLst>
+      <p:ext uri="{BB962C8B-B14F-4D97-AF65-F5344CB8AC3E}">
+        <p14:creationId xmlns:p14="http://schemas.microsoft.com/office/powerpoint/2010/main" val="682773979"/>
+      </p:ext>
+    </p:extLst>
+  </p:cSld>
+  <p:clrMapOvr>
+    <a:masterClrMapping/>
+  </p:clrMapOvr>
+</p:sld>
+</file>
+
+<file path=ppt/slides/slide8.xml><?xml version="1.0" encoding="utf-8"?>
+<p:sld xmlns:a="http://schemas.openxmlformats.org/drawingml/2006/main" xmlns:r="http://schemas.openxmlformats.org/officeDocument/2006/relationships" xmlns:p="http://schemas.openxmlformats.org/presentationml/2006/main">
+  <p:cSld>
+    <p:spTree>
+      <p:nvGrpSpPr>
+        <p:cNvPr id="1" name=""/>
+        <p:cNvGrpSpPr/>
+        <p:nvPr/>
+      </p:nvGrpSpPr>
+      <p:grpSpPr>
+        <a:xfrm>
+          <a:off x="0" y="0"/>
+          <a:ext cx="0" cy="0"/>
+          <a:chOff x="0" y="0"/>
+          <a:chExt cx="0" cy="0"/>
+        </a:xfrm>
+      </p:grpSpPr>
+      <p:sp>
+        <p:nvSpPr>
+          <p:cNvPr id="2" name="Title 1"/>
+          <p:cNvSpPr>
+            <a:spLocks noGrp="1"/>
+          </p:cNvSpPr>
+          <p:nvPr>
+            <p:ph type="title"/>
+          </p:nvPr>
+        </p:nvSpPr>
+        <p:spPr/>
+        <p:txBody>
+          <a:bodyPr/>
+          <a:lstStyle/>
+          <a:p>
+            <a:r>
+              <a:rPr lang="en-US" dirty="0" smtClean="0"/>
+              <a:t>Unintended Bias – Time</a:t>
+            </a:r>
+            <a:endParaRPr lang="en-US" dirty="0"/>
+          </a:p>
+        </p:txBody>
+      </p:sp>
+      <p:sp>
+        <p:nvSpPr>
+          <p:cNvPr id="3" name="Content Placeholder 2"/>
+          <p:cNvSpPr>
+            <a:spLocks noGrp="1"/>
+          </p:cNvSpPr>
+          <p:nvPr>
+            <p:ph idx="1"/>
+          </p:nvPr>
+        </p:nvSpPr>
+        <p:spPr>
+          <a:xfrm>
+            <a:off x="838199" y="1398155"/>
+            <a:ext cx="6900949" cy="585066"/>
+          </a:xfrm>
+        </p:spPr>
+        <p:txBody>
+          <a:bodyPr>
+            <a:normAutofit/>
+          </a:bodyPr>
+          <a:lstStyle/>
+          <a:p>
+            <a:pPr marL="0" indent="0">
+              <a:buNone/>
+            </a:pPr>
+            <a:r>
+              <a:rPr lang="en-US" sz="2400" i="1" dirty="0" smtClean="0"/>
+              <a:t>Weighted toxicity per sexual-orientation over time</a:t>
+            </a:r>
+            <a:endParaRPr lang="en-US" sz="2400" i="1" dirty="0"/>
+          </a:p>
+        </p:txBody>
+      </p:sp>
+      <p:pic>
+        <p:nvPicPr>
+          <p:cNvPr id="4" name="Picture 3"/>
+          <p:cNvPicPr>
+            <a:picLocks noChangeAspect="1"/>
+          </p:cNvPicPr>
+          <p:nvPr/>
+        </p:nvPicPr>
+        <p:blipFill>
+          <a:blip r:embed="rId3">
+            <a:extLst>
+              <a:ext uri="{28A0092B-C50C-407E-A947-70E740481C1C}">
+                <a14:useLocalDpi xmlns:a14="http://schemas.microsoft.com/office/drawing/2010/main" val="0"/>
+              </a:ext>
+            </a:extLst>
+          </a:blip>
+          <a:stretch>
+            <a:fillRect/>
+          </a:stretch>
+        </p:blipFill>
+        <p:spPr>
+          <a:xfrm>
+            <a:off x="1777731" y="1895202"/>
+            <a:ext cx="8636537" cy="4858052"/>
+          </a:xfrm>
+          <a:prstGeom prst="rect">
+            <a:avLst/>
+          </a:prstGeom>
+        </p:spPr>
+      </p:pic>
+    </p:spTree>
+    <p:extLst>
+      <p:ext uri="{BB962C8B-B14F-4D97-AF65-F5344CB8AC3E}">
+        <p14:creationId xmlns:p14="http://schemas.microsoft.com/office/powerpoint/2010/main" val="2500289725"/>
+      </p:ext>
+    </p:extLst>
+  </p:cSld>
+  <p:clrMapOvr>
+    <a:masterClrMapping/>
+  </p:clrMapOvr>
+</p:sld>
+</file>
+
+<file path=ppt/slides/slide9.xml><?xml version="1.0" encoding="utf-8"?>
+<p:sld xmlns:a="http://schemas.openxmlformats.org/drawingml/2006/main" xmlns:r="http://schemas.openxmlformats.org/officeDocument/2006/relationships" xmlns:p="http://schemas.openxmlformats.org/presentationml/2006/main">
+  <p:cSld>
+    <p:spTree>
+      <p:nvGrpSpPr>
+        <p:cNvPr id="1" name=""/>
+        <p:cNvGrpSpPr/>
+        <p:nvPr/>
+      </p:nvGrpSpPr>
+      <p:grpSpPr>
+        <a:xfrm>
+          <a:off x="0" y="0"/>
+          <a:ext cx="0" cy="0"/>
+          <a:chOff x="0" y="0"/>
+          <a:chExt cx="0" cy="0"/>
+        </a:xfrm>
+      </p:grpSpPr>
+      <p:sp>
+        <p:nvSpPr>
+          <p:cNvPr id="2" name="Title 1"/>
+          <p:cNvSpPr>
+            <a:spLocks noGrp="1"/>
+          </p:cNvSpPr>
+          <p:nvPr>
+            <p:ph type="title"/>
+          </p:nvPr>
+        </p:nvSpPr>
+        <p:spPr/>
+        <p:txBody>
+          <a:bodyPr/>
+          <a:lstStyle/>
+          <a:p>
+            <a:r>
+              <a:rPr lang="en-US" dirty="0" smtClean="0"/>
+              <a:t>Unintended Bias – Time</a:t>
+            </a:r>
+            <a:endParaRPr lang="en-US" dirty="0"/>
+          </a:p>
+        </p:txBody>
+      </p:sp>
+      <p:sp>
+        <p:nvSpPr>
+          <p:cNvPr id="3" name="Content Placeholder 2"/>
+          <p:cNvSpPr>
+            <a:spLocks noGrp="1"/>
+          </p:cNvSpPr>
+          <p:nvPr>
+            <p:ph idx="1"/>
+          </p:nvPr>
+        </p:nvSpPr>
+        <p:spPr>
+          <a:xfrm>
+            <a:off x="838199" y="1398155"/>
+            <a:ext cx="6900949" cy="585066"/>
+          </a:xfrm>
+        </p:spPr>
+        <p:txBody>
+          <a:bodyPr>
+            <a:normAutofit/>
+          </a:bodyPr>
+          <a:lstStyle/>
+          <a:p>
+            <a:pPr marL="0" indent="0">
+              <a:buNone/>
+            </a:pPr>
+            <a:r>
+              <a:rPr lang="en-US" sz="2400" i="1" dirty="0" smtClean="0"/>
+              <a:t>Weighted toxicity per gender over time</a:t>
+            </a:r>
+            <a:endParaRPr lang="en-US" sz="2400" i="1" dirty="0"/>
+          </a:p>
+        </p:txBody>
+      </p:sp>
+      <p:pic>
+        <p:nvPicPr>
+          <p:cNvPr id="4" name="Picture 3"/>
+          <p:cNvPicPr>
+            <a:picLocks noChangeAspect="1"/>
+          </p:cNvPicPr>
+          <p:nvPr/>
+        </p:nvPicPr>
+        <p:blipFill>
+          <a:blip r:embed="rId3">
+            <a:extLst>
+              <a:ext uri="{28A0092B-C50C-407E-A947-70E740481C1C}">
+                <a14:useLocalDpi xmlns:a14="http://schemas.microsoft.com/office/drawing/2010/main" val="0"/>
+              </a:ext>
+            </a:extLst>
+          </a:blip>
+          <a:stretch>
+            <a:fillRect/>
+          </a:stretch>
+        </p:blipFill>
+        <p:spPr>
+          <a:xfrm>
+            <a:off x="1777731" y="1895202"/>
+            <a:ext cx="8636537" cy="4858051"/>
+          </a:xfrm>
+          <a:prstGeom prst="rect">
+            <a:avLst/>
+          </a:prstGeom>
+        </p:spPr>
+      </p:pic>
+    </p:spTree>
+    <p:extLst>
+      <p:ext uri="{BB962C8B-B14F-4D97-AF65-F5344CB8AC3E}">
+        <p14:creationId xmlns:p14="http://schemas.microsoft.com/office/powerpoint/2010/main" val="448574432"/>
       </p:ext>
     </p:extLst>
   </p:cSld>
@@ -3577,4 +6901,265 @@
     </a:ext>
   </a:extLst>
 </a:theme>
+</file>
+
+<file path=ppt/theme/theme2.xml><?xml version="1.0" encoding="utf-8"?>
+<a:theme xmlns:a="http://schemas.openxmlformats.org/drawingml/2006/main" name="Office Theme">
+  <a:themeElements>
+    <a:clrScheme name="Office">
+      <a:dk1>
+        <a:sysClr val="windowText" lastClr="000000"/>
+      </a:dk1>
+      <a:lt1>
+        <a:sysClr val="window" lastClr="FFFFFF"/>
+      </a:lt1>
+      <a:dk2>
+        <a:srgbClr val="44546A"/>
+      </a:dk2>
+      <a:lt2>
+        <a:srgbClr val="E7E6E6"/>
+      </a:lt2>
+      <a:accent1>
+        <a:srgbClr val="5B9BD5"/>
+      </a:accent1>
+      <a:accent2>
+        <a:srgbClr val="ED7D31"/>
+      </a:accent2>
+      <a:accent3>
+        <a:srgbClr val="A5A5A5"/>
+      </a:accent3>
+      <a:accent4>
+        <a:srgbClr val="FFC000"/>
+      </a:accent4>
+      <a:accent5>
+        <a:srgbClr val="4472C4"/>
+      </a:accent5>
+      <a:accent6>
+        <a:srgbClr val="70AD47"/>
+      </a:accent6>
+      <a:hlink>
+        <a:srgbClr val="0563C1"/>
+      </a:hlink>
+      <a:folHlink>
+        <a:srgbClr val="954F72"/>
+      </a:folHlink>
+    </a:clrScheme>
+    <a:fontScheme name="Office">
+      <a:majorFont>
+        <a:latin typeface="Calibri Light" panose="020F0302020204030204"/>
+        <a:ea typeface=""/>
+        <a:cs typeface=""/>
+        <a:font script="Jpan" typeface="游ゴシック Light"/>
+        <a:font script="Hang" typeface="맑은 고딕"/>
+        <a:font script="Hans" typeface="等线 Light"/>
+        <a:font script="Hant" typeface="新細明體"/>
+        <a:font script="Arab" typeface="Times New Roman"/>
+        <a:font script="Hebr" typeface="Times New Roman"/>
+        <a:font script="Thai" typeface="Angsana New"/>
+        <a:font script="Ethi" typeface="Nyala"/>
+        <a:font script="Beng" typeface="Vrinda"/>
+        <a:font script="Gujr" typeface="Shruti"/>
+        <a:font script="Khmr" typeface="MoolBoran"/>
+        <a:font script="Knda" typeface="Tunga"/>
+        <a:font script="Guru" typeface="Raavi"/>
+        <a:font script="Cans" typeface="Euphemia"/>
+        <a:font script="Cher" typeface="Plantagenet Cherokee"/>
+        <a:font script="Yiii" typeface="Microsoft Yi Baiti"/>
+        <a:font script="Tibt" typeface="Microsoft Himalaya"/>
+        <a:font script="Thaa" typeface="MV Boli"/>
+        <a:font script="Deva" typeface="Mangal"/>
+        <a:font script="Telu" typeface="Gautami"/>
+        <a:font script="Taml" typeface="Latha"/>
+        <a:font script="Syrc" typeface="Estrangelo Edessa"/>
+        <a:font script="Orya" typeface="Kalinga"/>
+        <a:font script="Mlym" typeface="Kartika"/>
+        <a:font script="Laoo" typeface="DokChampa"/>
+        <a:font script="Sinh" typeface="Iskoola Pota"/>
+        <a:font script="Mong" typeface="Mongolian Baiti"/>
+        <a:font script="Viet" typeface="Times New Roman"/>
+        <a:font script="Uigh" typeface="Microsoft Uighur"/>
+        <a:font script="Geor" typeface="Sylfaen"/>
+      </a:majorFont>
+      <a:minorFont>
+        <a:latin typeface="Calibri" panose="020F0502020204030204"/>
+        <a:ea typeface=""/>
+        <a:cs typeface=""/>
+        <a:font script="Jpan" typeface="游ゴシック"/>
+        <a:font script="Hang" typeface="맑은 고딕"/>
+        <a:font script="Hans" typeface="等线"/>
+        <a:font script="Hant" typeface="新細明體"/>
+        <a:font script="Arab" typeface="Arial"/>
+        <a:font script="Hebr" typeface="Arial"/>
+        <a:font script="Thai" typeface="Cordia New"/>
+        <a:font script="Ethi" typeface="Nyala"/>
+        <a:font script="Beng" typeface="Vrinda"/>
+        <a:font script="Gujr" typeface="Shruti"/>
+        <a:font script="Khmr" typeface="DaunPenh"/>
+        <a:font script="Knda" typeface="Tunga"/>
+        <a:font script="Guru" typeface="Raavi"/>
+        <a:font script="Cans" typeface="Euphemia"/>
+        <a:font script="Cher" typeface="Plantagenet Cherokee"/>
+        <a:font script="Yiii" typeface="Microsoft Yi Baiti"/>
+        <a:font script="Tibt" typeface="Microsoft Himalaya"/>
+        <a:font script="Thaa" typeface="MV Boli"/>
+        <a:font script="Deva" typeface="Mangal"/>
+        <a:font script="Telu" typeface="Gautami"/>
+        <a:font script="Taml" typeface="Latha"/>
+        <a:font script="Syrc" typeface="Estrangelo Edessa"/>
+        <a:font script="Orya" typeface="Kalinga"/>
+        <a:font script="Mlym" typeface="Kartika"/>
+        <a:font script="Laoo" typeface="DokChampa"/>
+        <a:font script="Sinh" typeface="Iskoola Pota"/>
+        <a:font script="Mong" typeface="Mongolian Baiti"/>
+        <a:font script="Viet" typeface="Arial"/>
+        <a:font script="Uigh" typeface="Microsoft Uighur"/>
+        <a:font script="Geor" typeface="Sylfaen"/>
+      </a:minorFont>
+    </a:fontScheme>
+    <a:fmtScheme name="Office">
+      <a:fillStyleLst>
+        <a:solidFill>
+          <a:schemeClr val="phClr"/>
+        </a:solidFill>
+        <a:gradFill rotWithShape="1">
+          <a:gsLst>
+            <a:gs pos="0">
+              <a:schemeClr val="phClr">
+                <a:lumMod val="110000"/>
+                <a:satMod val="105000"/>
+                <a:tint val="67000"/>
+              </a:schemeClr>
+            </a:gs>
+            <a:gs pos="50000">
+              <a:schemeClr val="phClr">
+                <a:lumMod val="105000"/>
+                <a:satMod val="103000"/>
+                <a:tint val="73000"/>
+              </a:schemeClr>
+            </a:gs>
+            <a:gs pos="100000">
+              <a:schemeClr val="phClr">
+                <a:lumMod val="105000"/>
+                <a:satMod val="109000"/>
+                <a:tint val="81000"/>
+              </a:schemeClr>
+            </a:gs>
+          </a:gsLst>
+          <a:lin ang="5400000" scaled="0"/>
+        </a:gradFill>
+        <a:gradFill rotWithShape="1">
+          <a:gsLst>
+            <a:gs pos="0">
+              <a:schemeClr val="phClr">
+                <a:satMod val="103000"/>
+                <a:lumMod val="102000"/>
+                <a:tint val="94000"/>
+              </a:schemeClr>
+            </a:gs>
+            <a:gs pos="50000">
+              <a:schemeClr val="phClr">
+                <a:satMod val="110000"/>
+                <a:lumMod val="100000"/>
+                <a:shade val="100000"/>
+              </a:schemeClr>
+            </a:gs>
+            <a:gs pos="100000">
+              <a:schemeClr val="phClr">
+                <a:lumMod val="99000"/>
+                <a:satMod val="120000"/>
+                <a:shade val="78000"/>
+              </a:schemeClr>
+            </a:gs>
+          </a:gsLst>
+          <a:lin ang="5400000" scaled="0"/>
+        </a:gradFill>
+      </a:fillStyleLst>
+      <a:lnStyleLst>
+        <a:ln w="6350" cap="flat" cmpd="sng" algn="ctr">
+          <a:solidFill>
+            <a:schemeClr val="phClr"/>
+          </a:solidFill>
+          <a:prstDash val="solid"/>
+          <a:miter lim="800000"/>
+        </a:ln>
+        <a:ln w="12700" cap="flat" cmpd="sng" algn="ctr">
+          <a:solidFill>
+            <a:schemeClr val="phClr"/>
+          </a:solidFill>
+          <a:prstDash val="solid"/>
+          <a:miter lim="800000"/>
+        </a:ln>
+        <a:ln w="19050" cap="flat" cmpd="sng" algn="ctr">
+          <a:solidFill>
+            <a:schemeClr val="phClr"/>
+          </a:solidFill>
+          <a:prstDash val="solid"/>
+          <a:miter lim="800000"/>
+        </a:ln>
+      </a:lnStyleLst>
+      <a:effectStyleLst>
+        <a:effectStyle>
+          <a:effectLst/>
+        </a:effectStyle>
+        <a:effectStyle>
+          <a:effectLst/>
+        </a:effectStyle>
+        <a:effectStyle>
+          <a:effectLst>
+            <a:outerShdw blurRad="57150" dist="19050" dir="5400000" algn="ctr" rotWithShape="0">
+              <a:srgbClr val="000000">
+                <a:alpha val="63000"/>
+              </a:srgbClr>
+            </a:outerShdw>
+          </a:effectLst>
+        </a:effectStyle>
+      </a:effectStyleLst>
+      <a:bgFillStyleLst>
+        <a:solidFill>
+          <a:schemeClr val="phClr"/>
+        </a:solidFill>
+        <a:solidFill>
+          <a:schemeClr val="phClr">
+            <a:tint val="95000"/>
+            <a:satMod val="170000"/>
+          </a:schemeClr>
+        </a:solidFill>
+        <a:gradFill rotWithShape="1">
+          <a:gsLst>
+            <a:gs pos="0">
+              <a:schemeClr val="phClr">
+                <a:tint val="93000"/>
+                <a:satMod val="150000"/>
+                <a:shade val="98000"/>
+                <a:lumMod val="102000"/>
+              </a:schemeClr>
+            </a:gs>
+            <a:gs pos="50000">
+              <a:schemeClr val="phClr">
+                <a:tint val="98000"/>
+                <a:satMod val="130000"/>
+                <a:shade val="90000"/>
+                <a:lumMod val="103000"/>
+              </a:schemeClr>
+            </a:gs>
+            <a:gs pos="100000">
+              <a:schemeClr val="phClr">
+                <a:shade val="63000"/>
+                <a:satMod val="120000"/>
+              </a:schemeClr>
+            </a:gs>
+          </a:gsLst>
+          <a:lin ang="5400000" scaled="0"/>
+        </a:gradFill>
+      </a:bgFillStyleLst>
+    </a:fmtScheme>
+  </a:themeElements>
+  <a:objectDefaults/>
+  <a:extraClrSchemeLst/>
+  <a:extLst>
+    <a:ext uri="{05A4C25C-085E-4340-85A3-A5531E510DB2}">
+      <thm15:themeFamily xmlns:thm15="http://schemas.microsoft.com/office/thememl/2012/main" name="Office Theme" id="{62F939B6-93AF-4DB8-9C6B-D6C7DFDC589F}" vid="{4A3C46E8-61CC-4603-A589-7422A47A8E4A}"/>
+    </a:ext>
+  </a:extLst>
+</a:theme>
 </file>
</xml_diff>

<commit_message>
Changes colour on one of the plots so it will be easier to read on projector screen.
</commit_message>
<xml_diff>
--- a/NLP_presentation.pptx
+++ b/NLP_presentation.pptx
@@ -213,7 +213,7 @@
           <a:p>
             <a:fld id="{8F35A468-736C-4859-9661-77158CF12608}" type="datetimeFigureOut">
               <a:rPr lang="en-US" smtClean="0"/>
-              <a:t>11/27/2019</a:t>
+              <a:t>11/28/2019</a:t>
             </a:fld>
             <a:endParaRPr lang="en-US"/>
           </a:p>
@@ -277,38 +277,37 @@
           <a:p>
             <a:pPr lvl="0"/>
             <a:r>
-              <a:rPr lang="en-US" smtClean="0"/>
+              <a:rPr lang="en-US"/>
               <a:t>Edit Master text styles</a:t>
             </a:r>
           </a:p>
           <a:p>
             <a:pPr lvl="1"/>
             <a:r>
-              <a:rPr lang="en-US" smtClean="0"/>
+              <a:rPr lang="en-US"/>
               <a:t>Second level</a:t>
             </a:r>
           </a:p>
           <a:p>
             <a:pPr lvl="2"/>
             <a:r>
-              <a:rPr lang="en-US" smtClean="0"/>
+              <a:rPr lang="en-US"/>
               <a:t>Third level</a:t>
             </a:r>
           </a:p>
           <a:p>
             <a:pPr lvl="3"/>
             <a:r>
-              <a:rPr lang="en-US" smtClean="0"/>
+              <a:rPr lang="en-US"/>
               <a:t>Fourth level</a:t>
             </a:r>
           </a:p>
           <a:p>
             <a:pPr lvl="4"/>
             <a:r>
-              <a:rPr lang="en-US" smtClean="0"/>
+              <a:rPr lang="en-US"/>
               <a:t>Fifth level</a:t>
             </a:r>
-            <a:endParaRPr lang="en-US"/>
           </a:p>
         </p:txBody>
       </p:sp>
@@ -526,10 +525,9 @@
           <a:lstStyle/>
           <a:p>
             <a:r>
-              <a:rPr lang="en-US" dirty="0" smtClean="0"/>
+              <a:rPr lang="en-US" dirty="0"/>
               <a:t>Jacob</a:t>
             </a:r>
-            <a:endParaRPr lang="en-US" dirty="0"/>
           </a:p>
         </p:txBody>
       </p:sp>
@@ -614,10 +612,9 @@
           <a:lstStyle/>
           <a:p>
             <a:r>
-              <a:rPr lang="en-US" dirty="0" smtClean="0"/>
+              <a:rPr lang="en-US" dirty="0"/>
               <a:t>Jacob</a:t>
             </a:r>
-            <a:endParaRPr lang="en-US" dirty="0"/>
           </a:p>
         </p:txBody>
       </p:sp>
@@ -702,10 +699,9 @@
           <a:lstStyle/>
           <a:p>
             <a:r>
-              <a:rPr lang="en-US" dirty="0" smtClean="0"/>
+              <a:rPr lang="en-US" dirty="0"/>
               <a:t>Hannah</a:t>
             </a:r>
-            <a:endParaRPr lang="en-US" dirty="0"/>
           </a:p>
         </p:txBody>
       </p:sp>
@@ -790,10 +786,9 @@
           <a:lstStyle/>
           <a:p>
             <a:r>
-              <a:rPr lang="en-US" dirty="0" smtClean="0"/>
+              <a:rPr lang="en-US" dirty="0"/>
               <a:t>Hannah</a:t>
             </a:r>
-            <a:endParaRPr lang="en-US" dirty="0"/>
           </a:p>
         </p:txBody>
       </p:sp>
@@ -878,10 +873,9 @@
           <a:lstStyle/>
           <a:p>
             <a:r>
-              <a:rPr lang="en-US" dirty="0" smtClean="0"/>
+              <a:rPr lang="en-US" dirty="0"/>
               <a:t>Hannah</a:t>
             </a:r>
-            <a:endParaRPr lang="en-US" dirty="0"/>
           </a:p>
         </p:txBody>
       </p:sp>
@@ -966,10 +960,9 @@
           <a:lstStyle/>
           <a:p>
             <a:r>
-              <a:rPr lang="en-US" dirty="0" smtClean="0"/>
+              <a:rPr lang="en-US" dirty="0"/>
               <a:t>Hannah</a:t>
             </a:r>
-            <a:endParaRPr lang="en-US" dirty="0"/>
           </a:p>
         </p:txBody>
       </p:sp>
@@ -1054,10 +1047,9 @@
           <a:lstStyle/>
           <a:p>
             <a:r>
-              <a:rPr lang="en-US" dirty="0" smtClean="0"/>
+              <a:rPr lang="en-US" dirty="0"/>
               <a:t>Hannah</a:t>
             </a:r>
-            <a:endParaRPr lang="en-US" dirty="0"/>
           </a:p>
         </p:txBody>
       </p:sp>
@@ -1142,10 +1134,9 @@
           <a:lstStyle/>
           <a:p>
             <a:r>
-              <a:rPr lang="en-US" dirty="0" smtClean="0"/>
+              <a:rPr lang="en-US" dirty="0"/>
               <a:t>Jacob</a:t>
             </a:r>
-            <a:endParaRPr lang="en-US" dirty="0"/>
           </a:p>
         </p:txBody>
       </p:sp>
@@ -1230,10 +1221,9 @@
           <a:lstStyle/>
           <a:p>
             <a:r>
-              <a:rPr lang="en-US" dirty="0" smtClean="0"/>
+              <a:rPr lang="en-US" dirty="0"/>
               <a:t>Jacob</a:t>
             </a:r>
-            <a:endParaRPr lang="en-US" dirty="0"/>
           </a:p>
         </p:txBody>
       </p:sp>
@@ -1318,10 +1308,9 @@
           <a:lstStyle/>
           <a:p>
             <a:r>
-              <a:rPr lang="en-US" dirty="0" smtClean="0"/>
+              <a:rPr lang="en-US" dirty="0"/>
               <a:t>Jacob</a:t>
             </a:r>
-            <a:endParaRPr lang="en-US" dirty="0"/>
           </a:p>
         </p:txBody>
       </p:sp>
@@ -1406,10 +1395,9 @@
           <a:lstStyle/>
           <a:p>
             <a:r>
-              <a:rPr lang="en-US" dirty="0" smtClean="0"/>
+              <a:rPr lang="en-US" dirty="0"/>
               <a:t>Jacob</a:t>
             </a:r>
-            <a:endParaRPr lang="en-US" dirty="0"/>
           </a:p>
         </p:txBody>
       </p:sp>
@@ -1494,10 +1482,9 @@
           <a:lstStyle/>
           <a:p>
             <a:r>
-              <a:rPr lang="en-US" dirty="0" smtClean="0"/>
+              <a:rPr lang="en-US" dirty="0"/>
               <a:t>Jacob</a:t>
             </a:r>
-            <a:endParaRPr lang="en-US" dirty="0"/>
           </a:p>
         </p:txBody>
       </p:sp>
@@ -1582,10 +1569,9 @@
           <a:lstStyle/>
           <a:p>
             <a:r>
-              <a:rPr lang="en-US" dirty="0" smtClean="0"/>
+              <a:rPr lang="en-US" dirty="0"/>
               <a:t>Jacob</a:t>
             </a:r>
-            <a:endParaRPr lang="en-US" dirty="0"/>
           </a:p>
         </p:txBody>
       </p:sp>
@@ -1670,10 +1656,9 @@
           <a:lstStyle/>
           <a:p>
             <a:r>
-              <a:rPr lang="en-US" dirty="0" smtClean="0"/>
+              <a:rPr lang="en-US" dirty="0"/>
               <a:t>Jacob</a:t>
             </a:r>
-            <a:endParaRPr lang="en-US" dirty="0"/>
           </a:p>
         </p:txBody>
       </p:sp>
@@ -1758,10 +1743,9 @@
           <a:lstStyle/>
           <a:p>
             <a:r>
-              <a:rPr lang="en-US" dirty="0" smtClean="0"/>
+              <a:rPr lang="en-US" dirty="0"/>
               <a:t>Jacob</a:t>
             </a:r>
-            <a:endParaRPr lang="en-US" dirty="0"/>
           </a:p>
         </p:txBody>
       </p:sp>
@@ -1846,10 +1830,9 @@
           <a:lstStyle/>
           <a:p>
             <a:r>
-              <a:rPr lang="en-US" dirty="0" smtClean="0"/>
+              <a:rPr lang="en-US" dirty="0"/>
               <a:t>Jacob</a:t>
             </a:r>
-            <a:endParaRPr lang="en-US" dirty="0"/>
           </a:p>
         </p:txBody>
       </p:sp>
@@ -1934,10 +1917,9 @@
           <a:lstStyle/>
           <a:p>
             <a:r>
-              <a:rPr lang="en-US" dirty="0" smtClean="0"/>
+              <a:rPr lang="en-US" dirty="0"/>
               <a:t>Jacob</a:t>
             </a:r>
-            <a:endParaRPr lang="en-US" dirty="0"/>
           </a:p>
         </p:txBody>
       </p:sp>
@@ -2019,10 +2001,9 @@
           </a:lstStyle>
           <a:p>
             <a:r>
-              <a:rPr lang="en-US" smtClean="0"/>
+              <a:rPr lang="en-US"/>
               <a:t>Click to edit Master title style</a:t>
             </a:r>
-            <a:endParaRPr lang="en-US"/>
           </a:p>
         </p:txBody>
       </p:sp>
@@ -2084,10 +2065,9 @@
           </a:lstStyle>
           <a:p>
             <a:r>
-              <a:rPr lang="en-US" smtClean="0"/>
+              <a:rPr lang="en-US"/>
               <a:t>Click to edit Master subtitle style</a:t>
             </a:r>
-            <a:endParaRPr lang="en-US"/>
           </a:p>
         </p:txBody>
       </p:sp>
@@ -2108,7 +2088,7 @@
           <a:p>
             <a:fld id="{0B051DB5-80E6-45BF-93D7-66C1E34B89AA}" type="datetimeFigureOut">
               <a:rPr lang="en-US" smtClean="0"/>
-              <a:t>11/27/2019</a:t>
+              <a:t>11/28/2019</a:t>
             </a:fld>
             <a:endParaRPr lang="en-US"/>
           </a:p>
@@ -2202,10 +2182,9 @@
           <a:lstStyle/>
           <a:p>
             <a:r>
-              <a:rPr lang="en-US" smtClean="0"/>
+              <a:rPr lang="en-US"/>
               <a:t>Click to edit Master title style</a:t>
             </a:r>
-            <a:endParaRPr lang="en-US"/>
           </a:p>
         </p:txBody>
       </p:sp>
@@ -2226,38 +2205,37 @@
           <a:p>
             <a:pPr lvl="0"/>
             <a:r>
-              <a:rPr lang="en-US" smtClean="0"/>
+              <a:rPr lang="en-US"/>
               <a:t>Edit Master text styles</a:t>
             </a:r>
           </a:p>
           <a:p>
             <a:pPr lvl="1"/>
             <a:r>
-              <a:rPr lang="en-US" smtClean="0"/>
+              <a:rPr lang="en-US"/>
               <a:t>Second level</a:t>
             </a:r>
           </a:p>
           <a:p>
             <a:pPr lvl="2"/>
             <a:r>
-              <a:rPr lang="en-US" smtClean="0"/>
+              <a:rPr lang="en-US"/>
               <a:t>Third level</a:t>
             </a:r>
           </a:p>
           <a:p>
             <a:pPr lvl="3"/>
             <a:r>
-              <a:rPr lang="en-US" smtClean="0"/>
+              <a:rPr lang="en-US"/>
               <a:t>Fourth level</a:t>
             </a:r>
           </a:p>
           <a:p>
             <a:pPr lvl="4"/>
             <a:r>
-              <a:rPr lang="en-US" smtClean="0"/>
+              <a:rPr lang="en-US"/>
               <a:t>Fifth level</a:t>
             </a:r>
-            <a:endParaRPr lang="en-US"/>
           </a:p>
         </p:txBody>
       </p:sp>
@@ -2278,7 +2256,7 @@
           <a:p>
             <a:fld id="{0B051DB5-80E6-45BF-93D7-66C1E34B89AA}" type="datetimeFigureOut">
               <a:rPr lang="en-US" smtClean="0"/>
-              <a:t>11/27/2019</a:t>
+              <a:t>11/28/2019</a:t>
             </a:fld>
             <a:endParaRPr lang="en-US"/>
           </a:p>
@@ -2377,10 +2355,9 @@
           <a:lstStyle/>
           <a:p>
             <a:r>
-              <a:rPr lang="en-US" smtClean="0"/>
+              <a:rPr lang="en-US"/>
               <a:t>Click to edit Master title style</a:t>
             </a:r>
-            <a:endParaRPr lang="en-US"/>
           </a:p>
         </p:txBody>
       </p:sp>
@@ -2406,38 +2383,37 @@
           <a:p>
             <a:pPr lvl="0"/>
             <a:r>
-              <a:rPr lang="en-US" smtClean="0"/>
+              <a:rPr lang="en-US"/>
               <a:t>Edit Master text styles</a:t>
             </a:r>
           </a:p>
           <a:p>
             <a:pPr lvl="1"/>
             <a:r>
-              <a:rPr lang="en-US" smtClean="0"/>
+              <a:rPr lang="en-US"/>
               <a:t>Second level</a:t>
             </a:r>
           </a:p>
           <a:p>
             <a:pPr lvl="2"/>
             <a:r>
-              <a:rPr lang="en-US" smtClean="0"/>
+              <a:rPr lang="en-US"/>
               <a:t>Third level</a:t>
             </a:r>
           </a:p>
           <a:p>
             <a:pPr lvl="3"/>
             <a:r>
-              <a:rPr lang="en-US" smtClean="0"/>
+              <a:rPr lang="en-US"/>
               <a:t>Fourth level</a:t>
             </a:r>
           </a:p>
           <a:p>
             <a:pPr lvl="4"/>
             <a:r>
-              <a:rPr lang="en-US" smtClean="0"/>
+              <a:rPr lang="en-US"/>
               <a:t>Fifth level</a:t>
             </a:r>
-            <a:endParaRPr lang="en-US"/>
           </a:p>
         </p:txBody>
       </p:sp>
@@ -2458,7 +2434,7 @@
           <a:p>
             <a:fld id="{0B051DB5-80E6-45BF-93D7-66C1E34B89AA}" type="datetimeFigureOut">
               <a:rPr lang="en-US" smtClean="0"/>
-              <a:t>11/27/2019</a:t>
+              <a:t>11/28/2019</a:t>
             </a:fld>
             <a:endParaRPr lang="en-US"/>
           </a:p>
@@ -2558,10 +2534,9 @@
           </a:lstStyle>
           <a:p>
             <a:r>
-              <a:rPr lang="en-US" dirty="0" smtClean="0"/>
+              <a:rPr lang="en-US" dirty="0"/>
               <a:t>Click to edit Master title style</a:t>
             </a:r>
-            <a:endParaRPr lang="en-US" dirty="0"/>
           </a:p>
         </p:txBody>
       </p:sp>
@@ -2582,38 +2557,37 @@
           <a:p>
             <a:pPr lvl="0"/>
             <a:r>
-              <a:rPr lang="en-US" smtClean="0"/>
+              <a:rPr lang="en-US"/>
               <a:t>Edit Master text styles</a:t>
             </a:r>
           </a:p>
           <a:p>
             <a:pPr lvl="1"/>
             <a:r>
-              <a:rPr lang="en-US" smtClean="0"/>
+              <a:rPr lang="en-US"/>
               <a:t>Second level</a:t>
             </a:r>
           </a:p>
           <a:p>
             <a:pPr lvl="2"/>
             <a:r>
-              <a:rPr lang="en-US" smtClean="0"/>
+              <a:rPr lang="en-US"/>
               <a:t>Third level</a:t>
             </a:r>
           </a:p>
           <a:p>
             <a:pPr lvl="3"/>
             <a:r>
-              <a:rPr lang="en-US" smtClean="0"/>
+              <a:rPr lang="en-US"/>
               <a:t>Fourth level</a:t>
             </a:r>
           </a:p>
           <a:p>
             <a:pPr lvl="4"/>
             <a:r>
-              <a:rPr lang="en-US" smtClean="0"/>
+              <a:rPr lang="en-US"/>
               <a:t>Fifth level</a:t>
             </a:r>
-            <a:endParaRPr lang="en-US"/>
           </a:p>
         </p:txBody>
       </p:sp>
@@ -2634,7 +2608,7 @@
           <a:p>
             <a:fld id="{0B051DB5-80E6-45BF-93D7-66C1E34B89AA}" type="datetimeFigureOut">
               <a:rPr lang="en-US" smtClean="0"/>
-              <a:t>11/27/2019</a:t>
+              <a:t>11/28/2019</a:t>
             </a:fld>
             <a:endParaRPr lang="en-US"/>
           </a:p>
@@ -2737,10 +2711,9 @@
           </a:lstStyle>
           <a:p>
             <a:r>
-              <a:rPr lang="en-US" smtClean="0"/>
+              <a:rPr lang="en-US"/>
               <a:t>Click to edit Master title style</a:t>
             </a:r>
-            <a:endParaRPr lang="en-US"/>
           </a:p>
         </p:txBody>
       </p:sp>
@@ -2857,7 +2830,7 @@
           <a:p>
             <a:pPr lvl="0"/>
             <a:r>
-              <a:rPr lang="en-US" smtClean="0"/>
+              <a:rPr lang="en-US"/>
               <a:t>Edit Master text styles</a:t>
             </a:r>
           </a:p>
@@ -2880,7 +2853,7 @@
           <a:p>
             <a:fld id="{0B051DB5-80E6-45BF-93D7-66C1E34B89AA}" type="datetimeFigureOut">
               <a:rPr lang="en-US" smtClean="0"/>
-              <a:t>11/27/2019</a:t>
+              <a:t>11/28/2019</a:t>
             </a:fld>
             <a:endParaRPr lang="en-US"/>
           </a:p>
@@ -2974,10 +2947,9 @@
           <a:lstStyle/>
           <a:p>
             <a:r>
-              <a:rPr lang="en-US" smtClean="0"/>
+              <a:rPr lang="en-US"/>
               <a:t>Click to edit Master title style</a:t>
             </a:r>
-            <a:endParaRPr lang="en-US"/>
           </a:p>
         </p:txBody>
       </p:sp>
@@ -3003,38 +2975,37 @@
           <a:p>
             <a:pPr lvl="0"/>
             <a:r>
-              <a:rPr lang="en-US" smtClean="0"/>
+              <a:rPr lang="en-US"/>
               <a:t>Edit Master text styles</a:t>
             </a:r>
           </a:p>
           <a:p>
             <a:pPr lvl="1"/>
             <a:r>
-              <a:rPr lang="en-US" smtClean="0"/>
+              <a:rPr lang="en-US"/>
               <a:t>Second level</a:t>
             </a:r>
           </a:p>
           <a:p>
             <a:pPr lvl="2"/>
             <a:r>
-              <a:rPr lang="en-US" smtClean="0"/>
+              <a:rPr lang="en-US"/>
               <a:t>Third level</a:t>
             </a:r>
           </a:p>
           <a:p>
             <a:pPr lvl="3"/>
             <a:r>
-              <a:rPr lang="en-US" smtClean="0"/>
+              <a:rPr lang="en-US"/>
               <a:t>Fourth level</a:t>
             </a:r>
           </a:p>
           <a:p>
             <a:pPr lvl="4"/>
             <a:r>
-              <a:rPr lang="en-US" smtClean="0"/>
+              <a:rPr lang="en-US"/>
               <a:t>Fifth level</a:t>
             </a:r>
-            <a:endParaRPr lang="en-US"/>
           </a:p>
         </p:txBody>
       </p:sp>
@@ -3060,38 +3031,37 @@
           <a:p>
             <a:pPr lvl="0"/>
             <a:r>
-              <a:rPr lang="en-US" smtClean="0"/>
+              <a:rPr lang="en-US"/>
               <a:t>Edit Master text styles</a:t>
             </a:r>
           </a:p>
           <a:p>
             <a:pPr lvl="1"/>
             <a:r>
-              <a:rPr lang="en-US" smtClean="0"/>
+              <a:rPr lang="en-US"/>
               <a:t>Second level</a:t>
             </a:r>
           </a:p>
           <a:p>
             <a:pPr lvl="2"/>
             <a:r>
-              <a:rPr lang="en-US" smtClean="0"/>
+              <a:rPr lang="en-US"/>
               <a:t>Third level</a:t>
             </a:r>
           </a:p>
           <a:p>
             <a:pPr lvl="3"/>
             <a:r>
-              <a:rPr lang="en-US" smtClean="0"/>
+              <a:rPr lang="en-US"/>
               <a:t>Fourth level</a:t>
             </a:r>
           </a:p>
           <a:p>
             <a:pPr lvl="4"/>
             <a:r>
-              <a:rPr lang="en-US" smtClean="0"/>
+              <a:rPr lang="en-US"/>
               <a:t>Fifth level</a:t>
             </a:r>
-            <a:endParaRPr lang="en-US"/>
           </a:p>
         </p:txBody>
       </p:sp>
@@ -3112,7 +3082,7 @@
           <a:p>
             <a:fld id="{0B051DB5-80E6-45BF-93D7-66C1E34B89AA}" type="datetimeFigureOut">
               <a:rPr lang="en-US" smtClean="0"/>
-              <a:t>11/27/2019</a:t>
+              <a:t>11/28/2019</a:t>
             </a:fld>
             <a:endParaRPr lang="en-US"/>
           </a:p>
@@ -3211,10 +3181,9 @@
           <a:lstStyle/>
           <a:p>
             <a:r>
-              <a:rPr lang="en-US" smtClean="0"/>
+              <a:rPr lang="en-US"/>
               <a:t>Click to edit Master title style</a:t>
             </a:r>
-            <a:endParaRPr lang="en-US"/>
           </a:p>
         </p:txBody>
       </p:sp>
@@ -3277,7 +3246,7 @@
           <a:p>
             <a:pPr lvl="0"/>
             <a:r>
-              <a:rPr lang="en-US" smtClean="0"/>
+              <a:rPr lang="en-US"/>
               <a:t>Edit Master text styles</a:t>
             </a:r>
           </a:p>
@@ -3305,38 +3274,37 @@
           <a:p>
             <a:pPr lvl="0"/>
             <a:r>
-              <a:rPr lang="en-US" smtClean="0"/>
+              <a:rPr lang="en-US"/>
               <a:t>Edit Master text styles</a:t>
             </a:r>
           </a:p>
           <a:p>
             <a:pPr lvl="1"/>
             <a:r>
-              <a:rPr lang="en-US" smtClean="0"/>
+              <a:rPr lang="en-US"/>
               <a:t>Second level</a:t>
             </a:r>
           </a:p>
           <a:p>
             <a:pPr lvl="2"/>
             <a:r>
-              <a:rPr lang="en-US" smtClean="0"/>
+              <a:rPr lang="en-US"/>
               <a:t>Third level</a:t>
             </a:r>
           </a:p>
           <a:p>
             <a:pPr lvl="3"/>
             <a:r>
-              <a:rPr lang="en-US" smtClean="0"/>
+              <a:rPr lang="en-US"/>
               <a:t>Fourth level</a:t>
             </a:r>
           </a:p>
           <a:p>
             <a:pPr lvl="4"/>
             <a:r>
-              <a:rPr lang="en-US" smtClean="0"/>
+              <a:rPr lang="en-US"/>
               <a:t>Fifth level</a:t>
             </a:r>
-            <a:endParaRPr lang="en-US"/>
           </a:p>
         </p:txBody>
       </p:sp>
@@ -3399,7 +3367,7 @@
           <a:p>
             <a:pPr lvl="0"/>
             <a:r>
-              <a:rPr lang="en-US" smtClean="0"/>
+              <a:rPr lang="en-US"/>
               <a:t>Edit Master text styles</a:t>
             </a:r>
           </a:p>
@@ -3427,38 +3395,37 @@
           <a:p>
             <a:pPr lvl="0"/>
             <a:r>
-              <a:rPr lang="en-US" smtClean="0"/>
+              <a:rPr lang="en-US"/>
               <a:t>Edit Master text styles</a:t>
             </a:r>
           </a:p>
           <a:p>
             <a:pPr lvl="1"/>
             <a:r>
-              <a:rPr lang="en-US" smtClean="0"/>
+              <a:rPr lang="en-US"/>
               <a:t>Second level</a:t>
             </a:r>
           </a:p>
           <a:p>
             <a:pPr lvl="2"/>
             <a:r>
-              <a:rPr lang="en-US" smtClean="0"/>
+              <a:rPr lang="en-US"/>
               <a:t>Third level</a:t>
             </a:r>
           </a:p>
           <a:p>
             <a:pPr lvl="3"/>
             <a:r>
-              <a:rPr lang="en-US" smtClean="0"/>
+              <a:rPr lang="en-US"/>
               <a:t>Fourth level</a:t>
             </a:r>
           </a:p>
           <a:p>
             <a:pPr lvl="4"/>
             <a:r>
-              <a:rPr lang="en-US" smtClean="0"/>
+              <a:rPr lang="en-US"/>
               <a:t>Fifth level</a:t>
             </a:r>
-            <a:endParaRPr lang="en-US"/>
           </a:p>
         </p:txBody>
       </p:sp>
@@ -3479,7 +3446,7 @@
           <a:p>
             <a:fld id="{0B051DB5-80E6-45BF-93D7-66C1E34B89AA}" type="datetimeFigureOut">
               <a:rPr lang="en-US" smtClean="0"/>
-              <a:t>11/27/2019</a:t>
+              <a:t>11/28/2019</a:t>
             </a:fld>
             <a:endParaRPr lang="en-US"/>
           </a:p>
@@ -3573,10 +3540,9 @@
           <a:lstStyle/>
           <a:p>
             <a:r>
-              <a:rPr lang="en-US" smtClean="0"/>
+              <a:rPr lang="en-US"/>
               <a:t>Click to edit Master title style</a:t>
             </a:r>
-            <a:endParaRPr lang="en-US"/>
           </a:p>
         </p:txBody>
       </p:sp>
@@ -3597,7 +3563,7 @@
           <a:p>
             <a:fld id="{0B051DB5-80E6-45BF-93D7-66C1E34B89AA}" type="datetimeFigureOut">
               <a:rPr lang="en-US" smtClean="0"/>
-              <a:t>11/27/2019</a:t>
+              <a:t>11/28/2019</a:t>
             </a:fld>
             <a:endParaRPr lang="en-US"/>
           </a:p>
@@ -3692,7 +3658,7 @@
           <a:p>
             <a:fld id="{0B051DB5-80E6-45BF-93D7-66C1E34B89AA}" type="datetimeFigureOut">
               <a:rPr lang="en-US" smtClean="0"/>
-              <a:t>11/27/2019</a:t>
+              <a:t>11/28/2019</a:t>
             </a:fld>
             <a:endParaRPr lang="en-US"/>
           </a:p>
@@ -3795,10 +3761,9 @@
           </a:lstStyle>
           <a:p>
             <a:r>
-              <a:rPr lang="en-US" smtClean="0"/>
+              <a:rPr lang="en-US"/>
               <a:t>Click to edit Master title style</a:t>
             </a:r>
-            <a:endParaRPr lang="en-US"/>
           </a:p>
         </p:txBody>
       </p:sp>
@@ -3852,38 +3817,37 @@
           <a:p>
             <a:pPr lvl="0"/>
             <a:r>
-              <a:rPr lang="en-US" smtClean="0"/>
+              <a:rPr lang="en-US"/>
               <a:t>Edit Master text styles</a:t>
             </a:r>
           </a:p>
           <a:p>
             <a:pPr lvl="1"/>
             <a:r>
-              <a:rPr lang="en-US" smtClean="0"/>
+              <a:rPr lang="en-US"/>
               <a:t>Second level</a:t>
             </a:r>
           </a:p>
           <a:p>
             <a:pPr lvl="2"/>
             <a:r>
-              <a:rPr lang="en-US" smtClean="0"/>
+              <a:rPr lang="en-US"/>
               <a:t>Third level</a:t>
             </a:r>
           </a:p>
           <a:p>
             <a:pPr lvl="3"/>
             <a:r>
-              <a:rPr lang="en-US" smtClean="0"/>
+              <a:rPr lang="en-US"/>
               <a:t>Fourth level</a:t>
             </a:r>
           </a:p>
           <a:p>
             <a:pPr lvl="4"/>
             <a:r>
-              <a:rPr lang="en-US" smtClean="0"/>
+              <a:rPr lang="en-US"/>
               <a:t>Fifth level</a:t>
             </a:r>
-            <a:endParaRPr lang="en-US"/>
           </a:p>
         </p:txBody>
       </p:sp>
@@ -3946,7 +3910,7 @@
           <a:p>
             <a:pPr lvl="0"/>
             <a:r>
-              <a:rPr lang="en-US" smtClean="0"/>
+              <a:rPr lang="en-US"/>
               <a:t>Edit Master text styles</a:t>
             </a:r>
           </a:p>
@@ -3969,7 +3933,7 @@
           <a:p>
             <a:fld id="{0B051DB5-80E6-45BF-93D7-66C1E34B89AA}" type="datetimeFigureOut">
               <a:rPr lang="en-US" smtClean="0"/>
-              <a:t>11/27/2019</a:t>
+              <a:t>11/28/2019</a:t>
             </a:fld>
             <a:endParaRPr lang="en-US"/>
           </a:p>
@@ -4072,10 +4036,9 @@
           </a:lstStyle>
           <a:p>
             <a:r>
-              <a:rPr lang="en-US" smtClean="0"/>
+              <a:rPr lang="en-US"/>
               <a:t>Click to edit Master title style</a:t>
             </a:r>
-            <a:endParaRPr lang="en-US"/>
           </a:p>
         </p:txBody>
       </p:sp>
@@ -4199,7 +4162,7 @@
           <a:p>
             <a:pPr lvl="0"/>
             <a:r>
-              <a:rPr lang="en-US" smtClean="0"/>
+              <a:rPr lang="en-US"/>
               <a:t>Edit Master text styles</a:t>
             </a:r>
           </a:p>
@@ -4222,7 +4185,7 @@
           <a:p>
             <a:fld id="{0B051DB5-80E6-45BF-93D7-66C1E34B89AA}" type="datetimeFigureOut">
               <a:rPr lang="en-US" smtClean="0"/>
-              <a:t>11/27/2019</a:t>
+              <a:t>11/28/2019</a:t>
             </a:fld>
             <a:endParaRPr lang="en-US"/>
           </a:p>
@@ -4331,10 +4294,9 @@
           <a:lstStyle/>
           <a:p>
             <a:r>
-              <a:rPr lang="en-US" smtClean="0"/>
+              <a:rPr lang="en-US"/>
               <a:t>Click to edit Master title style</a:t>
             </a:r>
-            <a:endParaRPr lang="en-US"/>
           </a:p>
         </p:txBody>
       </p:sp>
@@ -4365,38 +4327,37 @@
           <a:p>
             <a:pPr lvl="0"/>
             <a:r>
-              <a:rPr lang="en-US" smtClean="0"/>
+              <a:rPr lang="en-US"/>
               <a:t>Edit Master text styles</a:t>
             </a:r>
           </a:p>
           <a:p>
             <a:pPr lvl="1"/>
             <a:r>
-              <a:rPr lang="en-US" smtClean="0"/>
+              <a:rPr lang="en-US"/>
               <a:t>Second level</a:t>
             </a:r>
           </a:p>
           <a:p>
             <a:pPr lvl="2"/>
             <a:r>
-              <a:rPr lang="en-US" smtClean="0"/>
+              <a:rPr lang="en-US"/>
               <a:t>Third level</a:t>
             </a:r>
           </a:p>
           <a:p>
             <a:pPr lvl="3"/>
             <a:r>
-              <a:rPr lang="en-US" smtClean="0"/>
+              <a:rPr lang="en-US"/>
               <a:t>Fourth level</a:t>
             </a:r>
           </a:p>
           <a:p>
             <a:pPr lvl="4"/>
             <a:r>
-              <a:rPr lang="en-US" smtClean="0"/>
+              <a:rPr lang="en-US"/>
               <a:t>Fifth level</a:t>
             </a:r>
-            <a:endParaRPr lang="en-US"/>
           </a:p>
         </p:txBody>
       </p:sp>
@@ -4435,7 +4396,7 @@
           <a:p>
             <a:fld id="{0B051DB5-80E6-45BF-93D7-66C1E34B89AA}" type="datetimeFigureOut">
               <a:rPr lang="en-US" smtClean="0"/>
-              <a:t>11/27/2019</a:t>
+              <a:t>11/28/2019</a:t>
             </a:fld>
             <a:endParaRPr lang="en-US"/>
           </a:p>
@@ -4856,10 +4817,9 @@
           <a:lstStyle/>
           <a:p>
             <a:r>
-              <a:rPr lang="en-US" dirty="0" smtClean="0"/>
+              <a:rPr lang="en-US" dirty="0"/>
               <a:t>NLP – Toxic comment challenge</a:t>
             </a:r>
-            <a:endParaRPr lang="en-US" dirty="0"/>
           </a:p>
         </p:txBody>
       </p:sp>
@@ -4879,10 +4839,9 @@
           <a:lstStyle/>
           <a:p>
             <a:r>
-              <a:rPr lang="en-US" dirty="0" smtClean="0"/>
+              <a:rPr lang="en-US" dirty="0"/>
               <a:t>Hannah and Jacob</a:t>
             </a:r>
-            <a:endParaRPr lang="en-US" dirty="0"/>
           </a:p>
         </p:txBody>
       </p:sp>
@@ -4932,10 +4891,9 @@
           <a:lstStyle/>
           <a:p>
             <a:r>
-              <a:rPr lang="en-US" dirty="0" smtClean="0"/>
+              <a:rPr lang="en-US" dirty="0"/>
               <a:t>Unintended Bias – Time</a:t>
             </a:r>
-            <a:endParaRPr lang="en-US" dirty="0"/>
           </a:p>
         </p:txBody>
       </p:sp>
@@ -4965,10 +4923,9 @@
               <a:buNone/>
             </a:pPr>
             <a:r>
-              <a:rPr lang="en-US" sz="2400" i="1" dirty="0" smtClean="0"/>
+              <a:rPr lang="en-US" sz="2400" i="1" dirty="0"/>
               <a:t>Weighted toxicity per disability over time</a:t>
             </a:r>
-            <a:endParaRPr lang="en-US" sz="2400" i="1" dirty="0"/>
           </a:p>
         </p:txBody>
       </p:sp>
@@ -5048,10 +5005,9 @@
           <a:lstStyle/>
           <a:p>
             <a:r>
-              <a:rPr lang="en-US" dirty="0" smtClean="0"/>
+              <a:rPr lang="en-US" dirty="0"/>
               <a:t>Class Imbalance</a:t>
             </a:r>
-            <a:endParaRPr lang="en-US" dirty="0"/>
           </a:p>
         </p:txBody>
       </p:sp>
@@ -5130,10 +5086,9 @@
           <a:lstStyle/>
           <a:p>
             <a:r>
-              <a:rPr lang="en-US" dirty="0" smtClean="0"/>
+              <a:rPr lang="en-US" dirty="0"/>
               <a:t>Class Imbalance - Demographic</a:t>
             </a:r>
-            <a:endParaRPr lang="en-US" dirty="0"/>
           </a:p>
         </p:txBody>
       </p:sp>
@@ -5212,10 +5167,9 @@
           <a:lstStyle/>
           <a:p>
             <a:r>
-              <a:rPr lang="en-US" dirty="0" smtClean="0"/>
+              <a:rPr lang="en-US" dirty="0"/>
               <a:t>Model</a:t>
             </a:r>
-            <a:endParaRPr lang="en-US" dirty="0"/>
           </a:p>
         </p:txBody>
       </p:sp>
@@ -5235,20 +5189,55 @@
           <a:lstStyle/>
           <a:p>
             <a:r>
-              <a:rPr lang="en-US" dirty="0" smtClean="0"/>
+              <a:rPr lang="en-US" dirty="0"/>
               <a:t>Auxiliary outputs</a:t>
             </a:r>
           </a:p>
           <a:p>
             <a:pPr lvl="1"/>
             <a:r>
-              <a:rPr lang="en-US" dirty="0" smtClean="0"/>
+              <a:rPr lang="en-US" dirty="0"/>
               <a:t>Looks at more than just comment toxicity</a:t>
             </a:r>
-            <a:endParaRPr lang="en-US" dirty="0"/>
-          </a:p>
-        </p:txBody>
-      </p:sp>
+          </a:p>
+        </p:txBody>
+      </p:sp>
+      <p:pic>
+        <p:nvPicPr>
+          <p:cNvPr id="13" name="Picture 12">
+            <a:extLst>
+              <a:ext uri="{FF2B5EF4-FFF2-40B4-BE49-F238E27FC236}">
+                <a16:creationId xmlns:a16="http://schemas.microsoft.com/office/drawing/2014/main" id="{68A192D3-D833-4120-9032-D33AF247D8A0}"/>
+              </a:ext>
+            </a:extLst>
+          </p:cNvPr>
+          <p:cNvPicPr>
+            <a:picLocks noChangeAspect="1"/>
+          </p:cNvPicPr>
+          <p:nvPr/>
+        </p:nvPicPr>
+        <p:blipFill>
+          <a:blip r:embed="rId3">
+            <a:extLst>
+              <a:ext uri="{28A0092B-C50C-407E-A947-70E740481C1C}">
+                <a14:useLocalDpi xmlns:a14="http://schemas.microsoft.com/office/drawing/2010/main" val="0"/>
+              </a:ext>
+            </a:extLst>
+          </a:blip>
+          <a:stretch>
+            <a:fillRect/>
+          </a:stretch>
+        </p:blipFill>
+        <p:spPr>
+          <a:xfrm>
+            <a:off x="9142914" y="0"/>
+            <a:ext cx="2694933" cy="6858000"/>
+          </a:xfrm>
+          <a:prstGeom prst="rect">
+            <a:avLst/>
+          </a:prstGeom>
+        </p:spPr>
+      </p:pic>
     </p:spTree>
     <p:extLst>
       <p:ext uri="{BB962C8B-B14F-4D97-AF65-F5344CB8AC3E}">
@@ -5295,10 +5284,9 @@
           <a:lstStyle/>
           <a:p>
             <a:r>
-              <a:rPr lang="en-US" dirty="0" smtClean="0"/>
+              <a:rPr lang="en-US" dirty="0"/>
               <a:t>Preliminary Results</a:t>
             </a:r>
-            <a:endParaRPr lang="en-US" dirty="0"/>
           </a:p>
         </p:txBody>
       </p:sp>
@@ -5367,10 +5355,9 @@
           <a:lstStyle/>
           <a:p>
             <a:r>
-              <a:rPr lang="en-US" dirty="0" smtClean="0"/>
+              <a:rPr lang="en-US" dirty="0"/>
               <a:t>Model Deployment – Societal Impacts</a:t>
             </a:r>
-            <a:endParaRPr lang="en-US" dirty="0"/>
           </a:p>
         </p:txBody>
       </p:sp>
@@ -5392,87 +5379,87 @@
           <a:lstStyle/>
           <a:p>
             <a:r>
-              <a:rPr lang="en-US" dirty="0" smtClean="0"/>
+              <a:rPr lang="en-US" dirty="0"/>
               <a:t>Transparency (Opacity)</a:t>
             </a:r>
           </a:p>
           <a:p>
             <a:pPr lvl="1"/>
             <a:r>
-              <a:rPr lang="en-US" dirty="0" smtClean="0"/>
+              <a:rPr lang="en-US" dirty="0"/>
               <a:t>Transparency to the deploying company</a:t>
             </a:r>
           </a:p>
           <a:p>
             <a:pPr lvl="1"/>
             <a:r>
-              <a:rPr lang="en-US" dirty="0" smtClean="0"/>
+              <a:rPr lang="en-US" dirty="0"/>
               <a:t>Determining auxiliary outputs can help make the model more transparent</a:t>
             </a:r>
           </a:p>
           <a:p>
             <a:r>
-              <a:rPr lang="en-US" dirty="0" smtClean="0"/>
+              <a:rPr lang="en-US" dirty="0"/>
               <a:t>Bias</a:t>
             </a:r>
           </a:p>
           <a:p>
             <a:pPr lvl="1"/>
             <a:r>
-              <a:rPr lang="en-US" dirty="0" smtClean="0"/>
+              <a:rPr lang="en-US" dirty="0"/>
               <a:t>Ensuring output is not biased towards certain groups</a:t>
             </a:r>
           </a:p>
           <a:p>
             <a:r>
-              <a:rPr lang="en-US" dirty="0" smtClean="0"/>
+              <a:rPr lang="en-US" dirty="0"/>
               <a:t>Labor</a:t>
             </a:r>
           </a:p>
           <a:p>
             <a:pPr lvl="1"/>
             <a:r>
-              <a:rPr lang="en-US" dirty="0" smtClean="0"/>
+              <a:rPr lang="en-US" dirty="0"/>
               <a:t>Very minimal</a:t>
             </a:r>
           </a:p>
           <a:p>
             <a:r>
-              <a:rPr lang="en-US" dirty="0" smtClean="0"/>
+              <a:rPr lang="en-US" dirty="0"/>
               <a:t>Privacy</a:t>
             </a:r>
           </a:p>
           <a:p>
             <a:pPr lvl="1"/>
             <a:r>
-              <a:rPr lang="en-US" dirty="0" smtClean="0"/>
+              <a:rPr lang="en-US" dirty="0"/>
               <a:t>Some people might be concerned with their data being used</a:t>
             </a:r>
           </a:p>
           <a:p>
             <a:pPr lvl="1"/>
             <a:r>
-              <a:rPr lang="en-US" dirty="0" smtClean="0"/>
+              <a:rPr lang="en-US" dirty="0"/>
               <a:t>These are public comments</a:t>
             </a:r>
           </a:p>
           <a:p>
             <a:r>
-              <a:rPr lang="en-US" dirty="0" smtClean="0"/>
+              <a:rPr lang="en-US" dirty="0"/>
               <a:t>Liability</a:t>
             </a:r>
           </a:p>
           <a:p>
             <a:pPr lvl="1"/>
             <a:r>
-              <a:rPr lang="en-US" dirty="0" smtClean="0"/>
+              <a:rPr lang="en-US" dirty="0"/>
               <a:t>Missing a toxic comment</a:t>
             </a:r>
           </a:p>
           <a:p>
             <a:pPr lvl="1"/>
             <a:r>
-              <a:rPr lang="en-US" dirty="0" smtClean="0"/>
+              <a:rPr lang="en-US" dirty="0"/>
               <a:t>Flagging a non-toxic comment</a:t>
             </a:r>
           </a:p>
@@ -5524,10 +5511,9 @@
           <a:lstStyle/>
           <a:p>
             <a:r>
-              <a:rPr lang="en-US" dirty="0" smtClean="0"/>
+              <a:rPr lang="en-US" dirty="0"/>
               <a:t>Freedom of Speech and Censorship</a:t>
             </a:r>
-            <a:endParaRPr lang="en-US" dirty="0"/>
           </a:p>
         </p:txBody>
       </p:sp>
@@ -5547,14 +5533,14 @@
           <a:lstStyle/>
           <a:p>
             <a:r>
-              <a:rPr lang="en-US" dirty="0" smtClean="0"/>
+              <a:rPr lang="en-US" dirty="0"/>
               <a:t>Societal controversy regarding freedom of speech and censorship</a:t>
             </a:r>
           </a:p>
           <a:p>
             <a:pPr lvl="1"/>
             <a:r>
-              <a:rPr lang="en-US" dirty="0" smtClean="0"/>
+              <a:rPr lang="en-US" dirty="0"/>
               <a:t>How is this considered in AI models?</a:t>
             </a:r>
           </a:p>
@@ -5564,7 +5550,7 @@
           </a:p>
           <a:p>
             <a:r>
-              <a:rPr lang="en-US" dirty="0" smtClean="0"/>
+              <a:rPr lang="en-US" dirty="0"/>
               <a:t>Is this model necessary?</a:t>
             </a:r>
           </a:p>
@@ -5616,10 +5602,9 @@
           <a:lstStyle/>
           <a:p>
             <a:r>
-              <a:rPr lang="en-US" dirty="0" smtClean="0"/>
+              <a:rPr lang="en-US" dirty="0"/>
               <a:t>Future Work</a:t>
             </a:r>
-            <a:endParaRPr lang="en-US" dirty="0"/>
           </a:p>
         </p:txBody>
       </p:sp>
@@ -5679,7 +5664,7 @@
               <a:buChar char="•"/>
             </a:pPr>
             <a:r>
-              <a:rPr lang="en-US" dirty="0" smtClean="0"/>
+              <a:rPr lang="en-US" dirty="0"/>
               <a:t>Feature Engineering</a:t>
             </a:r>
           </a:p>
@@ -5689,7 +5674,7 @@
               <a:buChar char="•"/>
             </a:pPr>
             <a:r>
-              <a:rPr lang="en-US" dirty="0" smtClean="0"/>
+              <a:rPr lang="en-US" dirty="0"/>
               <a:t>New features</a:t>
             </a:r>
           </a:p>
@@ -5706,7 +5691,7 @@
               <a:buChar char="•"/>
             </a:pPr>
             <a:r>
-              <a:rPr lang="en-US" dirty="0" smtClean="0"/>
+              <a:rPr lang="en-US" dirty="0"/>
               <a:t>Data cleaning</a:t>
             </a:r>
           </a:p>
@@ -5716,13 +5701,13 @@
               <a:buChar char="•"/>
             </a:pPr>
             <a:r>
-              <a:rPr lang="en-US" dirty="0" smtClean="0"/>
+              <a:rPr lang="en-US" dirty="0"/>
               <a:t>Contraction mapping</a:t>
             </a:r>
           </a:p>
           <a:p>
             <a:pPr lvl="1"/>
-            <a:endParaRPr lang="en-US" dirty="0" smtClean="0"/>
+            <a:endParaRPr lang="en-US" dirty="0"/>
           </a:p>
           <a:p>
             <a:pPr marL="285750" indent="-285750">
@@ -5730,7 +5715,7 @@
               <a:buChar char="•"/>
             </a:pPr>
             <a:r>
-              <a:rPr lang="en-US" dirty="0" smtClean="0"/>
+              <a:rPr lang="en-US" dirty="0"/>
               <a:t>Addressing class imbalance</a:t>
             </a:r>
           </a:p>
@@ -5747,7 +5732,7 @@
               <a:buChar char="•"/>
             </a:pPr>
             <a:r>
-              <a:rPr lang="en-US" dirty="0" smtClean="0"/>
+              <a:rPr lang="en-US" dirty="0"/>
               <a:t>Performance based on demographic</a:t>
             </a:r>
           </a:p>
@@ -5757,7 +5742,7 @@
               <a:buChar char="•"/>
             </a:pPr>
             <a:r>
-              <a:rPr lang="en-US" dirty="0" smtClean="0"/>
+              <a:rPr lang="en-US" dirty="0"/>
               <a:t>Toxicity and auxiliary outputs</a:t>
             </a:r>
           </a:p>
@@ -5823,31 +5808,46 @@
           <a:lstStyle/>
           <a:p>
             <a:r>
-              <a:rPr lang="en-US" dirty="0" smtClean="0"/>
+              <a:rPr lang="en-US" dirty="0"/>
               <a:t>Introduction</a:t>
             </a:r>
+          </a:p>
+        </p:txBody>
+      </p:sp>
+      <p:sp>
+        <p:nvSpPr>
+          <p:cNvPr id="3" name="Content Placeholder 2"/>
+          <p:cNvSpPr>
+            <a:spLocks noGrp="1"/>
+          </p:cNvSpPr>
+          <p:nvPr>
+            <p:ph idx="1"/>
+          </p:nvPr>
+        </p:nvSpPr>
+        <p:spPr/>
+        <p:txBody>
+          <a:bodyPr/>
+          <a:lstStyle/>
+          <a:p>
+            <a:r>
+              <a:rPr lang="en-US" dirty="0"/>
+              <a:t>NLP is used in classifying toxic texts</a:t>
+            </a:r>
+          </a:p>
+          <a:p>
             <a:endParaRPr lang="en-US" dirty="0"/>
           </a:p>
-        </p:txBody>
-      </p:sp>
-      <p:sp>
-        <p:nvSpPr>
-          <p:cNvPr id="3" name="Content Placeholder 2"/>
-          <p:cNvSpPr>
-            <a:spLocks noGrp="1"/>
-          </p:cNvSpPr>
-          <p:nvPr>
-            <p:ph idx="1"/>
-          </p:nvPr>
-        </p:nvSpPr>
-        <p:spPr/>
-        <p:txBody>
-          <a:bodyPr/>
-          <a:lstStyle/>
-          <a:p>
-            <a:r>
-              <a:rPr lang="en-US" dirty="0" smtClean="0"/>
-              <a:t>NLP is used in classifying toxic texts</a:t>
+          <a:p>
+            <a:r>
+              <a:rPr lang="en-US" dirty="0"/>
+              <a:t>Our goal: to classify toxic comments</a:t>
+            </a:r>
+          </a:p>
+          <a:p>
+            <a:pPr lvl="1"/>
+            <a:r>
+              <a:rPr lang="en-US" dirty="0"/>
+              <a:t>Jigsaw Toxicity Classification challenge</a:t>
             </a:r>
           </a:p>
           <a:p>
@@ -5855,23 +5855,7 @@
           </a:p>
           <a:p>
             <a:r>
-              <a:rPr lang="en-US" dirty="0" smtClean="0"/>
-              <a:t>Our goal: to classify toxic comments</a:t>
-            </a:r>
-          </a:p>
-          <a:p>
-            <a:pPr lvl="1"/>
-            <a:r>
-              <a:rPr lang="en-US" dirty="0" smtClean="0"/>
-              <a:t>Jigsaw Toxicity Classification challenge</a:t>
-            </a:r>
-          </a:p>
-          <a:p>
-            <a:endParaRPr lang="en-US" dirty="0"/>
-          </a:p>
-          <a:p>
-            <a:r>
-              <a:rPr lang="en-US" dirty="0" smtClean="0"/>
+              <a:rPr lang="en-US" dirty="0"/>
               <a:t>Biggest challenge: Bias!</a:t>
             </a:r>
           </a:p>
@@ -5923,10 +5907,9 @@
           <a:lstStyle/>
           <a:p>
             <a:r>
-              <a:rPr lang="en-US" dirty="0" smtClean="0"/>
+              <a:rPr lang="en-US" dirty="0"/>
               <a:t>Challenges</a:t>
             </a:r>
-            <a:endParaRPr lang="en-US" dirty="0"/>
           </a:p>
         </p:txBody>
       </p:sp>
@@ -5946,21 +5929,21 @@
           <a:lstStyle/>
           <a:p>
             <a:r>
-              <a:rPr lang="en-US" dirty="0" smtClean="0"/>
+              <a:rPr lang="en-US" dirty="0"/>
               <a:t>Unintended bias</a:t>
             </a:r>
           </a:p>
           <a:p>
             <a:pPr lvl="1"/>
             <a:r>
-              <a:rPr lang="en-US" dirty="0" smtClean="0"/>
+              <a:rPr lang="en-US" dirty="0"/>
               <a:t>Associating names or identities with toxicity</a:t>
             </a:r>
           </a:p>
           <a:p>
             <a:pPr lvl="1"/>
             <a:r>
-              <a:rPr lang="en-US" dirty="0" smtClean="0"/>
+              <a:rPr lang="en-US" dirty="0"/>
               <a:t>Due to data sources referring to certain identities/names in offensive ways.</a:t>
             </a:r>
           </a:p>
@@ -5970,28 +5953,28 @@
           </a:p>
           <a:p>
             <a:r>
-              <a:rPr lang="en-US" dirty="0" smtClean="0"/>
+              <a:rPr lang="en-US" dirty="0"/>
               <a:t>Data</a:t>
             </a:r>
           </a:p>
           <a:p>
             <a:pPr lvl="1"/>
             <a:r>
-              <a:rPr lang="en-US" dirty="0" smtClean="0"/>
+              <a:rPr lang="en-US" dirty="0"/>
               <a:t>Missing fields</a:t>
             </a:r>
           </a:p>
           <a:p>
             <a:pPr lvl="1"/>
             <a:r>
-              <a:rPr lang="en-US" dirty="0" smtClean="0"/>
+              <a:rPr lang="en-US" dirty="0"/>
               <a:t>Spelling/grammar errors</a:t>
             </a:r>
           </a:p>
           <a:p>
             <a:pPr lvl="1"/>
             <a:r>
-              <a:rPr lang="en-US" dirty="0" smtClean="0"/>
+              <a:rPr lang="en-US" dirty="0"/>
               <a:t>Imbalance of classes</a:t>
             </a:r>
           </a:p>
@@ -6047,10 +6030,9 @@
           <a:lstStyle/>
           <a:p>
             <a:r>
-              <a:rPr lang="en-US" dirty="0" smtClean="0"/>
+              <a:rPr lang="en-US" dirty="0"/>
               <a:t>Unintended Bias – Demographics &amp; Toxicity</a:t>
             </a:r>
-            <a:endParaRPr lang="en-US" dirty="0"/>
           </a:p>
         </p:txBody>
       </p:sp>
@@ -6079,7 +6061,7 @@
         <p:spPr>
           <a:xfrm>
             <a:off x="2832496" y="1825625"/>
-            <a:ext cx="6527007" cy="4351338"/>
+            <a:ext cx="6527007" cy="4351337"/>
           </a:xfrm>
         </p:spPr>
       </p:pic>
@@ -6129,10 +6111,9 @@
           <a:lstStyle/>
           <a:p>
             <a:r>
-              <a:rPr lang="en-US" dirty="0" smtClean="0"/>
+              <a:rPr lang="en-US" dirty="0"/>
               <a:t>Unintended Bias – Demographics &amp; Comment Label</a:t>
             </a:r>
-            <a:endParaRPr lang="en-US" dirty="0"/>
           </a:p>
         </p:txBody>
       </p:sp>
@@ -6211,10 +6192,9 @@
           <a:lstStyle/>
           <a:p>
             <a:r>
-              <a:rPr lang="en-US" dirty="0" smtClean="0"/>
+              <a:rPr lang="en-US" dirty="0"/>
               <a:t>Unintended Bias – Time</a:t>
             </a:r>
-            <a:endParaRPr lang="en-US" dirty="0"/>
           </a:p>
         </p:txBody>
       </p:sp>
@@ -6244,10 +6224,9 @@
               <a:buNone/>
             </a:pPr>
             <a:r>
-              <a:rPr lang="en-US" sz="2400" i="1" dirty="0" smtClean="0"/>
+              <a:rPr lang="en-US" sz="2400" i="1" dirty="0"/>
               <a:t>Weighted toxicity per race over time</a:t>
             </a:r>
-            <a:endParaRPr lang="en-US" sz="2400" i="1" dirty="0"/>
           </a:p>
         </p:txBody>
       </p:sp>
@@ -6327,10 +6306,9 @@
           <a:lstStyle/>
           <a:p>
             <a:r>
-              <a:rPr lang="en-US" dirty="0" smtClean="0"/>
+              <a:rPr lang="en-US" dirty="0"/>
               <a:t>Unintended Bias – Time</a:t>
             </a:r>
-            <a:endParaRPr lang="en-US" dirty="0"/>
           </a:p>
         </p:txBody>
       </p:sp>
@@ -6360,10 +6338,9 @@
               <a:buNone/>
             </a:pPr>
             <a:r>
-              <a:rPr lang="en-US" sz="2400" i="1" dirty="0" smtClean="0"/>
+              <a:rPr lang="en-US" sz="2400" i="1" dirty="0"/>
               <a:t>Weighted toxicity per religion over time</a:t>
             </a:r>
-            <a:endParaRPr lang="en-US" sz="2400" i="1" dirty="0"/>
           </a:p>
         </p:txBody>
       </p:sp>
@@ -6443,10 +6420,9 @@
           <a:lstStyle/>
           <a:p>
             <a:r>
-              <a:rPr lang="en-US" dirty="0" smtClean="0"/>
+              <a:rPr lang="en-US" dirty="0"/>
               <a:t>Unintended Bias – Time</a:t>
             </a:r>
-            <a:endParaRPr lang="en-US" dirty="0"/>
           </a:p>
         </p:txBody>
       </p:sp>
@@ -6476,10 +6452,9 @@
               <a:buNone/>
             </a:pPr>
             <a:r>
-              <a:rPr lang="en-US" sz="2400" i="1" dirty="0" smtClean="0"/>
+              <a:rPr lang="en-US" sz="2400" i="1" dirty="0"/>
               <a:t>Weighted toxicity per sexual-orientation over time</a:t>
             </a:r>
-            <a:endParaRPr lang="en-US" sz="2400" i="1" dirty="0"/>
           </a:p>
         </p:txBody>
       </p:sp>
@@ -6559,10 +6534,9 @@
           <a:lstStyle/>
           <a:p>
             <a:r>
-              <a:rPr lang="en-US" dirty="0" smtClean="0"/>
+              <a:rPr lang="en-US" dirty="0"/>
               <a:t>Unintended Bias – Time</a:t>
             </a:r>
-            <a:endParaRPr lang="en-US" dirty="0"/>
           </a:p>
         </p:txBody>
       </p:sp>
@@ -6592,10 +6566,9 @@
               <a:buNone/>
             </a:pPr>
             <a:r>
-              <a:rPr lang="en-US" sz="2400" i="1" dirty="0" smtClean="0"/>
+              <a:rPr lang="en-US" sz="2400" i="1" dirty="0"/>
               <a:t>Weighted toxicity per gender over time</a:t>
             </a:r>
-            <a:endParaRPr lang="en-US" sz="2400" i="1" dirty="0"/>
           </a:p>
         </p:txBody>
       </p:sp>

</xml_diff>

<commit_message>
Adds results and a theme to the presentation as well as my notes.
</commit_message>
<xml_diff>
--- a/NLP_presentation.pptx
+++ b/NLP_presentation.pptx
@@ -2,7 +2,7 @@
 <file path=ppt/presentation.xml><?xml version="1.0" encoding="utf-8"?>
 <p:presentation xmlns:a="http://schemas.openxmlformats.org/drawingml/2006/main" xmlns:r="http://schemas.openxmlformats.org/officeDocument/2006/relationships" xmlns:p="http://schemas.openxmlformats.org/presentationml/2006/main" saveSubsetFonts="1">
   <p:sldMasterIdLst>
-    <p:sldMasterId id="2147483648" r:id="rId1"/>
+    <p:sldMasterId id="2147483660" r:id="rId1"/>
   </p:sldMasterIdLst>
   <p:notesMasterIdLst>
     <p:notesMasterId r:id="rId19"/>
@@ -32,7 +32,7 @@
     <a:defPPr>
       <a:defRPr lang="en-US"/>
     </a:defPPr>
-    <a:lvl1pPr marL="0" algn="l" defTabSz="914400" rtl="0" eaLnBrk="1" latinLnBrk="0" hangingPunct="1">
+    <a:lvl1pPr marL="0" algn="l" defTabSz="457200" rtl="0" eaLnBrk="1" latinLnBrk="0" hangingPunct="1">
       <a:defRPr sz="1800" kern="1200">
         <a:solidFill>
           <a:schemeClr val="tx1"/>
@@ -42,7 +42,7 @@
         <a:cs typeface="+mn-cs"/>
       </a:defRPr>
     </a:lvl1pPr>
-    <a:lvl2pPr marL="457200" algn="l" defTabSz="914400" rtl="0" eaLnBrk="1" latinLnBrk="0" hangingPunct="1">
+    <a:lvl2pPr marL="457200" algn="l" defTabSz="457200" rtl="0" eaLnBrk="1" latinLnBrk="0" hangingPunct="1">
       <a:defRPr sz="1800" kern="1200">
         <a:solidFill>
           <a:schemeClr val="tx1"/>
@@ -52,7 +52,7 @@
         <a:cs typeface="+mn-cs"/>
       </a:defRPr>
     </a:lvl2pPr>
-    <a:lvl3pPr marL="914400" algn="l" defTabSz="914400" rtl="0" eaLnBrk="1" latinLnBrk="0" hangingPunct="1">
+    <a:lvl3pPr marL="914400" algn="l" defTabSz="457200" rtl="0" eaLnBrk="1" latinLnBrk="0" hangingPunct="1">
       <a:defRPr sz="1800" kern="1200">
         <a:solidFill>
           <a:schemeClr val="tx1"/>
@@ -62,7 +62,7 @@
         <a:cs typeface="+mn-cs"/>
       </a:defRPr>
     </a:lvl3pPr>
-    <a:lvl4pPr marL="1371600" algn="l" defTabSz="914400" rtl="0" eaLnBrk="1" latinLnBrk="0" hangingPunct="1">
+    <a:lvl4pPr marL="1371600" algn="l" defTabSz="457200" rtl="0" eaLnBrk="1" latinLnBrk="0" hangingPunct="1">
       <a:defRPr sz="1800" kern="1200">
         <a:solidFill>
           <a:schemeClr val="tx1"/>
@@ -72,7 +72,7 @@
         <a:cs typeface="+mn-cs"/>
       </a:defRPr>
     </a:lvl4pPr>
-    <a:lvl5pPr marL="1828800" algn="l" defTabSz="914400" rtl="0" eaLnBrk="1" latinLnBrk="0" hangingPunct="1">
+    <a:lvl5pPr marL="1828800" algn="l" defTabSz="457200" rtl="0" eaLnBrk="1" latinLnBrk="0" hangingPunct="1">
       <a:defRPr sz="1800" kern="1200">
         <a:solidFill>
           <a:schemeClr val="tx1"/>
@@ -82,7 +82,7 @@
         <a:cs typeface="+mn-cs"/>
       </a:defRPr>
     </a:lvl5pPr>
-    <a:lvl6pPr marL="2286000" algn="l" defTabSz="914400" rtl="0" eaLnBrk="1" latinLnBrk="0" hangingPunct="1">
+    <a:lvl6pPr marL="2286000" algn="l" defTabSz="457200" rtl="0" eaLnBrk="1" latinLnBrk="0" hangingPunct="1">
       <a:defRPr sz="1800" kern="1200">
         <a:solidFill>
           <a:schemeClr val="tx1"/>
@@ -92,7 +92,7 @@
         <a:cs typeface="+mn-cs"/>
       </a:defRPr>
     </a:lvl6pPr>
-    <a:lvl7pPr marL="2743200" algn="l" defTabSz="914400" rtl="0" eaLnBrk="1" latinLnBrk="0" hangingPunct="1">
+    <a:lvl7pPr marL="2743200" algn="l" defTabSz="457200" rtl="0" eaLnBrk="1" latinLnBrk="0" hangingPunct="1">
       <a:defRPr sz="1800" kern="1200">
         <a:solidFill>
           <a:schemeClr val="tx1"/>
@@ -102,7 +102,7 @@
         <a:cs typeface="+mn-cs"/>
       </a:defRPr>
     </a:lvl7pPr>
-    <a:lvl8pPr marL="3200400" algn="l" defTabSz="914400" rtl="0" eaLnBrk="1" latinLnBrk="0" hangingPunct="1">
+    <a:lvl8pPr marL="3200400" algn="l" defTabSz="457200" rtl="0" eaLnBrk="1" latinLnBrk="0" hangingPunct="1">
       <a:defRPr sz="1800" kern="1200">
         <a:solidFill>
           <a:schemeClr val="tx1"/>
@@ -112,7 +112,7 @@
         <a:cs typeface="+mn-cs"/>
       </a:defRPr>
     </a:lvl8pPr>
-    <a:lvl9pPr marL="3657600" algn="l" defTabSz="914400" rtl="0" eaLnBrk="1" latinLnBrk="0" hangingPunct="1">
+    <a:lvl9pPr marL="3657600" algn="l" defTabSz="457200" rtl="0" eaLnBrk="1" latinLnBrk="0" hangingPunct="1">
       <a:defRPr sz="1800" kern="1200">
         <a:solidFill>
           <a:schemeClr val="tx1"/>
@@ -703,6 +703,24 @@
               <a:t>Hannah</a:t>
             </a:r>
           </a:p>
+          <a:p>
+            <a:endParaRPr lang="en-US" dirty="0"/>
+          </a:p>
+          <a:p>
+            <a:r>
+              <a:rPr lang="en-US" dirty="0"/>
+              <a:t>Looking at the data, it can be seen there is a clear class imbalance</a:t>
+            </a:r>
+          </a:p>
+          <a:p>
+            <a:endParaRPr lang="en-US" dirty="0"/>
+          </a:p>
+          <a:p>
+            <a:r>
+              <a:rPr lang="en-US" dirty="0"/>
+              <a:t>Only 6% of comments are toxic compared to 94% considered non toxic</a:t>
+            </a:r>
+          </a:p>
         </p:txBody>
       </p:sp>
       <p:sp>
@@ -790,6 +808,50 @@
               <a:t>Hannah</a:t>
             </a:r>
           </a:p>
+          <a:p>
+            <a:endParaRPr lang="en-US" dirty="0"/>
+          </a:p>
+          <a:p>
+            <a:r>
+              <a:rPr lang="en-US" dirty="0"/>
+              <a:t>Broke down the number of samples per demographic as well as how each demographic is labelled</a:t>
+            </a:r>
+          </a:p>
+          <a:p>
+            <a:endParaRPr lang="en-US" dirty="0"/>
+          </a:p>
+          <a:p>
+            <a:r>
+              <a:rPr lang="en-US" dirty="0"/>
+              <a:t>Note that every demographic does contain toxic comments, so it </a:t>
+            </a:r>
+            <a:r>
+              <a:rPr lang="en-US" dirty="0" err="1"/>
+              <a:t>itsn’t</a:t>
+            </a:r>
+            <a:r>
+              <a:rPr lang="en-US" dirty="0"/>
+              <a:t> biased towards certain groups</a:t>
+            </a:r>
+          </a:p>
+          <a:p>
+            <a:r>
+              <a:rPr lang="en-US" dirty="0"/>
+              <a:t>Ratio of normal vs toxic is similar for all groups. The one group which seems to have the least number of toxic comments compared to normal comments is Christian</a:t>
+            </a:r>
+          </a:p>
+          <a:p>
+            <a:endParaRPr lang="en-US" dirty="0"/>
+          </a:p>
+          <a:p>
+            <a:r>
+              <a:rPr lang="en-US" dirty="0"/>
+              <a:t>If you look at different groups of demographics, disability is a lot smaller than the other categories (gender, race, sexual orientation, religion)</a:t>
+            </a:r>
+          </a:p>
+          <a:p>
+            <a:endParaRPr lang="en-US" dirty="0"/>
+          </a:p>
         </p:txBody>
       </p:sp>
       <p:sp>
@@ -964,6 +1026,119 @@
               <a:t>Hannah</a:t>
             </a:r>
           </a:p>
+          <a:p>
+            <a:endParaRPr lang="en-US" dirty="0"/>
+          </a:p>
+          <a:p>
+            <a:r>
+              <a:rPr lang="en-US" dirty="0"/>
+              <a:t>Model is learning something (if a model only predicted false then it would achieve 92% accuracy. Actual accuracy is higher at 94%)</a:t>
+            </a:r>
+          </a:p>
+          <a:p>
+            <a:endParaRPr lang="en-US" dirty="0"/>
+          </a:p>
+          <a:p>
+            <a:r>
+              <a:rPr lang="en-US" dirty="0"/>
+              <a:t>Precision = percent of samples in predicted class which were predicted correctly/belong to that class (TP / TP + FP)</a:t>
+            </a:r>
+          </a:p>
+          <a:p>
+            <a:pPr marL="171450" indent="-171450">
+              <a:buFontTx/>
+              <a:buChar char="-"/>
+            </a:pPr>
+            <a:r>
+              <a:rPr lang="en-US" dirty="0"/>
+              <a:t>Having a lot of False positives decreases the value</a:t>
+            </a:r>
+          </a:p>
+          <a:p>
+            <a:pPr marL="171450" indent="-171450">
+              <a:buFontTx/>
+              <a:buChar char="-"/>
+            </a:pPr>
+            <a:r>
+              <a:rPr lang="en-US" dirty="0"/>
+              <a:t>Can be seen that almost half of the samples which were predicted to be toxic are not actually toxic</a:t>
+            </a:r>
+          </a:p>
+          <a:p>
+            <a:pPr marL="0" indent="0">
+              <a:buFontTx/>
+              <a:buNone/>
+            </a:pPr>
+            <a:endParaRPr lang="en-US" dirty="0"/>
+          </a:p>
+          <a:p>
+            <a:r>
+              <a:rPr lang="en-US" dirty="0"/>
+              <a:t>Recall = percent of samples in a class were predicted to be in that class (TP / TP + FN) (percent of predictions for a class where the samples actually belong to that class)</a:t>
+            </a:r>
+          </a:p>
+          <a:p>
+            <a:pPr marL="171450" indent="-171450">
+              <a:buFontTx/>
+              <a:buChar char="-"/>
+            </a:pPr>
+            <a:r>
+              <a:rPr lang="en-US" dirty="0"/>
+              <a:t>Having a lot of false negatives decreases the value</a:t>
+            </a:r>
+          </a:p>
+          <a:p>
+            <a:pPr marL="171450" indent="-171450">
+              <a:buFontTx/>
+              <a:buChar char="-"/>
+            </a:pPr>
+            <a:r>
+              <a:rPr lang="en-US" dirty="0"/>
+              <a:t>Can be seen that about a quarter of the toxic comments are not labelled as toxic</a:t>
+            </a:r>
+          </a:p>
+          <a:p>
+            <a:pPr marL="171450" indent="-171450">
+              <a:buFontTx/>
+              <a:buChar char="-"/>
+            </a:pPr>
+            <a:endParaRPr lang="en-US" dirty="0"/>
+          </a:p>
+          <a:p>
+            <a:pPr marL="0" indent="0">
+              <a:buFontTx/>
+              <a:buNone/>
+            </a:pPr>
+            <a:r>
+              <a:rPr lang="en-US" dirty="0"/>
+              <a:t>F1 score – uses precision and recall for calculation (</a:t>
+            </a:r>
+            <a:r>
+              <a:rPr lang="en-US" dirty="0" err="1"/>
+              <a:t>kinda</a:t>
+            </a:r>
+            <a:r>
+              <a:rPr lang="en-US" dirty="0"/>
+              <a:t> like a mean between the two)</a:t>
+            </a:r>
+          </a:p>
+          <a:p>
+            <a:pPr marL="0" indent="0">
+              <a:buFontTx/>
+              <a:buNone/>
+            </a:pPr>
+            <a:r>
+              <a:rPr lang="en-US" dirty="0"/>
+              <a:t>There is a lot of room for improvement</a:t>
+            </a:r>
+          </a:p>
+          <a:p>
+            <a:pPr marL="0" indent="0">
+              <a:buFontTx/>
+              <a:buNone/>
+            </a:pPr>
+            <a:endParaRPr lang="en-US" dirty="0"/>
+          </a:p>
         </p:txBody>
       </p:sp>
       <p:sp>
@@ -1960,8 +2135,16 @@
 </file>
 
 <file path=ppt/slideLayouts/slideLayout1.xml><?xml version="1.0" encoding="utf-8"?>
-<p:sldLayout xmlns:a="http://schemas.openxmlformats.org/drawingml/2006/main" xmlns:r="http://schemas.openxmlformats.org/officeDocument/2006/relationships" xmlns:p="http://schemas.openxmlformats.org/presentationml/2006/main" type="title" preserve="1">
+<p:sldLayout xmlns:a="http://schemas.openxmlformats.org/drawingml/2006/main" xmlns:r="http://schemas.openxmlformats.org/officeDocument/2006/relationships" xmlns:p="http://schemas.openxmlformats.org/presentationml/2006/main" showMasterSp="0" type="title" preserve="1">
   <p:cSld name="Title Slide">
+    <p:bg>
+      <p:bgPr>
+        <a:solidFill>
+          <a:schemeClr val="bg2"/>
+        </a:solidFill>
+        <a:effectLst/>
+      </p:bgPr>
+    </p:bg>
     <p:spTree>
       <p:nvGrpSpPr>
         <p:cNvPr id="1" name=""/>
@@ -1988,15 +2171,21 @@
         </p:nvSpPr>
         <p:spPr>
           <a:xfrm>
-            <a:off x="1524000" y="1122363"/>
-            <a:ext cx="9144000" cy="2387600"/>
+            <a:off x="1915128" y="1788454"/>
+            <a:ext cx="8361229" cy="2098226"/>
           </a:xfrm>
         </p:spPr>
         <p:txBody>
-          <a:bodyPr anchor="b"/>
+          <a:bodyPr anchor="b">
+            <a:noAutofit/>
+          </a:bodyPr>
           <a:lstStyle>
             <a:lvl1pPr algn="ctr">
-              <a:defRPr sz="6000"/>
+              <a:defRPr sz="7200" cap="all" baseline="0">
+                <a:solidFill>
+                  <a:schemeClr val="tx2"/>
+                </a:solidFill>
+              </a:defRPr>
             </a:lvl1pPr>
           </a:lstStyle>
           <a:p>
@@ -2004,6 +2193,7 @@
               <a:rPr lang="en-US"/>
               <a:t>Click to edit Master title style</a:t>
             </a:r>
+            <a:endParaRPr lang="en-US" dirty="0"/>
           </a:p>
         </p:txBody>
       </p:sp>
@@ -2019,16 +2209,27 @@
         </p:nvSpPr>
         <p:spPr>
           <a:xfrm>
-            <a:off x="1524000" y="3602038"/>
-            <a:ext cx="9144000" cy="1655762"/>
+            <a:off x="2679906" y="3956279"/>
+            <a:ext cx="6831673" cy="1086237"/>
           </a:xfrm>
         </p:spPr>
         <p:txBody>
-          <a:bodyPr/>
+          <a:bodyPr>
+            <a:normAutofit/>
+          </a:bodyPr>
           <a:lstStyle>
             <a:lvl1pPr marL="0" indent="0" algn="ctr">
+              <a:lnSpc>
+                <a:spcPct val="112000"/>
+              </a:lnSpc>
+              <a:spcBef>
+                <a:spcPts val="0"/>
+              </a:spcBef>
+              <a:spcAft>
+                <a:spcPts val="0"/>
+              </a:spcAft>
               <a:buNone/>
-              <a:defRPr sz="2400"/>
+              <a:defRPr sz="2300"/>
             </a:lvl1pPr>
             <a:lvl2pPr marL="457200" indent="0" algn="ctr">
               <a:buNone/>
@@ -2068,6 +2269,7 @@
               <a:rPr lang="en-US"/>
               <a:t>Click to edit Master subtitle style</a:t>
             </a:r>
+            <a:endParaRPr lang="en-US" dirty="0"/>
           </a:p>
         </p:txBody>
       </p:sp>
@@ -2081,10 +2283,23 @@
             <p:ph type="dt" sz="half" idx="10"/>
           </p:nvPr>
         </p:nvSpPr>
-        <p:spPr/>
-        <p:txBody>
-          <a:bodyPr/>
-          <a:lstStyle/>
+        <p:spPr>
+          <a:xfrm>
+            <a:off x="752858" y="6453386"/>
+            <a:ext cx="1607944" cy="404614"/>
+          </a:xfrm>
+        </p:spPr>
+        <p:txBody>
+          <a:bodyPr/>
+          <a:lstStyle>
+            <a:lvl1pPr>
+              <a:defRPr baseline="0">
+                <a:solidFill>
+                  <a:schemeClr val="tx2"/>
+                </a:solidFill>
+              </a:defRPr>
+            </a:lvl1pPr>
+          </a:lstStyle>
           <a:p>
             <a:fld id="{0B051DB5-80E6-45BF-93D7-66C1E34B89AA}" type="datetimeFigureOut">
               <a:rPr lang="en-US" smtClean="0"/>
@@ -2104,10 +2319,23 @@
             <p:ph type="ftr" sz="quarter" idx="11"/>
           </p:nvPr>
         </p:nvSpPr>
-        <p:spPr/>
-        <p:txBody>
-          <a:bodyPr/>
-          <a:lstStyle/>
+        <p:spPr>
+          <a:xfrm>
+            <a:off x="2584054" y="6453386"/>
+            <a:ext cx="7023377" cy="404614"/>
+          </a:xfrm>
+        </p:spPr>
+        <p:txBody>
+          <a:bodyPr/>
+          <a:lstStyle>
+            <a:lvl1pPr algn="ctr">
+              <a:defRPr baseline="0">
+                <a:solidFill>
+                  <a:schemeClr val="tx2"/>
+                </a:solidFill>
+              </a:defRPr>
+            </a:lvl1pPr>
+          </a:lstStyle>
           <a:p>
             <a:endParaRPr lang="en-US"/>
           </a:p>
@@ -2123,10 +2351,23 @@
             <p:ph type="sldNum" sz="quarter" idx="12"/>
           </p:nvPr>
         </p:nvSpPr>
-        <p:spPr/>
-        <p:txBody>
-          <a:bodyPr/>
-          <a:lstStyle/>
+        <p:spPr>
+          <a:xfrm>
+            <a:off x="9830683" y="6453386"/>
+            <a:ext cx="1596292" cy="404614"/>
+          </a:xfrm>
+        </p:spPr>
+        <p:txBody>
+          <a:bodyPr/>
+          <a:lstStyle>
+            <a:lvl1pPr>
+              <a:defRPr baseline="0">
+                <a:solidFill>
+                  <a:schemeClr val="tx2"/>
+                </a:solidFill>
+              </a:defRPr>
+            </a:lvl1pPr>
+          </a:lstStyle>
           <a:p>
             <a:fld id="{C64287CA-828A-4E61-81C9-7C8400C7BDE7}" type="slidenum">
               <a:rPr lang="en-US" smtClean="0"/>
@@ -2136,15 +2377,144 @@
           </a:p>
         </p:txBody>
       </p:sp>
+      <p:grpSp>
+        <p:nvGrpSpPr>
+          <p:cNvPr id="7" name="Group 6"/>
+          <p:cNvGrpSpPr/>
+          <p:nvPr/>
+        </p:nvGrpSpPr>
+        <p:grpSpPr>
+          <a:xfrm>
+            <a:off x="752858" y="744469"/>
+            <a:ext cx="10674117" cy="5349671"/>
+            <a:chOff x="752858" y="744469"/>
+            <a:chExt cx="10674117" cy="5349671"/>
+          </a:xfrm>
+        </p:grpSpPr>
+        <p:sp>
+          <p:nvSpPr>
+            <p:cNvPr id="11" name="Freeform 6"/>
+            <p:cNvSpPr/>
+            <p:nvPr/>
+          </p:nvSpPr>
+          <p:spPr bwMode="auto">
+            <a:xfrm>
+              <a:off x="8151962" y="1685652"/>
+              <a:ext cx="3275013" cy="4408488"/>
+            </a:xfrm>
+            <a:custGeom>
+              <a:avLst/>
+              <a:gdLst/>
+              <a:ahLst/>
+              <a:cxnLst/>
+              <a:rect l="l" t="t" r="r" b="b"/>
+              <a:pathLst>
+                <a:path w="10000" h="10000">
+                  <a:moveTo>
+                    <a:pt x="8761" y="0"/>
+                  </a:moveTo>
+                  <a:lnTo>
+                    <a:pt x="10000" y="0"/>
+                  </a:lnTo>
+                  <a:lnTo>
+                    <a:pt x="10000" y="10000"/>
+                  </a:lnTo>
+                  <a:lnTo>
+                    <a:pt x="0" y="10000"/>
+                  </a:lnTo>
+                  <a:lnTo>
+                    <a:pt x="0" y="9126"/>
+                  </a:lnTo>
+                  <a:lnTo>
+                    <a:pt x="8761" y="9127"/>
+                  </a:lnTo>
+                  <a:lnTo>
+                    <a:pt x="8761" y="0"/>
+                  </a:lnTo>
+                  <a:close/>
+                </a:path>
+              </a:pathLst>
+            </a:custGeom>
+            <a:solidFill>
+              <a:schemeClr val="tx2"/>
+            </a:solidFill>
+            <a:ln w="0">
+              <a:noFill/>
+              <a:prstDash val="solid"/>
+              <a:round/>
+              <a:headEnd/>
+              <a:tailEnd/>
+            </a:ln>
+          </p:spPr>
+        </p:sp>
+        <p:sp>
+          <p:nvSpPr>
+            <p:cNvPr id="14" name="Freeform 6"/>
+            <p:cNvSpPr/>
+            <p:nvPr/>
+          </p:nvSpPr>
+          <p:spPr bwMode="auto">
+            <a:xfrm flipH="1" flipV="1">
+              <a:off x="752858" y="744469"/>
+              <a:ext cx="3275668" cy="4408488"/>
+            </a:xfrm>
+            <a:custGeom>
+              <a:avLst/>
+              <a:gdLst/>
+              <a:ahLst/>
+              <a:cxnLst/>
+              <a:rect l="l" t="t" r="r" b="b"/>
+              <a:pathLst>
+                <a:path w="10002" h="10000">
+                  <a:moveTo>
+                    <a:pt x="8763" y="0"/>
+                  </a:moveTo>
+                  <a:lnTo>
+                    <a:pt x="10002" y="0"/>
+                  </a:lnTo>
+                  <a:lnTo>
+                    <a:pt x="10002" y="10000"/>
+                  </a:lnTo>
+                  <a:lnTo>
+                    <a:pt x="2" y="10000"/>
+                  </a:lnTo>
+                  <a:cubicBezTo>
+                    <a:pt x="-2" y="9698"/>
+                    <a:pt x="4" y="9427"/>
+                    <a:pt x="0" y="9125"/>
+                  </a:cubicBezTo>
+                  <a:lnTo>
+                    <a:pt x="8763" y="9128"/>
+                  </a:lnTo>
+                  <a:lnTo>
+                    <a:pt x="8763" y="0"/>
+                  </a:lnTo>
+                  <a:close/>
+                </a:path>
+              </a:pathLst>
+            </a:custGeom>
+            <a:solidFill>
+              <a:schemeClr val="tx2"/>
+            </a:solidFill>
+            <a:ln w="0">
+              <a:noFill/>
+              <a:prstDash val="solid"/>
+              <a:round/>
+              <a:headEnd/>
+              <a:tailEnd/>
+            </a:ln>
+          </p:spPr>
+        </p:sp>
+      </p:grpSp>
     </p:spTree>
     <p:extLst>
       <p:ext uri="{BB962C8B-B14F-4D97-AF65-F5344CB8AC3E}">
-        <p14:creationId xmlns:p14="http://schemas.microsoft.com/office/powerpoint/2010/main" val="260003769"/>
+        <p14:creationId xmlns:p14="http://schemas.microsoft.com/office/powerpoint/2010/main" val="656262701"/>
       </p:ext>
     </p:extLst>
   </p:cSld>
   <p:clrMapOvr>
-    <a:masterClrMapping/>
+    <a:overrideClrMapping bg1="lt1" tx1="dk1" bg2="lt2" tx2="dk2" accent1="accent1" accent2="accent2" accent3="accent3" accent4="accent4" accent5="accent5" accent6="accent6" hlink="hlink" folHlink="folHlink"/>
   </p:clrMapOvr>
 </p:sldLayout>
 </file>
@@ -2185,6 +2555,7 @@
               <a:rPr lang="en-US"/>
               <a:t>Click to edit Master title style</a:t>
             </a:r>
+            <a:endParaRPr lang="en-US" dirty="0"/>
           </a:p>
         </p:txBody>
       </p:sp>
@@ -2198,7 +2569,12 @@
             <p:ph type="body" orient="vert" idx="1"/>
           </p:nvPr>
         </p:nvSpPr>
-        <p:spPr/>
+        <p:spPr>
+          <a:xfrm>
+            <a:off x="1371600" y="2295525"/>
+            <a:ext cx="9601200" cy="3571875"/>
+          </a:xfrm>
+        </p:spPr>
         <p:txBody>
           <a:bodyPr vert="eaVert"/>
           <a:lstStyle/>
@@ -2236,6 +2612,7 @@
               <a:rPr lang="en-US"/>
               <a:t>Fifth level</a:t>
             </a:r>
+            <a:endParaRPr lang="en-US" dirty="0"/>
           </a:p>
         </p:txBody>
       </p:sp>
@@ -2307,7 +2684,7 @@
     </p:spTree>
     <p:extLst>
       <p:ext uri="{BB962C8B-B14F-4D97-AF65-F5344CB8AC3E}">
-        <p14:creationId xmlns:p14="http://schemas.microsoft.com/office/powerpoint/2010/main" val="695719397"/>
+        <p14:creationId xmlns:p14="http://schemas.microsoft.com/office/powerpoint/2010/main" val="1305714457"/>
       </p:ext>
     </p:extLst>
   </p:cSld>
@@ -2346,8 +2723,8 @@
         </p:nvSpPr>
         <p:spPr>
           <a:xfrm>
-            <a:off x="8724900" y="365125"/>
-            <a:ext cx="2628900" cy="5811838"/>
+            <a:off x="9596561" y="624156"/>
+            <a:ext cx="1565766" cy="5243244"/>
           </a:xfrm>
         </p:spPr>
         <p:txBody>
@@ -2358,6 +2735,7 @@
               <a:rPr lang="en-US"/>
               <a:t>Click to edit Master title style</a:t>
             </a:r>
+            <a:endParaRPr lang="en-US" dirty="0"/>
           </a:p>
         </p:txBody>
       </p:sp>
@@ -2373,8 +2751,8 @@
         </p:nvSpPr>
         <p:spPr>
           <a:xfrm>
-            <a:off x="838200" y="365125"/>
-            <a:ext cx="7734300" cy="5811838"/>
+            <a:off x="1371600" y="624156"/>
+            <a:ext cx="8179641" cy="5243244"/>
           </a:xfrm>
         </p:spPr>
         <p:txBody>
@@ -2414,6 +2792,7 @@
               <a:rPr lang="en-US"/>
               <a:t>Fifth level</a:t>
             </a:r>
+            <a:endParaRPr lang="en-US" dirty="0"/>
           </a:p>
         </p:txBody>
       </p:sp>
@@ -2485,7 +2864,7 @@
     </p:spTree>
     <p:extLst>
       <p:ext uri="{BB962C8B-B14F-4D97-AF65-F5344CB8AC3E}">
-        <p14:creationId xmlns:p14="http://schemas.microsoft.com/office/powerpoint/2010/main" val="263572157"/>
+        <p14:creationId xmlns:p14="http://schemas.microsoft.com/office/powerpoint/2010/main" val="1913066369"/>
       </p:ext>
     </p:extLst>
   </p:cSld>
@@ -2524,19 +2903,14 @@
         </p:nvSpPr>
         <p:spPr/>
         <p:txBody>
-          <a:bodyPr>
-            <a:normAutofit/>
-          </a:bodyPr>
-          <a:lstStyle>
-            <a:lvl1pPr>
-              <a:defRPr sz="3600"/>
-            </a:lvl1pPr>
-          </a:lstStyle>
-          <a:p>
-            <a:r>
-              <a:rPr lang="en-US" dirty="0"/>
+          <a:bodyPr/>
+          <a:lstStyle/>
+          <a:p>
+            <a:r>
+              <a:rPr lang="en-US"/>
               <a:t>Click to edit Master title style</a:t>
             </a:r>
+            <a:endParaRPr lang="en-US" dirty="0"/>
           </a:p>
         </p:txBody>
       </p:sp>
@@ -2588,6 +2962,7 @@
               <a:rPr lang="en-US"/>
               <a:t>Fifth level</a:t>
             </a:r>
+            <a:endParaRPr lang="en-US" dirty="0"/>
           </a:p>
         </p:txBody>
       </p:sp>
@@ -2659,7 +3034,7 @@
     </p:spTree>
     <p:extLst>
       <p:ext uri="{BB962C8B-B14F-4D97-AF65-F5344CB8AC3E}">
-        <p14:creationId xmlns:p14="http://schemas.microsoft.com/office/powerpoint/2010/main" val="1946025733"/>
+        <p14:creationId xmlns:p14="http://schemas.microsoft.com/office/powerpoint/2010/main" val="4006017308"/>
       </p:ext>
     </p:extLst>
   </p:cSld>
@@ -2670,8 +3045,13 @@
 </file>
 
 <file path=ppt/slideLayouts/slideLayout3.xml><?xml version="1.0" encoding="utf-8"?>
-<p:sldLayout xmlns:a="http://schemas.openxmlformats.org/drawingml/2006/main" xmlns:r="http://schemas.openxmlformats.org/officeDocument/2006/relationships" xmlns:p="http://schemas.openxmlformats.org/presentationml/2006/main" type="secHead" preserve="1">
+<p:sldLayout xmlns:a="http://schemas.openxmlformats.org/drawingml/2006/main" xmlns:r="http://schemas.openxmlformats.org/officeDocument/2006/relationships" xmlns:p="http://schemas.openxmlformats.org/presentationml/2006/main" showMasterSp="0" type="secHead" preserve="1">
   <p:cSld name="Section Header">
+    <p:bg>
+      <p:bgRef idx="1001">
+        <a:schemeClr val="bg2"/>
+      </p:bgRef>
+    </p:bg>
     <p:spTree>
       <p:nvGrpSpPr>
         <p:cNvPr id="1" name=""/>
@@ -2698,15 +3078,21 @@
         </p:nvSpPr>
         <p:spPr>
           <a:xfrm>
-            <a:off x="831850" y="1709738"/>
-            <a:ext cx="10515600" cy="2852737"/>
+            <a:off x="765025" y="1301360"/>
+            <a:ext cx="9612971" cy="2852737"/>
           </a:xfrm>
         </p:spPr>
         <p:txBody>
-          <a:bodyPr anchor="b"/>
+          <a:bodyPr anchor="b">
+            <a:normAutofit/>
+          </a:bodyPr>
           <a:lstStyle>
-            <a:lvl1pPr>
-              <a:defRPr sz="6000"/>
+            <a:lvl1pPr algn="r">
+              <a:defRPr sz="7200" cap="all" baseline="0">
+                <a:solidFill>
+                  <a:schemeClr val="tx2"/>
+                </a:solidFill>
+              </a:defRPr>
             </a:lvl1pPr>
           </a:lstStyle>
           <a:p>
@@ -2714,6 +3100,7 @@
               <a:rPr lang="en-US"/>
               <a:t>Click to edit Master title style</a:t>
             </a:r>
+            <a:endParaRPr lang="en-US" dirty="0"/>
           </a:p>
         </p:txBody>
       </p:sp>
@@ -2729,20 +3116,27 @@
         </p:nvSpPr>
         <p:spPr>
           <a:xfrm>
-            <a:off x="831850" y="4589463"/>
-            <a:ext cx="10515600" cy="1500187"/>
+            <a:off x="765025" y="4216328"/>
+            <a:ext cx="9612971" cy="1143324"/>
           </a:xfrm>
         </p:spPr>
         <p:txBody>
           <a:bodyPr/>
           <a:lstStyle>
-            <a:lvl1pPr marL="0" indent="0">
+            <a:lvl1pPr marL="0" indent="0" algn="r">
+              <a:lnSpc>
+                <a:spcPct val="112000"/>
+              </a:lnSpc>
+              <a:spcBef>
+                <a:spcPts val="0"/>
+              </a:spcBef>
+              <a:spcAft>
+                <a:spcPts val="0"/>
+              </a:spcAft>
               <a:buNone/>
               <a:defRPr sz="2400">
                 <a:solidFill>
-                  <a:schemeClr val="tx1">
-                    <a:tint val="75000"/>
-                  </a:schemeClr>
+                  <a:schemeClr val="tx2"/>
                 </a:solidFill>
               </a:defRPr>
             </a:lvl1pPr>
@@ -2846,10 +3240,23 @@
             <p:ph type="dt" sz="half" idx="10"/>
           </p:nvPr>
         </p:nvSpPr>
-        <p:spPr/>
-        <p:txBody>
-          <a:bodyPr/>
-          <a:lstStyle/>
+        <p:spPr>
+          <a:xfrm>
+            <a:off x="738908" y="6453386"/>
+            <a:ext cx="1622409" cy="404614"/>
+          </a:xfrm>
+        </p:spPr>
+        <p:txBody>
+          <a:bodyPr/>
+          <a:lstStyle>
+            <a:lvl1pPr>
+              <a:defRPr>
+                <a:solidFill>
+                  <a:schemeClr val="tx2"/>
+                </a:solidFill>
+              </a:defRPr>
+            </a:lvl1pPr>
+          </a:lstStyle>
           <a:p>
             <a:fld id="{0B051DB5-80E6-45BF-93D7-66C1E34B89AA}" type="datetimeFigureOut">
               <a:rPr lang="en-US" smtClean="0"/>
@@ -2869,10 +3276,23 @@
             <p:ph type="ftr" sz="quarter" idx="11"/>
           </p:nvPr>
         </p:nvSpPr>
-        <p:spPr/>
-        <p:txBody>
-          <a:bodyPr/>
-          <a:lstStyle/>
+        <p:spPr>
+          <a:xfrm>
+            <a:off x="2584312" y="6453386"/>
+            <a:ext cx="7023377" cy="404614"/>
+          </a:xfrm>
+        </p:spPr>
+        <p:txBody>
+          <a:bodyPr/>
+          <a:lstStyle>
+            <a:lvl1pPr algn="ctr">
+              <a:defRPr>
+                <a:solidFill>
+                  <a:schemeClr val="tx2"/>
+                </a:solidFill>
+              </a:defRPr>
+            </a:lvl1pPr>
+          </a:lstStyle>
           <a:p>
             <a:endParaRPr lang="en-US"/>
           </a:p>
@@ -2888,10 +3308,23 @@
             <p:ph type="sldNum" sz="quarter" idx="12"/>
           </p:nvPr>
         </p:nvSpPr>
-        <p:spPr/>
-        <p:txBody>
-          <a:bodyPr/>
-          <a:lstStyle/>
+        <p:spPr>
+          <a:xfrm>
+            <a:off x="9830683" y="6453386"/>
+            <a:ext cx="1596292" cy="404614"/>
+          </a:xfrm>
+        </p:spPr>
+        <p:txBody>
+          <a:bodyPr/>
+          <a:lstStyle>
+            <a:lvl1pPr>
+              <a:defRPr>
+                <a:solidFill>
+                  <a:schemeClr val="tx2"/>
+                </a:solidFill>
+              </a:defRPr>
+            </a:lvl1pPr>
+          </a:lstStyle>
           <a:p>
             <a:fld id="{C64287CA-828A-4E61-81C9-7C8400C7BDE7}" type="slidenum">
               <a:rPr lang="en-US" smtClean="0"/>
@@ -2901,15 +3334,71 @@
           </a:p>
         </p:txBody>
       </p:sp>
+      <p:sp>
+        <p:nvSpPr>
+          <p:cNvPr id="7" name="Freeform 6" title="Crop Mark"/>
+          <p:cNvSpPr/>
+          <p:nvPr/>
+        </p:nvSpPr>
+        <p:spPr bwMode="auto">
+          <a:xfrm>
+            <a:off x="8151962" y="1685652"/>
+            <a:ext cx="3275013" cy="4408488"/>
+          </a:xfrm>
+          <a:custGeom>
+            <a:avLst/>
+            <a:gdLst/>
+            <a:ahLst/>
+            <a:cxnLst/>
+            <a:rect l="0" t="0" r="r" b="b"/>
+            <a:pathLst>
+              <a:path w="4125" h="5554">
+                <a:moveTo>
+                  <a:pt x="3614" y="0"/>
+                </a:moveTo>
+                <a:lnTo>
+                  <a:pt x="4125" y="0"/>
+                </a:lnTo>
+                <a:lnTo>
+                  <a:pt x="4125" y="5554"/>
+                </a:lnTo>
+                <a:lnTo>
+                  <a:pt x="0" y="5554"/>
+                </a:lnTo>
+                <a:lnTo>
+                  <a:pt x="0" y="5074"/>
+                </a:lnTo>
+                <a:lnTo>
+                  <a:pt x="3614" y="5074"/>
+                </a:lnTo>
+                <a:lnTo>
+                  <a:pt x="3614" y="0"/>
+                </a:lnTo>
+                <a:close/>
+              </a:path>
+            </a:pathLst>
+          </a:custGeom>
+          <a:solidFill>
+            <a:schemeClr val="tx2"/>
+          </a:solidFill>
+          <a:ln w="0">
+            <a:noFill/>
+            <a:prstDash val="solid"/>
+            <a:round/>
+            <a:headEnd/>
+            <a:tailEnd/>
+          </a:ln>
+        </p:spPr>
+      </p:sp>
     </p:spTree>
     <p:extLst>
       <p:ext uri="{BB962C8B-B14F-4D97-AF65-F5344CB8AC3E}">
-        <p14:creationId xmlns:p14="http://schemas.microsoft.com/office/powerpoint/2010/main" val="705757274"/>
+        <p14:creationId xmlns:p14="http://schemas.microsoft.com/office/powerpoint/2010/main" val="683981967"/>
       </p:ext>
     </p:extLst>
   </p:cSld>
   <p:clrMapOvr>
-    <a:masterClrMapping/>
+    <a:overrideClrMapping bg1="dk1" tx1="lt1" bg2="dk2" tx2="lt2" accent1="accent1" accent2="accent2" accent3="accent3" accent4="accent4" accent5="accent5" accent6="accent6" hlink="hlink" folHlink="folHlink"/>
   </p:clrMapOvr>
 </p:sldLayout>
 </file>
@@ -2944,12 +3433,21 @@
         <p:spPr/>
         <p:txBody>
           <a:bodyPr/>
-          <a:lstStyle/>
+          <a:lstStyle>
+            <a:lvl1pPr>
+              <a:defRPr>
+                <a:solidFill>
+                  <a:schemeClr val="tx2"/>
+                </a:solidFill>
+              </a:defRPr>
+            </a:lvl1pPr>
+          </a:lstStyle>
           <a:p>
             <a:r>
               <a:rPr lang="en-US"/>
               <a:t>Click to edit Master title style</a:t>
             </a:r>
+            <a:endParaRPr lang="en-US" dirty="0"/>
           </a:p>
         </p:txBody>
       </p:sp>
@@ -2965,13 +3463,49 @@
         </p:nvSpPr>
         <p:spPr>
           <a:xfrm>
-            <a:off x="838200" y="1825625"/>
-            <a:ext cx="5181600" cy="4351338"/>
+            <a:off x="1371600" y="2285999"/>
+            <a:ext cx="4447786" cy="3581401"/>
           </a:xfrm>
         </p:spPr>
         <p:txBody>
           <a:bodyPr/>
-          <a:lstStyle/>
+          <a:lstStyle>
+            <a:lvl1pPr>
+              <a:defRPr baseline="0">
+                <a:solidFill>
+                  <a:schemeClr val="tx2"/>
+                </a:solidFill>
+              </a:defRPr>
+            </a:lvl1pPr>
+            <a:lvl2pPr>
+              <a:defRPr baseline="0">
+                <a:solidFill>
+                  <a:schemeClr val="tx2"/>
+                </a:solidFill>
+              </a:defRPr>
+            </a:lvl2pPr>
+            <a:lvl3pPr>
+              <a:defRPr baseline="0">
+                <a:solidFill>
+                  <a:schemeClr val="tx2"/>
+                </a:solidFill>
+              </a:defRPr>
+            </a:lvl3pPr>
+            <a:lvl4pPr>
+              <a:defRPr baseline="0">
+                <a:solidFill>
+                  <a:schemeClr val="tx2"/>
+                </a:solidFill>
+              </a:defRPr>
+            </a:lvl4pPr>
+            <a:lvl5pPr>
+              <a:defRPr baseline="0">
+                <a:solidFill>
+                  <a:schemeClr val="tx2"/>
+                </a:solidFill>
+              </a:defRPr>
+            </a:lvl5pPr>
+          </a:lstStyle>
           <a:p>
             <a:pPr lvl="0"/>
             <a:r>
@@ -3006,6 +3540,7 @@
               <a:rPr lang="en-US"/>
               <a:t>Fifth level</a:t>
             </a:r>
+            <a:endParaRPr lang="en-US" dirty="0"/>
           </a:p>
         </p:txBody>
       </p:sp>
@@ -3021,13 +3556,49 @@
         </p:nvSpPr>
         <p:spPr>
           <a:xfrm>
-            <a:off x="6172200" y="1825625"/>
-            <a:ext cx="5181600" cy="4351338"/>
+            <a:off x="6525403" y="2285999"/>
+            <a:ext cx="4447786" cy="3581401"/>
           </a:xfrm>
         </p:spPr>
         <p:txBody>
           <a:bodyPr/>
-          <a:lstStyle/>
+          <a:lstStyle>
+            <a:lvl1pPr>
+              <a:defRPr>
+                <a:solidFill>
+                  <a:schemeClr val="tx2"/>
+                </a:solidFill>
+              </a:defRPr>
+            </a:lvl1pPr>
+            <a:lvl2pPr>
+              <a:defRPr>
+                <a:solidFill>
+                  <a:schemeClr val="tx2"/>
+                </a:solidFill>
+              </a:defRPr>
+            </a:lvl2pPr>
+            <a:lvl3pPr>
+              <a:defRPr>
+                <a:solidFill>
+                  <a:schemeClr val="tx2"/>
+                </a:solidFill>
+              </a:defRPr>
+            </a:lvl3pPr>
+            <a:lvl4pPr>
+              <a:defRPr>
+                <a:solidFill>
+                  <a:schemeClr val="tx2"/>
+                </a:solidFill>
+              </a:defRPr>
+            </a:lvl4pPr>
+            <a:lvl5pPr>
+              <a:defRPr>
+                <a:solidFill>
+                  <a:schemeClr val="tx2"/>
+                </a:solidFill>
+              </a:defRPr>
+            </a:lvl5pPr>
+          </a:lstStyle>
           <a:p>
             <a:pPr lvl="0"/>
             <a:r>
@@ -3062,6 +3633,7 @@
               <a:rPr lang="en-US"/>
               <a:t>Fifth level</a:t>
             </a:r>
+            <a:endParaRPr lang="en-US" dirty="0"/>
           </a:p>
         </p:txBody>
       </p:sp>
@@ -3133,7 +3705,7 @@
     </p:spTree>
     <p:extLst>
       <p:ext uri="{BB962C8B-B14F-4D97-AF65-F5344CB8AC3E}">
-        <p14:creationId xmlns:p14="http://schemas.microsoft.com/office/powerpoint/2010/main" val="2252169283"/>
+        <p14:creationId xmlns:p14="http://schemas.microsoft.com/office/powerpoint/2010/main" val="3279659959"/>
       </p:ext>
     </p:extLst>
   </p:cSld>
@@ -3172,18 +3744,27 @@
         </p:nvSpPr>
         <p:spPr>
           <a:xfrm>
-            <a:off x="839788" y="365125"/>
-            <a:ext cx="10515600" cy="1325563"/>
+            <a:off x="1371600" y="685800"/>
+            <a:ext cx="9601200" cy="1485900"/>
           </a:xfrm>
         </p:spPr>
         <p:txBody>
           <a:bodyPr/>
-          <a:lstStyle/>
+          <a:lstStyle>
+            <a:lvl1pPr>
+              <a:defRPr>
+                <a:solidFill>
+                  <a:schemeClr val="tx2"/>
+                </a:solidFill>
+              </a:defRPr>
+            </a:lvl1pPr>
+          </a:lstStyle>
           <a:p>
             <a:r>
               <a:rPr lang="en-US"/>
               <a:t>Click to edit Master title style</a:t>
             </a:r>
+            <a:endParaRPr lang="en-US" dirty="0"/>
           </a:p>
         </p:txBody>
       </p:sp>
@@ -3199,16 +3780,31 @@
         </p:nvSpPr>
         <p:spPr>
           <a:xfrm>
-            <a:off x="839788" y="1681163"/>
-            <a:ext cx="5157787" cy="823912"/>
+            <a:off x="1371600" y="2340864"/>
+            <a:ext cx="4443984" cy="823912"/>
           </a:xfrm>
         </p:spPr>
         <p:txBody>
-          <a:bodyPr anchor="b"/>
+          <a:bodyPr anchor="b">
+            <a:noAutofit/>
+          </a:bodyPr>
           <a:lstStyle>
             <a:lvl1pPr marL="0" indent="0">
+              <a:lnSpc>
+                <a:spcPct val="84000"/>
+              </a:lnSpc>
+              <a:spcBef>
+                <a:spcPts val="0"/>
+              </a:spcBef>
+              <a:spcAft>
+                <a:spcPts val="0"/>
+              </a:spcAft>
               <a:buNone/>
-              <a:defRPr sz="2400" b="1"/>
+              <a:defRPr sz="3000" b="0" baseline="0">
+                <a:solidFill>
+                  <a:schemeClr val="tx2"/>
+                </a:solidFill>
+              </a:defRPr>
             </a:lvl1pPr>
             <a:lvl2pPr marL="457200" indent="0">
               <a:buNone/>
@@ -3264,13 +3860,49 @@
         </p:nvSpPr>
         <p:spPr>
           <a:xfrm>
-            <a:off x="839788" y="2505075"/>
-            <a:ext cx="5157787" cy="3684588"/>
+            <a:off x="1371600" y="3305207"/>
+            <a:ext cx="4443984" cy="2562193"/>
           </a:xfrm>
         </p:spPr>
         <p:txBody>
           <a:bodyPr/>
-          <a:lstStyle/>
+          <a:lstStyle>
+            <a:lvl1pPr>
+              <a:defRPr baseline="0">
+                <a:solidFill>
+                  <a:schemeClr val="tx2"/>
+                </a:solidFill>
+              </a:defRPr>
+            </a:lvl1pPr>
+            <a:lvl2pPr>
+              <a:defRPr baseline="0">
+                <a:solidFill>
+                  <a:schemeClr val="tx2"/>
+                </a:solidFill>
+              </a:defRPr>
+            </a:lvl2pPr>
+            <a:lvl3pPr>
+              <a:defRPr baseline="0">
+                <a:solidFill>
+                  <a:schemeClr val="tx2"/>
+                </a:solidFill>
+              </a:defRPr>
+            </a:lvl3pPr>
+            <a:lvl4pPr>
+              <a:defRPr baseline="0">
+                <a:solidFill>
+                  <a:schemeClr val="tx2"/>
+                </a:solidFill>
+              </a:defRPr>
+            </a:lvl4pPr>
+            <a:lvl5pPr>
+              <a:defRPr baseline="0">
+                <a:solidFill>
+                  <a:schemeClr val="tx2"/>
+                </a:solidFill>
+              </a:defRPr>
+            </a:lvl5pPr>
+          </a:lstStyle>
           <a:p>
             <a:pPr lvl="0"/>
             <a:r>
@@ -3305,6 +3937,7 @@
               <a:rPr lang="en-US"/>
               <a:t>Fifth level</a:t>
             </a:r>
+            <a:endParaRPr lang="en-US" dirty="0"/>
           </a:p>
         </p:txBody>
       </p:sp>
@@ -3320,16 +3953,31 @@
         </p:nvSpPr>
         <p:spPr>
           <a:xfrm>
-            <a:off x="6172200" y="1681163"/>
-            <a:ext cx="5183188" cy="823912"/>
+            <a:off x="6525014" y="2340864"/>
+            <a:ext cx="4443984" cy="823912"/>
           </a:xfrm>
         </p:spPr>
         <p:txBody>
-          <a:bodyPr anchor="b"/>
+          <a:bodyPr anchor="b">
+            <a:noAutofit/>
+          </a:bodyPr>
           <a:lstStyle>
             <a:lvl1pPr marL="0" indent="0">
+              <a:lnSpc>
+                <a:spcPct val="84000"/>
+              </a:lnSpc>
+              <a:spcBef>
+                <a:spcPts val="0"/>
+              </a:spcBef>
+              <a:spcAft>
+                <a:spcPts val="0"/>
+              </a:spcAft>
               <a:buNone/>
-              <a:defRPr sz="2400" b="1"/>
+              <a:defRPr sz="3000" b="0" baseline="0">
+                <a:solidFill>
+                  <a:schemeClr val="tx2"/>
+                </a:solidFill>
+              </a:defRPr>
             </a:lvl1pPr>
             <a:lvl2pPr marL="457200" indent="0">
               <a:buNone/>
@@ -3385,13 +4033,49 @@
         </p:nvSpPr>
         <p:spPr>
           <a:xfrm>
-            <a:off x="6172200" y="2505075"/>
-            <a:ext cx="5183188" cy="3684588"/>
+            <a:off x="6525014" y="3305207"/>
+            <a:ext cx="4443984" cy="2562193"/>
           </a:xfrm>
         </p:spPr>
         <p:txBody>
           <a:bodyPr/>
-          <a:lstStyle/>
+          <a:lstStyle>
+            <a:lvl1pPr>
+              <a:defRPr baseline="0">
+                <a:solidFill>
+                  <a:schemeClr val="tx2"/>
+                </a:solidFill>
+              </a:defRPr>
+            </a:lvl1pPr>
+            <a:lvl2pPr>
+              <a:defRPr baseline="0">
+                <a:solidFill>
+                  <a:schemeClr val="tx2"/>
+                </a:solidFill>
+              </a:defRPr>
+            </a:lvl2pPr>
+            <a:lvl3pPr>
+              <a:defRPr baseline="0">
+                <a:solidFill>
+                  <a:schemeClr val="tx2"/>
+                </a:solidFill>
+              </a:defRPr>
+            </a:lvl3pPr>
+            <a:lvl4pPr>
+              <a:defRPr baseline="0">
+                <a:solidFill>
+                  <a:schemeClr val="tx2"/>
+                </a:solidFill>
+              </a:defRPr>
+            </a:lvl4pPr>
+            <a:lvl5pPr>
+              <a:defRPr baseline="0">
+                <a:solidFill>
+                  <a:schemeClr val="tx2"/>
+                </a:solidFill>
+              </a:defRPr>
+            </a:lvl5pPr>
+          </a:lstStyle>
           <a:p>
             <a:pPr lvl="0"/>
             <a:r>
@@ -3426,6 +4110,7 @@
               <a:rPr lang="en-US"/>
               <a:t>Fifth level</a:t>
             </a:r>
+            <a:endParaRPr lang="en-US" dirty="0"/>
           </a:p>
         </p:txBody>
       </p:sp>
@@ -3497,7 +4182,7 @@
     </p:spTree>
     <p:extLst>
       <p:ext uri="{BB962C8B-B14F-4D97-AF65-F5344CB8AC3E}">
-        <p14:creationId xmlns:p14="http://schemas.microsoft.com/office/powerpoint/2010/main" val="1272099093"/>
+        <p14:creationId xmlns:p14="http://schemas.microsoft.com/office/powerpoint/2010/main" val="4015114372"/>
       </p:ext>
     </p:extLst>
   </p:cSld>
@@ -3543,6 +4228,7 @@
               <a:rPr lang="en-US"/>
               <a:t>Click to edit Master title style</a:t>
             </a:r>
+            <a:endParaRPr lang="en-US" dirty="0"/>
           </a:p>
         </p:txBody>
       </p:sp>
@@ -3614,7 +4300,7 @@
     </p:spTree>
     <p:extLst>
       <p:ext uri="{BB962C8B-B14F-4D97-AF65-F5344CB8AC3E}">
-        <p14:creationId xmlns:p14="http://schemas.microsoft.com/office/powerpoint/2010/main" val="1876330673"/>
+        <p14:creationId xmlns:p14="http://schemas.microsoft.com/office/powerpoint/2010/main" val="846033551"/>
       </p:ext>
     </p:extLst>
   </p:cSld>
@@ -3709,7 +4395,7 @@
     </p:spTree>
     <p:extLst>
       <p:ext uri="{BB962C8B-B14F-4D97-AF65-F5344CB8AC3E}">
-        <p14:creationId xmlns:p14="http://schemas.microsoft.com/office/powerpoint/2010/main" val="975985276"/>
+        <p14:creationId xmlns:p14="http://schemas.microsoft.com/office/powerpoint/2010/main" val="2909753396"/>
       </p:ext>
     </p:extLst>
   </p:cSld>
@@ -3720,7 +4406,7 @@
 </file>
 
 <file path=ppt/slideLayouts/slideLayout8.xml><?xml version="1.0" encoding="utf-8"?>
-<p:sldLayout xmlns:a="http://schemas.openxmlformats.org/drawingml/2006/main" xmlns:r="http://schemas.openxmlformats.org/officeDocument/2006/relationships" xmlns:p="http://schemas.openxmlformats.org/presentationml/2006/main" type="objTx" preserve="1">
+<p:sldLayout xmlns:a="http://schemas.openxmlformats.org/drawingml/2006/main" xmlns:r="http://schemas.openxmlformats.org/officeDocument/2006/relationships" xmlns:p="http://schemas.openxmlformats.org/presentationml/2006/main" showMasterSp="0" type="objTx" preserve="1">
   <p:cSld name="Content with Caption">
     <p:spTree>
       <p:nvGrpSpPr>
@@ -3738,25 +4424,72 @@
       </p:grpSpPr>
       <p:sp>
         <p:nvSpPr>
-          <p:cNvPr id="2" name="Title 1"/>
-          <p:cNvSpPr>
-            <a:spLocks noGrp="1"/>
-          </p:cNvSpPr>
-          <p:nvPr>
-            <p:ph type="title"/>
-          </p:nvPr>
+          <p:cNvPr id="8" name="Rectangle 7" title="Background Shape"/>
+          <p:cNvSpPr/>
+          <p:nvPr/>
         </p:nvSpPr>
         <p:spPr>
           <a:xfrm>
-            <a:off x="839788" y="457200"/>
-            <a:ext cx="3932237" cy="1600200"/>
+            <a:off x="0" y="376"/>
+            <a:ext cx="5303520" cy="6857624"/>
+          </a:xfrm>
+          <a:prstGeom prst="rect">
+            <a:avLst/>
+          </a:prstGeom>
+          <a:solidFill>
+            <a:schemeClr val="accent1"/>
+          </a:solidFill>
+          <a:ln>
+            <a:noFill/>
+          </a:ln>
+        </p:spPr>
+        <p:style>
+          <a:lnRef idx="2">
+            <a:schemeClr val="accent1">
+              <a:shade val="50000"/>
+            </a:schemeClr>
+          </a:lnRef>
+          <a:fillRef idx="1">
+            <a:schemeClr val="accent1"/>
+          </a:fillRef>
+          <a:effectRef idx="0">
+            <a:schemeClr val="accent1"/>
+          </a:effectRef>
+          <a:fontRef idx="minor">
+            <a:schemeClr val="lt1"/>
+          </a:fontRef>
+        </p:style>
+      </p:sp>
+      <p:sp>
+        <p:nvSpPr>
+          <p:cNvPr id="2" name="Title 1"/>
+          <p:cNvSpPr>
+            <a:spLocks noGrp="1"/>
+          </p:cNvSpPr>
+          <p:nvPr>
+            <p:ph type="title"/>
+          </p:nvPr>
+        </p:nvSpPr>
+        <p:spPr>
+          <a:xfrm>
+            <a:off x="723900" y="685800"/>
+            <a:ext cx="3855720" cy="2157884"/>
           </a:xfrm>
         </p:spPr>
         <p:txBody>
-          <a:bodyPr anchor="b"/>
+          <a:bodyPr anchor="t">
+            <a:noAutofit/>
+          </a:bodyPr>
           <a:lstStyle>
             <a:lvl1pPr>
-              <a:defRPr sz="3200"/>
+              <a:lnSpc>
+                <a:spcPct val="84000"/>
+              </a:lnSpc>
+              <a:defRPr sz="4800" baseline="0">
+                <a:solidFill>
+                  <a:schemeClr val="tx2"/>
+                </a:solidFill>
+              </a:defRPr>
             </a:lvl1pPr>
           </a:lstStyle>
           <a:p>
@@ -3764,6 +4497,7 @@
               <a:rPr lang="en-US"/>
               <a:t>Click to edit Master title style</a:t>
             </a:r>
+            <a:endParaRPr lang="en-US" dirty="0"/>
           </a:p>
         </p:txBody>
       </p:sp>
@@ -3779,39 +4513,39 @@
         </p:nvSpPr>
         <p:spPr>
           <a:xfrm>
-            <a:off x="5183188" y="987425"/>
-            <a:ext cx="6172200" cy="4873625"/>
+            <a:off x="6256020" y="685801"/>
+            <a:ext cx="5212080" cy="5175250"/>
           </a:xfrm>
         </p:spPr>
         <p:txBody>
           <a:bodyPr/>
           <a:lstStyle>
             <a:lvl1pPr>
-              <a:defRPr sz="3200"/>
+              <a:defRPr sz="2000"/>
             </a:lvl1pPr>
             <a:lvl2pPr>
-              <a:defRPr sz="2800"/>
+              <a:defRPr sz="2000"/>
             </a:lvl2pPr>
             <a:lvl3pPr>
-              <a:defRPr sz="2400"/>
+              <a:defRPr sz="1800"/>
             </a:lvl3pPr>
             <a:lvl4pPr>
-              <a:defRPr sz="2000"/>
+              <a:defRPr sz="1800"/>
             </a:lvl4pPr>
             <a:lvl5pPr>
-              <a:defRPr sz="2000"/>
+              <a:defRPr sz="1600"/>
             </a:lvl5pPr>
             <a:lvl6pPr>
-              <a:defRPr sz="2000"/>
+              <a:defRPr sz="1600"/>
             </a:lvl6pPr>
             <a:lvl7pPr>
-              <a:defRPr sz="2000"/>
+              <a:defRPr sz="1600"/>
             </a:lvl7pPr>
             <a:lvl8pPr>
-              <a:defRPr sz="2000"/>
+              <a:defRPr sz="1600"/>
             </a:lvl8pPr>
             <a:lvl9pPr>
-              <a:defRPr sz="2000"/>
+              <a:defRPr sz="1600"/>
             </a:lvl9pPr>
           </a:lstStyle>
           <a:p>
@@ -3848,6 +4582,7 @@
               <a:rPr lang="en-US"/>
               <a:t>Fifth level</a:t>
             </a:r>
+            <a:endParaRPr lang="en-US" dirty="0"/>
           </a:p>
         </p:txBody>
       </p:sp>
@@ -3863,14 +4598,23 @@
         </p:nvSpPr>
         <p:spPr>
           <a:xfrm>
-            <a:off x="839788" y="2057400"/>
-            <a:ext cx="3932237" cy="3811588"/>
+            <a:off x="723900" y="2856344"/>
+            <a:ext cx="3855720" cy="3011056"/>
           </a:xfrm>
         </p:spPr>
         <p:txBody>
           <a:bodyPr/>
           <a:lstStyle>
             <a:lvl1pPr marL="0" indent="0">
+              <a:lnSpc>
+                <a:spcPct val="113000"/>
+              </a:lnSpc>
+              <a:spcBef>
+                <a:spcPts val="0"/>
+              </a:spcBef>
+              <a:spcAft>
+                <a:spcPts val="1500"/>
+              </a:spcAft>
               <a:buNone/>
               <a:defRPr sz="1600"/>
             </a:lvl1pPr>
@@ -3926,10 +4670,23 @@
             <p:ph type="dt" sz="half" idx="10"/>
           </p:nvPr>
         </p:nvSpPr>
-        <p:spPr/>
-        <p:txBody>
-          <a:bodyPr/>
-          <a:lstStyle/>
+        <p:spPr>
+          <a:xfrm>
+            <a:off x="723900" y="6453386"/>
+            <a:ext cx="1204572" cy="404614"/>
+          </a:xfrm>
+        </p:spPr>
+        <p:txBody>
+          <a:bodyPr/>
+          <a:lstStyle>
+            <a:lvl1pPr>
+              <a:defRPr>
+                <a:solidFill>
+                  <a:schemeClr val="tx2"/>
+                </a:solidFill>
+              </a:defRPr>
+            </a:lvl1pPr>
+          </a:lstStyle>
           <a:p>
             <a:fld id="{0B051DB5-80E6-45BF-93D7-66C1E34B89AA}" type="datetimeFigureOut">
               <a:rPr lang="en-US" smtClean="0"/>
@@ -3949,10 +4706,23 @@
             <p:ph type="ftr" sz="quarter" idx="11"/>
           </p:nvPr>
         </p:nvSpPr>
-        <p:spPr/>
-        <p:txBody>
-          <a:bodyPr/>
-          <a:lstStyle/>
+        <p:spPr>
+          <a:xfrm>
+            <a:off x="2205945" y="6453386"/>
+            <a:ext cx="2373675" cy="404614"/>
+          </a:xfrm>
+        </p:spPr>
+        <p:txBody>
+          <a:bodyPr/>
+          <a:lstStyle>
+            <a:lvl1pPr>
+              <a:defRPr>
+                <a:solidFill>
+                  <a:schemeClr val="tx2"/>
+                </a:solidFill>
+              </a:defRPr>
+            </a:lvl1pPr>
+          </a:lstStyle>
           <a:p>
             <a:endParaRPr lang="en-US"/>
           </a:p>
@@ -3968,10 +4738,23 @@
             <p:ph type="sldNum" sz="quarter" idx="12"/>
           </p:nvPr>
         </p:nvSpPr>
-        <p:spPr/>
-        <p:txBody>
-          <a:bodyPr/>
-          <a:lstStyle/>
+        <p:spPr>
+          <a:xfrm>
+            <a:off x="9883140" y="6453386"/>
+            <a:ext cx="1596292" cy="404614"/>
+          </a:xfrm>
+        </p:spPr>
+        <p:txBody>
+          <a:bodyPr/>
+          <a:lstStyle>
+            <a:lvl1pPr>
+              <a:defRPr>
+                <a:solidFill>
+                  <a:schemeClr val="tx2"/>
+                </a:solidFill>
+              </a:defRPr>
+            </a:lvl1pPr>
+          </a:lstStyle>
           <a:p>
             <a:fld id="{C64287CA-828A-4E61-81C9-7C8400C7BDE7}" type="slidenum">
               <a:rPr lang="en-US" smtClean="0"/>
@@ -3981,10 +4764,48 @@
           </a:p>
         </p:txBody>
       </p:sp>
+      <p:sp>
+        <p:nvSpPr>
+          <p:cNvPr id="9" name="Rectangle 8" title="Divider Bar"/>
+          <p:cNvSpPr/>
+          <p:nvPr/>
+        </p:nvSpPr>
+        <p:spPr>
+          <a:xfrm>
+            <a:off x="5303520" y="376"/>
+            <a:ext cx="228600" cy="6858000"/>
+          </a:xfrm>
+          <a:prstGeom prst="rect">
+            <a:avLst/>
+          </a:prstGeom>
+          <a:solidFill>
+            <a:schemeClr val="tx2"/>
+          </a:solidFill>
+          <a:ln>
+            <a:noFill/>
+          </a:ln>
+        </p:spPr>
+        <p:style>
+          <a:lnRef idx="2">
+            <a:schemeClr val="accent1">
+              <a:shade val="50000"/>
+            </a:schemeClr>
+          </a:lnRef>
+          <a:fillRef idx="1">
+            <a:schemeClr val="accent1"/>
+          </a:fillRef>
+          <a:effectRef idx="0">
+            <a:schemeClr val="accent1"/>
+          </a:effectRef>
+          <a:fontRef idx="minor">
+            <a:schemeClr val="lt1"/>
+          </a:fontRef>
+        </p:style>
+      </p:sp>
     </p:spTree>
     <p:extLst>
       <p:ext uri="{BB962C8B-B14F-4D97-AF65-F5344CB8AC3E}">
-        <p14:creationId xmlns:p14="http://schemas.microsoft.com/office/powerpoint/2010/main" val="2863015879"/>
+        <p14:creationId xmlns:p14="http://schemas.microsoft.com/office/powerpoint/2010/main" val="330719836"/>
       </p:ext>
     </p:extLst>
   </p:cSld>
@@ -3995,7 +4816,7 @@
 </file>
 
 <file path=ppt/slideLayouts/slideLayout9.xml><?xml version="1.0" encoding="utf-8"?>
-<p:sldLayout xmlns:a="http://schemas.openxmlformats.org/drawingml/2006/main" xmlns:r="http://schemas.openxmlformats.org/officeDocument/2006/relationships" xmlns:p="http://schemas.openxmlformats.org/presentationml/2006/main" type="picTx" preserve="1">
+<p:sldLayout xmlns:a="http://schemas.openxmlformats.org/drawingml/2006/main" xmlns:r="http://schemas.openxmlformats.org/officeDocument/2006/relationships" xmlns:p="http://schemas.openxmlformats.org/presentationml/2006/main" showMasterSp="0" type="picTx" preserve="1">
   <p:cSld name="Picture with Caption">
     <p:spTree>
       <p:nvGrpSpPr>
@@ -4013,25 +4834,68 @@
       </p:grpSpPr>
       <p:sp>
         <p:nvSpPr>
-          <p:cNvPr id="2" name="Title 1"/>
-          <p:cNvSpPr>
-            <a:spLocks noGrp="1"/>
-          </p:cNvSpPr>
-          <p:nvPr>
-            <p:ph type="title"/>
-          </p:nvPr>
+          <p:cNvPr id="8" name="Rectangle 7" title="Background Shape"/>
+          <p:cNvSpPr/>
+          <p:nvPr/>
         </p:nvSpPr>
         <p:spPr>
           <a:xfrm>
-            <a:off x="839788" y="457200"/>
-            <a:ext cx="3932237" cy="1600200"/>
+            <a:off x="0" y="376"/>
+            <a:ext cx="5303520" cy="6857624"/>
+          </a:xfrm>
+          <a:prstGeom prst="rect">
+            <a:avLst/>
+          </a:prstGeom>
+          <a:solidFill>
+            <a:schemeClr val="accent1"/>
+          </a:solidFill>
+          <a:ln>
+            <a:noFill/>
+          </a:ln>
+        </p:spPr>
+        <p:style>
+          <a:lnRef idx="2">
+            <a:schemeClr val="accent1">
+              <a:shade val="50000"/>
+            </a:schemeClr>
+          </a:lnRef>
+          <a:fillRef idx="1">
+            <a:schemeClr val="accent1"/>
+          </a:fillRef>
+          <a:effectRef idx="0">
+            <a:schemeClr val="accent1"/>
+          </a:effectRef>
+          <a:fontRef idx="minor">
+            <a:schemeClr val="lt1"/>
+          </a:fontRef>
+        </p:style>
+      </p:sp>
+      <p:sp>
+        <p:nvSpPr>
+          <p:cNvPr id="2" name="Title 1"/>
+          <p:cNvSpPr>
+            <a:spLocks noGrp="1"/>
+          </p:cNvSpPr>
+          <p:nvPr>
+            <p:ph type="title"/>
+          </p:nvPr>
+        </p:nvSpPr>
+        <p:spPr>
+          <a:xfrm>
+            <a:off x="723900" y="685800"/>
+            <a:ext cx="3855720" cy="2157884"/>
           </a:xfrm>
         </p:spPr>
         <p:txBody>
-          <a:bodyPr anchor="b"/>
+          <a:bodyPr anchor="t">
+            <a:normAutofit/>
+          </a:bodyPr>
           <a:lstStyle>
             <a:lvl1pPr>
-              <a:defRPr sz="3200"/>
+              <a:lnSpc>
+                <a:spcPct val="84000"/>
+              </a:lnSpc>
+              <a:defRPr sz="4800" baseline="0"/>
             </a:lvl1pPr>
           </a:lstStyle>
           <a:p>
@@ -4039,6 +4903,7 @@
               <a:rPr lang="en-US"/>
               <a:t>Click to edit Master title style</a:t>
             </a:r>
+            <a:endParaRPr lang="en-US" dirty="0"/>
           </a:p>
         </p:txBody>
       </p:sp>
@@ -4046,7 +4911,7 @@
         <p:nvSpPr>
           <p:cNvPr id="3" name="Picture Placeholder 2"/>
           <p:cNvSpPr>
-            <a:spLocks noGrp="1"/>
+            <a:spLocks noGrp="1" noChangeAspect="1"/>
           </p:cNvSpPr>
           <p:nvPr>
             <p:ph type="pic" idx="1"/>
@@ -4054,24 +4919,26 @@
         </p:nvSpPr>
         <p:spPr>
           <a:xfrm>
-            <a:off x="5183188" y="987425"/>
-            <a:ext cx="6172200" cy="4873625"/>
+            <a:off x="5532120" y="0"/>
+            <a:ext cx="6659880" cy="6857999"/>
           </a:xfrm>
         </p:spPr>
         <p:txBody>
-          <a:bodyPr/>
+          <a:bodyPr anchor="t">
+            <a:normAutofit/>
+          </a:bodyPr>
           <a:lstStyle>
             <a:lvl1pPr marL="0" indent="0">
               <a:buNone/>
-              <a:defRPr sz="3200"/>
+              <a:defRPr sz="2000"/>
             </a:lvl1pPr>
             <a:lvl2pPr marL="457200" indent="0">
               <a:buNone/>
-              <a:defRPr sz="2800"/>
+              <a:defRPr sz="2000"/>
             </a:lvl2pPr>
             <a:lvl3pPr marL="914400" indent="0">
               <a:buNone/>
-              <a:defRPr sz="2400"/>
+              <a:defRPr sz="2000"/>
             </a:lvl3pPr>
             <a:lvl4pPr marL="1371600" indent="0">
               <a:buNone/>
@@ -4099,7 +4966,11 @@
             </a:lvl9pPr>
           </a:lstStyle>
           <a:p>
-            <a:endParaRPr lang="en-US"/>
+            <a:r>
+              <a:rPr lang="en-US"/>
+              <a:t>Click icon to add picture</a:t>
+            </a:r>
+            <a:endParaRPr lang="en-US" dirty="0"/>
           </a:p>
         </p:txBody>
       </p:sp>
@@ -4115,14 +4986,23 @@
         </p:nvSpPr>
         <p:spPr>
           <a:xfrm>
-            <a:off x="839788" y="2057400"/>
-            <a:ext cx="3932237" cy="3811588"/>
+            <a:off x="723900" y="2855968"/>
+            <a:ext cx="3855720" cy="3011432"/>
           </a:xfrm>
         </p:spPr>
         <p:txBody>
           <a:bodyPr/>
           <a:lstStyle>
             <a:lvl1pPr marL="0" indent="0">
+              <a:lnSpc>
+                <a:spcPct val="113000"/>
+              </a:lnSpc>
+              <a:spcBef>
+                <a:spcPts val="0"/>
+              </a:spcBef>
+              <a:spcAft>
+                <a:spcPts val="1500"/>
+              </a:spcAft>
               <a:buNone/>
               <a:defRPr sz="1600"/>
             </a:lvl1pPr>
@@ -4178,10 +5058,23 @@
             <p:ph type="dt" sz="half" idx="10"/>
           </p:nvPr>
         </p:nvSpPr>
-        <p:spPr/>
-        <p:txBody>
-          <a:bodyPr/>
-          <a:lstStyle/>
+        <p:spPr>
+          <a:xfrm>
+            <a:off x="723900" y="6453386"/>
+            <a:ext cx="1204572" cy="404614"/>
+          </a:xfrm>
+        </p:spPr>
+        <p:txBody>
+          <a:bodyPr/>
+          <a:lstStyle>
+            <a:lvl1pPr>
+              <a:defRPr>
+                <a:solidFill>
+                  <a:schemeClr val="tx2"/>
+                </a:solidFill>
+              </a:defRPr>
+            </a:lvl1pPr>
+          </a:lstStyle>
           <a:p>
             <a:fld id="{0B051DB5-80E6-45BF-93D7-66C1E34B89AA}" type="datetimeFigureOut">
               <a:rPr lang="en-US" smtClean="0"/>
@@ -4201,10 +5094,23 @@
             <p:ph type="ftr" sz="quarter" idx="11"/>
           </p:nvPr>
         </p:nvSpPr>
-        <p:spPr/>
-        <p:txBody>
-          <a:bodyPr/>
-          <a:lstStyle/>
+        <p:spPr>
+          <a:xfrm>
+            <a:off x="2205945" y="6453386"/>
+            <a:ext cx="2373675" cy="404614"/>
+          </a:xfrm>
+        </p:spPr>
+        <p:txBody>
+          <a:bodyPr/>
+          <a:lstStyle>
+            <a:lvl1pPr>
+              <a:defRPr>
+                <a:solidFill>
+                  <a:schemeClr val="tx2"/>
+                </a:solidFill>
+              </a:defRPr>
+            </a:lvl1pPr>
+          </a:lstStyle>
           <a:p>
             <a:endParaRPr lang="en-US"/>
           </a:p>
@@ -4220,10 +5126,23 @@
             <p:ph type="sldNum" sz="quarter" idx="12"/>
           </p:nvPr>
         </p:nvSpPr>
-        <p:spPr/>
-        <p:txBody>
-          <a:bodyPr/>
-          <a:lstStyle/>
+        <p:spPr>
+          <a:xfrm>
+            <a:off x="9883140" y="6453386"/>
+            <a:ext cx="1596292" cy="404614"/>
+          </a:xfrm>
+        </p:spPr>
+        <p:txBody>
+          <a:bodyPr/>
+          <a:lstStyle>
+            <a:lvl1pPr>
+              <a:defRPr>
+                <a:solidFill>
+                  <a:schemeClr val="tx2"/>
+                </a:solidFill>
+              </a:defRPr>
+            </a:lvl1pPr>
+          </a:lstStyle>
           <a:p>
             <a:fld id="{C64287CA-828A-4E61-81C9-7C8400C7BDE7}" type="slidenum">
               <a:rPr lang="en-US" smtClean="0"/>
@@ -4233,10 +5152,48 @@
           </a:p>
         </p:txBody>
       </p:sp>
+      <p:sp>
+        <p:nvSpPr>
+          <p:cNvPr id="9" name="Rectangle 8" title="Divider Bar"/>
+          <p:cNvSpPr/>
+          <p:nvPr/>
+        </p:nvSpPr>
+        <p:spPr>
+          <a:xfrm>
+            <a:off x="5303520" y="376"/>
+            <a:ext cx="228600" cy="6858000"/>
+          </a:xfrm>
+          <a:prstGeom prst="rect">
+            <a:avLst/>
+          </a:prstGeom>
+          <a:solidFill>
+            <a:schemeClr val="tx2"/>
+          </a:solidFill>
+          <a:ln>
+            <a:noFill/>
+          </a:ln>
+        </p:spPr>
+        <p:style>
+          <a:lnRef idx="2">
+            <a:schemeClr val="accent1">
+              <a:shade val="50000"/>
+            </a:schemeClr>
+          </a:lnRef>
+          <a:fillRef idx="1">
+            <a:schemeClr val="accent1"/>
+          </a:fillRef>
+          <a:effectRef idx="0">
+            <a:schemeClr val="accent1"/>
+          </a:effectRef>
+          <a:fontRef idx="minor">
+            <a:schemeClr val="lt1"/>
+          </a:fontRef>
+        </p:style>
+      </p:sp>
     </p:spTree>
     <p:extLst>
       <p:ext uri="{BB962C8B-B14F-4D97-AF65-F5344CB8AC3E}">
-        <p14:creationId xmlns:p14="http://schemas.microsoft.com/office/powerpoint/2010/main" val="552007542"/>
+        <p14:creationId xmlns:p14="http://schemas.microsoft.com/office/powerpoint/2010/main" val="2107134511"/>
       </p:ext>
     </p:extLst>
   </p:cSld>
@@ -4250,9 +5207,12 @@
 <p:sldMaster xmlns:a="http://schemas.openxmlformats.org/drawingml/2006/main" xmlns:r="http://schemas.openxmlformats.org/officeDocument/2006/relationships" xmlns:p="http://schemas.openxmlformats.org/presentationml/2006/main">
   <p:cSld>
     <p:bg>
-      <p:bgRef idx="1001">
-        <a:schemeClr val="bg1"/>
-      </p:bgRef>
+      <p:bgPr>
+        <a:solidFill>
+          <a:schemeClr val="bg2"/>
+        </a:solidFill>
+        <a:effectLst/>
+      </p:bgPr>
     </p:bg>
     <p:spTree>
       <p:nvGrpSpPr>
@@ -4280,15 +5240,15 @@
         </p:nvSpPr>
         <p:spPr>
           <a:xfrm>
-            <a:off x="838200" y="365125"/>
-            <a:ext cx="10515600" cy="1325563"/>
+            <a:off x="1371600" y="685800"/>
+            <a:ext cx="9601200" cy="1485900"/>
           </a:xfrm>
           <a:prstGeom prst="rect">
             <a:avLst/>
           </a:prstGeom>
         </p:spPr>
         <p:txBody>
-          <a:bodyPr vert="horz" lIns="91440" tIns="45720" rIns="91440" bIns="45720" rtlCol="0" anchor="ctr">
+          <a:bodyPr vert="horz" lIns="91440" tIns="45720" rIns="91440" bIns="45720" rtlCol="0" anchor="t">
             <a:normAutofit/>
           </a:bodyPr>
           <a:lstStyle/>
@@ -4297,6 +5257,7 @@
               <a:rPr lang="en-US"/>
               <a:t>Click to edit Master title style</a:t>
             </a:r>
+            <a:endParaRPr lang="en-US" dirty="0"/>
           </a:p>
         </p:txBody>
       </p:sp>
@@ -4312,8 +5273,8 @@
         </p:nvSpPr>
         <p:spPr>
           <a:xfrm>
-            <a:off x="838200" y="1825625"/>
-            <a:ext cx="10515600" cy="4351338"/>
+            <a:off x="1371600" y="2286000"/>
+            <a:ext cx="9601200" cy="3581400"/>
           </a:xfrm>
           <a:prstGeom prst="rect">
             <a:avLst/>
@@ -4358,6 +5319,7 @@
               <a:rPr lang="en-US"/>
               <a:t>Fifth level</a:t>
             </a:r>
+            <a:endParaRPr lang="en-US" dirty="0"/>
           </a:p>
         </p:txBody>
       </p:sp>
@@ -4373,8 +5335,8 @@
         </p:nvSpPr>
         <p:spPr>
           <a:xfrm>
-            <a:off x="838200" y="6356350"/>
-            <a:ext cx="2743200" cy="365125"/>
+            <a:off x="1390650" y="6453386"/>
+            <a:ext cx="1204572" cy="404614"/>
           </a:xfrm>
           <a:prstGeom prst="rect">
             <a:avLst/>
@@ -4384,11 +5346,9 @@
           <a:bodyPr vert="horz" lIns="91440" tIns="45720" rIns="91440" bIns="45720" rtlCol="0" anchor="ctr"/>
           <a:lstStyle>
             <a:lvl1pPr algn="l">
-              <a:defRPr sz="1200">
+              <a:defRPr sz="1200" baseline="0">
                 <a:solidFill>
-                  <a:schemeClr val="tx1">
-                    <a:tint val="75000"/>
-                  </a:schemeClr>
+                  <a:schemeClr val="tx2"/>
                 </a:solidFill>
               </a:defRPr>
             </a:lvl1pPr>
@@ -4414,8 +5374,8 @@
         </p:nvSpPr>
         <p:spPr>
           <a:xfrm>
-            <a:off x="4038600" y="6356350"/>
-            <a:ext cx="4114800" cy="365125"/>
+            <a:off x="2893564" y="6453386"/>
+            <a:ext cx="6280830" cy="404614"/>
           </a:xfrm>
           <a:prstGeom prst="rect">
             <a:avLst/>
@@ -4424,12 +5384,10 @@
         <p:txBody>
           <a:bodyPr vert="horz" lIns="91440" tIns="45720" rIns="91440" bIns="45720" rtlCol="0" anchor="ctr"/>
           <a:lstStyle>
-            <a:lvl1pPr algn="ctr">
-              <a:defRPr sz="1200">
+            <a:lvl1pPr algn="l">
+              <a:defRPr sz="1200" baseline="0">
                 <a:solidFill>
-                  <a:schemeClr val="tx1">
-                    <a:tint val="75000"/>
-                  </a:schemeClr>
+                  <a:schemeClr val="tx2"/>
                 </a:solidFill>
               </a:defRPr>
             </a:lvl1pPr>
@@ -4451,8 +5409,8 @@
         </p:nvSpPr>
         <p:spPr>
           <a:xfrm>
-            <a:off x="8610600" y="6356350"/>
-            <a:ext cx="2743200" cy="365125"/>
+            <a:off x="9472736" y="6453386"/>
+            <a:ext cx="1596292" cy="404614"/>
           </a:xfrm>
           <a:prstGeom prst="rect">
             <a:avLst/>
@@ -4462,11 +5420,9 @@
           <a:bodyPr vert="horz" lIns="91440" tIns="45720" rIns="91440" bIns="45720" rtlCol="0" anchor="ctr"/>
           <a:lstStyle>
             <a:lvl1pPr algn="r">
-              <a:defRPr sz="1200">
+              <a:defRPr sz="1200" baseline="0">
                 <a:solidFill>
-                  <a:schemeClr val="tx1">
-                    <a:tint val="75000"/>
-                  </a:schemeClr>
+                  <a:schemeClr val="tx2"/>
                 </a:solidFill>
               </a:defRPr>
             </a:lvl1pPr>
@@ -4480,40 +5436,78 @@
           </a:p>
         </p:txBody>
       </p:sp>
+      <p:sp>
+        <p:nvSpPr>
+          <p:cNvPr id="9" name="Rectangle 8" title="Side bar"/>
+          <p:cNvSpPr/>
+          <p:nvPr/>
+        </p:nvSpPr>
+        <p:spPr>
+          <a:xfrm>
+            <a:off x="478095" y="376"/>
+            <a:ext cx="228600" cy="6858000"/>
+          </a:xfrm>
+          <a:prstGeom prst="rect">
+            <a:avLst/>
+          </a:prstGeom>
+          <a:solidFill>
+            <a:schemeClr val="tx2"/>
+          </a:solidFill>
+          <a:ln>
+            <a:noFill/>
+          </a:ln>
+        </p:spPr>
+        <p:style>
+          <a:lnRef idx="2">
+            <a:schemeClr val="accent1">
+              <a:shade val="50000"/>
+            </a:schemeClr>
+          </a:lnRef>
+          <a:fillRef idx="1">
+            <a:schemeClr val="accent1"/>
+          </a:fillRef>
+          <a:effectRef idx="0">
+            <a:schemeClr val="accent1"/>
+          </a:effectRef>
+          <a:fontRef idx="minor">
+            <a:schemeClr val="lt1"/>
+          </a:fontRef>
+        </p:style>
+      </p:sp>
     </p:spTree>
     <p:extLst>
       <p:ext uri="{BB962C8B-B14F-4D97-AF65-F5344CB8AC3E}">
-        <p14:creationId xmlns:p14="http://schemas.microsoft.com/office/powerpoint/2010/main" val="3650437781"/>
+        <p14:creationId xmlns:p14="http://schemas.microsoft.com/office/powerpoint/2010/main" val="1114738630"/>
       </p:ext>
     </p:extLst>
   </p:cSld>
   <p:clrMap bg1="lt1" tx1="dk1" bg2="lt2" tx2="dk2" accent1="accent1" accent2="accent2" accent3="accent3" accent4="accent4" accent5="accent5" accent6="accent6" hlink="hlink" folHlink="folHlink"/>
   <p:sldLayoutIdLst>
-    <p:sldLayoutId id="2147483649" r:id="rId1"/>
-    <p:sldLayoutId id="2147483650" r:id="rId2"/>
-    <p:sldLayoutId id="2147483651" r:id="rId3"/>
-    <p:sldLayoutId id="2147483652" r:id="rId4"/>
-    <p:sldLayoutId id="2147483653" r:id="rId5"/>
-    <p:sldLayoutId id="2147483654" r:id="rId6"/>
-    <p:sldLayoutId id="2147483655" r:id="rId7"/>
-    <p:sldLayoutId id="2147483656" r:id="rId8"/>
-    <p:sldLayoutId id="2147483657" r:id="rId9"/>
-    <p:sldLayoutId id="2147483658" r:id="rId10"/>
-    <p:sldLayoutId id="2147483659" r:id="rId11"/>
+    <p:sldLayoutId id="2147483661" r:id="rId1"/>
+    <p:sldLayoutId id="2147483662" r:id="rId2"/>
+    <p:sldLayoutId id="2147483663" r:id="rId3"/>
+    <p:sldLayoutId id="2147483664" r:id="rId4"/>
+    <p:sldLayoutId id="2147483665" r:id="rId5"/>
+    <p:sldLayoutId id="2147483666" r:id="rId6"/>
+    <p:sldLayoutId id="2147483667" r:id="rId7"/>
+    <p:sldLayoutId id="2147483668" r:id="rId8"/>
+    <p:sldLayoutId id="2147483669" r:id="rId9"/>
+    <p:sldLayoutId id="2147483670" r:id="rId10"/>
+    <p:sldLayoutId id="2147483671" r:id="rId11"/>
   </p:sldLayoutIdLst>
   <p:txStyles>
     <p:titleStyle>
       <a:lvl1pPr algn="l" defTabSz="914400" rtl="0" eaLnBrk="1" latinLnBrk="0" hangingPunct="1">
         <a:lnSpc>
-          <a:spcPct val="90000"/>
+          <a:spcPct val="89000"/>
         </a:lnSpc>
         <a:spcBef>
           <a:spcPct val="0"/>
         </a:spcBef>
         <a:buNone/>
-        <a:defRPr sz="4400" kern="1200">
+        <a:defRPr sz="4400" kern="1200" baseline="0">
           <a:solidFill>
-            <a:schemeClr val="tx1"/>
+            <a:schemeClr val="tx2"/>
           </a:solidFill>
           <a:latin typeface="+mj-lt"/>
           <a:ea typeface="+mj-ea"/>
@@ -4522,162 +5516,189 @@
       </a:lvl1pPr>
     </p:titleStyle>
     <p:bodyStyle>
-      <a:lvl1pPr marL="228600" indent="-228600" algn="l" defTabSz="914400" rtl="0" eaLnBrk="1" latinLnBrk="0" hangingPunct="1">
+      <a:lvl1pPr marL="384048" indent="-384048" algn="l" defTabSz="914400" rtl="0" eaLnBrk="1" latinLnBrk="0" hangingPunct="1">
         <a:lnSpc>
-          <a:spcPct val="90000"/>
+          <a:spcPct val="94000"/>
         </a:lnSpc>
         <a:spcBef>
           <a:spcPts val="1000"/>
         </a:spcBef>
-        <a:buFont typeface="Arial" panose="020B0604020202020204" pitchFamily="34" charset="0"/>
-        <a:buChar char="•"/>
-        <a:defRPr sz="2800" kern="1200">
+        <a:spcAft>
+          <a:spcPts val="200"/>
+        </a:spcAft>
+        <a:buFont typeface="Franklin Gothic Book" panose="020B0503020102020204" pitchFamily="34" charset="0"/>
+        <a:buChar char="■"/>
+        <a:defRPr sz="2000" kern="1200" baseline="0">
           <a:solidFill>
-            <a:schemeClr val="tx1"/>
+            <a:schemeClr val="tx2"/>
           </a:solidFill>
           <a:latin typeface="+mn-lt"/>
           <a:ea typeface="+mn-ea"/>
           <a:cs typeface="+mn-cs"/>
         </a:defRPr>
       </a:lvl1pPr>
-      <a:lvl2pPr marL="685800" indent="-228600" algn="l" defTabSz="914400" rtl="0" eaLnBrk="1" latinLnBrk="0" hangingPunct="1">
+      <a:lvl2pPr marL="914400" indent="-384048" algn="l" defTabSz="914400" rtl="0" eaLnBrk="1" latinLnBrk="0" hangingPunct="1">
         <a:lnSpc>
-          <a:spcPct val="90000"/>
+          <a:spcPct val="94000"/>
         </a:lnSpc>
         <a:spcBef>
           <a:spcPts val="500"/>
         </a:spcBef>
-        <a:buFont typeface="Arial" panose="020B0604020202020204" pitchFamily="34" charset="0"/>
-        <a:buChar char="•"/>
-        <a:defRPr sz="2400" kern="1200">
+        <a:spcAft>
+          <a:spcPts val="200"/>
+        </a:spcAft>
+        <a:buFont typeface="Franklin Gothic Book" panose="020B0503020102020204" pitchFamily="34" charset="0"/>
+        <a:buChar char="–"/>
+        <a:defRPr sz="2000" i="1" kern="1200" baseline="0">
           <a:solidFill>
-            <a:schemeClr val="tx1"/>
+            <a:schemeClr val="tx2"/>
           </a:solidFill>
           <a:latin typeface="+mn-lt"/>
           <a:ea typeface="+mn-ea"/>
           <a:cs typeface="+mn-cs"/>
         </a:defRPr>
       </a:lvl2pPr>
-      <a:lvl3pPr marL="1143000" indent="-228600" algn="l" defTabSz="914400" rtl="0" eaLnBrk="1" latinLnBrk="0" hangingPunct="1">
+      <a:lvl3pPr marL="1371600" indent="-384048" algn="l" defTabSz="914400" rtl="0" eaLnBrk="1" latinLnBrk="0" hangingPunct="1">
         <a:lnSpc>
-          <a:spcPct val="90000"/>
+          <a:spcPct val="94000"/>
         </a:lnSpc>
         <a:spcBef>
           <a:spcPts val="500"/>
         </a:spcBef>
-        <a:buFont typeface="Arial" panose="020B0604020202020204" pitchFamily="34" charset="0"/>
-        <a:buChar char="•"/>
-        <a:defRPr sz="2000" kern="1200">
+        <a:spcAft>
+          <a:spcPts val="200"/>
+        </a:spcAft>
+        <a:buFont typeface="Franklin Gothic Book" panose="020B0503020102020204" pitchFamily="34" charset="0"/>
+        <a:buChar char="■"/>
+        <a:defRPr sz="1800" kern="1200" baseline="0">
           <a:solidFill>
-            <a:schemeClr val="tx1"/>
+            <a:schemeClr val="tx2"/>
           </a:solidFill>
           <a:latin typeface="+mn-lt"/>
           <a:ea typeface="+mn-ea"/>
           <a:cs typeface="+mn-cs"/>
         </a:defRPr>
       </a:lvl3pPr>
-      <a:lvl4pPr marL="1600200" indent="-228600" algn="l" defTabSz="914400" rtl="0" eaLnBrk="1" latinLnBrk="0" hangingPunct="1">
+      <a:lvl4pPr marL="1828800" indent="-384048" algn="l" defTabSz="914400" rtl="0" eaLnBrk="1" latinLnBrk="0" hangingPunct="1">
         <a:lnSpc>
-          <a:spcPct val="90000"/>
+          <a:spcPct val="94000"/>
         </a:lnSpc>
         <a:spcBef>
           <a:spcPts val="500"/>
         </a:spcBef>
-        <a:buFont typeface="Arial" panose="020B0604020202020204" pitchFamily="34" charset="0"/>
-        <a:buChar char="•"/>
-        <a:defRPr sz="1800" kern="1200">
+        <a:spcAft>
+          <a:spcPts val="200"/>
+        </a:spcAft>
+        <a:buFont typeface="Franklin Gothic Book" panose="020B0503020102020204" pitchFamily="34" charset="0"/>
+        <a:buChar char="–"/>
+        <a:defRPr sz="1800" i="1" kern="1200" baseline="0">
           <a:solidFill>
-            <a:schemeClr val="tx1"/>
+            <a:schemeClr val="tx2"/>
           </a:solidFill>
           <a:latin typeface="+mn-lt"/>
           <a:ea typeface="+mn-ea"/>
           <a:cs typeface="+mn-cs"/>
         </a:defRPr>
       </a:lvl4pPr>
-      <a:lvl5pPr marL="2057400" indent="-228600" algn="l" defTabSz="914400" rtl="0" eaLnBrk="1" latinLnBrk="0" hangingPunct="1">
+      <a:lvl5pPr marL="2286000" indent="-384048" algn="l" defTabSz="914400" rtl="0" eaLnBrk="1" latinLnBrk="0" hangingPunct="1">
         <a:lnSpc>
-          <a:spcPct val="90000"/>
+          <a:spcPct val="94000"/>
         </a:lnSpc>
         <a:spcBef>
           <a:spcPts val="500"/>
         </a:spcBef>
-        <a:buFont typeface="Arial" panose="020B0604020202020204" pitchFamily="34" charset="0"/>
-        <a:buChar char="•"/>
-        <a:defRPr sz="1800" kern="1200">
+        <a:spcAft>
+          <a:spcPts val="200"/>
+        </a:spcAft>
+        <a:buFont typeface="Franklin Gothic Book" panose="020B0503020102020204" pitchFamily="34" charset="0"/>
+        <a:buChar char="■"/>
+        <a:defRPr sz="1600" kern="1200" baseline="0">
           <a:solidFill>
-            <a:schemeClr val="tx1"/>
+            <a:schemeClr val="tx2"/>
           </a:solidFill>
           <a:latin typeface="+mn-lt"/>
           <a:ea typeface="+mn-ea"/>
           <a:cs typeface="+mn-cs"/>
         </a:defRPr>
       </a:lvl5pPr>
-      <a:lvl6pPr marL="2514600" indent="-228600" algn="l" defTabSz="914400" rtl="0" eaLnBrk="1" latinLnBrk="0" hangingPunct="1">
+      <a:lvl6pPr marL="2743200" indent="-384048" algn="l" defTabSz="914400" rtl="0" eaLnBrk="1" latinLnBrk="0" hangingPunct="1">
         <a:lnSpc>
-          <a:spcPct val="90000"/>
+          <a:spcPct val="94000"/>
         </a:lnSpc>
         <a:spcBef>
           <a:spcPts val="500"/>
         </a:spcBef>
-        <a:buFont typeface="Arial" panose="020B0604020202020204" pitchFamily="34" charset="0"/>
-        <a:buChar char="•"/>
-        <a:defRPr sz="1800" kern="1200">
+        <a:spcAft>
+          <a:spcPts val="200"/>
+        </a:spcAft>
+        <a:buFont typeface="Franklin Gothic Book" panose="020B0503020102020204" pitchFamily="34" charset="0"/>
+        <a:buChar char="–"/>
+        <a:defRPr sz="1600" i="1" kern="1200" baseline="0">
           <a:solidFill>
-            <a:schemeClr val="tx1"/>
+            <a:schemeClr val="tx2"/>
           </a:solidFill>
           <a:latin typeface="+mn-lt"/>
           <a:ea typeface="+mn-ea"/>
           <a:cs typeface="+mn-cs"/>
         </a:defRPr>
       </a:lvl6pPr>
-      <a:lvl7pPr marL="2971800" indent="-228600" algn="l" defTabSz="914400" rtl="0" eaLnBrk="1" latinLnBrk="0" hangingPunct="1">
+      <a:lvl7pPr marL="3200400" indent="-384048" algn="l" defTabSz="914400" rtl="0" eaLnBrk="1" latinLnBrk="0" hangingPunct="1">
         <a:lnSpc>
-          <a:spcPct val="90000"/>
+          <a:spcPct val="94000"/>
         </a:lnSpc>
         <a:spcBef>
           <a:spcPts val="500"/>
         </a:spcBef>
-        <a:buFont typeface="Arial" panose="020B0604020202020204" pitchFamily="34" charset="0"/>
-        <a:buChar char="•"/>
-        <a:defRPr sz="1800" kern="1200">
+        <a:spcAft>
+          <a:spcPts val="200"/>
+        </a:spcAft>
+        <a:buFont typeface="Franklin Gothic Book" panose="020B0503020102020204" pitchFamily="34" charset="0"/>
+        <a:buChar char="■"/>
+        <a:defRPr sz="1400" kern="1200" baseline="0">
           <a:solidFill>
-            <a:schemeClr val="tx1"/>
+            <a:schemeClr val="tx2"/>
           </a:solidFill>
           <a:latin typeface="+mn-lt"/>
           <a:ea typeface="+mn-ea"/>
           <a:cs typeface="+mn-cs"/>
         </a:defRPr>
       </a:lvl7pPr>
-      <a:lvl8pPr marL="3429000" indent="-228600" algn="l" defTabSz="914400" rtl="0" eaLnBrk="1" latinLnBrk="0" hangingPunct="1">
+      <a:lvl8pPr marL="3657600" indent="-384048" algn="l" defTabSz="914400" rtl="0" eaLnBrk="1" latinLnBrk="0" hangingPunct="1">
         <a:lnSpc>
-          <a:spcPct val="90000"/>
+          <a:spcPct val="94000"/>
         </a:lnSpc>
         <a:spcBef>
           <a:spcPts val="500"/>
         </a:spcBef>
-        <a:buFont typeface="Arial" panose="020B0604020202020204" pitchFamily="34" charset="0"/>
-        <a:buChar char="•"/>
-        <a:defRPr sz="1800" kern="1200">
+        <a:spcAft>
+          <a:spcPts val="200"/>
+        </a:spcAft>
+        <a:buFont typeface="Franklin Gothic Book" panose="020B0503020102020204" pitchFamily="34" charset="0"/>
+        <a:buChar char="–"/>
+        <a:defRPr sz="1400" i="1" kern="1200" baseline="0">
           <a:solidFill>
-            <a:schemeClr val="tx1"/>
+            <a:schemeClr val="tx2"/>
           </a:solidFill>
           <a:latin typeface="+mn-lt"/>
           <a:ea typeface="+mn-ea"/>
           <a:cs typeface="+mn-cs"/>
         </a:defRPr>
       </a:lvl8pPr>
-      <a:lvl9pPr marL="3886200" indent="-228600" algn="l" defTabSz="914400" rtl="0" eaLnBrk="1" latinLnBrk="0" hangingPunct="1">
+      <a:lvl9pPr marL="4114800" indent="-384048" algn="l" defTabSz="914400" rtl="0" eaLnBrk="1" latinLnBrk="0" hangingPunct="1">
         <a:lnSpc>
-          <a:spcPct val="90000"/>
+          <a:spcPct val="94000"/>
         </a:lnSpc>
         <a:spcBef>
           <a:spcPts val="500"/>
         </a:spcBef>
-        <a:buFont typeface="Arial" panose="020B0604020202020204" pitchFamily="34" charset="0"/>
-        <a:buChar char="•"/>
-        <a:defRPr sz="1800" kern="1200">
+        <a:spcAft>
+          <a:spcPts val="200"/>
+        </a:spcAft>
+        <a:buFont typeface="Franklin Gothic Book" panose="020B0503020102020204" pitchFamily="34" charset="0"/>
+        <a:buChar char="■"/>
+        <a:defRPr sz="1400" kern="1200" baseline="0">
           <a:solidFill>
-            <a:schemeClr val="tx1"/>
+            <a:schemeClr val="tx2"/>
           </a:solidFill>
           <a:latin typeface="+mn-lt"/>
           <a:ea typeface="+mn-ea"/>
@@ -4781,6 +5802,52 @@
       </a:lvl9pPr>
     </p:otherStyle>
   </p:txStyles>
+  <p:extLst mod="1">
+    <p:ext uri="{27BBF7A9-308A-43DC-89C8-2F10F3537804}">
+      <p15:sldGuideLst xmlns:p15="http://schemas.microsoft.com/office/powerpoint/2012/main">
+        <p15:guide id="3" orient="horz" pos="1368">
+          <p15:clr>
+            <a:srgbClr val="F26B43"/>
+          </p15:clr>
+        </p15:guide>
+        <p15:guide id="4" orient="horz" pos="1440">
+          <p15:clr>
+            <a:srgbClr val="F26B43"/>
+          </p15:clr>
+        </p15:guide>
+        <p15:guide id="6" orient="horz" pos="3696">
+          <p15:clr>
+            <a:srgbClr val="F26B43"/>
+          </p15:clr>
+        </p15:guide>
+        <p15:guide id="7" orient="horz" pos="432">
+          <p15:clr>
+            <a:srgbClr val="F26B43"/>
+          </p15:clr>
+        </p15:guide>
+        <p15:guide id="8" orient="horz" pos="1512">
+          <p15:clr>
+            <a:srgbClr val="F26B43"/>
+          </p15:clr>
+        </p15:guide>
+        <p15:guide id="9" pos="6912">
+          <p15:clr>
+            <a:srgbClr val="F26B43"/>
+          </p15:clr>
+        </p15:guide>
+        <p15:guide id="10" pos="936">
+          <p15:clr>
+            <a:srgbClr val="F26B43"/>
+          </p15:clr>
+        </p15:guide>
+        <p15:guide id="11" pos="864">
+          <p15:clr>
+            <a:srgbClr val="F26B43"/>
+          </p15:clr>
+        </p15:guide>
+      </p15:sldGuideLst>
+    </p:ext>
+  </p:extLst>
 </p:sldMaster>
 </file>
 
@@ -4811,14 +5878,26 @@
             <p:ph type="ctrTitle"/>
           </p:nvPr>
         </p:nvSpPr>
-        <p:spPr/>
-        <p:txBody>
-          <a:bodyPr/>
-          <a:lstStyle/>
-          <a:p>
-            <a:r>
-              <a:rPr lang="en-US" dirty="0"/>
-              <a:t>NLP – Toxic comment challenge</a:t>
+        <p:spPr>
+          <a:xfrm>
+            <a:off x="1164339" y="1788454"/>
+            <a:ext cx="9862806" cy="2098226"/>
+          </a:xfrm>
+        </p:spPr>
+        <p:txBody>
+          <a:bodyPr/>
+          <a:lstStyle/>
+          <a:p>
+            <a:r>
+              <a:rPr lang="en-US" dirty="0"/>
+              <a:t>NLP – Toxic Comment</a:t>
+            </a:r>
+            <a:br>
+              <a:rPr lang="en-US" dirty="0"/>
+            </a:br>
+            <a:r>
+              <a:rPr lang="en-US" dirty="0"/>
+              <a:t>Classifier</a:t>
             </a:r>
           </a:p>
         </p:txBody>
@@ -5116,8 +6195,8 @@
         </p:blipFill>
         <p:spPr>
           <a:xfrm>
-            <a:off x="2832496" y="1825625"/>
-            <a:ext cx="6527007" cy="4351338"/>
+            <a:off x="3487862" y="2286000"/>
+            <a:ext cx="5368675" cy="3581400"/>
           </a:xfrm>
         </p:spPr>
       </p:pic>
@@ -5204,10 +6283,10 @@
       </p:sp>
       <p:pic>
         <p:nvPicPr>
-          <p:cNvPr id="13" name="Picture 12">
+          <p:cNvPr id="15" name="Picture 14">
             <a:extLst>
               <a:ext uri="{FF2B5EF4-FFF2-40B4-BE49-F238E27FC236}">
-                <a16:creationId xmlns:a16="http://schemas.microsoft.com/office/drawing/2014/main" id="{68A192D3-D833-4120-9032-D33AF247D8A0}"/>
+                <a16:creationId xmlns:a16="http://schemas.microsoft.com/office/drawing/2014/main" id="{D04B38E0-3564-4D91-8716-F19F48DBDCB3}"/>
               </a:ext>
             </a:extLst>
           </p:cNvPr>
@@ -5230,8 +6309,8 @@
         </p:blipFill>
         <p:spPr>
           <a:xfrm>
-            <a:off x="9142914" y="0"/>
-            <a:ext cx="2694933" cy="6858000"/>
+            <a:off x="0" y="4532971"/>
+            <a:ext cx="12192000" cy="1576794"/>
           </a:xfrm>
           <a:prstGeom prst="rect">
             <a:avLst/>
@@ -5290,25 +6369,413 @@
           </a:p>
         </p:txBody>
       </p:sp>
-      <p:sp>
-        <p:nvSpPr>
-          <p:cNvPr id="3" name="Content Placeholder 2"/>
-          <p:cNvSpPr>
-            <a:spLocks noGrp="1"/>
-          </p:cNvSpPr>
+      <p:graphicFrame>
+        <p:nvGraphicFramePr>
+          <p:cNvPr id="4" name="Content Placeholder 3">
+            <a:extLst>
+              <a:ext uri="{FF2B5EF4-FFF2-40B4-BE49-F238E27FC236}">
+                <a16:creationId xmlns:a16="http://schemas.microsoft.com/office/drawing/2014/main" id="{30427962-05A0-49E2-920E-A485BE47572A}"/>
+              </a:ext>
+            </a:extLst>
+          </p:cNvPr>
+          <p:cNvGraphicFramePr>
+            <a:graphicFrameLocks noGrp="1"/>
+          </p:cNvGraphicFramePr>
           <p:nvPr>
             <p:ph idx="1"/>
-          </p:nvPr>
-        </p:nvSpPr>
-        <p:spPr/>
-        <p:txBody>
-          <a:bodyPr/>
-          <a:lstStyle/>
-          <a:p>
-            <a:endParaRPr lang="en-US" dirty="0"/>
-          </a:p>
-        </p:txBody>
-      </p:sp>
+            <p:extLst>
+              <p:ext uri="{D42A27DB-BD31-4B8C-83A1-F6EECF244321}">
+                <p14:modId xmlns:p14="http://schemas.microsoft.com/office/powerpoint/2010/main" val="1827059115"/>
+              </p:ext>
+            </p:extLst>
+          </p:nvPr>
+        </p:nvGraphicFramePr>
+        <p:xfrm>
+          <a:off x="970200" y="2687320"/>
+          <a:ext cx="10404000" cy="1483360"/>
+        </p:xfrm>
+        <a:graphic>
+          <a:graphicData uri="http://schemas.openxmlformats.org/drawingml/2006/table">
+            <a:tbl>
+              <a:tblPr firstRow="1" lastRow="1" bandRow="1">
+                <a:tableStyleId>{3B4B98B0-60AC-42C2-AFA5-B58CD77FA1E5}</a:tableStyleId>
+              </a:tblPr>
+              <a:tblGrid>
+                <a:gridCol w="1908000">
+                  <a:extLst>
+                    <a:ext uri="{9D8B030D-6E8A-4147-A177-3AD203B41FA5}">
+                      <a16:colId xmlns:a16="http://schemas.microsoft.com/office/drawing/2014/main" val="4107648373"/>
+                    </a:ext>
+                  </a:extLst>
+                </a:gridCol>
+                <a:gridCol w="1296000">
+                  <a:extLst>
+                    <a:ext uri="{9D8B030D-6E8A-4147-A177-3AD203B41FA5}">
+                      <a16:colId xmlns:a16="http://schemas.microsoft.com/office/drawing/2014/main" val="540782756"/>
+                    </a:ext>
+                  </a:extLst>
+                </a:gridCol>
+                <a:gridCol w="1296000">
+                  <a:extLst>
+                    <a:ext uri="{9D8B030D-6E8A-4147-A177-3AD203B41FA5}">
+                      <a16:colId xmlns:a16="http://schemas.microsoft.com/office/drawing/2014/main" val="3924810096"/>
+                    </a:ext>
+                  </a:extLst>
+                </a:gridCol>
+                <a:gridCol w="1296000">
+                  <a:extLst>
+                    <a:ext uri="{9D8B030D-6E8A-4147-A177-3AD203B41FA5}">
+                      <a16:colId xmlns:a16="http://schemas.microsoft.com/office/drawing/2014/main" val="2042421101"/>
+                    </a:ext>
+                  </a:extLst>
+                </a:gridCol>
+                <a:gridCol w="2628000">
+                  <a:extLst>
+                    <a:ext uri="{9D8B030D-6E8A-4147-A177-3AD203B41FA5}">
+                      <a16:colId xmlns:a16="http://schemas.microsoft.com/office/drawing/2014/main" val="1067294038"/>
+                    </a:ext>
+                  </a:extLst>
+                </a:gridCol>
+                <a:gridCol w="1980000">
+                  <a:extLst>
+                    <a:ext uri="{9D8B030D-6E8A-4147-A177-3AD203B41FA5}">
+                      <a16:colId xmlns:a16="http://schemas.microsoft.com/office/drawing/2014/main" val="2884866926"/>
+                    </a:ext>
+                  </a:extLst>
+                </a:gridCol>
+              </a:tblGrid>
+              <a:tr h="370840">
+                <a:tc>
+                  <a:txBody>
+                    <a:bodyPr/>
+                    <a:lstStyle/>
+                    <a:p>
+                      <a:r>
+                        <a:rPr lang="en-CA" dirty="0"/>
+                        <a:t>Class</a:t>
+                      </a:r>
+                    </a:p>
+                  </a:txBody>
+                  <a:tcPr/>
+                </a:tc>
+                <a:tc>
+                  <a:txBody>
+                    <a:bodyPr/>
+                    <a:lstStyle/>
+                    <a:p>
+                      <a:r>
+                        <a:rPr lang="en-CA" dirty="0"/>
+                        <a:t>Precision</a:t>
+                      </a:r>
+                    </a:p>
+                  </a:txBody>
+                  <a:tcPr/>
+                </a:tc>
+                <a:tc>
+                  <a:txBody>
+                    <a:bodyPr/>
+                    <a:lstStyle/>
+                    <a:p>
+                      <a:r>
+                        <a:rPr lang="en-CA" dirty="0"/>
+                        <a:t>Recall</a:t>
+                      </a:r>
+                    </a:p>
+                  </a:txBody>
+                  <a:tcPr/>
+                </a:tc>
+                <a:tc>
+                  <a:txBody>
+                    <a:bodyPr/>
+                    <a:lstStyle/>
+                    <a:p>
+                      <a:r>
+                        <a:rPr lang="en-CA" dirty="0"/>
+                        <a:t>F1-Score</a:t>
+                      </a:r>
+                    </a:p>
+                  </a:txBody>
+                  <a:tcPr/>
+                </a:tc>
+                <a:tc>
+                  <a:txBody>
+                    <a:bodyPr/>
+                    <a:lstStyle/>
+                    <a:p>
+                      <a:r>
+                        <a:rPr lang="en-CA" dirty="0"/>
+                        <a:t>Number of Test Samples</a:t>
+                      </a:r>
+                    </a:p>
+                  </a:txBody>
+                  <a:tcPr/>
+                </a:tc>
+                <a:tc>
+                  <a:txBody>
+                    <a:bodyPr/>
+                    <a:lstStyle/>
+                    <a:p>
+                      <a:r>
+                        <a:rPr lang="en-CA" dirty="0"/>
+                        <a:t>% of Test Samples</a:t>
+                      </a:r>
+                    </a:p>
+                  </a:txBody>
+                  <a:tcPr/>
+                </a:tc>
+                <a:extLst>
+                  <a:ext uri="{0D108BD9-81ED-4DB2-BD59-A6C34878D82A}">
+                    <a16:rowId xmlns:a16="http://schemas.microsoft.com/office/drawing/2014/main" val="3688064195"/>
+                  </a:ext>
+                </a:extLst>
+              </a:tr>
+              <a:tr h="370840">
+                <a:tc>
+                  <a:txBody>
+                    <a:bodyPr/>
+                    <a:lstStyle/>
+                    <a:p>
+                      <a:r>
+                        <a:rPr lang="en-CA" dirty="0"/>
+                        <a:t>False</a:t>
+                      </a:r>
+                    </a:p>
+                  </a:txBody>
+                  <a:tcPr/>
+                </a:tc>
+                <a:tc>
+                  <a:txBody>
+                    <a:bodyPr/>
+                    <a:lstStyle/>
+                    <a:p>
+                      <a:r>
+                        <a:rPr lang="en-CA" dirty="0"/>
+                        <a:t>0.98</a:t>
+                      </a:r>
+                    </a:p>
+                  </a:txBody>
+                  <a:tcPr/>
+                </a:tc>
+                <a:tc>
+                  <a:txBody>
+                    <a:bodyPr/>
+                    <a:lstStyle/>
+                    <a:p>
+                      <a:r>
+                        <a:rPr lang="en-CA" dirty="0"/>
+                        <a:t>0.95</a:t>
+                      </a:r>
+                    </a:p>
+                  </a:txBody>
+                  <a:tcPr/>
+                </a:tc>
+                <a:tc>
+                  <a:txBody>
+                    <a:bodyPr/>
+                    <a:lstStyle/>
+                    <a:p>
+                      <a:r>
+                        <a:rPr lang="en-CA" dirty="0"/>
+                        <a:t>0.97</a:t>
+                      </a:r>
+                    </a:p>
+                  </a:txBody>
+                  <a:tcPr/>
+                </a:tc>
+                <a:tc>
+                  <a:txBody>
+                    <a:bodyPr/>
+                    <a:lstStyle/>
+                    <a:p>
+                      <a:r>
+                        <a:rPr lang="en-CA" dirty="0"/>
+                        <a:t>331,897</a:t>
+                      </a:r>
+                    </a:p>
+                  </a:txBody>
+                  <a:tcPr/>
+                </a:tc>
+                <a:tc>
+                  <a:txBody>
+                    <a:bodyPr/>
+                    <a:lstStyle/>
+                    <a:p>
+                      <a:r>
+                        <a:rPr lang="en-CA" dirty="0"/>
+                        <a:t>92%</a:t>
+                      </a:r>
+                    </a:p>
+                  </a:txBody>
+                  <a:tcPr/>
+                </a:tc>
+                <a:extLst>
+                  <a:ext uri="{0D108BD9-81ED-4DB2-BD59-A6C34878D82A}">
+                    <a16:rowId xmlns:a16="http://schemas.microsoft.com/office/drawing/2014/main" val="2636636236"/>
+                  </a:ext>
+                </a:extLst>
+              </a:tr>
+              <a:tr h="370840">
+                <a:tc>
+                  <a:txBody>
+                    <a:bodyPr/>
+                    <a:lstStyle/>
+                    <a:p>
+                      <a:r>
+                        <a:rPr lang="en-CA" dirty="0"/>
+                        <a:t>True (Toxic)</a:t>
+                      </a:r>
+                    </a:p>
+                  </a:txBody>
+                  <a:tcPr/>
+                </a:tc>
+                <a:tc>
+                  <a:txBody>
+                    <a:bodyPr/>
+                    <a:lstStyle/>
+                    <a:p>
+                      <a:r>
+                        <a:rPr lang="en-CA" dirty="0"/>
+                        <a:t>0.58</a:t>
+                      </a:r>
+                    </a:p>
+                  </a:txBody>
+                  <a:tcPr/>
+                </a:tc>
+                <a:tc>
+                  <a:txBody>
+                    <a:bodyPr/>
+                    <a:lstStyle/>
+                    <a:p>
+                      <a:r>
+                        <a:rPr lang="en-CA" dirty="0"/>
+                        <a:t>0.76</a:t>
+                      </a:r>
+                    </a:p>
+                  </a:txBody>
+                  <a:tcPr/>
+                </a:tc>
+                <a:tc>
+                  <a:txBody>
+                    <a:bodyPr/>
+                    <a:lstStyle/>
+                    <a:p>
+                      <a:r>
+                        <a:rPr lang="en-CA" dirty="0"/>
+                        <a:t>0.66</a:t>
+                      </a:r>
+                    </a:p>
+                  </a:txBody>
+                  <a:tcPr/>
+                </a:tc>
+                <a:tc>
+                  <a:txBody>
+                    <a:bodyPr/>
+                    <a:lstStyle/>
+                    <a:p>
+                      <a:r>
+                        <a:rPr lang="en-CA" dirty="0"/>
+                        <a:t>29,078</a:t>
+                      </a:r>
+                    </a:p>
+                  </a:txBody>
+                  <a:tcPr/>
+                </a:tc>
+                <a:tc>
+                  <a:txBody>
+                    <a:bodyPr/>
+                    <a:lstStyle/>
+                    <a:p>
+                      <a:r>
+                        <a:rPr lang="en-CA" dirty="0"/>
+                        <a:t>8%</a:t>
+                      </a:r>
+                    </a:p>
+                  </a:txBody>
+                  <a:tcPr/>
+                </a:tc>
+                <a:extLst>
+                  <a:ext uri="{0D108BD9-81ED-4DB2-BD59-A6C34878D82A}">
+                    <a16:rowId xmlns:a16="http://schemas.microsoft.com/office/drawing/2014/main" val="2307476534"/>
+                  </a:ext>
+                </a:extLst>
+              </a:tr>
+              <a:tr h="370840">
+                <a:tc>
+                  <a:txBody>
+                    <a:bodyPr/>
+                    <a:lstStyle/>
+                    <a:p>
+                      <a:r>
+                        <a:rPr lang="en-CA" dirty="0"/>
+                        <a:t>Overall Accuracy</a:t>
+                      </a:r>
+                    </a:p>
+                  </a:txBody>
+                  <a:tcPr/>
+                </a:tc>
+                <a:tc>
+                  <a:txBody>
+                    <a:bodyPr/>
+                    <a:lstStyle/>
+                    <a:p>
+                      <a:endParaRPr lang="en-CA" dirty="0"/>
+                    </a:p>
+                  </a:txBody>
+                  <a:tcPr/>
+                </a:tc>
+                <a:tc>
+                  <a:txBody>
+                    <a:bodyPr/>
+                    <a:lstStyle/>
+                    <a:p>
+                      <a:endParaRPr lang="en-CA"/>
+                    </a:p>
+                  </a:txBody>
+                  <a:tcPr/>
+                </a:tc>
+                <a:tc>
+                  <a:txBody>
+                    <a:bodyPr/>
+                    <a:lstStyle/>
+                    <a:p>
+                      <a:endParaRPr lang="en-CA" dirty="0"/>
+                    </a:p>
+                  </a:txBody>
+                  <a:tcPr/>
+                </a:tc>
+                <a:tc>
+                  <a:txBody>
+                    <a:bodyPr/>
+                    <a:lstStyle/>
+                    <a:p>
+                      <a:r>
+                        <a:rPr lang="en-CA" dirty="0"/>
+                        <a:t>94%</a:t>
+                      </a:r>
+                    </a:p>
+                  </a:txBody>
+                  <a:tcPr/>
+                </a:tc>
+                <a:tc>
+                  <a:txBody>
+                    <a:bodyPr/>
+                    <a:lstStyle/>
+                    <a:p>
+                      <a:endParaRPr lang="en-CA" dirty="0"/>
+                    </a:p>
+                  </a:txBody>
+                  <a:tcPr/>
+                </a:tc>
+                <a:extLst>
+                  <a:ext uri="{0D108BD9-81ED-4DB2-BD59-A6C34878D82A}">
+                    <a16:rowId xmlns:a16="http://schemas.microsoft.com/office/drawing/2014/main" val="4213078861"/>
+                  </a:ext>
+                </a:extLst>
+              </a:tr>
+            </a:tbl>
+          </a:graphicData>
+        </a:graphic>
+      </p:graphicFrame>
     </p:spTree>
     <p:extLst>
       <p:ext uri="{BB962C8B-B14F-4D97-AF65-F5344CB8AC3E}">
@@ -5374,7 +6841,7 @@
         <p:spPr/>
         <p:txBody>
           <a:bodyPr>
-            <a:normAutofit fontScale="85000" lnSpcReduction="20000"/>
+            <a:normAutofit fontScale="70000" lnSpcReduction="20000"/>
           </a:bodyPr>
           <a:lstStyle/>
           <a:p>
@@ -6060,8 +7527,8 @@
         </p:blipFill>
         <p:spPr>
           <a:xfrm>
-            <a:off x="2832496" y="1825625"/>
-            <a:ext cx="6527007" cy="4351337"/>
+            <a:off x="3487862" y="2286000"/>
+            <a:ext cx="5368675" cy="3581400"/>
           </a:xfrm>
         </p:spPr>
       </p:pic>
@@ -6141,8 +7608,8 @@
         </p:blipFill>
         <p:spPr>
           <a:xfrm>
-            <a:off x="2832497" y="1825625"/>
-            <a:ext cx="6527006" cy="4351338"/>
+            <a:off x="3487859" y="2286000"/>
+            <a:ext cx="5368682" cy="3581400"/>
           </a:xfrm>
         </p:spPr>
       </p:pic>
@@ -6616,9 +8083,9 @@
 </file>
 
 <file path=ppt/theme/theme1.xml><?xml version="1.0" encoding="utf-8"?>
-<a:theme xmlns:a="http://schemas.openxmlformats.org/drawingml/2006/main" name="Office Theme">
+<a:theme xmlns:a="http://schemas.openxmlformats.org/drawingml/2006/main" name="Crop">
   <a:themeElements>
-    <a:clrScheme name="Office">
+    <a:clrScheme name="Crop">
       <a:dk1>
         <a:sysClr val="windowText" lastClr="000000"/>
       </a:dk1>
@@ -6626,83 +8093,48 @@
         <a:sysClr val="window" lastClr="FFFFFF"/>
       </a:lt1>
       <a:dk2>
-        <a:srgbClr val="44546A"/>
+        <a:srgbClr val="191B0E"/>
       </a:dk2>
       <a:lt2>
-        <a:srgbClr val="E7E6E6"/>
+        <a:srgbClr val="EFEDE3"/>
       </a:lt2>
       <a:accent1>
-        <a:srgbClr val="5B9BD5"/>
+        <a:srgbClr val="8C8D86"/>
       </a:accent1>
       <a:accent2>
-        <a:srgbClr val="ED7D31"/>
+        <a:srgbClr val="E6C069"/>
       </a:accent2>
       <a:accent3>
-        <a:srgbClr val="A5A5A5"/>
+        <a:srgbClr val="897B61"/>
       </a:accent3>
       <a:accent4>
-        <a:srgbClr val="FFC000"/>
+        <a:srgbClr val="8DAB8E"/>
       </a:accent4>
       <a:accent5>
-        <a:srgbClr val="4472C4"/>
+        <a:srgbClr val="77A2BB"/>
       </a:accent5>
       <a:accent6>
-        <a:srgbClr val="70AD47"/>
+        <a:srgbClr val="E28394"/>
       </a:accent6>
       <a:hlink>
-        <a:srgbClr val="0563C1"/>
+        <a:srgbClr val="77A2BB"/>
       </a:hlink>
       <a:folHlink>
-        <a:srgbClr val="954F72"/>
+        <a:srgbClr val="957A99"/>
       </a:folHlink>
     </a:clrScheme>
-    <a:fontScheme name="Office">
+    <a:fontScheme name="Crop">
       <a:majorFont>
-        <a:latin typeface="Calibri Light" panose="020F0302020204030204"/>
+        <a:latin typeface="Franklin Gothic Book" panose="020B0503020102020204"/>
         <a:ea typeface=""/>
         <a:cs typeface=""/>
-        <a:font script="Jpan" typeface="游ゴシック Light"/>
-        <a:font script="Hang" typeface="맑은 고딕"/>
-        <a:font script="Hans" typeface="等线 Light"/>
-        <a:font script="Hant" typeface="新細明體"/>
-        <a:font script="Arab" typeface="Times New Roman"/>
-        <a:font script="Hebr" typeface="Times New Roman"/>
-        <a:font script="Thai" typeface="Angsana New"/>
-        <a:font script="Ethi" typeface="Nyala"/>
-        <a:font script="Beng" typeface="Vrinda"/>
-        <a:font script="Gujr" typeface="Shruti"/>
-        <a:font script="Khmr" typeface="MoolBoran"/>
-        <a:font script="Knda" typeface="Tunga"/>
-        <a:font script="Guru" typeface="Raavi"/>
-        <a:font script="Cans" typeface="Euphemia"/>
-        <a:font script="Cher" typeface="Plantagenet Cherokee"/>
-        <a:font script="Yiii" typeface="Microsoft Yi Baiti"/>
-        <a:font script="Tibt" typeface="Microsoft Himalaya"/>
-        <a:font script="Thaa" typeface="MV Boli"/>
-        <a:font script="Deva" typeface="Mangal"/>
-        <a:font script="Telu" typeface="Gautami"/>
-        <a:font script="Taml" typeface="Latha"/>
-        <a:font script="Syrc" typeface="Estrangelo Edessa"/>
-        <a:font script="Orya" typeface="Kalinga"/>
-        <a:font script="Mlym" typeface="Kartika"/>
-        <a:font script="Laoo" typeface="DokChampa"/>
-        <a:font script="Sinh" typeface="Iskoola Pota"/>
-        <a:font script="Mong" typeface="Mongolian Baiti"/>
-        <a:font script="Viet" typeface="Times New Roman"/>
-        <a:font script="Uigh" typeface="Microsoft Uighur"/>
-        <a:font script="Geor" typeface="Sylfaen"/>
-      </a:majorFont>
-      <a:minorFont>
-        <a:latin typeface="Calibri" panose="020F0502020204030204"/>
-        <a:ea typeface=""/>
-        <a:cs typeface=""/>
-        <a:font script="Jpan" typeface="游ゴシック"/>
-        <a:font script="Hang" typeface="맑은 고딕"/>
-        <a:font script="Hans" typeface="等线"/>
-        <a:font script="Hant" typeface="新細明體"/>
-        <a:font script="Arab" typeface="Arial"/>
-        <a:font script="Hebr" typeface="Arial"/>
-        <a:font script="Thai" typeface="Cordia New"/>
+        <a:font script="Jpan" typeface="メイリオ"/>
+        <a:font script="Hang" typeface="돋움"/>
+        <a:font script="Hans" typeface="华文楷体"/>
+        <a:font script="Hant" typeface="微軟正黑體"/>
+        <a:font script="Arab" typeface="Tahoma"/>
+        <a:font script="Hebr" typeface="Aharoni"/>
+        <a:font script="Thai" typeface="LilyUPC"/>
         <a:font script="Ethi" typeface="Nyala"/>
         <a:font script="Beng" typeface="Vrinda"/>
         <a:font script="Gujr" typeface="Shruti"/>
@@ -6723,12 +8155,47 @@
         <a:font script="Laoo" typeface="DokChampa"/>
         <a:font script="Sinh" typeface="Iskoola Pota"/>
         <a:font script="Mong" typeface="Mongolian Baiti"/>
-        <a:font script="Viet" typeface="Arial"/>
+        <a:font script="Viet" typeface="Tahoma"/>
+        <a:font script="Uigh" typeface="Microsoft Uighur"/>
+        <a:font script="Geor" typeface="Sylfaen"/>
+      </a:majorFont>
+      <a:minorFont>
+        <a:latin typeface="Franklin Gothic Book" panose="020B0503020102020204"/>
+        <a:ea typeface=""/>
+        <a:cs typeface=""/>
+        <a:font script="Jpan" typeface="メイリオ"/>
+        <a:font script="Hang" typeface="돋움"/>
+        <a:font script="Hans" typeface="华文楷体"/>
+        <a:font script="Hant" typeface="微軟正黑體"/>
+        <a:font script="Arab" typeface="Tahoma"/>
+        <a:font script="Hebr" typeface="Aharoni"/>
+        <a:font script="Thai" typeface="LilyUPC"/>
+        <a:font script="Ethi" typeface="Nyala"/>
+        <a:font script="Beng" typeface="Vrinda"/>
+        <a:font script="Gujr" typeface="Shruti"/>
+        <a:font script="Khmr" typeface="DaunPenh"/>
+        <a:font script="Knda" typeface="Tunga"/>
+        <a:font script="Guru" typeface="Raavi"/>
+        <a:font script="Cans" typeface="Euphemia"/>
+        <a:font script="Cher" typeface="Plantagenet Cherokee"/>
+        <a:font script="Yiii" typeface="Microsoft Yi Baiti"/>
+        <a:font script="Tibt" typeface="Microsoft Himalaya"/>
+        <a:font script="Thaa" typeface="MV Boli"/>
+        <a:font script="Deva" typeface="Mangal"/>
+        <a:font script="Telu" typeface="Gautami"/>
+        <a:font script="Taml" typeface="Latha"/>
+        <a:font script="Syrc" typeface="Estrangelo Edessa"/>
+        <a:font script="Orya" typeface="Kalinga"/>
+        <a:font script="Mlym" typeface="Kartika"/>
+        <a:font script="Laoo" typeface="DokChampa"/>
+        <a:font script="Sinh" typeface="Iskoola Pota"/>
+        <a:font script="Mong" typeface="Mongolian Baiti"/>
+        <a:font script="Viet" typeface="Tahoma"/>
         <a:font script="Uigh" typeface="Microsoft Uighur"/>
         <a:font script="Geor" typeface="Sylfaen"/>
       </a:minorFont>
     </a:fontScheme>
-    <a:fmtScheme name="Office">
+    <a:fmtScheme name="Crop">
       <a:fillStyleLst>
         <a:solidFill>
           <a:schemeClr val="phClr"/>
@@ -6737,23 +8204,23 @@
           <a:gsLst>
             <a:gs pos="0">
               <a:schemeClr val="phClr">
+                <a:tint val="67000"/>
+                <a:satMod val="105000"/>
                 <a:lumMod val="110000"/>
-                <a:satMod val="105000"/>
-                <a:tint val="67000"/>
               </a:schemeClr>
             </a:gs>
             <a:gs pos="50000">
               <a:schemeClr val="phClr">
+                <a:tint val="73000"/>
+                <a:satMod val="103000"/>
                 <a:lumMod val="105000"/>
-                <a:satMod val="103000"/>
-                <a:tint val="73000"/>
               </a:schemeClr>
             </a:gs>
             <a:gs pos="100000">
               <a:schemeClr val="phClr">
+                <a:tint val="81000"/>
+                <a:satMod val="109000"/>
                 <a:lumMod val="105000"/>
-                <a:satMod val="109000"/>
-                <a:tint val="81000"/>
               </a:schemeClr>
             </a:gs>
           </a:gsLst>
@@ -6763,23 +8230,23 @@
           <a:gsLst>
             <a:gs pos="0">
               <a:schemeClr val="phClr">
+                <a:tint val="94000"/>
                 <a:satMod val="103000"/>
                 <a:lumMod val="102000"/>
-                <a:tint val="94000"/>
               </a:schemeClr>
             </a:gs>
             <a:gs pos="50000">
               <a:schemeClr val="phClr">
+                <a:shade val="100000"/>
                 <a:satMod val="110000"/>
                 <a:lumMod val="100000"/>
-                <a:shade val="100000"/>
               </a:schemeClr>
             </a:gs>
             <a:gs pos="100000">
               <a:schemeClr val="phClr">
+                <a:shade val="78000"/>
+                <a:satMod val="120000"/>
                 <a:lumMod val="99000"/>
-                <a:satMod val="120000"/>
-                <a:shade val="78000"/>
               </a:schemeClr>
             </a:gs>
           </a:gsLst>
@@ -6787,26 +8254,23 @@
         </a:gradFill>
       </a:fillStyleLst>
       <a:lnStyleLst>
-        <a:ln w="6350" cap="flat" cmpd="sng" algn="ctr">
+        <a:ln w="6350" cap="flat" cmpd="sng" algn="in">
           <a:solidFill>
             <a:schemeClr val="phClr"/>
           </a:solidFill>
           <a:prstDash val="solid"/>
-          <a:miter lim="800000"/>
         </a:ln>
-        <a:ln w="12700" cap="flat" cmpd="sng" algn="ctr">
+        <a:ln w="34925" cap="flat" cmpd="sng" algn="in">
           <a:solidFill>
             <a:schemeClr val="phClr"/>
           </a:solidFill>
           <a:prstDash val="solid"/>
-          <a:miter lim="800000"/>
         </a:ln>
-        <a:ln w="19050" cap="flat" cmpd="sng" algn="ctr">
+        <a:ln w="19050" cap="flat" cmpd="sng" algn="in">
           <a:solidFill>
             <a:schemeClr val="phClr"/>
           </a:solidFill>
           <a:prstDash val="solid"/>
-          <a:miter lim="800000"/>
         </a:ln>
       </a:lnStyleLst>
       <a:effectStyleLst>
@@ -6820,7 +8284,7 @@
           <a:effectLst>
             <a:outerShdw blurRad="57150" dist="19050" dir="5400000" algn="ctr" rotWithShape="0">
               <a:srgbClr val="000000">
-                <a:alpha val="63000"/>
+                <a:alpha val="35000"/>
               </a:srgbClr>
             </a:outerShdw>
           </a:effectLst>
@@ -6841,16 +8305,16 @@
             <a:gs pos="0">
               <a:schemeClr val="phClr">
                 <a:tint val="93000"/>
+                <a:shade val="98000"/>
                 <a:satMod val="150000"/>
-                <a:shade val="98000"/>
                 <a:lumMod val="102000"/>
               </a:schemeClr>
             </a:gs>
             <a:gs pos="50000">
               <a:schemeClr val="phClr">
                 <a:tint val="98000"/>
+                <a:shade val="90000"/>
                 <a:satMod val="130000"/>
-                <a:shade val="90000"/>
                 <a:lumMod val="103000"/>
               </a:schemeClr>
             </a:gs>
@@ -6870,7 +8334,7 @@
   <a:extraClrSchemeLst/>
   <a:extLst>
     <a:ext uri="{05A4C25C-085E-4340-85A3-A5531E510DB2}">
-      <thm15:themeFamily xmlns:thm15="http://schemas.microsoft.com/office/thememl/2012/main" name="Office Theme" id="{62F939B6-93AF-4DB8-9C6B-D6C7DFDC589F}" vid="{4A3C46E8-61CC-4603-A589-7422A47A8E4A}"/>
+      <thm15:themeFamily xmlns:thm15="http://schemas.microsoft.com/office/thememl/2012/main" name="Crop" id="{EC9488ED-E761-4D60-9AC4-764D1FE2C171}" vid="{CE19780C-D67D-4C13-9DE9-A52BC3BA51B4}"/>
     </a:ext>
   </a:extLst>
 </a:theme>

</xml_diff>

<commit_message>
Edited the model diagram to better utilize the space on the slideshow.
</commit_message>
<xml_diff>
--- a/NLP_presentation.pptx
+++ b/NLP_presentation.pptx
@@ -6309,8 +6309,8 @@
         </p:blipFill>
         <p:spPr>
           <a:xfrm>
-            <a:off x="0" y="4532971"/>
-            <a:ext cx="12192000" cy="1576794"/>
+            <a:off x="1588980" y="1890712"/>
+            <a:ext cx="9780196" cy="4371975"/>
           </a:xfrm>
           <a:prstGeom prst="rect">
             <a:avLst/>

</xml_diff>

<commit_message>
Fixes some formatting for the presentation.
</commit_message>
<xml_diff>
--- a/NLP_presentation.pptx
+++ b/NLP_presentation.pptx
@@ -24,7 +24,7 @@
     <p:sldId id="269" r:id="rId15"/>
     <p:sldId id="270" r:id="rId16"/>
     <p:sldId id="272" r:id="rId17"/>
-    <p:sldId id="271" r:id="rId18"/>
+    <p:sldId id="273" r:id="rId18"/>
   </p:sldIdLst>
   <p:sldSz cx="12192000" cy="6858000"/>
   <p:notesSz cx="6858000" cy="9144000"/>
@@ -721,6 +721,15 @@
               <a:t>Only 6% of comments are toxic compared to 94% considered non toxic</a:t>
             </a:r>
           </a:p>
+          <a:p>
+            <a:endParaRPr lang="en-US" dirty="0"/>
+          </a:p>
+          <a:p>
+            <a:r>
+              <a:rPr lang="en-US" dirty="0"/>
+              <a:t>This data was then randomly split 80-20 train test, with 20% of the 80% being allocated for validation</a:t>
+            </a:r>
+          </a:p>
         </p:txBody>
       </p:sp>
       <p:sp>
@@ -850,6 +859,12 @@
             </a:r>
           </a:p>
           <a:p>
+            <a:r>
+              <a:rPr lang="en-US" dirty="0"/>
+              <a:t>Due to less representation of disability groups compared to other demographic groups, so this can be considered bias. (Model may not learn well for these type of toxic comments)</a:t>
+            </a:r>
+          </a:p>
+          <a:p>
             <a:endParaRPr lang="en-US" dirty="0"/>
           </a:p>
         </p:txBody>
@@ -939,6 +954,264 @@
               <a:t>Hannah</a:t>
             </a:r>
           </a:p>
+          <a:p>
+            <a:endParaRPr lang="en-US" dirty="0"/>
+          </a:p>
+          <a:p>
+            <a:r>
+              <a:rPr lang="en-US" dirty="0"/>
+              <a:t>Input layer </a:t>
+            </a:r>
+          </a:p>
+          <a:p>
+            <a:pPr marL="171450" indent="-171450">
+              <a:buFontTx/>
+              <a:buChar char="-"/>
+            </a:pPr>
+            <a:r>
+              <a:rPr lang="en-US" dirty="0"/>
+              <a:t>The model takes in the text for the comment to </a:t>
+            </a:r>
+            <a:r>
+              <a:rPr lang="en-US" dirty="0" err="1"/>
+              <a:t>classifiy</a:t>
+            </a:r>
+            <a:r>
+              <a:rPr lang="en-US" dirty="0"/>
+              <a:t>. Considers comments to have a max length of 220 words</a:t>
+            </a:r>
+          </a:p>
+          <a:p>
+            <a:r>
+              <a:rPr lang="en-US" dirty="0"/>
+              <a:t>Embedding Layer </a:t>
+            </a:r>
+          </a:p>
+          <a:p>
+            <a:pPr marL="171450" indent="-171450">
+              <a:buFontTx/>
+              <a:buChar char="-"/>
+            </a:pPr>
+            <a:r>
+              <a:rPr lang="en-US" dirty="0"/>
+              <a:t>uses a pretrained word embedding as the first layer so we don’t have to learn this. </a:t>
+            </a:r>
+          </a:p>
+          <a:p>
+            <a:pPr marL="171450" indent="-171450">
+              <a:buFontTx/>
+              <a:buChar char="-"/>
+            </a:pPr>
+            <a:r>
+              <a:rPr lang="en-US" dirty="0"/>
+              <a:t>Pretrained word embedding used is glove, which was trained on text from a common web crawl (840 billion tokens used where 2.2 million unique words are considered and each word vector is expressed using 300 dimensional vector</a:t>
+            </a:r>
+          </a:p>
+          <a:p>
+            <a:pPr marL="0" indent="0">
+              <a:buFontTx/>
+              <a:buNone/>
+            </a:pPr>
+            <a:r>
+              <a:rPr lang="en-US" dirty="0"/>
+              <a:t>Bidirectional LSTM Layer</a:t>
+            </a:r>
+          </a:p>
+          <a:p>
+            <a:pPr marL="171450" indent="-171450">
+              <a:buFontTx/>
+              <a:buChar char="-"/>
+            </a:pPr>
+            <a:r>
+              <a:rPr lang="en-US" dirty="0"/>
+              <a:t>LSTM = long short term memory</a:t>
+            </a:r>
+          </a:p>
+          <a:p>
+            <a:pPr marL="171450" indent="-171450">
+              <a:buFontTx/>
+              <a:buChar char="-"/>
+            </a:pPr>
+            <a:r>
+              <a:rPr lang="en-US" dirty="0"/>
+              <a:t>LSTM is a type of recurrent neural network which is able to learn and handle long term </a:t>
+            </a:r>
+            <a:r>
+              <a:rPr lang="en-US" dirty="0" err="1"/>
+              <a:t>demendencies</a:t>
+            </a:r>
+            <a:r>
+              <a:rPr lang="en-US" dirty="0"/>
+              <a:t> (which corresponds to words far apart in a comment which are related). </a:t>
+            </a:r>
+          </a:p>
+          <a:p>
+            <a:pPr marL="171450" indent="-171450">
+              <a:buFontTx/>
+              <a:buChar char="-"/>
+            </a:pPr>
+            <a:r>
+              <a:rPr lang="en-US" dirty="0"/>
+              <a:t>LSTM is able to see/</a:t>
+            </a:r>
+            <a:r>
+              <a:rPr lang="en-US" dirty="0" err="1"/>
+              <a:t>perserves</a:t>
+            </a:r>
+            <a:r>
+              <a:rPr lang="en-US" dirty="0"/>
+              <a:t> past information since information is run through it for a forward pass</a:t>
+            </a:r>
+          </a:p>
+          <a:p>
+            <a:pPr marL="171450" indent="-171450">
+              <a:buFontTx/>
+              <a:buChar char="-"/>
+            </a:pPr>
+            <a:r>
+              <a:rPr lang="en-US" dirty="0"/>
+              <a:t>Bidirectional LSTM runs the data forward and backward so LSTM units can preserve past and future information to learn context better</a:t>
+            </a:r>
+          </a:p>
+          <a:p>
+            <a:pPr marL="0" indent="0">
+              <a:buFontTx/>
+              <a:buNone/>
+            </a:pPr>
+            <a:r>
+              <a:rPr lang="en-US" dirty="0"/>
+              <a:t>Hidden Dense Layers</a:t>
+            </a:r>
+          </a:p>
+          <a:p>
+            <a:pPr marL="171450" indent="-171450">
+              <a:buFontTx/>
+              <a:buChar char="-"/>
+            </a:pPr>
+            <a:r>
+              <a:rPr lang="en-US" dirty="0"/>
+              <a:t>These layers are just densely connect layers, similar to layers in neural networks/multi layer perception networks</a:t>
+            </a:r>
+          </a:p>
+          <a:p>
+            <a:pPr marL="171450" indent="-171450">
+              <a:buFontTx/>
+              <a:buChar char="-"/>
+            </a:pPr>
+            <a:r>
+              <a:rPr lang="en-US" dirty="0"/>
+              <a:t>Add layers act like skip connections for info before dense layer and </a:t>
+            </a:r>
+            <a:r>
+              <a:rPr lang="en-US" dirty="0" err="1"/>
+              <a:t>ouput</a:t>
+            </a:r>
+            <a:r>
+              <a:rPr lang="en-US" dirty="0"/>
+              <a:t> of dense layer</a:t>
+            </a:r>
+          </a:p>
+          <a:p>
+            <a:pPr marL="0" indent="0">
+              <a:buFontTx/>
+              <a:buNone/>
+            </a:pPr>
+            <a:r>
+              <a:rPr lang="en-US" dirty="0"/>
+              <a:t>Output Layers</a:t>
+            </a:r>
+          </a:p>
+          <a:p>
+            <a:pPr marL="0" indent="0">
+              <a:buFontTx/>
+              <a:buNone/>
+            </a:pPr>
+            <a:r>
+              <a:rPr lang="en-US" dirty="0"/>
+              <a:t>- Output layer has 1 output for predicting if the comment is toxic or not</a:t>
+            </a:r>
+          </a:p>
+          <a:p>
+            <a:pPr marL="171450" indent="-171450">
+              <a:buFontTx/>
+              <a:buChar char="-"/>
+            </a:pPr>
+            <a:r>
+              <a:rPr lang="en-US" dirty="0"/>
+              <a:t>Auxiliary output layer has 6 outputs: target, </a:t>
+            </a:r>
+            <a:r>
+              <a:rPr lang="en-US" dirty="0" err="1"/>
+              <a:t>severe_toxicity</a:t>
+            </a:r>
+            <a:r>
+              <a:rPr lang="en-US" dirty="0"/>
+              <a:t>, obscene, </a:t>
+            </a:r>
+            <a:r>
+              <a:rPr lang="en-US" dirty="0" err="1"/>
+              <a:t>identity_Attack</a:t>
+            </a:r>
+            <a:r>
+              <a:rPr lang="en-US" dirty="0"/>
+              <a:t>, insult, and threat. </a:t>
+            </a:r>
+          </a:p>
+          <a:p>
+            <a:pPr marL="171450" indent="-171450">
+              <a:buFontTx/>
+              <a:buChar char="-"/>
+            </a:pPr>
+            <a:r>
+              <a:rPr lang="en-US" dirty="0"/>
+              <a:t>Aux outputs are not used directly or used to measure performance, but having neural networks/ML/DL models learn multiple outputs that are related can help with prediction accuracy/performance</a:t>
+            </a:r>
+          </a:p>
+          <a:p>
+            <a:endParaRPr lang="en-US" dirty="0"/>
+          </a:p>
+          <a:p>
+            <a:r>
+              <a:rPr lang="en-US" dirty="0"/>
+              <a:t>Dropout – helps with regularization/ prevents overfitting by randomly selecting inputs to drop. Spatial Dropout 1D drops entire feature maps instead.</a:t>
+            </a:r>
+          </a:p>
+          <a:p>
+            <a:endParaRPr lang="en-US" dirty="0"/>
+          </a:p>
+          <a:p>
+            <a:r>
+              <a:rPr lang="en-US" dirty="0"/>
+              <a:t>Pooling – Finds the max and average features over all time steps (</a:t>
+            </a:r>
+            <a:r>
+              <a:rPr lang="en-US" dirty="0" err="1"/>
+              <a:t>ie</a:t>
+            </a:r>
+            <a:r>
+              <a:rPr lang="en-US" dirty="0"/>
+              <a:t> the LSTM layers output a 2D matrix where one dimension is time steps and the other is features, and over the time steps axis the pooling layers find the max and average layer)</a:t>
+            </a:r>
+          </a:p>
+          <a:p>
+            <a:endParaRPr lang="en-US" dirty="0"/>
+          </a:p>
+          <a:p>
+            <a:r>
+              <a:rPr lang="en-US" dirty="0"/>
+              <a:t>Auxiliary outputs</a:t>
+            </a:r>
+          </a:p>
+          <a:p>
+            <a:pPr lvl="1"/>
+            <a:r>
+              <a:rPr lang="en-US" dirty="0"/>
+              <a:t>Looks at more than just comment toxicity</a:t>
+            </a:r>
+          </a:p>
+          <a:p>
+            <a:endParaRPr lang="en-US" dirty="0"/>
+          </a:p>
         </p:txBody>
       </p:sp>
       <p:sp>
@@ -1342,93 +1615,6 @@
     <p:extLst>
       <p:ext uri="{BB962C8B-B14F-4D97-AF65-F5344CB8AC3E}">
         <p14:creationId xmlns:p14="http://schemas.microsoft.com/office/powerpoint/2010/main" val="3424159689"/>
-      </p:ext>
-    </p:extLst>
-  </p:cSld>
-  <p:clrMapOvr>
-    <a:masterClrMapping/>
-  </p:clrMapOvr>
-</p:notes>
-</file>
-
-<file path=ppt/notesSlides/notesSlide17.xml><?xml version="1.0" encoding="utf-8"?>
-<p:notes xmlns:a="http://schemas.openxmlformats.org/drawingml/2006/main" xmlns:r="http://schemas.openxmlformats.org/officeDocument/2006/relationships" xmlns:p="http://schemas.openxmlformats.org/presentationml/2006/main">
-  <p:cSld>
-    <p:spTree>
-      <p:nvGrpSpPr>
-        <p:cNvPr id="1" name=""/>
-        <p:cNvGrpSpPr/>
-        <p:nvPr/>
-      </p:nvGrpSpPr>
-      <p:grpSpPr>
-        <a:xfrm>
-          <a:off x="0" y="0"/>
-          <a:ext cx="0" cy="0"/>
-          <a:chOff x="0" y="0"/>
-          <a:chExt cx="0" cy="0"/>
-        </a:xfrm>
-      </p:grpSpPr>
-      <p:sp>
-        <p:nvSpPr>
-          <p:cNvPr id="2" name="Slide Image Placeholder 1"/>
-          <p:cNvSpPr>
-            <a:spLocks noGrp="1" noRot="1" noChangeAspect="1"/>
-          </p:cNvSpPr>
-          <p:nvPr>
-            <p:ph type="sldImg"/>
-          </p:nvPr>
-        </p:nvSpPr>
-        <p:spPr/>
-      </p:sp>
-      <p:sp>
-        <p:nvSpPr>
-          <p:cNvPr id="3" name="Notes Placeholder 2"/>
-          <p:cNvSpPr>
-            <a:spLocks noGrp="1"/>
-          </p:cNvSpPr>
-          <p:nvPr>
-            <p:ph type="body" idx="1"/>
-          </p:nvPr>
-        </p:nvSpPr>
-        <p:spPr/>
-        <p:txBody>
-          <a:bodyPr/>
-          <a:lstStyle/>
-          <a:p>
-            <a:r>
-              <a:rPr lang="en-US" dirty="0"/>
-              <a:t>Jacob</a:t>
-            </a:r>
-          </a:p>
-        </p:txBody>
-      </p:sp>
-      <p:sp>
-        <p:nvSpPr>
-          <p:cNvPr id="4" name="Slide Number Placeholder 3"/>
-          <p:cNvSpPr>
-            <a:spLocks noGrp="1"/>
-          </p:cNvSpPr>
-          <p:nvPr>
-            <p:ph type="sldNum" sz="quarter" idx="10"/>
-          </p:nvPr>
-        </p:nvSpPr>
-        <p:spPr/>
-        <p:txBody>
-          <a:bodyPr/>
-          <a:lstStyle/>
-          <a:p>
-            <a:fld id="{FF5CDC9F-0281-447B-80BB-A2BA7CFD35CB}" type="slidenum">
-              <a:rPr lang="en-US" smtClean="0"/>
-              <a:t>17</a:t>
-            </a:fld>
-            <a:endParaRPr lang="en-US"/>
-          </a:p>
-        </p:txBody>
-      </p:sp>
-    </p:spTree>
-    <p:extLst>
-      <p:ext uri="{BB962C8B-B14F-4D97-AF65-F5344CB8AC3E}">
-        <p14:creationId xmlns:p14="http://schemas.microsoft.com/office/powerpoint/2010/main" val="695313553"/>
       </p:ext>
     </p:extLst>
   </p:cSld>
@@ -6114,8 +6300,8 @@
         </p:blipFill>
         <p:spPr>
           <a:xfrm>
-            <a:off x="2178940" y="1690688"/>
-            <a:ext cx="7252230" cy="4351338"/>
+            <a:off x="2272200" y="2171700"/>
+            <a:ext cx="7800000" cy="4680000"/>
           </a:xfrm>
         </p:spPr>
       </p:pic>
@@ -6195,8 +6381,8 @@
         </p:blipFill>
         <p:spPr>
           <a:xfrm>
-            <a:off x="3487862" y="2286000"/>
-            <a:ext cx="5368675" cy="3581400"/>
+            <a:off x="2664438" y="2171700"/>
+            <a:ext cx="7015524" cy="4680000"/>
           </a:xfrm>
         </p:spPr>
       </p:pic>
@@ -6252,35 +6438,6 @@
           </a:p>
         </p:txBody>
       </p:sp>
-      <p:sp>
-        <p:nvSpPr>
-          <p:cNvPr id="3" name="Content Placeholder 2"/>
-          <p:cNvSpPr>
-            <a:spLocks noGrp="1"/>
-          </p:cNvSpPr>
-          <p:nvPr>
-            <p:ph idx="1"/>
-          </p:nvPr>
-        </p:nvSpPr>
-        <p:spPr/>
-        <p:txBody>
-          <a:bodyPr/>
-          <a:lstStyle/>
-          <a:p>
-            <a:r>
-              <a:rPr lang="en-US" dirty="0"/>
-              <a:t>Auxiliary outputs</a:t>
-            </a:r>
-          </a:p>
-          <a:p>
-            <a:pPr lvl="1"/>
-            <a:r>
-              <a:rPr lang="en-US" dirty="0"/>
-              <a:t>Looks at more than just comment toxicity</a:t>
-            </a:r>
-          </a:p>
-        </p:txBody>
-      </p:sp>
       <p:pic>
         <p:nvPicPr>
           <p:cNvPr id="15" name="Picture 14">
@@ -6309,7 +6466,7 @@
         </p:blipFill>
         <p:spPr>
           <a:xfrm>
-            <a:off x="1588980" y="1890712"/>
+            <a:off x="1371600" y="1800225"/>
             <a:ext cx="9780196" cy="4371975"/>
           </a:xfrm>
           <a:prstGeom prst="rect">
@@ -6385,20 +6542,20 @@
             <p:ph idx="1"/>
             <p:extLst>
               <p:ext uri="{D42A27DB-BD31-4B8C-83A1-F6EECF244321}">
-                <p14:modId xmlns:p14="http://schemas.microsoft.com/office/powerpoint/2010/main" val="1827059115"/>
+                <p14:modId xmlns:p14="http://schemas.microsoft.com/office/powerpoint/2010/main" val="2223444805"/>
               </p:ext>
             </p:extLst>
           </p:nvPr>
         </p:nvGraphicFramePr>
         <p:xfrm>
-          <a:off x="970200" y="2687320"/>
+          <a:off x="970200" y="3202941"/>
           <a:ext cx="10404000" cy="1483360"/>
         </p:xfrm>
         <a:graphic>
           <a:graphicData uri="http://schemas.openxmlformats.org/drawingml/2006/table">
             <a:tbl>
               <a:tblPr firstRow="1" lastRow="1" bandRow="1">
-                <a:tableStyleId>{3B4B98B0-60AC-42C2-AFA5-B58CD77FA1E5}</a:tableStyleId>
+                <a:tableStyleId>{9D7B26C5-4107-4FEC-AEDC-1716B250A1EF}</a:tableStyleId>
               </a:tblPr>
               <a:tblGrid>
                 <a:gridCol w="1908000">
@@ -6838,10 +6995,15 @@
             <p:ph idx="1"/>
           </p:nvPr>
         </p:nvSpPr>
-        <p:spPr/>
+        <p:spPr>
+          <a:xfrm>
+            <a:off x="1371600" y="2285999"/>
+            <a:ext cx="9601200" cy="4520657"/>
+          </a:xfrm>
+        </p:spPr>
         <p:txBody>
           <a:bodyPr>
-            <a:normAutofit fontScale="70000" lnSpcReduction="20000"/>
+            <a:normAutofit fontScale="92500" lnSpcReduction="20000"/>
           </a:bodyPr>
           <a:lstStyle/>
           <a:p>
@@ -7055,7 +7217,13 @@
       </p:grpSpPr>
       <p:sp>
         <p:nvSpPr>
-          <p:cNvPr id="2" name="Title 1"/>
+          <p:cNvPr id="2" name="Title 1">
+            <a:extLst>
+              <a:ext uri="{FF2B5EF4-FFF2-40B4-BE49-F238E27FC236}">
+                <a16:creationId xmlns:a16="http://schemas.microsoft.com/office/drawing/2014/main" id="{0036828C-84CB-4689-93C5-D706686F1815}"/>
+              </a:ext>
+            </a:extLst>
+          </p:cNvPr>
           <p:cNvSpPr>
             <a:spLocks noGrp="1"/>
           </p:cNvSpPr>
@@ -7069,24 +7237,102 @@
           <a:lstStyle/>
           <a:p>
             <a:r>
-              <a:rPr lang="en-US" dirty="0"/>
+              <a:rPr lang="en-CA" dirty="0"/>
               <a:t>Future Work</a:t>
+            </a:r>
+          </a:p>
+        </p:txBody>
+      </p:sp>
+      <p:sp>
+        <p:nvSpPr>
+          <p:cNvPr id="3" name="Content Placeholder 2">
+            <a:extLst>
+              <a:ext uri="{FF2B5EF4-FFF2-40B4-BE49-F238E27FC236}">
+                <a16:creationId xmlns:a16="http://schemas.microsoft.com/office/drawing/2014/main" id="{5EF57141-07ED-4C45-86E2-D96B060F67F2}"/>
+              </a:ext>
+            </a:extLst>
+          </p:cNvPr>
+          <p:cNvSpPr>
+            <a:spLocks noGrp="1"/>
+          </p:cNvSpPr>
+          <p:nvPr>
+            <p:ph sz="half" idx="1"/>
+          </p:nvPr>
+        </p:nvSpPr>
+        <p:spPr>
+          <a:xfrm>
+            <a:off x="1371600" y="2171700"/>
+            <a:ext cx="4447786" cy="3581401"/>
+          </a:xfrm>
+        </p:spPr>
+        <p:txBody>
+          <a:bodyPr/>
+          <a:lstStyle/>
+          <a:p>
+            <a:r>
+              <a:rPr lang="en-CA" dirty="0"/>
+              <a:t>Feature engineering</a:t>
+            </a:r>
+          </a:p>
+          <a:p>
+            <a:pPr lvl="1"/>
+            <a:r>
+              <a:rPr lang="en-CA" dirty="0"/>
+              <a:t>New features</a:t>
+            </a:r>
+          </a:p>
+          <a:p>
+            <a:r>
+              <a:rPr lang="en-CA" dirty="0"/>
+              <a:t>Data cleaning</a:t>
+            </a:r>
+          </a:p>
+          <a:p>
+            <a:pPr lvl="1"/>
+            <a:r>
+              <a:rPr lang="en-CA" dirty="0"/>
+              <a:t>Contraction mapping</a:t>
+            </a:r>
+          </a:p>
+          <a:p>
+            <a:r>
+              <a:rPr lang="en-CA" dirty="0"/>
+              <a:t>Addressing class imbalance</a:t>
+            </a:r>
+          </a:p>
+          <a:p>
+            <a:r>
+              <a:rPr lang="en-CA" dirty="0"/>
+              <a:t>Performance based on demographic</a:t>
+            </a:r>
+          </a:p>
+          <a:p>
+            <a:pPr lvl="1"/>
+            <a:r>
+              <a:rPr lang="en-CA" dirty="0"/>
+              <a:t>Toxicity and auxiliary outputs</a:t>
             </a:r>
           </a:p>
         </p:txBody>
       </p:sp>
       <p:pic>
         <p:nvPicPr>
-          <p:cNvPr id="4" name="Content Placeholder 3"/>
+          <p:cNvPr id="5" name="Content Placeholder 3">
+            <a:extLst>
+              <a:ext uri="{FF2B5EF4-FFF2-40B4-BE49-F238E27FC236}">
+                <a16:creationId xmlns:a16="http://schemas.microsoft.com/office/drawing/2014/main" id="{7A17F897-95EE-4A03-942F-15715E6F516E}"/>
+              </a:ext>
+            </a:extLst>
+          </p:cNvPr>
           <p:cNvPicPr>
             <a:picLocks noGrp="1" noChangeAspect="1"/>
           </p:cNvPicPr>
           <p:nvPr>
-            <p:ph idx="1"/>
+            <p:ph sz="half" idx="2"/>
           </p:nvPr>
         </p:nvPicPr>
         <p:blipFill>
-          <a:blip r:embed="rId3" cstate="print">
+          <a:blip r:embed="rId2" cstate="print">
             <a:extLst>
               <a:ext uri="{28A0092B-C50C-407E-A947-70E740481C1C}">
                 <a14:useLocalDpi xmlns:a14="http://schemas.microsoft.com/office/drawing/2010/main" val="0"/>
@@ -7099,140 +7345,15 @@
         </p:blipFill>
         <p:spPr>
           <a:xfrm>
-            <a:off x="4622881" y="1690688"/>
-            <a:ext cx="7252229" cy="4351337"/>
+            <a:off x="5894403" y="2072401"/>
+            <a:ext cx="6297597" cy="3780000"/>
           </a:xfrm>
         </p:spPr>
       </p:pic>
-      <p:sp>
-        <p:nvSpPr>
-          <p:cNvPr id="5" name="TextBox 4"/>
-          <p:cNvSpPr txBox="1"/>
-          <p:nvPr/>
-        </p:nvSpPr>
-        <p:spPr>
-          <a:xfrm>
-            <a:off x="897775" y="2069869"/>
-            <a:ext cx="3433156" cy="3970318"/>
-          </a:xfrm>
-          <a:prstGeom prst="rect">
-            <a:avLst/>
-          </a:prstGeom>
-          <a:noFill/>
-        </p:spPr>
-        <p:txBody>
-          <a:bodyPr wrap="square" rtlCol="0">
-            <a:spAutoFit/>
-          </a:bodyPr>
-          <a:lstStyle/>
-          <a:p>
-            <a:pPr marL="285750" indent="-285750">
-              <a:buFont typeface="Arial" panose="020B0604020202020204" pitchFamily="34" charset="0"/>
-              <a:buChar char="•"/>
-            </a:pPr>
-            <a:r>
-              <a:rPr lang="en-US" dirty="0"/>
-              <a:t>Feature Engineering</a:t>
-            </a:r>
-          </a:p>
-          <a:p>
-            <a:pPr marL="742950" lvl="1" indent="-285750">
-              <a:buFont typeface="Arial" panose="020B0604020202020204" pitchFamily="34" charset="0"/>
-              <a:buChar char="•"/>
-            </a:pPr>
-            <a:r>
-              <a:rPr lang="en-US" dirty="0"/>
-              <a:t>New features</a:t>
-            </a:r>
-          </a:p>
-          <a:p>
-            <a:pPr marL="742950" lvl="1" indent="-285750">
-              <a:buFont typeface="Arial" panose="020B0604020202020204" pitchFamily="34" charset="0"/>
-              <a:buChar char="•"/>
-            </a:pPr>
-            <a:endParaRPr lang="en-US" dirty="0"/>
-          </a:p>
-          <a:p>
-            <a:pPr marL="285750" indent="-285750">
-              <a:buFont typeface="Arial" panose="020B0604020202020204" pitchFamily="34" charset="0"/>
-              <a:buChar char="•"/>
-            </a:pPr>
-            <a:r>
-              <a:rPr lang="en-US" dirty="0"/>
-              <a:t>Data cleaning</a:t>
-            </a:r>
-          </a:p>
-          <a:p>
-            <a:pPr marL="742950" lvl="1" indent="-285750">
-              <a:buFont typeface="Arial" panose="020B0604020202020204" pitchFamily="34" charset="0"/>
-              <a:buChar char="•"/>
-            </a:pPr>
-            <a:r>
-              <a:rPr lang="en-US" dirty="0"/>
-              <a:t>Contraction mapping</a:t>
-            </a:r>
-          </a:p>
-          <a:p>
-            <a:pPr lvl="1"/>
-            <a:endParaRPr lang="en-US" dirty="0"/>
-          </a:p>
-          <a:p>
-            <a:pPr marL="285750" indent="-285750">
-              <a:buFont typeface="Arial" panose="020B0604020202020204" pitchFamily="34" charset="0"/>
-              <a:buChar char="•"/>
-            </a:pPr>
-            <a:r>
-              <a:rPr lang="en-US" dirty="0"/>
-              <a:t>Addressing class imbalance</a:t>
-            </a:r>
-          </a:p>
-          <a:p>
-            <a:pPr marL="742950" lvl="1" indent="-285750">
-              <a:buFont typeface="Arial" panose="020B0604020202020204" pitchFamily="34" charset="0"/>
-              <a:buChar char="•"/>
-            </a:pPr>
-            <a:endParaRPr lang="en-US" dirty="0"/>
-          </a:p>
-          <a:p>
-            <a:pPr marL="285750" indent="-285750">
-              <a:buFont typeface="Arial" panose="020B0604020202020204" pitchFamily="34" charset="0"/>
-              <a:buChar char="•"/>
-            </a:pPr>
-            <a:r>
-              <a:rPr lang="en-US" dirty="0"/>
-              <a:t>Performance based on demographic</a:t>
-            </a:r>
-          </a:p>
-          <a:p>
-            <a:pPr marL="742950" lvl="1" indent="-285750">
-              <a:buFont typeface="Arial" panose="020B0604020202020204" pitchFamily="34" charset="0"/>
-              <a:buChar char="•"/>
-            </a:pPr>
-            <a:r>
-              <a:rPr lang="en-US" dirty="0"/>
-              <a:t>Toxicity and auxiliary outputs</a:t>
-            </a:r>
-          </a:p>
-          <a:p>
-            <a:pPr marL="285750" indent="-285750">
-              <a:buFont typeface="Arial" panose="020B0604020202020204" pitchFamily="34" charset="0"/>
-              <a:buChar char="•"/>
-            </a:pPr>
-            <a:endParaRPr lang="en-US" dirty="0"/>
-          </a:p>
-          <a:p>
-            <a:pPr marL="285750" indent="-285750">
-              <a:buFont typeface="Arial" panose="020B0604020202020204" pitchFamily="34" charset="0"/>
-              <a:buChar char="•"/>
-            </a:pPr>
-            <a:endParaRPr lang="en-US" dirty="0"/>
-          </a:p>
-        </p:txBody>
-      </p:sp>
     </p:spTree>
     <p:extLst>
       <p:ext uri="{BB962C8B-B14F-4D97-AF65-F5344CB8AC3E}">
-        <p14:creationId xmlns:p14="http://schemas.microsoft.com/office/powerpoint/2010/main" val="86519822"/>
+        <p14:creationId xmlns:p14="http://schemas.microsoft.com/office/powerpoint/2010/main" val="261310822"/>
       </p:ext>
     </p:extLst>
   </p:cSld>
@@ -7298,7 +7419,7 @@
           <a:p>
             <a:r>
               <a:rPr lang="en-US" dirty="0"/>
-              <a:t>NLP is used in classifying toxic texts</a:t>
+              <a:t>Natural Language Processing (NLP) is used in classifying toxic text</a:t>
             </a:r>
           </a:p>
           <a:p>
@@ -7527,8 +7648,8 @@
         </p:blipFill>
         <p:spPr>
           <a:xfrm>
-            <a:off x="3487862" y="2286000"/>
-            <a:ext cx="5368675" cy="3581400"/>
+            <a:off x="2664437" y="2171700"/>
+            <a:ext cx="7015525" cy="4680000"/>
           </a:xfrm>
         </p:spPr>
       </p:pic>
@@ -7608,8 +7729,8 @@
         </p:blipFill>
         <p:spPr>
           <a:xfrm>
-            <a:off x="3487859" y="2286000"/>
-            <a:ext cx="5368682" cy="3581400"/>
+            <a:off x="2664433" y="2171700"/>
+            <a:ext cx="7015534" cy="4680000"/>
           </a:xfrm>
         </p:spPr>
       </p:pic>

</xml_diff>

<commit_message>
Jacob notes in presentation
</commit_message>
<xml_diff>
--- a/NLP_presentation.pptx
+++ b/NLP_presentation.pptx
@@ -213,7 +213,7 @@
           <a:p>
             <a:fld id="{8F35A468-736C-4859-9661-77158CF12608}" type="datetimeFigureOut">
               <a:rPr lang="en-US" smtClean="0"/>
-              <a:t>11/28/2019</a:t>
+              <a:t>11/29/2019</a:t>
             </a:fld>
             <a:endParaRPr lang="en-US"/>
           </a:p>
@@ -612,9 +612,47 @@
           <a:lstStyle/>
           <a:p>
             <a:r>
-              <a:rPr lang="en-US" dirty="0"/>
+              <a:rPr lang="en-US" dirty="0" smtClean="0"/>
               <a:t>Jacob</a:t>
             </a:r>
+          </a:p>
+          <a:p>
+            <a:endParaRPr lang="en-US" dirty="0" smtClean="0"/>
+          </a:p>
+          <a:p>
+            <a:r>
+              <a:rPr lang="en-US" dirty="0" smtClean="0"/>
+              <a:t>A general trend of increased toxicity over time in all demographics. What does that mean?</a:t>
+            </a:r>
+          </a:p>
+          <a:p>
+            <a:endParaRPr lang="en-US" dirty="0" smtClean="0"/>
+          </a:p>
+          <a:p>
+            <a:r>
+              <a:rPr lang="en-US" dirty="0" smtClean="0"/>
+              <a:t>Are people becoming more toxic? Probably</a:t>
+            </a:r>
+            <a:r>
+              <a:rPr lang="en-US" baseline="0" dirty="0" smtClean="0"/>
+              <a:t> not</a:t>
+            </a:r>
+          </a:p>
+          <a:p>
+            <a:r>
+              <a:rPr lang="en-US" baseline="0" dirty="0" smtClean="0"/>
+              <a:t>It is most likely due to events in news or social media. But this can still cause problems for our model. </a:t>
+            </a:r>
+          </a:p>
+          <a:p>
+            <a:endParaRPr lang="en-US" baseline="0" dirty="0" smtClean="0"/>
+          </a:p>
+          <a:p>
+            <a:r>
+              <a:rPr lang="en-US" baseline="0" dirty="0" smtClean="0"/>
+              <a:t>Unintended bias is something that should be considered when designing and deploying a toxicity classification model.</a:t>
+            </a:r>
+            <a:endParaRPr lang="en-US" dirty="0" smtClean="0"/>
           </a:p>
         </p:txBody>
       </p:sp>
@@ -1582,9 +1620,19 @@
           <a:lstStyle/>
           <a:p>
             <a:r>
-              <a:rPr lang="en-US" dirty="0"/>
+              <a:rPr lang="en-US" dirty="0" smtClean="0"/>
               <a:t>Jacob</a:t>
             </a:r>
+          </a:p>
+          <a:p>
+            <a:endParaRPr lang="en-US" dirty="0" smtClean="0"/>
+          </a:p>
+          <a:p>
+            <a:r>
+              <a:rPr lang="en-US" dirty="0" smtClean="0"/>
+              <a:t>If people can’t agree to what is considered toxic, how can we deploy such a model?</a:t>
+            </a:r>
+            <a:endParaRPr lang="en-US" dirty="0"/>
           </a:p>
         </p:txBody>
       </p:sp>
@@ -1615,6 +1663,219 @@
     <p:extLst>
       <p:ext uri="{BB962C8B-B14F-4D97-AF65-F5344CB8AC3E}">
         <p14:creationId xmlns:p14="http://schemas.microsoft.com/office/powerpoint/2010/main" val="3424159689"/>
+      </p:ext>
+    </p:extLst>
+  </p:cSld>
+  <p:clrMapOvr>
+    <a:masterClrMapping/>
+  </p:clrMapOvr>
+</p:notes>
+</file>
+
+<file path=ppt/notesSlides/notesSlide17.xml><?xml version="1.0" encoding="utf-8"?>
+<p:notes xmlns:a="http://schemas.openxmlformats.org/drawingml/2006/main" xmlns:r="http://schemas.openxmlformats.org/officeDocument/2006/relationships" xmlns:p="http://schemas.openxmlformats.org/presentationml/2006/main">
+  <p:cSld>
+    <p:spTree>
+      <p:nvGrpSpPr>
+        <p:cNvPr id="1" name=""/>
+        <p:cNvGrpSpPr/>
+        <p:nvPr/>
+      </p:nvGrpSpPr>
+      <p:grpSpPr>
+        <a:xfrm>
+          <a:off x="0" y="0"/>
+          <a:ext cx="0" cy="0"/>
+          <a:chOff x="0" y="0"/>
+          <a:chExt cx="0" cy="0"/>
+        </a:xfrm>
+      </p:grpSpPr>
+      <p:sp>
+        <p:nvSpPr>
+          <p:cNvPr id="2" name="Slide Image Placeholder 1"/>
+          <p:cNvSpPr>
+            <a:spLocks noGrp="1" noRot="1" noChangeAspect="1"/>
+          </p:cNvSpPr>
+          <p:nvPr>
+            <p:ph type="sldImg"/>
+          </p:nvPr>
+        </p:nvSpPr>
+        <p:spPr/>
+      </p:sp>
+      <p:sp>
+        <p:nvSpPr>
+          <p:cNvPr id="3" name="Notes Placeholder 2"/>
+          <p:cNvSpPr>
+            <a:spLocks noGrp="1"/>
+          </p:cNvSpPr>
+          <p:nvPr>
+            <p:ph type="body" idx="1"/>
+          </p:nvPr>
+        </p:nvSpPr>
+        <p:spPr/>
+        <p:txBody>
+          <a:bodyPr/>
+          <a:lstStyle/>
+          <a:p>
+            <a:r>
+              <a:rPr lang="en-US" dirty="0" smtClean="0"/>
+              <a:t>Jacob</a:t>
+            </a:r>
+          </a:p>
+          <a:p>
+            <a:endParaRPr lang="en-US" dirty="0" smtClean="0"/>
+          </a:p>
+          <a:p>
+            <a:pPr marL="171450" indent="-171450">
+              <a:buFontTx/>
+              <a:buChar char="-"/>
+            </a:pPr>
+            <a:r>
+              <a:rPr lang="en-US" baseline="0" dirty="0" smtClean="0"/>
+              <a:t>New features generated (length of comment, number of capitals, number of question marks, number of exclamation marks, </a:t>
+            </a:r>
+            <a:r>
+              <a:rPr lang="en-US" baseline="0" dirty="0" err="1" smtClean="0"/>
+              <a:t>etc</a:t>
+            </a:r>
+            <a:r>
+              <a:rPr lang="en-US" baseline="0" dirty="0" smtClean="0"/>
+              <a:t>)</a:t>
+            </a:r>
+          </a:p>
+          <a:p>
+            <a:pPr marL="628650" lvl="1" indent="-171450">
+              <a:buFontTx/>
+              <a:buChar char="-"/>
+            </a:pPr>
+            <a:r>
+              <a:rPr lang="en-US" baseline="0" dirty="0" smtClean="0"/>
+              <a:t>We think those features can help</a:t>
+            </a:r>
+          </a:p>
+          <a:p>
+            <a:pPr marL="628650" lvl="1" indent="-171450">
+              <a:buFontTx/>
+              <a:buChar char="-"/>
+            </a:pPr>
+            <a:r>
+              <a:rPr lang="en-US" baseline="0" dirty="0" smtClean="0"/>
+              <a:t>We calculated the correlation with original features</a:t>
+            </a:r>
+          </a:p>
+          <a:p>
+            <a:pPr marL="628650" lvl="1" indent="-171450">
+              <a:buFontTx/>
+              <a:buChar char="-"/>
+            </a:pPr>
+            <a:endParaRPr lang="en-US" baseline="0" dirty="0" smtClean="0"/>
+          </a:p>
+          <a:p>
+            <a:pPr marL="171450" lvl="0" indent="-171450">
+              <a:buFontTx/>
+              <a:buChar char="-"/>
+            </a:pPr>
+            <a:r>
+              <a:rPr lang="en-US" baseline="0" dirty="0" smtClean="0"/>
+              <a:t>Data cleaning using a contraction map (dictionary of potential spelling mistakes)</a:t>
+            </a:r>
+          </a:p>
+          <a:p>
+            <a:pPr marL="171450" lvl="0" indent="-171450">
+              <a:buFontTx/>
+              <a:buChar char="-"/>
+            </a:pPr>
+            <a:endParaRPr lang="en-US" baseline="0" dirty="0" smtClean="0"/>
+          </a:p>
+          <a:p>
+            <a:pPr marL="171450" lvl="0" indent="-171450">
+              <a:buFontTx/>
+              <a:buChar char="-"/>
+            </a:pPr>
+            <a:r>
+              <a:rPr lang="en-US" baseline="0" dirty="0" smtClean="0"/>
+              <a:t>We must consider class imbalance</a:t>
+            </a:r>
+          </a:p>
+          <a:p>
+            <a:pPr marL="628650" lvl="1" indent="-171450">
+              <a:buFontTx/>
+              <a:buChar char="-"/>
+            </a:pPr>
+            <a:r>
+              <a:rPr lang="en-US" baseline="0" dirty="0" smtClean="0"/>
+              <a:t>Random sampling?</a:t>
+            </a:r>
+          </a:p>
+          <a:p>
+            <a:pPr marL="628650" lvl="1" indent="-171450">
+              <a:buFontTx/>
+              <a:buChar char="-"/>
+            </a:pPr>
+            <a:r>
+              <a:rPr lang="en-US" baseline="0" dirty="0" smtClean="0"/>
+              <a:t>GAN?</a:t>
+            </a:r>
+          </a:p>
+          <a:p>
+            <a:pPr marL="171450" lvl="0" indent="-171450">
+              <a:buFontTx/>
+              <a:buChar char="-"/>
+            </a:pPr>
+            <a:r>
+              <a:rPr lang="en-US" baseline="0" dirty="0" smtClean="0"/>
+              <a:t>We want to evaluate the performance of our model on different demographics.</a:t>
+            </a:r>
+          </a:p>
+          <a:p>
+            <a:pPr marL="628650" lvl="1" indent="-171450">
+              <a:buFontTx/>
+              <a:buChar char="-"/>
+            </a:pPr>
+            <a:r>
+              <a:rPr lang="en-US" baseline="0" dirty="0" smtClean="0"/>
+              <a:t>We also want to train our model on auxiliary outputs such as “funny”, “sad”, “insult”, etc.</a:t>
+            </a:r>
+          </a:p>
+          <a:p>
+            <a:pPr marL="628650" lvl="1" indent="-171450">
+              <a:buFontTx/>
+              <a:buChar char="-"/>
+            </a:pPr>
+            <a:r>
+              <a:rPr lang="en-US" baseline="0" dirty="0" smtClean="0"/>
+              <a:t>We want to see if the model will associate any of these outputs with specific demographic </a:t>
+            </a:r>
+            <a:endParaRPr lang="en-US" dirty="0"/>
+          </a:p>
+        </p:txBody>
+      </p:sp>
+      <p:sp>
+        <p:nvSpPr>
+          <p:cNvPr id="4" name="Slide Number Placeholder 3"/>
+          <p:cNvSpPr>
+            <a:spLocks noGrp="1"/>
+          </p:cNvSpPr>
+          <p:nvPr>
+            <p:ph type="sldNum" sz="quarter" idx="10"/>
+          </p:nvPr>
+        </p:nvSpPr>
+        <p:spPr/>
+        <p:txBody>
+          <a:bodyPr/>
+          <a:lstStyle/>
+          <a:p>
+            <a:fld id="{FF5CDC9F-0281-447B-80BB-A2BA7CFD35CB}" type="slidenum">
+              <a:rPr lang="en-US" smtClean="0"/>
+              <a:t>17</a:t>
+            </a:fld>
+            <a:endParaRPr lang="en-US"/>
+          </a:p>
+        </p:txBody>
+      </p:sp>
+    </p:spTree>
+    <p:extLst>
+      <p:ext uri="{BB962C8B-B14F-4D97-AF65-F5344CB8AC3E}">
+        <p14:creationId xmlns:p14="http://schemas.microsoft.com/office/powerpoint/2010/main" val="630139500"/>
       </p:ext>
     </p:extLst>
   </p:cSld>
@@ -1669,9 +1930,82 @@
           <a:lstStyle/>
           <a:p>
             <a:r>
-              <a:rPr lang="en-US" dirty="0"/>
+              <a:rPr lang="en-US" dirty="0" smtClean="0"/>
               <a:t>Jacob</a:t>
             </a:r>
+          </a:p>
+          <a:p>
+            <a:pPr marL="171450" indent="-171450">
+              <a:buFontTx/>
+              <a:buChar char="-"/>
+            </a:pPr>
+            <a:r>
+              <a:rPr lang="en-US" dirty="0" smtClean="0"/>
+              <a:t>Natural Language Processing is a subfield of artificial intelligence that is used in a variety of applications.</a:t>
+            </a:r>
+          </a:p>
+          <a:p>
+            <a:pPr marL="171450" indent="-171450">
+              <a:buFontTx/>
+              <a:buChar char="-"/>
+            </a:pPr>
+            <a:r>
+              <a:rPr lang="en-US" dirty="0" smtClean="0"/>
+              <a:t>In this presentation, we will be discussing the use of NLP in classifying toxic text.</a:t>
+            </a:r>
+          </a:p>
+          <a:p>
+            <a:pPr marL="171450" indent="-171450">
+              <a:buFontTx/>
+              <a:buChar char="-"/>
+            </a:pPr>
+            <a:endParaRPr lang="en-US" dirty="0" smtClean="0"/>
+          </a:p>
+          <a:p>
+            <a:pPr marL="171450" indent="-171450">
+              <a:buFontTx/>
+              <a:buChar char="-"/>
+            </a:pPr>
+            <a:r>
+              <a:rPr lang="en-US" dirty="0" smtClean="0"/>
+              <a:t>We will be attempting to classify toxic comments using the jigsaw toxicity classification challenge.</a:t>
+            </a:r>
+          </a:p>
+          <a:p>
+            <a:pPr marL="171450" indent="-171450">
+              <a:buFontTx/>
+              <a:buChar char="-"/>
+            </a:pPr>
+            <a:r>
+              <a:rPr lang="en-US" dirty="0" smtClean="0"/>
+              <a:t>Data</a:t>
+            </a:r>
+            <a:r>
+              <a:rPr lang="en-US" baseline="0" dirty="0" smtClean="0"/>
+              <a:t> contains a large sum of comments (~2 million) along with their target (toxicity value) and subtype (threat, insult, identity attack, sexual explicit, etc.)</a:t>
+            </a:r>
+          </a:p>
+          <a:p>
+            <a:pPr marL="171450" indent="-171450">
+              <a:buFontTx/>
+              <a:buChar char="-"/>
+            </a:pPr>
+            <a:endParaRPr lang="en-US" dirty="0" smtClean="0"/>
+          </a:p>
+          <a:p>
+            <a:pPr marL="171450" indent="-171450">
+              <a:buFontTx/>
+              <a:buChar char="-"/>
+            </a:pPr>
+            <a:r>
+              <a:rPr lang="en-US" dirty="0" smtClean="0"/>
+              <a:t>Biggest challenge we faced so</a:t>
+            </a:r>
+            <a:r>
+              <a:rPr lang="en-US" baseline="0" dirty="0" smtClean="0"/>
+              <a:t> far is bias in the data. We will dedicate a large portion of this presentation talking about bias.</a:t>
+            </a:r>
+            <a:endParaRPr lang="en-US" dirty="0"/>
           </a:p>
         </p:txBody>
       </p:sp>
@@ -1756,8 +2090,87 @@
           <a:lstStyle/>
           <a:p>
             <a:r>
-              <a:rPr lang="en-US" dirty="0"/>
+              <a:rPr lang="en-US" dirty="0" smtClean="0"/>
               <a:t>Jacob</a:t>
+            </a:r>
+          </a:p>
+          <a:p>
+            <a:pPr marL="171450" indent="-171450">
+              <a:buFontTx/>
+              <a:buChar char="-"/>
+            </a:pPr>
+            <a:r>
+              <a:rPr lang="en-US" dirty="0" smtClean="0"/>
+              <a:t>One</a:t>
+            </a:r>
+            <a:r>
+              <a:rPr lang="en-US" baseline="0" dirty="0" smtClean="0"/>
+              <a:t> of the main challenges in comment classification is the unintended bias in the data.</a:t>
+            </a:r>
+            <a:endParaRPr lang="en-US" baseline="0" dirty="0"/>
+          </a:p>
+          <a:p>
+            <a:pPr marL="171450" indent="-171450">
+              <a:buFontTx/>
+              <a:buChar char="-"/>
+            </a:pPr>
+            <a:r>
+              <a:rPr lang="en-US" baseline="0" dirty="0" smtClean="0"/>
+              <a:t>Generally, there are words that tend to be used frequently in toxic comments, so machine learning models often associate these words with toxicity.</a:t>
+            </a:r>
+          </a:p>
+          <a:p>
+            <a:pPr marL="628650" lvl="1" indent="-171450">
+              <a:buFontTx/>
+              <a:buChar char="-"/>
+            </a:pPr>
+            <a:r>
+              <a:rPr lang="en-US" baseline="0" dirty="0" smtClean="0"/>
+              <a:t>Example the word “gay”</a:t>
+            </a:r>
+          </a:p>
+          <a:p>
+            <a:pPr marL="628650" lvl="1" indent="-171450">
+              <a:buFontTx/>
+              <a:buChar char="-"/>
+            </a:pPr>
+            <a:endParaRPr lang="en-US" baseline="0" dirty="0" smtClean="0"/>
+          </a:p>
+          <a:p>
+            <a:pPr marL="171450" lvl="0" indent="-171450">
+              <a:buFontTx/>
+              <a:buChar char="-"/>
+            </a:pPr>
+            <a:r>
+              <a:rPr lang="en-US" baseline="0" dirty="0" smtClean="0"/>
+              <a:t>Another challenge within the data is its structure. There are missing fields in the data, there exists spelling and grammar errors in some of the comments, and there is a significant imbalance between the classes.</a:t>
+            </a:r>
+          </a:p>
+          <a:p>
+            <a:pPr marL="171450" lvl="0" indent="-171450">
+              <a:buFontTx/>
+              <a:buChar char="-"/>
+            </a:pPr>
+            <a:r>
+              <a:rPr lang="en-US" baseline="0" dirty="0" smtClean="0"/>
+              <a:t>There are more normal comments that toxic ones.</a:t>
+            </a:r>
+          </a:p>
+          <a:p>
+            <a:pPr marL="171450" lvl="0" indent="-171450">
+              <a:buFontTx/>
+              <a:buChar char="-"/>
+            </a:pPr>
+            <a:endParaRPr lang="en-US" baseline="0" dirty="0" smtClean="0"/>
+          </a:p>
+          <a:p>
+            <a:pPr marL="171450" lvl="0" indent="-171450">
+              <a:buFontTx/>
+              <a:buChar char="-"/>
+            </a:pPr>
+            <a:r>
+              <a:rPr lang="en-US" baseline="0" dirty="0" smtClean="0"/>
+              <a:t>Next, we will discuss the various sources of unintended bias!</a:t>
             </a:r>
           </a:p>
         </p:txBody>
@@ -1843,9 +2256,68 @@
           <a:lstStyle/>
           <a:p>
             <a:r>
-              <a:rPr lang="en-US" dirty="0"/>
+              <a:rPr lang="en-US" dirty="0" smtClean="0"/>
               <a:t>Jacob</a:t>
             </a:r>
+          </a:p>
+          <a:p>
+            <a:pPr marL="171450" indent="-171450">
+              <a:buFontTx/>
+              <a:buChar char="-"/>
+            </a:pPr>
+            <a:r>
+              <a:rPr lang="en-US" dirty="0" smtClean="0"/>
+              <a:t>The</a:t>
+            </a:r>
+            <a:r>
+              <a:rPr lang="en-US" baseline="0" dirty="0" smtClean="0"/>
+              <a:t> first form of unintended bias is bias towards demographics.</a:t>
+            </a:r>
+          </a:p>
+          <a:p>
+            <a:pPr marL="171450" indent="-171450">
+              <a:buFontTx/>
+              <a:buChar char="-"/>
+            </a:pPr>
+            <a:endParaRPr lang="en-US" baseline="0" dirty="0" smtClean="0"/>
+          </a:p>
+          <a:p>
+            <a:pPr marL="171450" indent="-171450">
+              <a:buFontTx/>
+              <a:buChar char="-"/>
+            </a:pPr>
+            <a:r>
+              <a:rPr lang="en-US" baseline="0" dirty="0" smtClean="0"/>
+              <a:t>To investigate this bias, we calculated the average weighted toxicity associated with each demographic.</a:t>
+            </a:r>
+          </a:p>
+          <a:p>
+            <a:pPr marL="171450" indent="-171450">
+              <a:buFontTx/>
+              <a:buChar char="-"/>
+            </a:pPr>
+            <a:endParaRPr lang="en-US" baseline="0" dirty="0" smtClean="0"/>
+          </a:p>
+          <a:p>
+            <a:pPr marL="171450" indent="-171450">
+              <a:buFontTx/>
+              <a:buChar char="-"/>
+            </a:pPr>
+            <a:r>
+              <a:rPr lang="en-US" baseline="0" dirty="0" smtClean="0"/>
+              <a:t>In this dataset, comments associated with “white” and “black” have the highest weighted toxic value.</a:t>
+            </a:r>
+          </a:p>
+          <a:p>
+            <a:pPr marL="628650" lvl="1" indent="-171450">
+              <a:buFontTx/>
+              <a:buChar char="-"/>
+            </a:pPr>
+            <a:r>
+              <a:rPr lang="en-US" baseline="0" dirty="0" smtClean="0"/>
+              <a:t>This can result in the model being biased towards comments who mention white or black</a:t>
+            </a:r>
+            <a:endParaRPr lang="en-US" dirty="0" smtClean="0"/>
           </a:p>
         </p:txBody>
       </p:sp>
@@ -1930,9 +2402,76 @@
           <a:lstStyle/>
           <a:p>
             <a:r>
-              <a:rPr lang="en-US" dirty="0"/>
+              <a:rPr lang="en-US" dirty="0" smtClean="0"/>
               <a:t>Jacob</a:t>
             </a:r>
+          </a:p>
+          <a:p>
+            <a:r>
+              <a:rPr lang="en-US" dirty="0" smtClean="0"/>
+              <a:t>-</a:t>
+            </a:r>
+            <a:r>
+              <a:rPr lang="en-US" baseline="0" dirty="0" smtClean="0"/>
+              <a:t> To dive a little deeper into bias in demographics, we investigated the correlation of each demographic with the labels within the data.</a:t>
+            </a:r>
+          </a:p>
+          <a:p>
+            <a:endParaRPr lang="en-US" baseline="0" dirty="0" smtClean="0"/>
+          </a:p>
+          <a:p>
+            <a:r>
+              <a:rPr lang="en-US" baseline="0" dirty="0" smtClean="0"/>
+              <a:t>As we can see,</a:t>
+            </a:r>
+          </a:p>
+          <a:p>
+            <a:pPr marL="171450" indent="-171450">
+              <a:buFontTx/>
+              <a:buChar char="-"/>
+            </a:pPr>
+            <a:r>
+              <a:rPr lang="en-US" baseline="0" dirty="0" smtClean="0"/>
+              <a:t>Insult is associated the most with white/black</a:t>
+            </a:r>
+          </a:p>
+          <a:p>
+            <a:pPr marL="628650" lvl="1" indent="-171450">
+              <a:buFontTx/>
+              <a:buChar char="-"/>
+            </a:pPr>
+            <a:r>
+              <a:rPr lang="en-US" baseline="0" dirty="0" smtClean="0"/>
+              <a:t>Also associated more with physical and mental illness as well as homosexual</a:t>
+            </a:r>
+          </a:p>
+          <a:p>
+            <a:pPr marL="171450" lvl="0" indent="-171450">
+              <a:buFontTx/>
+              <a:buChar char="-"/>
+            </a:pPr>
+            <a:r>
+              <a:rPr lang="en-US" baseline="0" dirty="0" smtClean="0"/>
+              <a:t>Sexual explicit is associated more with male, female, and homosexual.</a:t>
+            </a:r>
+          </a:p>
+          <a:p>
+            <a:pPr marL="171450" lvl="0" indent="-171450">
+              <a:buFontTx/>
+              <a:buChar char="-"/>
+            </a:pPr>
+            <a:endParaRPr lang="en-US" baseline="0" dirty="0" smtClean="0"/>
+          </a:p>
+          <a:p>
+            <a:pPr marL="0" lvl="0" indent="0">
+              <a:buFontTx/>
+              <a:buNone/>
+            </a:pPr>
+            <a:r>
+              <a:rPr lang="en-US" baseline="0" dirty="0" smtClean="0"/>
+              <a:t>It is worth noting that while there are differences in these correlations, they are of small magnitude.</a:t>
+            </a:r>
+            <a:endParaRPr lang="en-US" dirty="0"/>
           </a:p>
         </p:txBody>
       </p:sp>
@@ -2017,9 +2556,69 @@
           <a:lstStyle/>
           <a:p>
             <a:r>
-              <a:rPr lang="en-US" dirty="0"/>
+              <a:rPr lang="en-US" dirty="0" smtClean="0"/>
               <a:t>Jacob</a:t>
             </a:r>
+          </a:p>
+          <a:p>
+            <a:endParaRPr lang="en-US" dirty="0" smtClean="0"/>
+          </a:p>
+          <a:p>
+            <a:r>
+              <a:rPr lang="en-US" dirty="0" smtClean="0"/>
+              <a:t>Another interesting form of unintended</a:t>
+            </a:r>
+            <a:r>
+              <a:rPr lang="en-US" baseline="0" dirty="0" smtClean="0"/>
+              <a:t> bias is bias with time.</a:t>
+            </a:r>
+          </a:p>
+          <a:p>
+            <a:endParaRPr lang="en-US" baseline="0" dirty="0" smtClean="0"/>
+          </a:p>
+          <a:p>
+            <a:r>
+              <a:rPr lang="en-US" baseline="0" dirty="0" smtClean="0"/>
+              <a:t>We investigated this by computing the weighted toxicity for each demographic over time.</a:t>
+            </a:r>
+          </a:p>
+          <a:p>
+            <a:pPr marL="171450" indent="-171450">
+              <a:buFontTx/>
+              <a:buChar char="-"/>
+            </a:pPr>
+            <a:r>
+              <a:rPr lang="en-US" baseline="0" dirty="0" smtClean="0"/>
+              <a:t>We noticed that there are “peaks” in the graph</a:t>
+            </a:r>
+          </a:p>
+          <a:p>
+            <a:pPr marL="171450" indent="-171450">
+              <a:buFontTx/>
+              <a:buChar char="-"/>
+            </a:pPr>
+            <a:r>
+              <a:rPr lang="en-US" baseline="0" dirty="0" smtClean="0"/>
+              <a:t>Different demographics appear in toxic comments more frequently in specific times.</a:t>
+            </a:r>
+          </a:p>
+          <a:p>
+            <a:pPr marL="171450" indent="-171450">
+              <a:buFontTx/>
+              <a:buChar char="-"/>
+            </a:pPr>
+            <a:endParaRPr lang="en-US" baseline="0" dirty="0" smtClean="0"/>
+          </a:p>
+          <a:p>
+            <a:pPr marL="171450" indent="-171450">
+              <a:buFontTx/>
+              <a:buChar char="-"/>
+            </a:pPr>
+            <a:r>
+              <a:rPr lang="en-US" baseline="0" dirty="0" smtClean="0"/>
+              <a:t>Example: The peak in July for white and black is most likely associated with the white supremacist rally in Charlottesville, Virginia. </a:t>
+            </a:r>
+            <a:endParaRPr lang="en-US" dirty="0"/>
           </a:p>
         </p:txBody>
       </p:sp>
@@ -2104,9 +2703,54 @@
           <a:lstStyle/>
           <a:p>
             <a:r>
-              <a:rPr lang="en-US" dirty="0"/>
+              <a:rPr lang="en-US" dirty="0" smtClean="0"/>
               <a:t>Jacob</a:t>
             </a:r>
+          </a:p>
+          <a:p>
+            <a:endParaRPr lang="en-US" dirty="0" smtClean="0"/>
+          </a:p>
+          <a:p>
+            <a:r>
+              <a:rPr lang="en-US" dirty="0" smtClean="0"/>
+              <a:t>Another example is the peak of toxicity associated with </a:t>
+            </a:r>
+            <a:r>
+              <a:rPr lang="en-US" dirty="0" err="1" smtClean="0"/>
+              <a:t>muslim</a:t>
+            </a:r>
+            <a:r>
+              <a:rPr lang="en-US" dirty="0" smtClean="0"/>
+              <a:t> in Jan 2017.</a:t>
+            </a:r>
+          </a:p>
+          <a:p>
+            <a:pPr marL="171450" indent="-171450">
+              <a:buFontTx/>
+              <a:buChar char="-"/>
+            </a:pPr>
+            <a:r>
+              <a:rPr lang="en-US" baseline="0" dirty="0" smtClean="0"/>
+              <a:t>This was when trump initiated the Muslim ban</a:t>
+            </a:r>
+          </a:p>
+          <a:p>
+            <a:pPr marL="171450" indent="-171450">
+              <a:buFontTx/>
+              <a:buChar char="-"/>
+            </a:pPr>
+            <a:endParaRPr lang="en-US" baseline="0" dirty="0" smtClean="0"/>
+          </a:p>
+          <a:p>
+            <a:pPr marL="0" indent="0">
+              <a:buFontTx/>
+              <a:buNone/>
+            </a:pPr>
+            <a:r>
+              <a:rPr lang="en-US" baseline="0" dirty="0" smtClean="0"/>
+              <a:t>In a lot of cases, we are able to explain these peaks based on events in the news. But unless these news is considered by the model, this bias will cause problems in classifying toxicity.</a:t>
+            </a:r>
+            <a:endParaRPr lang="en-US" dirty="0"/>
           </a:p>
         </p:txBody>
       </p:sp>
@@ -2191,9 +2835,23 @@
           <a:lstStyle/>
           <a:p>
             <a:r>
-              <a:rPr lang="en-US" dirty="0"/>
+              <a:rPr lang="en-US" dirty="0" smtClean="0"/>
               <a:t>Jacob</a:t>
             </a:r>
+          </a:p>
+          <a:p>
+            <a:endParaRPr lang="en-US" dirty="0" smtClean="0"/>
+          </a:p>
+          <a:p>
+            <a:r>
+              <a:rPr lang="en-US" dirty="0" smtClean="0"/>
+              <a:t>We still see an overall increase in toxicity over</a:t>
+            </a:r>
+            <a:r>
+              <a:rPr lang="en-US" baseline="0" dirty="0" smtClean="0"/>
+              <a:t> time</a:t>
+            </a:r>
+            <a:endParaRPr lang="en-US" dirty="0"/>
           </a:p>
         </p:txBody>
       </p:sp>
@@ -2489,7 +3147,7 @@
           <a:p>
             <a:fld id="{0B051DB5-80E6-45BF-93D7-66C1E34B89AA}" type="datetimeFigureOut">
               <a:rPr lang="en-US" smtClean="0"/>
-              <a:t>11/28/2019</a:t>
+              <a:t>11/29/2019</a:t>
             </a:fld>
             <a:endParaRPr lang="en-US"/>
           </a:p>
@@ -2819,7 +3477,7 @@
           <a:p>
             <a:fld id="{0B051DB5-80E6-45BF-93D7-66C1E34B89AA}" type="datetimeFigureOut">
               <a:rPr lang="en-US" smtClean="0"/>
-              <a:t>11/28/2019</a:t>
+              <a:t>11/29/2019</a:t>
             </a:fld>
             <a:endParaRPr lang="en-US"/>
           </a:p>
@@ -2999,7 +3657,7 @@
           <a:p>
             <a:fld id="{0B051DB5-80E6-45BF-93D7-66C1E34B89AA}" type="datetimeFigureOut">
               <a:rPr lang="en-US" smtClean="0"/>
-              <a:t>11/28/2019</a:t>
+              <a:t>11/29/2019</a:t>
             </a:fld>
             <a:endParaRPr lang="en-US"/>
           </a:p>
@@ -3169,7 +3827,7 @@
           <a:p>
             <a:fld id="{0B051DB5-80E6-45BF-93D7-66C1E34B89AA}" type="datetimeFigureOut">
               <a:rPr lang="en-US" smtClean="0"/>
-              <a:t>11/28/2019</a:t>
+              <a:t>11/29/2019</a:t>
             </a:fld>
             <a:endParaRPr lang="en-US"/>
           </a:p>
@@ -3446,7 +4104,7 @@
           <a:p>
             <a:fld id="{0B051DB5-80E6-45BF-93D7-66C1E34B89AA}" type="datetimeFigureOut">
               <a:rPr lang="en-US" smtClean="0"/>
-              <a:t>11/28/2019</a:t>
+              <a:t>11/29/2019</a:t>
             </a:fld>
             <a:endParaRPr lang="en-US"/>
           </a:p>
@@ -3840,7 +4498,7 @@
           <a:p>
             <a:fld id="{0B051DB5-80E6-45BF-93D7-66C1E34B89AA}" type="datetimeFigureOut">
               <a:rPr lang="en-US" smtClean="0"/>
-              <a:t>11/28/2019</a:t>
+              <a:t>11/29/2019</a:t>
             </a:fld>
             <a:endParaRPr lang="en-US"/>
           </a:p>
@@ -4317,7 +4975,7 @@
           <a:p>
             <a:fld id="{0B051DB5-80E6-45BF-93D7-66C1E34B89AA}" type="datetimeFigureOut">
               <a:rPr lang="en-US" smtClean="0"/>
-              <a:t>11/28/2019</a:t>
+              <a:t>11/29/2019</a:t>
             </a:fld>
             <a:endParaRPr lang="en-US"/>
           </a:p>
@@ -4435,7 +5093,7 @@
           <a:p>
             <a:fld id="{0B051DB5-80E6-45BF-93D7-66C1E34B89AA}" type="datetimeFigureOut">
               <a:rPr lang="en-US" smtClean="0"/>
-              <a:t>11/28/2019</a:t>
+              <a:t>11/29/2019</a:t>
             </a:fld>
             <a:endParaRPr lang="en-US"/>
           </a:p>
@@ -4530,7 +5188,7 @@
           <a:p>
             <a:fld id="{0B051DB5-80E6-45BF-93D7-66C1E34B89AA}" type="datetimeFigureOut">
               <a:rPr lang="en-US" smtClean="0"/>
-              <a:t>11/28/2019</a:t>
+              <a:t>11/29/2019</a:t>
             </a:fld>
             <a:endParaRPr lang="en-US"/>
           </a:p>
@@ -4876,7 +5534,7 @@
           <a:p>
             <a:fld id="{0B051DB5-80E6-45BF-93D7-66C1E34B89AA}" type="datetimeFigureOut">
               <a:rPr lang="en-US" smtClean="0"/>
-              <a:t>11/28/2019</a:t>
+              <a:t>11/29/2019</a:t>
             </a:fld>
             <a:endParaRPr lang="en-US"/>
           </a:p>
@@ -5264,7 +5922,7 @@
           <a:p>
             <a:fld id="{0B051DB5-80E6-45BF-93D7-66C1E34B89AA}" type="datetimeFigureOut">
               <a:rPr lang="en-US" smtClean="0"/>
-              <a:t>11/28/2019</a:t>
+              <a:t>11/29/2019</a:t>
             </a:fld>
             <a:endParaRPr lang="en-US"/>
           </a:p>
@@ -5542,7 +6200,7 @@
           <a:p>
             <a:fld id="{0B051DB5-80E6-45BF-93D7-66C1E34B89AA}" type="datetimeFigureOut">
               <a:rPr lang="en-US" smtClean="0"/>
-              <a:t>11/28/2019</a:t>
+              <a:t>11/29/2019</a:t>
             </a:fld>
             <a:endParaRPr lang="en-US"/>
           </a:p>
@@ -7332,7 +7990,7 @@
           </p:nvPr>
         </p:nvPicPr>
         <p:blipFill>
-          <a:blip r:embed="rId2" cstate="print">
+          <a:blip r:embed="rId3" cstate="print">
             <a:extLst>
               <a:ext uri="{28A0092B-C50C-407E-A947-70E740481C1C}">
                 <a14:useLocalDpi xmlns:a14="http://schemas.microsoft.com/office/drawing/2010/main" val="0"/>

</xml_diff>

<commit_message>
Adds some comments for ethical issues.
</commit_message>
<xml_diff>
--- a/NLP_presentation.pptx
+++ b/NLP_presentation.pptx
@@ -612,47 +612,47 @@
           <a:lstStyle/>
           <a:p>
             <a:r>
-              <a:rPr lang="en-US" dirty="0" smtClean="0"/>
+              <a:rPr lang="en-US" dirty="0"/>
               <a:t>Jacob</a:t>
             </a:r>
           </a:p>
           <a:p>
-            <a:endParaRPr lang="en-US" dirty="0" smtClean="0"/>
-          </a:p>
-          <a:p>
-            <a:r>
-              <a:rPr lang="en-US" dirty="0" smtClean="0"/>
+            <a:endParaRPr lang="en-US" dirty="0"/>
+          </a:p>
+          <a:p>
+            <a:r>
+              <a:rPr lang="en-US" dirty="0"/>
               <a:t>A general trend of increased toxicity over time in all demographics. What does that mean?</a:t>
             </a:r>
           </a:p>
           <a:p>
-            <a:endParaRPr lang="en-US" dirty="0" smtClean="0"/>
-          </a:p>
-          <a:p>
-            <a:r>
-              <a:rPr lang="en-US" dirty="0" smtClean="0"/>
+            <a:endParaRPr lang="en-US" dirty="0"/>
+          </a:p>
+          <a:p>
+            <a:r>
+              <a:rPr lang="en-US" dirty="0"/>
               <a:t>Are people becoming more toxic? Probably</a:t>
             </a:r>
             <a:r>
-              <a:rPr lang="en-US" baseline="0" dirty="0" smtClean="0"/>
+              <a:rPr lang="en-US" baseline="0" dirty="0"/>
               <a:t> not</a:t>
             </a:r>
           </a:p>
           <a:p>
             <a:r>
-              <a:rPr lang="en-US" baseline="0" dirty="0" smtClean="0"/>
+              <a:rPr lang="en-US" baseline="0" dirty="0"/>
               <a:t>It is most likely due to events in news or social media. But this can still cause problems for our model. </a:t>
             </a:r>
           </a:p>
           <a:p>
-            <a:endParaRPr lang="en-US" baseline="0" dirty="0" smtClean="0"/>
-          </a:p>
-          <a:p>
-            <a:r>
-              <a:rPr lang="en-US" baseline="0" dirty="0" smtClean="0"/>
+            <a:endParaRPr lang="en-US" baseline="0" dirty="0"/>
+          </a:p>
+          <a:p>
+            <a:r>
+              <a:rPr lang="en-US" baseline="0" dirty="0"/>
               <a:t>Unintended bias is something that should be considered when designing and deploying a toxicity classification model.</a:t>
             </a:r>
-            <a:endParaRPr lang="en-US" dirty="0" smtClean="0"/>
+            <a:endParaRPr lang="en-US" dirty="0"/>
           </a:p>
         </p:txBody>
       </p:sp>
@@ -1537,6 +1537,15 @@
               <a:t>Hannah</a:t>
             </a:r>
           </a:p>
+          <a:p>
+            <a:endParaRPr lang="en-US" dirty="0"/>
+          </a:p>
+          <a:p>
+            <a:r>
+              <a:rPr lang="en-US" dirty="0"/>
+              <a:t>Considering the case where a toxic comment classifier is used in social media to flag or remove toxic comments</a:t>
+            </a:r>
+          </a:p>
         </p:txBody>
       </p:sp>
       <p:sp>
@@ -1620,19 +1629,18 @@
           <a:lstStyle/>
           <a:p>
             <a:r>
-              <a:rPr lang="en-US" dirty="0" smtClean="0"/>
+              <a:rPr lang="en-US" dirty="0"/>
               <a:t>Jacob</a:t>
             </a:r>
           </a:p>
           <a:p>
-            <a:endParaRPr lang="en-US" dirty="0" smtClean="0"/>
-          </a:p>
-          <a:p>
-            <a:r>
-              <a:rPr lang="en-US" dirty="0" smtClean="0"/>
+            <a:endParaRPr lang="en-US" dirty="0"/>
+          </a:p>
+          <a:p>
+            <a:r>
+              <a:rPr lang="en-US" dirty="0"/>
               <a:t>If people can’t agree to what is considered toxic, how can we deploy such a model?</a:t>
             </a:r>
-            <a:endParaRPr lang="en-US" dirty="0"/>
           </a:p>
         </p:txBody>
       </p:sp>
@@ -1717,12 +1725,12 @@
           <a:lstStyle/>
           <a:p>
             <a:r>
-              <a:rPr lang="en-US" dirty="0" smtClean="0"/>
+              <a:rPr lang="en-US" dirty="0"/>
               <a:t>Jacob</a:t>
             </a:r>
           </a:p>
           <a:p>
-            <a:endParaRPr lang="en-US" dirty="0" smtClean="0"/>
+            <a:endParaRPr lang="en-US" dirty="0"/>
           </a:p>
           <a:p>
             <a:pPr marL="171450" indent="-171450">
@@ -1730,15 +1738,15 @@
               <a:buChar char="-"/>
             </a:pPr>
             <a:r>
-              <a:rPr lang="en-US" baseline="0" dirty="0" smtClean="0"/>
+              <a:rPr lang="en-US" baseline="0" dirty="0"/>
               <a:t>New features generated (length of comment, number of capitals, number of question marks, number of exclamation marks, </a:t>
             </a:r>
             <a:r>
-              <a:rPr lang="en-US" baseline="0" dirty="0" err="1" smtClean="0"/>
+              <a:rPr lang="en-US" baseline="0" dirty="0" err="1"/>
               <a:t>etc</a:t>
             </a:r>
             <a:r>
-              <a:rPr lang="en-US" baseline="0" dirty="0" smtClean="0"/>
+              <a:rPr lang="en-US" baseline="0" dirty="0"/>
               <a:t>)</a:t>
             </a:r>
           </a:p>
@@ -1748,7 +1756,7 @@
               <a:buChar char="-"/>
             </a:pPr>
             <a:r>
-              <a:rPr lang="en-US" baseline="0" dirty="0" smtClean="0"/>
+              <a:rPr lang="en-US" baseline="0" dirty="0"/>
               <a:t>We think those features can help</a:t>
             </a:r>
           </a:p>
@@ -1758,7 +1766,7 @@
               <a:buChar char="-"/>
             </a:pPr>
             <a:r>
-              <a:rPr lang="en-US" baseline="0" dirty="0" smtClean="0"/>
+              <a:rPr lang="en-US" baseline="0" dirty="0"/>
               <a:t>We calculated the correlation with original features</a:t>
             </a:r>
           </a:p>
@@ -1767,7 +1775,7 @@
               <a:buFontTx/>
               <a:buChar char="-"/>
             </a:pPr>
-            <a:endParaRPr lang="en-US" baseline="0" dirty="0" smtClean="0"/>
+            <a:endParaRPr lang="en-US" baseline="0" dirty="0"/>
           </a:p>
           <a:p>
             <a:pPr marL="171450" lvl="0" indent="-171450">
@@ -1775,7 +1783,7 @@
               <a:buChar char="-"/>
             </a:pPr>
             <a:r>
-              <a:rPr lang="en-US" baseline="0" dirty="0" smtClean="0"/>
+              <a:rPr lang="en-US" baseline="0" dirty="0"/>
               <a:t>Data cleaning using a contraction map (dictionary of potential spelling mistakes)</a:t>
             </a:r>
           </a:p>
@@ -1784,7 +1792,7 @@
               <a:buFontTx/>
               <a:buChar char="-"/>
             </a:pPr>
-            <a:endParaRPr lang="en-US" baseline="0" dirty="0" smtClean="0"/>
+            <a:endParaRPr lang="en-US" baseline="0" dirty="0"/>
           </a:p>
           <a:p>
             <a:pPr marL="171450" lvl="0" indent="-171450">
@@ -1792,7 +1800,7 @@
               <a:buChar char="-"/>
             </a:pPr>
             <a:r>
-              <a:rPr lang="en-US" baseline="0" dirty="0" smtClean="0"/>
+              <a:rPr lang="en-US" baseline="0" dirty="0"/>
               <a:t>We must consider class imbalance</a:t>
             </a:r>
           </a:p>
@@ -1802,7 +1810,7 @@
               <a:buChar char="-"/>
             </a:pPr>
             <a:r>
-              <a:rPr lang="en-US" baseline="0" dirty="0" smtClean="0"/>
+              <a:rPr lang="en-US" baseline="0" dirty="0"/>
               <a:t>Random sampling?</a:t>
             </a:r>
           </a:p>
@@ -1812,7 +1820,7 @@
               <a:buChar char="-"/>
             </a:pPr>
             <a:r>
-              <a:rPr lang="en-US" baseline="0" dirty="0" smtClean="0"/>
+              <a:rPr lang="en-US" baseline="0" dirty="0"/>
               <a:t>GAN?</a:t>
             </a:r>
           </a:p>
@@ -1822,7 +1830,7 @@
               <a:buChar char="-"/>
             </a:pPr>
             <a:r>
-              <a:rPr lang="en-US" baseline="0" dirty="0" smtClean="0"/>
+              <a:rPr lang="en-US" baseline="0" dirty="0"/>
               <a:t>We want to evaluate the performance of our model on different demographics.</a:t>
             </a:r>
           </a:p>
@@ -1832,7 +1840,7 @@
               <a:buChar char="-"/>
             </a:pPr>
             <a:r>
-              <a:rPr lang="en-US" baseline="0" dirty="0" smtClean="0"/>
+              <a:rPr lang="en-US" baseline="0" dirty="0"/>
               <a:t>We also want to train our model on auxiliary outputs such as “funny”, “sad”, “insult”, etc.</a:t>
             </a:r>
           </a:p>
@@ -1842,7 +1850,7 @@
               <a:buChar char="-"/>
             </a:pPr>
             <a:r>
-              <a:rPr lang="en-US" baseline="0" dirty="0" smtClean="0"/>
+              <a:rPr lang="en-US" baseline="0" dirty="0"/>
               <a:t>We want to see if the model will associate any of these outputs with specific demographic </a:t>
             </a:r>
             <a:endParaRPr lang="en-US" dirty="0"/>
@@ -1930,7 +1938,7 @@
           <a:lstStyle/>
           <a:p>
             <a:r>
-              <a:rPr lang="en-US" dirty="0" smtClean="0"/>
+              <a:rPr lang="en-US" dirty="0"/>
               <a:t>Jacob</a:t>
             </a:r>
           </a:p>
@@ -1940,7 +1948,7 @@
               <a:buChar char="-"/>
             </a:pPr>
             <a:r>
-              <a:rPr lang="en-US" dirty="0" smtClean="0"/>
+              <a:rPr lang="en-US" dirty="0"/>
               <a:t>Natural Language Processing is a subfield of artificial intelligence that is used in a variety of applications.</a:t>
             </a:r>
           </a:p>
@@ -1950,7 +1958,7 @@
               <a:buChar char="-"/>
             </a:pPr>
             <a:r>
-              <a:rPr lang="en-US" dirty="0" smtClean="0"/>
+              <a:rPr lang="en-US" dirty="0"/>
               <a:t>In this presentation, we will be discussing the use of NLP in classifying toxic text.</a:t>
             </a:r>
           </a:p>
@@ -1959,7 +1967,7 @@
               <a:buFontTx/>
               <a:buChar char="-"/>
             </a:pPr>
-            <a:endParaRPr lang="en-US" dirty="0" smtClean="0"/>
+            <a:endParaRPr lang="en-US" dirty="0"/>
           </a:p>
           <a:p>
             <a:pPr marL="171450" indent="-171450">
@@ -1967,7 +1975,7 @@
               <a:buChar char="-"/>
             </a:pPr>
             <a:r>
-              <a:rPr lang="en-US" dirty="0" smtClean="0"/>
+              <a:rPr lang="en-US" dirty="0"/>
               <a:t>We will be attempting to classify toxic comments using the jigsaw toxicity classification challenge.</a:t>
             </a:r>
           </a:p>
@@ -1977,11 +1985,11 @@
               <a:buChar char="-"/>
             </a:pPr>
             <a:r>
-              <a:rPr lang="en-US" dirty="0" smtClean="0"/>
+              <a:rPr lang="en-US" dirty="0"/>
               <a:t>Data</a:t>
             </a:r>
             <a:r>
-              <a:rPr lang="en-US" baseline="0" dirty="0" smtClean="0"/>
+              <a:rPr lang="en-US" baseline="0" dirty="0"/>
               <a:t> contains a large sum of comments (~2 million) along with their target (toxicity value) and subtype (threat, insult, identity attack, sexual explicit, etc.)</a:t>
             </a:r>
           </a:p>
@@ -1990,7 +1998,7 @@
               <a:buFontTx/>
               <a:buChar char="-"/>
             </a:pPr>
-            <a:endParaRPr lang="en-US" dirty="0" smtClean="0"/>
+            <a:endParaRPr lang="en-US" dirty="0"/>
           </a:p>
           <a:p>
             <a:pPr marL="171450" indent="-171450">
@@ -1998,11 +2006,11 @@
               <a:buChar char="-"/>
             </a:pPr>
             <a:r>
-              <a:rPr lang="en-US" dirty="0" smtClean="0"/>
+              <a:rPr lang="en-US" dirty="0"/>
               <a:t>Biggest challenge we faced so</a:t>
             </a:r>
             <a:r>
-              <a:rPr lang="en-US" baseline="0" dirty="0" smtClean="0"/>
+              <a:rPr lang="en-US" baseline="0" dirty="0"/>
               <a:t> far is bias in the data. We will dedicate a large portion of this presentation talking about bias.</a:t>
             </a:r>
             <a:endParaRPr lang="en-US" dirty="0"/>
@@ -2090,7 +2098,7 @@
           <a:lstStyle/>
           <a:p>
             <a:r>
-              <a:rPr lang="en-US" dirty="0" smtClean="0"/>
+              <a:rPr lang="en-US" dirty="0"/>
               <a:t>Jacob</a:t>
             </a:r>
           </a:p>
@@ -2100,14 +2108,13 @@
               <a:buChar char="-"/>
             </a:pPr>
             <a:r>
-              <a:rPr lang="en-US" dirty="0" smtClean="0"/>
+              <a:rPr lang="en-US" dirty="0"/>
               <a:t>One</a:t>
             </a:r>
             <a:r>
-              <a:rPr lang="en-US" baseline="0" dirty="0" smtClean="0"/>
+              <a:rPr lang="en-US" baseline="0" dirty="0"/>
               <a:t> of the main challenges in comment classification is the unintended bias in the data.</a:t>
             </a:r>
-            <a:endParaRPr lang="en-US" baseline="0" dirty="0"/>
           </a:p>
           <a:p>
             <a:pPr marL="171450" indent="-171450">
@@ -2115,7 +2122,7 @@
               <a:buChar char="-"/>
             </a:pPr>
             <a:r>
-              <a:rPr lang="en-US" baseline="0" dirty="0" smtClean="0"/>
+              <a:rPr lang="en-US" baseline="0" dirty="0"/>
               <a:t>Generally, there are words that tend to be used frequently in toxic comments, so machine learning models often associate these words with toxicity.</a:t>
             </a:r>
           </a:p>
@@ -2125,7 +2132,7 @@
               <a:buChar char="-"/>
             </a:pPr>
             <a:r>
-              <a:rPr lang="en-US" baseline="0" dirty="0" smtClean="0"/>
+              <a:rPr lang="en-US" baseline="0" dirty="0"/>
               <a:t>Example the word “gay”</a:t>
             </a:r>
           </a:p>
@@ -2134,7 +2141,7 @@
               <a:buFontTx/>
               <a:buChar char="-"/>
             </a:pPr>
-            <a:endParaRPr lang="en-US" baseline="0" dirty="0" smtClean="0"/>
+            <a:endParaRPr lang="en-US" baseline="0" dirty="0"/>
           </a:p>
           <a:p>
             <a:pPr marL="171450" lvl="0" indent="-171450">
@@ -2142,7 +2149,7 @@
               <a:buChar char="-"/>
             </a:pPr>
             <a:r>
-              <a:rPr lang="en-US" baseline="0" dirty="0" smtClean="0"/>
+              <a:rPr lang="en-US" baseline="0" dirty="0"/>
               <a:t>Another challenge within the data is its structure. There are missing fields in the data, there exists spelling and grammar errors in some of the comments, and there is a significant imbalance between the classes.</a:t>
             </a:r>
           </a:p>
@@ -2152,7 +2159,7 @@
               <a:buChar char="-"/>
             </a:pPr>
             <a:r>
-              <a:rPr lang="en-US" baseline="0" dirty="0" smtClean="0"/>
+              <a:rPr lang="en-US" baseline="0" dirty="0"/>
               <a:t>There are more normal comments that toxic ones.</a:t>
             </a:r>
           </a:p>
@@ -2161,7 +2168,7 @@
               <a:buFontTx/>
               <a:buChar char="-"/>
             </a:pPr>
-            <a:endParaRPr lang="en-US" baseline="0" dirty="0" smtClean="0"/>
+            <a:endParaRPr lang="en-US" baseline="0" dirty="0"/>
           </a:p>
           <a:p>
             <a:pPr marL="171450" lvl="0" indent="-171450">
@@ -2169,7 +2176,7 @@
               <a:buChar char="-"/>
             </a:pPr>
             <a:r>
-              <a:rPr lang="en-US" baseline="0" dirty="0" smtClean="0"/>
+              <a:rPr lang="en-US" baseline="0" dirty="0"/>
               <a:t>Next, we will discuss the various sources of unintended bias!</a:t>
             </a:r>
           </a:p>
@@ -2256,7 +2263,7 @@
           <a:lstStyle/>
           <a:p>
             <a:r>
-              <a:rPr lang="en-US" dirty="0" smtClean="0"/>
+              <a:rPr lang="en-US" dirty="0"/>
               <a:t>Jacob</a:t>
             </a:r>
           </a:p>
@@ -2266,11 +2273,11 @@
               <a:buChar char="-"/>
             </a:pPr>
             <a:r>
-              <a:rPr lang="en-US" dirty="0" smtClean="0"/>
+              <a:rPr lang="en-US" dirty="0"/>
               <a:t>The</a:t>
             </a:r>
             <a:r>
-              <a:rPr lang="en-US" baseline="0" dirty="0" smtClean="0"/>
+              <a:rPr lang="en-US" baseline="0" dirty="0"/>
               <a:t> first form of unintended bias is bias towards demographics.</a:t>
             </a:r>
           </a:p>
@@ -2279,7 +2286,7 @@
               <a:buFontTx/>
               <a:buChar char="-"/>
             </a:pPr>
-            <a:endParaRPr lang="en-US" baseline="0" dirty="0" smtClean="0"/>
+            <a:endParaRPr lang="en-US" baseline="0" dirty="0"/>
           </a:p>
           <a:p>
             <a:pPr marL="171450" indent="-171450">
@@ -2287,7 +2294,7 @@
               <a:buChar char="-"/>
             </a:pPr>
             <a:r>
-              <a:rPr lang="en-US" baseline="0" dirty="0" smtClean="0"/>
+              <a:rPr lang="en-US" baseline="0" dirty="0"/>
               <a:t>To investigate this bias, we calculated the average weighted toxicity associated with each demographic.</a:t>
             </a:r>
           </a:p>
@@ -2296,7 +2303,7 @@
               <a:buFontTx/>
               <a:buChar char="-"/>
             </a:pPr>
-            <a:endParaRPr lang="en-US" baseline="0" dirty="0" smtClean="0"/>
+            <a:endParaRPr lang="en-US" baseline="0" dirty="0"/>
           </a:p>
           <a:p>
             <a:pPr marL="171450" indent="-171450">
@@ -2304,7 +2311,7 @@
               <a:buChar char="-"/>
             </a:pPr>
             <a:r>
-              <a:rPr lang="en-US" baseline="0" dirty="0" smtClean="0"/>
+              <a:rPr lang="en-US" baseline="0" dirty="0"/>
               <a:t>In this dataset, comments associated with “white” and “black” have the highest weighted toxic value.</a:t>
             </a:r>
           </a:p>
@@ -2314,10 +2321,10 @@
               <a:buChar char="-"/>
             </a:pPr>
             <a:r>
-              <a:rPr lang="en-US" baseline="0" dirty="0" smtClean="0"/>
+              <a:rPr lang="en-US" baseline="0" dirty="0"/>
               <a:t>This can result in the model being biased towards comments who mention white or black</a:t>
             </a:r>
-            <a:endParaRPr lang="en-US" dirty="0" smtClean="0"/>
+            <a:endParaRPr lang="en-US" dirty="0"/>
           </a:p>
         </p:txBody>
       </p:sp>
@@ -2402,26 +2409,26 @@
           <a:lstStyle/>
           <a:p>
             <a:r>
-              <a:rPr lang="en-US" dirty="0" smtClean="0"/>
+              <a:rPr lang="en-US" dirty="0"/>
               <a:t>Jacob</a:t>
             </a:r>
           </a:p>
           <a:p>
             <a:r>
-              <a:rPr lang="en-US" dirty="0" smtClean="0"/>
+              <a:rPr lang="en-US" dirty="0"/>
               <a:t>-</a:t>
             </a:r>
             <a:r>
-              <a:rPr lang="en-US" baseline="0" dirty="0" smtClean="0"/>
+              <a:rPr lang="en-US" baseline="0" dirty="0"/>
               <a:t> To dive a little deeper into bias in demographics, we investigated the correlation of each demographic with the labels within the data.</a:t>
             </a:r>
           </a:p>
           <a:p>
-            <a:endParaRPr lang="en-US" baseline="0" dirty="0" smtClean="0"/>
-          </a:p>
-          <a:p>
-            <a:r>
-              <a:rPr lang="en-US" baseline="0" dirty="0" smtClean="0"/>
+            <a:endParaRPr lang="en-US" baseline="0" dirty="0"/>
+          </a:p>
+          <a:p>
+            <a:r>
+              <a:rPr lang="en-US" baseline="0" dirty="0"/>
               <a:t>As we can see,</a:t>
             </a:r>
           </a:p>
@@ -2431,7 +2438,7 @@
               <a:buChar char="-"/>
             </a:pPr>
             <a:r>
-              <a:rPr lang="en-US" baseline="0" dirty="0" smtClean="0"/>
+              <a:rPr lang="en-US" baseline="0" dirty="0"/>
               <a:t>Insult is associated the most with white/black</a:t>
             </a:r>
           </a:p>
@@ -2441,7 +2448,7 @@
               <a:buChar char="-"/>
             </a:pPr>
             <a:r>
-              <a:rPr lang="en-US" baseline="0" dirty="0" smtClean="0"/>
+              <a:rPr lang="en-US" baseline="0" dirty="0"/>
               <a:t>Also associated more with physical and mental illness as well as homosexual</a:t>
             </a:r>
           </a:p>
@@ -2451,7 +2458,7 @@
               <a:buChar char="-"/>
             </a:pPr>
             <a:r>
-              <a:rPr lang="en-US" baseline="0" dirty="0" smtClean="0"/>
+              <a:rPr lang="en-US" baseline="0" dirty="0"/>
               <a:t>Sexual explicit is associated more with male, female, and homosexual.</a:t>
             </a:r>
           </a:p>
@@ -2460,7 +2467,7 @@
               <a:buFontTx/>
               <a:buChar char="-"/>
             </a:pPr>
-            <a:endParaRPr lang="en-US" baseline="0" dirty="0" smtClean="0"/>
+            <a:endParaRPr lang="en-US" baseline="0" dirty="0"/>
           </a:p>
           <a:p>
             <a:pPr marL="0" lvl="0" indent="0">
@@ -2468,7 +2475,7 @@
               <a:buNone/>
             </a:pPr>
             <a:r>
-              <a:rPr lang="en-US" baseline="0" dirty="0" smtClean="0"/>
+              <a:rPr lang="en-US" baseline="0" dirty="0"/>
               <a:t>It is worth noting that while there are differences in these correlations, they are of small magnitude.</a:t>
             </a:r>
             <a:endParaRPr lang="en-US" dirty="0"/>
@@ -2556,29 +2563,29 @@
           <a:lstStyle/>
           <a:p>
             <a:r>
-              <a:rPr lang="en-US" dirty="0" smtClean="0"/>
+              <a:rPr lang="en-US" dirty="0"/>
               <a:t>Jacob</a:t>
             </a:r>
           </a:p>
           <a:p>
-            <a:endParaRPr lang="en-US" dirty="0" smtClean="0"/>
-          </a:p>
-          <a:p>
-            <a:r>
-              <a:rPr lang="en-US" dirty="0" smtClean="0"/>
+            <a:endParaRPr lang="en-US" dirty="0"/>
+          </a:p>
+          <a:p>
+            <a:r>
+              <a:rPr lang="en-US" dirty="0"/>
               <a:t>Another interesting form of unintended</a:t>
             </a:r>
             <a:r>
-              <a:rPr lang="en-US" baseline="0" dirty="0" smtClean="0"/>
+              <a:rPr lang="en-US" baseline="0" dirty="0"/>
               <a:t> bias is bias with time.</a:t>
             </a:r>
           </a:p>
           <a:p>
-            <a:endParaRPr lang="en-US" baseline="0" dirty="0" smtClean="0"/>
-          </a:p>
-          <a:p>
-            <a:r>
-              <a:rPr lang="en-US" baseline="0" dirty="0" smtClean="0"/>
+            <a:endParaRPr lang="en-US" baseline="0" dirty="0"/>
+          </a:p>
+          <a:p>
+            <a:r>
+              <a:rPr lang="en-US" baseline="0" dirty="0"/>
               <a:t>We investigated this by computing the weighted toxicity for each demographic over time.</a:t>
             </a:r>
           </a:p>
@@ -2588,7 +2595,7 @@
               <a:buChar char="-"/>
             </a:pPr>
             <a:r>
-              <a:rPr lang="en-US" baseline="0" dirty="0" smtClean="0"/>
+              <a:rPr lang="en-US" baseline="0" dirty="0"/>
               <a:t>We noticed that there are “peaks” in the graph</a:t>
             </a:r>
           </a:p>
@@ -2598,7 +2605,7 @@
               <a:buChar char="-"/>
             </a:pPr>
             <a:r>
-              <a:rPr lang="en-US" baseline="0" dirty="0" smtClean="0"/>
+              <a:rPr lang="en-US" baseline="0" dirty="0"/>
               <a:t>Different demographics appear in toxic comments more frequently in specific times.</a:t>
             </a:r>
           </a:p>
@@ -2607,7 +2614,7 @@
               <a:buFontTx/>
               <a:buChar char="-"/>
             </a:pPr>
-            <a:endParaRPr lang="en-US" baseline="0" dirty="0" smtClean="0"/>
+            <a:endParaRPr lang="en-US" baseline="0" dirty="0"/>
           </a:p>
           <a:p>
             <a:pPr marL="171450" indent="-171450">
@@ -2615,7 +2622,7 @@
               <a:buChar char="-"/>
             </a:pPr>
             <a:r>
-              <a:rPr lang="en-US" baseline="0" dirty="0" smtClean="0"/>
+              <a:rPr lang="en-US" baseline="0" dirty="0"/>
               <a:t>Example: The peak in July for white and black is most likely associated with the white supremacist rally in Charlottesville, Virginia. </a:t>
             </a:r>
             <a:endParaRPr lang="en-US" dirty="0"/>
@@ -2703,24 +2710,24 @@
           <a:lstStyle/>
           <a:p>
             <a:r>
-              <a:rPr lang="en-US" dirty="0" smtClean="0"/>
+              <a:rPr lang="en-US" dirty="0"/>
               <a:t>Jacob</a:t>
             </a:r>
           </a:p>
           <a:p>
-            <a:endParaRPr lang="en-US" dirty="0" smtClean="0"/>
-          </a:p>
-          <a:p>
-            <a:r>
-              <a:rPr lang="en-US" dirty="0" smtClean="0"/>
+            <a:endParaRPr lang="en-US" dirty="0"/>
+          </a:p>
+          <a:p>
+            <a:r>
+              <a:rPr lang="en-US" dirty="0"/>
               <a:t>Another example is the peak of toxicity associated with </a:t>
             </a:r>
             <a:r>
-              <a:rPr lang="en-US" dirty="0" err="1" smtClean="0"/>
+              <a:rPr lang="en-US" dirty="0" err="1"/>
               <a:t>muslim</a:t>
             </a:r>
             <a:r>
-              <a:rPr lang="en-US" dirty="0" smtClean="0"/>
+              <a:rPr lang="en-US" dirty="0"/>
               <a:t> in Jan 2017.</a:t>
             </a:r>
           </a:p>
@@ -2730,7 +2737,7 @@
               <a:buChar char="-"/>
             </a:pPr>
             <a:r>
-              <a:rPr lang="en-US" baseline="0" dirty="0" smtClean="0"/>
+              <a:rPr lang="en-US" baseline="0" dirty="0"/>
               <a:t>This was when trump initiated the Muslim ban</a:t>
             </a:r>
           </a:p>
@@ -2739,7 +2746,7 @@
               <a:buFontTx/>
               <a:buChar char="-"/>
             </a:pPr>
-            <a:endParaRPr lang="en-US" baseline="0" dirty="0" smtClean="0"/>
+            <a:endParaRPr lang="en-US" baseline="0" dirty="0"/>
           </a:p>
           <a:p>
             <a:pPr marL="0" indent="0">
@@ -2747,7 +2754,7 @@
               <a:buNone/>
             </a:pPr>
             <a:r>
-              <a:rPr lang="en-US" baseline="0" dirty="0" smtClean="0"/>
+              <a:rPr lang="en-US" baseline="0" dirty="0"/>
               <a:t>In a lot of cases, we are able to explain these peaks based on events in the news. But unless these news is considered by the model, this bias will cause problems in classifying toxicity.</a:t>
             </a:r>
             <a:endParaRPr lang="en-US" dirty="0"/>
@@ -2835,20 +2842,20 @@
           <a:lstStyle/>
           <a:p>
             <a:r>
-              <a:rPr lang="en-US" dirty="0" smtClean="0"/>
+              <a:rPr lang="en-US" dirty="0"/>
               <a:t>Jacob</a:t>
             </a:r>
           </a:p>
           <a:p>
-            <a:endParaRPr lang="en-US" dirty="0" smtClean="0"/>
-          </a:p>
-          <a:p>
-            <a:r>
-              <a:rPr lang="en-US" dirty="0" smtClean="0"/>
+            <a:endParaRPr lang="en-US" dirty="0"/>
+          </a:p>
+          <a:p>
+            <a:r>
+              <a:rPr lang="en-US" dirty="0"/>
               <a:t>We still see an overall increase in toxicity over</a:t>
             </a:r>
             <a:r>
-              <a:rPr lang="en-US" baseline="0" dirty="0" smtClean="0"/>
+              <a:rPr lang="en-US" baseline="0" dirty="0"/>
               <a:t> time</a:t>
             </a:r>
             <a:endParaRPr lang="en-US" dirty="0"/>

</xml_diff>